<commit_message>
Added example citations to Powerpoint and renamed the template example file
</commit_message>
<xml_diff>
--- a/Knockout Templating - slides.pptx
+++ b/Knockout Templating - slides.pptx
@@ -7,19 +7,18 @@
   <p:sldIdLst>
     <p:sldId id="256" r:id="rId2"/>
     <p:sldId id="265" r:id="rId3"/>
-    <p:sldId id="258" r:id="rId4"/>
-    <p:sldId id="259" r:id="rId5"/>
-    <p:sldId id="263" r:id="rId6"/>
-    <p:sldId id="260" r:id="rId7"/>
-    <p:sldId id="264" r:id="rId8"/>
-    <p:sldId id="274" r:id="rId9"/>
-    <p:sldId id="267" r:id="rId10"/>
-    <p:sldId id="268" r:id="rId11"/>
-    <p:sldId id="275" r:id="rId12"/>
+    <p:sldId id="259" r:id="rId4"/>
+    <p:sldId id="263" r:id="rId5"/>
+    <p:sldId id="260" r:id="rId6"/>
+    <p:sldId id="264" r:id="rId7"/>
+    <p:sldId id="274" r:id="rId8"/>
+    <p:sldId id="267" r:id="rId9"/>
+    <p:sldId id="268" r:id="rId10"/>
+    <p:sldId id="275" r:id="rId11"/>
+    <p:sldId id="270" r:id="rId12"/>
     <p:sldId id="271" r:id="rId13"/>
-    <p:sldId id="270" r:id="rId14"/>
-    <p:sldId id="272" r:id="rId15"/>
-    <p:sldId id="273" r:id="rId16"/>
+    <p:sldId id="272" r:id="rId14"/>
+    <p:sldId id="273" r:id="rId15"/>
   </p:sldIdLst>
   <p:sldSz cx="9144000" cy="6858000" type="screen4x3"/>
   <p:notesSz cx="6858000" cy="9144000"/>
@@ -3945,348 +3944,76 @@
             <a:spLocks noGrp="1"/>
           </p:cNvSpPr>
           <p:nvPr>
-            <p:ph type="title"/>
-          </p:nvPr>
-        </p:nvSpPr>
-        <p:spPr/>
-        <p:txBody>
-          <a:bodyPr/>
-          <a:lstStyle/>
-          <a:p>
-            <a:pPr marR="0" rtl="0"/>
-            <a:r>
-              <a:rPr lang="en-US" b="1" i="0" u="none" strike="noStrike" baseline="0" dirty="0" err="1" smtClean="0">
-                <a:solidFill>
-                  <a:srgbClr val="345A8A"/>
-                </a:solidFill>
-                <a:latin typeface="Calibri"/>
-                <a:ea typeface="ＭＳ ゴシック"/>
-              </a:rPr>
+            <p:ph type="ctrTitle"/>
+          </p:nvPr>
+        </p:nvSpPr>
+        <p:spPr/>
+        <p:txBody>
+          <a:bodyPr/>
+          <a:lstStyle/>
+          <a:p>
+            <a:r>
+              <a:rPr lang="en-US" sz="3600" dirty="0"/>
+              <a:t> Advanced </a:t>
+            </a:r>
+            <a:r>
+              <a:rPr lang="en-US" sz="3600" dirty="0" err="1"/>
               <a:t>Templating</a:t>
             </a:r>
             <a:r>
-              <a:rPr lang="en-US" b="1" i="0" u="none" strike="noStrike" baseline="0" dirty="0" smtClean="0">
-                <a:solidFill>
-                  <a:srgbClr val="345A8A"/>
-                </a:solidFill>
-                <a:latin typeface="Calibri"/>
-                <a:ea typeface="ＭＳ ゴシック"/>
-              </a:rPr>
-              <a:t> requires </a:t>
-            </a:r>
-            <a:r>
-              <a:rPr lang="en-US" b="1" i="0" u="none" strike="noStrike" baseline="0" dirty="0" smtClean="0">
-                <a:solidFill>
-                  <a:srgbClr val="345A8A"/>
-                </a:solidFill>
-                <a:latin typeface="Calibri"/>
-                <a:ea typeface="ＭＳ ゴシック"/>
-              </a:rPr>
-              <a:t>2 parts</a:t>
-            </a:r>
-          </a:p>
-        </p:txBody>
-      </p:sp>
-      <p:sp>
-        <p:nvSpPr>
-          <p:cNvPr id="3" name="Text Placeholder 2"/>
-          <p:cNvSpPr>
-            <a:spLocks noGrp="1"/>
-          </p:cNvSpPr>
-          <p:nvPr>
-            <p:ph type="body" idx="1"/>
-          </p:nvPr>
-        </p:nvSpPr>
-        <p:spPr/>
-        <p:txBody>
-          <a:bodyPr>
-            <a:normAutofit fontScale="70000" lnSpcReduction="20000"/>
-          </a:bodyPr>
-          <a:lstStyle/>
-          <a:p>
-            <a:pPr lvl="0"/>
-            <a:r>
-              <a:rPr lang="en-US" b="1" i="0" u="none" strike="noStrike" baseline="0" dirty="0" smtClean="0">
-                <a:solidFill>
-                  <a:srgbClr val="4F81BD"/>
-                </a:solidFill>
-                <a:latin typeface="Calibri"/>
-                <a:ea typeface="ＭＳ ゴシック"/>
-              </a:rPr>
-              <a:t>“template” data-</a:t>
-            </a:r>
-            <a:r>
-              <a:rPr lang="en-US" b="1" dirty="0">
-                <a:solidFill>
-                  <a:srgbClr val="4F81BD"/>
-                </a:solidFill>
-                <a:latin typeface="Calibri"/>
-                <a:ea typeface="ＭＳ ゴシック"/>
-              </a:rPr>
-              <a:t>bind ❒</a:t>
-            </a:r>
-            <a:endParaRPr lang="en-US" b="1" i="0" u="none" strike="noStrike" baseline="0" dirty="0" smtClean="0">
-              <a:solidFill>
-                <a:srgbClr val="4F81BD"/>
-              </a:solidFill>
-              <a:latin typeface="Calibri"/>
-              <a:ea typeface="ＭＳ ゴシック"/>
-            </a:endParaRPr>
-          </a:p>
-          <a:p>
-            <a:pPr lvl="0"/>
-            <a:r>
-              <a:rPr lang="en-US" b="1" i="0" u="none" strike="noStrike" baseline="0" dirty="0" smtClean="0">
-                <a:solidFill>
-                  <a:srgbClr val="4F81BD"/>
-                </a:solidFill>
-                <a:latin typeface="Calibri"/>
-                <a:ea typeface="ＭＳ ゴシック"/>
-              </a:rPr>
-              <a:t>A custom script tag that contains your template </a:t>
-            </a:r>
-            <a:r>
-              <a:rPr lang="en-US" b="1" dirty="0">
-                <a:solidFill>
-                  <a:srgbClr val="4F81BD"/>
-                </a:solidFill>
-                <a:latin typeface="Calibri"/>
-                <a:ea typeface="ＭＳ ゴシック"/>
-              </a:rPr>
-              <a:t>content ❒</a:t>
-            </a:r>
-            <a:endParaRPr lang="en-US" b="1" i="0" u="none" strike="noStrike" baseline="0" dirty="0" smtClean="0">
-              <a:solidFill>
-                <a:srgbClr val="4F81BD"/>
-              </a:solidFill>
-              <a:latin typeface="Calibri"/>
-              <a:ea typeface="ＭＳ ゴシック"/>
-            </a:endParaRPr>
-          </a:p>
-          <a:p>
-            <a:pPr marR="0" lvl="1" rtl="0"/>
-            <a:r>
-              <a:rPr lang="en-US" b="1" i="0" u="none" strike="noStrike" baseline="0" dirty="0" smtClean="0">
-                <a:solidFill>
-                  <a:srgbClr val="4F81BD"/>
-                </a:solidFill>
-                <a:latin typeface="Calibri"/>
-                <a:ea typeface="ＭＳ ゴシック"/>
-              </a:rPr>
-              <a:t>Combine this with the ‘</a:t>
-            </a:r>
-            <a:r>
-              <a:rPr lang="en-US" b="1" i="0" u="none" strike="noStrike" baseline="0" dirty="0" err="1" smtClean="0">
-                <a:solidFill>
-                  <a:srgbClr val="4F81BD"/>
-                </a:solidFill>
-                <a:latin typeface="Calibri"/>
-                <a:ea typeface="ＭＳ ゴシック"/>
-              </a:rPr>
-              <a:t>foreach</a:t>
-            </a:r>
-            <a:r>
-              <a:rPr lang="en-US" b="1" i="0" u="none" strike="noStrike" baseline="0" dirty="0" smtClean="0">
-                <a:solidFill>
-                  <a:srgbClr val="4F81BD"/>
-                </a:solidFill>
-                <a:latin typeface="Calibri"/>
-                <a:ea typeface="ＭＳ ゴシック"/>
-              </a:rPr>
-              <a:t>’ property of the template bind and you can render several instances of the same template with different values.</a:t>
-            </a:r>
-          </a:p>
-          <a:p>
-            <a:pPr marR="0" lvl="0" rtl="0"/>
-            <a:r>
-              <a:rPr lang="en-US" b="1" i="0" u="none" strike="noStrike" baseline="0" dirty="0" smtClean="0">
-                <a:solidFill>
-                  <a:srgbClr val="4F81BD"/>
-                </a:solidFill>
-                <a:latin typeface="Calibri"/>
-                <a:ea typeface="ＭＳ ゴシック"/>
-              </a:rPr>
-              <a:t>Adding a template bind is simple:</a:t>
-            </a:r>
-          </a:p>
-          <a:p>
-            <a:pPr marR="0" lvl="1" rtl="0"/>
-            <a:r>
-              <a:rPr lang="en-US" b="1" i="0" u="none" strike="noStrike" baseline="0" dirty="0" smtClean="0">
-                <a:solidFill>
-                  <a:srgbClr val="4F81BD"/>
-                </a:solidFill>
-                <a:latin typeface="Calibri"/>
-                <a:ea typeface="ＭＳ ゴシック"/>
-              </a:rPr>
-              <a:t>At face value this data bind will find your template with the “</a:t>
-            </a:r>
-            <a:r>
-              <a:rPr lang="en-US" b="1" i="0" u="none" strike="noStrike" baseline="0" dirty="0" err="1" smtClean="0">
-                <a:solidFill>
-                  <a:srgbClr val="4F81BD"/>
-                </a:solidFill>
-                <a:latin typeface="Calibri"/>
-                <a:ea typeface="ＭＳ ゴシック"/>
-              </a:rPr>
-              <a:t>myTemplate</a:t>
-            </a:r>
-            <a:r>
-              <a:rPr lang="en-US" b="1" i="0" u="none" strike="noStrike" baseline="0" dirty="0" smtClean="0">
-                <a:solidFill>
-                  <a:srgbClr val="4F81BD"/>
-                </a:solidFill>
-                <a:latin typeface="Calibri"/>
-                <a:ea typeface="ＭＳ ゴシック"/>
-              </a:rPr>
-              <a:t>” name and render it in your display</a:t>
-            </a:r>
-          </a:p>
-          <a:p>
-            <a:pPr marR="0" lvl="1" rtl="0"/>
-            <a:r>
-              <a:rPr lang="en-US" b="1" i="0" u="none" strike="noStrike" baseline="0" dirty="0" smtClean="0">
-                <a:solidFill>
-                  <a:srgbClr val="4F81BD"/>
-                </a:solidFill>
-                <a:latin typeface="Calibri"/>
-                <a:ea typeface="ＭＳ ゴシック"/>
-              </a:rPr>
-              <a:t>If you don’t provide it a context, it will assume the context of the current level in your view </a:t>
-            </a:r>
-            <a:r>
-              <a:rPr lang="en-US" b="1" i="0" u="none" strike="noStrike" baseline="0" dirty="0" smtClean="0">
-                <a:solidFill>
-                  <a:srgbClr val="4F81BD"/>
-                </a:solidFill>
-                <a:latin typeface="Calibri"/>
-                <a:ea typeface="ＭＳ ゴシック"/>
-              </a:rPr>
-              <a:t>model </a:t>
-            </a:r>
-            <a:endParaRPr lang="en-US" b="1" i="0" u="none" strike="noStrike" baseline="0" dirty="0" smtClean="0">
-              <a:solidFill>
-                <a:srgbClr val="4F81BD"/>
-              </a:solidFill>
-              <a:latin typeface="Calibri"/>
-              <a:ea typeface="ＭＳ ゴシック"/>
-            </a:endParaRPr>
-          </a:p>
-          <a:p>
-            <a:pPr lvl="1"/>
-            <a:r>
-              <a:rPr lang="en-US" b="1" i="0" u="none" strike="noStrike" baseline="0" dirty="0" smtClean="0">
-                <a:solidFill>
-                  <a:srgbClr val="4F81BD"/>
-                </a:solidFill>
-                <a:latin typeface="Calibri"/>
-                <a:ea typeface="ＭＳ ゴシック"/>
-              </a:rPr>
-              <a:t>Control the context of your template by supplying a data parameter</a:t>
-            </a:r>
-            <a:r>
-              <a:rPr lang="en-US" b="1" dirty="0">
-                <a:solidFill>
-                  <a:srgbClr val="4F81BD"/>
-                </a:solidFill>
-                <a:latin typeface="Calibri"/>
-                <a:ea typeface="ＭＳ ゴシック"/>
-              </a:rPr>
-              <a:t>: ❒</a:t>
-            </a:r>
-            <a:endParaRPr lang="en-US" b="1" i="0" u="none" strike="noStrike" baseline="0" dirty="0" smtClean="0">
-              <a:solidFill>
-                <a:srgbClr val="4F81BD"/>
-              </a:solidFill>
-              <a:latin typeface="Calibri"/>
-              <a:ea typeface="ＭＳ ゴシック"/>
-            </a:endParaRPr>
-          </a:p>
-          <a:p>
-            <a:pPr marR="0" lvl="2" rtl="0"/>
-            <a:r>
-              <a:rPr lang="en-US" b="1" i="1" u="none" strike="noStrike" baseline="0" dirty="0" smtClean="0">
-                <a:solidFill>
-                  <a:srgbClr val="4F81BD"/>
-                </a:solidFill>
-                <a:latin typeface="Calibri"/>
-                <a:ea typeface="ＭＳ ゴシック"/>
-              </a:rPr>
-              <a:t>Any bindings for this instance of the template will be in context of the specific item instead of the root level view model</a:t>
-            </a:r>
-          </a:p>
-          <a:p>
-            <a:pPr marR="0" lvl="1" rtl="0"/>
-            <a:r>
-              <a:rPr lang="en-US" b="1" i="0" u="none" strike="noStrike" baseline="0" dirty="0" smtClean="0">
-                <a:solidFill>
-                  <a:srgbClr val="4F81BD"/>
-                </a:solidFill>
-                <a:latin typeface="Calibri"/>
-                <a:ea typeface="ＭＳ ゴシック"/>
-              </a:rPr>
-              <a:t>You can iterate over a collection in your data model to repeat the template for each item</a:t>
-            </a:r>
-            <a:r>
-              <a:rPr lang="en-US" b="1" i="0" u="none" strike="noStrike" baseline="0" dirty="0" smtClean="0">
-                <a:solidFill>
-                  <a:srgbClr val="4F81BD"/>
-                </a:solidFill>
-                <a:latin typeface="Calibri"/>
-                <a:ea typeface="ＭＳ ゴシック"/>
-              </a:rPr>
-              <a:t>. </a:t>
-            </a:r>
-            <a:endParaRPr lang="en-US" b="1" i="0" u="none" strike="noStrike" baseline="0" dirty="0" smtClean="0">
-              <a:solidFill>
-                <a:srgbClr val="4F81BD"/>
-              </a:solidFill>
-              <a:latin typeface="Calibri"/>
-              <a:ea typeface="ＭＳ ゴシック"/>
-            </a:endParaRPr>
-          </a:p>
-          <a:p>
-            <a:pPr lvl="2"/>
-            <a:r>
-              <a:rPr lang="en-US" b="1" i="1" u="none" strike="noStrike" baseline="0" dirty="0" smtClean="0">
-                <a:solidFill>
-                  <a:srgbClr val="4F81BD"/>
-                </a:solidFill>
-                <a:latin typeface="Calibri"/>
-                <a:ea typeface="ＭＳ ゴシック"/>
-              </a:rPr>
-              <a:t>This will repeat the template for each item in the ‘guys’ object and also put the template in the context of ‘guys</a:t>
-            </a:r>
-            <a:r>
-              <a:rPr lang="en-US" b="1" i="1" dirty="0">
-                <a:solidFill>
-                  <a:srgbClr val="4F81BD"/>
-                </a:solidFill>
-                <a:latin typeface="Calibri"/>
-                <a:ea typeface="ＭＳ ゴシック"/>
-              </a:rPr>
-              <a:t>’ ❒</a:t>
-            </a:r>
-            <a:endParaRPr lang="en-US" b="1" i="1" u="none" strike="noStrike" baseline="0" dirty="0" smtClean="0">
-              <a:solidFill>
-                <a:srgbClr val="4F81BD"/>
-              </a:solidFill>
-              <a:latin typeface="Calibri"/>
-              <a:ea typeface="ＭＳ ゴシック"/>
-            </a:endParaRPr>
+              <a:rPr lang="en-US" sz="3600" dirty="0"/>
+              <a:t> Techniques</a:t>
+            </a:r>
+          </a:p>
+        </p:txBody>
+      </p:sp>
+      <p:sp>
+        <p:nvSpPr>
+          <p:cNvPr id="3" name="Subtitle 2"/>
+          <p:cNvSpPr>
+            <a:spLocks noGrp="1"/>
+          </p:cNvSpPr>
+          <p:nvPr>
+            <p:ph type="subTitle" idx="1"/>
+          </p:nvPr>
+        </p:nvSpPr>
+        <p:spPr/>
+        <p:txBody>
+          <a:bodyPr/>
+          <a:lstStyle/>
+          <a:p>
+            <a:r>
+              <a:rPr lang="en-US" dirty="0"/>
+              <a:t>Template Nesting, Dynamic </a:t>
+            </a:r>
+            <a:r>
+              <a:rPr lang="en-US" dirty="0" err="1" smtClean="0"/>
+              <a:t>Templating</a:t>
+            </a:r>
+            <a:r>
+              <a:rPr lang="en-US" dirty="0"/>
+              <a:t>, Independent Template Observables &amp; Delayed content updating</a:t>
+            </a:r>
           </a:p>
         </p:txBody>
       </p:sp>
     </p:spTree>
     <p:extLst>
       <p:ext uri="{BB962C8B-B14F-4D97-AF65-F5344CB8AC3E}">
-        <p14:creationId xmlns:p14="http://schemas.microsoft.com/office/powerpoint/2010/main" val="910141512"/>
+        <p14:creationId xmlns:p14="http://schemas.microsoft.com/office/powerpoint/2010/main" val="71867692"/>
       </p:ext>
     </p:extLst>
   </p:cSld>
   <p:clrMapOvr>
     <a:masterClrMapping/>
   </p:clrMapOvr>
+  <p:timing>
+    <p:tnLst>
+      <p:par>
+        <p:cTn xmlns:p14="http://schemas.microsoft.com/office/powerpoint/2010/main" id="1" dur="indefinite" restart="never" nodeType="tmRoot"/>
+      </p:par>
+    </p:tnLst>
+  </p:timing>
 </p:sld>
 </file>
 
@@ -4314,65 +4041,85 @@
             <a:spLocks noGrp="1"/>
           </p:cNvSpPr>
           <p:nvPr>
-            <p:ph type="ctrTitle"/>
-          </p:nvPr>
-        </p:nvSpPr>
-        <p:spPr/>
-        <p:txBody>
-          <a:bodyPr/>
-          <a:lstStyle/>
-          <a:p>
-            <a:r>
-              <a:rPr lang="en-US" sz="3600" dirty="0"/>
-              <a:t> Advanced </a:t>
-            </a:r>
-            <a:r>
-              <a:rPr lang="en-US" sz="3600" dirty="0" err="1"/>
-              <a:t>Templating</a:t>
-            </a:r>
-            <a:r>
-              <a:rPr lang="en-US" sz="3600" dirty="0"/>
-              <a:t> Techniques</a:t>
-            </a:r>
-          </a:p>
-        </p:txBody>
-      </p:sp>
-      <p:sp>
-        <p:nvSpPr>
-          <p:cNvPr id="3" name="Subtitle 2"/>
-          <p:cNvSpPr>
-            <a:spLocks noGrp="1"/>
-          </p:cNvSpPr>
-          <p:nvPr>
-            <p:ph type="subTitle" idx="1"/>
-          </p:nvPr>
-        </p:nvSpPr>
-        <p:spPr/>
-        <p:txBody>
-          <a:bodyPr/>
-          <a:lstStyle/>
-          <a:p>
-            <a:endParaRPr lang="en-US" dirty="0"/>
+            <p:ph type="title"/>
+          </p:nvPr>
+        </p:nvSpPr>
+        <p:spPr/>
+        <p:txBody>
+          <a:bodyPr/>
+          <a:lstStyle/>
+          <a:p>
+            <a:pPr marR="0" rtl="0"/>
+            <a:r>
+              <a:rPr lang="en-US" b="1" i="0" u="none" strike="noStrike" baseline="0" dirty="0" smtClean="0">
+                <a:solidFill>
+                  <a:srgbClr val="345A8A"/>
+                </a:solidFill>
+                <a:latin typeface="Calibri"/>
+                <a:ea typeface="ＭＳ ゴシック"/>
+              </a:rPr>
+              <a:t>Template Nesting</a:t>
+            </a:r>
+          </a:p>
+        </p:txBody>
+      </p:sp>
+      <p:sp>
+        <p:nvSpPr>
+          <p:cNvPr id="3" name="Text Placeholder 2"/>
+          <p:cNvSpPr>
+            <a:spLocks noGrp="1"/>
+          </p:cNvSpPr>
+          <p:nvPr>
+            <p:ph type="body" idx="1"/>
+          </p:nvPr>
+        </p:nvSpPr>
+        <p:spPr/>
+        <p:txBody>
+          <a:bodyPr/>
+          <a:lstStyle/>
+          <a:p>
+            <a:r>
+              <a:rPr lang="en-US" dirty="0" smtClean="0"/>
+              <a:t>You can place templates within other templates to render out complex collections containing collections of </a:t>
+            </a:r>
+            <a:r>
+              <a:rPr lang="en-US" dirty="0"/>
+              <a:t>their own. ❒ </a:t>
+            </a:r>
+            <a:r>
+              <a:rPr lang="en-US" sz="1400" i="1" dirty="0">
+                <a:solidFill>
+                  <a:srgbClr val="A6A6A6"/>
+                </a:solidFill>
+              </a:rPr>
+              <a:t>see </a:t>
+            </a:r>
+            <a:r>
+              <a:rPr lang="en-US" sz="1400" i="1" dirty="0" err="1">
+                <a:solidFill>
+                  <a:srgbClr val="A6A6A6"/>
+                </a:solidFill>
+              </a:rPr>
+              <a:t>templateTechniques.html</a:t>
+            </a:r>
+            <a:endParaRPr lang="en-US" sz="1400" i="1" dirty="0">
+              <a:solidFill>
+                <a:srgbClr val="A6A6A6"/>
+              </a:solidFill>
+            </a:endParaRPr>
           </a:p>
         </p:txBody>
       </p:sp>
     </p:spTree>
     <p:extLst>
       <p:ext uri="{BB962C8B-B14F-4D97-AF65-F5344CB8AC3E}">
-        <p14:creationId xmlns:p14="http://schemas.microsoft.com/office/powerpoint/2010/main" val="71867692"/>
+        <p14:creationId xmlns:p14="http://schemas.microsoft.com/office/powerpoint/2010/main" val="3695262174"/>
       </p:ext>
     </p:extLst>
   </p:cSld>
   <p:clrMapOvr>
     <a:masterClrMapping/>
   </p:clrMapOvr>
-  <p:timing>
-    <p:tnLst>
-      <p:par>
-        <p:cTn xmlns:p14="http://schemas.microsoft.com/office/powerpoint/2010/main" id="1" dur="indefinite" restart="never" nodeType="tmRoot"/>
-      </p:par>
-    </p:tnLst>
-  </p:timing>
 </p:sld>
 </file>
 
@@ -4410,15 +4157,32 @@
           <a:p>
             <a:pPr marR="0" rtl="0"/>
             <a:r>
-              <a:rPr lang="en-US" b="1" i="0" u="none" strike="noStrike" baseline="0" smtClean="0">
+              <a:rPr lang="en-US" b="1" i="0" u="none" strike="noStrike" baseline="0" dirty="0" smtClean="0">
                 <a:solidFill>
                   <a:srgbClr val="345A8A"/>
                 </a:solidFill>
                 <a:latin typeface="Calibri"/>
                 <a:ea typeface="ＭＳ ゴシック"/>
               </a:rPr>
-              <a:t>Dynamic templating</a:t>
-            </a:r>
+              <a:t>Dynamic </a:t>
+            </a:r>
+            <a:r>
+              <a:rPr lang="en-US" b="1" i="0" u="none" strike="noStrike" baseline="0" dirty="0" err="1" smtClean="0">
+                <a:solidFill>
+                  <a:srgbClr val="345A8A"/>
+                </a:solidFill>
+                <a:latin typeface="Calibri"/>
+                <a:ea typeface="ＭＳ ゴシック"/>
+              </a:rPr>
+              <a:t>templating</a:t>
+            </a:r>
+            <a:endParaRPr lang="en-US" b="1" i="0" u="none" strike="noStrike" baseline="0" dirty="0" smtClean="0">
+              <a:solidFill>
+                <a:srgbClr val="345A8A"/>
+              </a:solidFill>
+              <a:latin typeface="Calibri"/>
+              <a:ea typeface="ＭＳ ゴシック"/>
+            </a:endParaRPr>
           </a:p>
         </p:txBody>
       </p:sp>
@@ -4482,8 +4246,44 @@
                 <a:latin typeface="Calibri"/>
                 <a:ea typeface="ＭＳ ゴシック"/>
               </a:rPr>
-              <a:t>. ❒</a:t>
-            </a:r>
+              <a:t>. </a:t>
+            </a:r>
+            <a:r>
+              <a:rPr lang="en-US" b="1" i="1" dirty="0" smtClean="0">
+                <a:solidFill>
+                  <a:srgbClr val="4F81BD"/>
+                </a:solidFill>
+                <a:latin typeface="Calibri"/>
+                <a:ea typeface="ＭＳ ゴシック"/>
+              </a:rPr>
+              <a:t>❒ </a:t>
+            </a:r>
+            <a:r>
+              <a:rPr lang="en-US" sz="1400" i="1" dirty="0">
+                <a:solidFill>
+                  <a:srgbClr val="A6A6A6"/>
+                </a:solidFill>
+              </a:rPr>
+              <a:t>see </a:t>
+            </a:r>
+            <a:r>
+              <a:rPr lang="en-US" sz="1400" i="1" dirty="0" err="1">
+                <a:solidFill>
+                  <a:srgbClr val="A6A6A6"/>
+                </a:solidFill>
+              </a:rPr>
+              <a:t>templateTechniques.html</a:t>
+            </a:r>
+            <a:endParaRPr lang="en-US" sz="1400" i="1" dirty="0">
+              <a:solidFill>
+                <a:srgbClr val="A6A6A6"/>
+              </a:solidFill>
+            </a:endParaRPr>
+          </a:p>
+          <a:p>
+            <a:pPr marL="685800" lvl="2" indent="0">
+              <a:buNone/>
+            </a:pPr>
             <a:endParaRPr lang="en-US" b="1" i="1" u="none" strike="noStrike" baseline="0" dirty="0" smtClean="0">
               <a:solidFill>
                 <a:srgbClr val="4F81BD"/>
@@ -4536,19 +4336,21 @@
         </p:nvSpPr>
         <p:spPr/>
         <p:txBody>
-          <a:bodyPr/>
+          <a:bodyPr>
+            <a:normAutofit fontScale="90000"/>
+          </a:bodyPr>
           <a:lstStyle/>
           <a:p>
             <a:pPr marR="0" rtl="0"/>
             <a:r>
-              <a:rPr lang="en-US" b="1" i="0" u="none" strike="noStrike" baseline="0" smtClean="0">
+              <a:rPr lang="en-US" b="1" i="0" u="none" strike="noStrike" baseline="0" dirty="0" smtClean="0">
                 <a:solidFill>
                   <a:srgbClr val="345A8A"/>
                 </a:solidFill>
                 <a:latin typeface="Calibri"/>
                 <a:ea typeface="ＭＳ ゴシック"/>
               </a:rPr>
-              <a:t>Template Nesting</a:t>
+              <a:t>Independent Template Observables</a:t>
             </a:r>
           </a:p>
         </p:txBody>
@@ -4569,20 +4371,75 @@
           <a:lstStyle/>
           <a:p>
             <a:r>
-              <a:rPr lang="en-US" dirty="0" smtClean="0"/>
-              <a:t>You can place templates within other templates to render out complex collections containing collections of </a:t>
-            </a:r>
-            <a:r>
-              <a:rPr lang="en-US" dirty="0"/>
-              <a:t>their own. ❒</a:t>
-            </a:r>
+              <a:rPr lang="en-US" b="1" i="0" u="none" strike="noStrike" baseline="0" dirty="0" smtClean="0">
+                <a:solidFill>
+                  <a:srgbClr val="4F81BD"/>
+                </a:solidFill>
+                <a:latin typeface="Calibri"/>
+                <a:ea typeface="ＭＳ ゴシック"/>
+              </a:rPr>
+              <a:t>If you iterate over a collection and give each item a commonly named observable to track it’s template, you can change each item’s template independently from each </a:t>
+            </a:r>
+            <a:r>
+              <a:rPr lang="en-US" b="1" dirty="0">
+                <a:solidFill>
+                  <a:srgbClr val="4F81BD"/>
+                </a:solidFill>
+                <a:latin typeface="Calibri"/>
+                <a:ea typeface="ＭＳ ゴシック"/>
+              </a:rPr>
+              <a:t>other </a:t>
+            </a:r>
+            <a:r>
+              <a:rPr lang="en-US" b="1" dirty="0" smtClean="0">
+                <a:solidFill>
+                  <a:srgbClr val="4F81BD"/>
+                </a:solidFill>
+                <a:latin typeface="Calibri"/>
+                <a:ea typeface="ＭＳ ゴシック"/>
+              </a:rPr>
+              <a:t>❒</a:t>
+            </a:r>
+            <a:r>
+              <a:rPr lang="en-US" sz="1400" i="1" dirty="0">
+                <a:solidFill>
+                  <a:srgbClr val="A6A6A6"/>
+                </a:solidFill>
+              </a:rPr>
+              <a:t>see </a:t>
+            </a:r>
+            <a:r>
+              <a:rPr lang="en-US" sz="1400" i="1" dirty="0" err="1">
+                <a:solidFill>
+                  <a:srgbClr val="A6A6A6"/>
+                </a:solidFill>
+              </a:rPr>
+              <a:t>templateTechniques.html</a:t>
+            </a:r>
+            <a:endParaRPr lang="en-US" sz="1400" i="1" dirty="0">
+              <a:solidFill>
+                <a:srgbClr val="A6A6A6"/>
+              </a:solidFill>
+            </a:endParaRPr>
+          </a:p>
+          <a:p>
+            <a:pPr marL="0" lvl="0" indent="0">
+              <a:buNone/>
+            </a:pPr>
+            <a:endParaRPr lang="en-US" b="1" i="0" u="none" strike="noStrike" baseline="0" dirty="0" smtClean="0">
+              <a:solidFill>
+                <a:srgbClr val="4F81BD"/>
+              </a:solidFill>
+              <a:latin typeface="Calibri"/>
+              <a:ea typeface="ＭＳ ゴシック"/>
+            </a:endParaRPr>
           </a:p>
         </p:txBody>
       </p:sp>
     </p:spTree>
     <p:extLst>
       <p:ext uri="{BB962C8B-B14F-4D97-AF65-F5344CB8AC3E}">
-        <p14:creationId xmlns:p14="http://schemas.microsoft.com/office/powerpoint/2010/main" val="3695262174"/>
+        <p14:creationId xmlns:p14="http://schemas.microsoft.com/office/powerpoint/2010/main" val="3733725666"/>
       </p:ext>
     </p:extLst>
   </p:cSld>
@@ -4621,40 +4478,45 @@
         </p:nvSpPr>
         <p:spPr/>
         <p:txBody>
+          <a:bodyPr/>
+          <a:lstStyle/>
+          <a:p>
+            <a:pPr marR="0" rtl="0"/>
+            <a:r>
+              <a:rPr lang="en-US" b="1" i="0" u="none" strike="noStrike" baseline="0" dirty="0" smtClean="0">
+                <a:solidFill>
+                  <a:srgbClr val="345A8A"/>
+                </a:solidFill>
+                <a:latin typeface="Calibri"/>
+                <a:ea typeface="ＭＳ ゴシック"/>
+              </a:rPr>
+              <a:t>Delayed content updating</a:t>
+            </a:r>
+          </a:p>
+        </p:txBody>
+      </p:sp>
+      <p:sp>
+        <p:nvSpPr>
+          <p:cNvPr id="3" name="Text Placeholder 2"/>
+          <p:cNvSpPr>
+            <a:spLocks noGrp="1"/>
+          </p:cNvSpPr>
+          <p:nvPr>
+            <p:ph type="body" idx="1"/>
+          </p:nvPr>
+        </p:nvSpPr>
+        <p:spPr>
+          <a:xfrm>
+            <a:off x="549275" y="1600200"/>
+            <a:ext cx="8042276" cy="5043375"/>
+          </a:xfrm>
+        </p:spPr>
+        <p:txBody>
           <a:bodyPr>
-            <a:normAutofit fontScale="90000"/>
+            <a:normAutofit fontScale="62500" lnSpcReduction="20000"/>
           </a:bodyPr>
           <a:lstStyle/>
           <a:p>
-            <a:pPr marR="0" rtl="0"/>
-            <a:r>
-              <a:rPr lang="en-US" b="1" i="0" u="none" strike="noStrike" baseline="0" smtClean="0">
-                <a:solidFill>
-                  <a:srgbClr val="345A8A"/>
-                </a:solidFill>
-                <a:latin typeface="Calibri"/>
-                <a:ea typeface="ＭＳ ゴシック"/>
-              </a:rPr>
-              <a:t>Independent Template Observables</a:t>
-            </a:r>
-          </a:p>
-        </p:txBody>
-      </p:sp>
-      <p:sp>
-        <p:nvSpPr>
-          <p:cNvPr id="3" name="Text Placeholder 2"/>
-          <p:cNvSpPr>
-            <a:spLocks noGrp="1"/>
-          </p:cNvSpPr>
-          <p:nvPr>
-            <p:ph type="body" idx="1"/>
-          </p:nvPr>
-        </p:nvSpPr>
-        <p:spPr/>
-        <p:txBody>
-          <a:bodyPr/>
-          <a:lstStyle/>
-          <a:p>
             <a:pPr lvl="0"/>
             <a:r>
               <a:rPr lang="en-US" b="1" i="0" u="none" strike="noStrike" baseline="0" dirty="0" smtClean="0">
@@ -4664,7 +4526,7 @@
                 <a:latin typeface="Calibri"/>
                 <a:ea typeface="ＭＳ ゴシック"/>
               </a:rPr>
-              <a:t>If you iterate over a collection and give each item a commonly named observable to track it’s template, you can change each item’s template independently from each </a:t>
+              <a:t>Expanding </a:t>
             </a:r>
             <a:r>
               <a:rPr lang="en-US" b="1" dirty="0">
@@ -4674,7 +4536,27 @@
                 <a:latin typeface="Calibri"/>
                 <a:ea typeface="ＭＳ ゴシック"/>
               </a:rPr>
-              <a:t>other ❒</a:t>
+              <a:t>on the Independent Template </a:t>
+            </a:r>
+            <a:r>
+              <a:rPr lang="en-US" b="1" dirty="0" smtClean="0">
+                <a:solidFill>
+                  <a:srgbClr val="4F81BD"/>
+                </a:solidFill>
+                <a:latin typeface="Calibri"/>
+                <a:ea typeface="ＭＳ ゴシック"/>
+              </a:rPr>
+              <a:t>Observables example, you can use this to improve KO performance with </a:t>
+            </a:r>
+            <a:r>
+              <a:rPr lang="en-US" b="1" smtClean="0">
+                <a:solidFill>
+                  <a:srgbClr val="4F81BD"/>
+                </a:solidFill>
+                <a:latin typeface="Calibri"/>
+                <a:ea typeface="ＭＳ ゴシック"/>
+              </a:rPr>
+              <a:t>large data sets</a:t>
             </a:r>
             <a:endParaRPr lang="en-US" b="1" i="0" u="none" strike="noStrike" baseline="0" dirty="0" smtClean="0">
               <a:solidFill>
@@ -4684,301 +4566,281 @@
               <a:ea typeface="ＭＳ ゴシック"/>
             </a:endParaRPr>
           </a:p>
-        </p:txBody>
-      </p:sp>
-    </p:spTree>
-    <p:extLst>
-      <p:ext uri="{BB962C8B-B14F-4D97-AF65-F5344CB8AC3E}">
-        <p14:creationId xmlns:p14="http://schemas.microsoft.com/office/powerpoint/2010/main" val="3733725666"/>
-      </p:ext>
-    </p:extLst>
-  </p:cSld>
-  <p:clrMapOvr>
-    <a:masterClrMapping/>
-  </p:clrMapOvr>
-</p:sld>
-</file>
-
-<file path=ppt/slides/slide15.xml><?xml version="1.0" encoding="utf-8"?>
-<p:sld xmlns:a="http://schemas.openxmlformats.org/drawingml/2006/main" xmlns:r="http://schemas.openxmlformats.org/officeDocument/2006/relationships" xmlns:p="http://schemas.openxmlformats.org/presentationml/2006/main">
-  <p:cSld>
-    <p:spTree>
-      <p:nvGrpSpPr>
-        <p:cNvPr id="1" name=""/>
-        <p:cNvGrpSpPr/>
-        <p:nvPr/>
-      </p:nvGrpSpPr>
-      <p:grpSpPr>
-        <a:xfrm>
-          <a:off x="0" y="0"/>
-          <a:ext cx="0" cy="0"/>
-          <a:chOff x="0" y="0"/>
-          <a:chExt cx="0" cy="0"/>
-        </a:xfrm>
-      </p:grpSpPr>
-      <p:sp>
-        <p:nvSpPr>
-          <p:cNvPr id="2" name="Title 1"/>
-          <p:cNvSpPr>
-            <a:spLocks noGrp="1"/>
-          </p:cNvSpPr>
-          <p:nvPr>
-            <p:ph type="title"/>
-          </p:nvPr>
-        </p:nvSpPr>
-        <p:spPr/>
-        <p:txBody>
-          <a:bodyPr/>
-          <a:lstStyle/>
-          <a:p>
-            <a:pPr marR="0" rtl="0"/>
-            <a:r>
-              <a:rPr lang="en-US" b="1" i="0" u="none" strike="noStrike" baseline="0" smtClean="0">
-                <a:solidFill>
-                  <a:srgbClr val="345A8A"/>
-                </a:solidFill>
-                <a:latin typeface="Calibri"/>
-                <a:ea typeface="ＭＳ ゴシック"/>
-              </a:rPr>
-              <a:t>Delayed content updating</a:t>
-            </a:r>
-          </a:p>
-        </p:txBody>
-      </p:sp>
-      <p:sp>
-        <p:nvSpPr>
-          <p:cNvPr id="3" name="Text Placeholder 2"/>
-          <p:cNvSpPr>
-            <a:spLocks noGrp="1"/>
-          </p:cNvSpPr>
-          <p:nvPr>
-            <p:ph type="body" idx="1"/>
-          </p:nvPr>
-        </p:nvSpPr>
-        <p:spPr/>
-        <p:txBody>
-          <a:bodyPr>
-            <a:normAutofit fontScale="47500" lnSpcReduction="20000"/>
-          </a:bodyPr>
-          <a:lstStyle/>
-          <a:p>
-            <a:pPr marR="0" lvl="0" rtl="0"/>
-            <a:r>
-              <a:rPr lang="en-US" b="1" i="0" u="none" strike="noStrike" baseline="0" smtClean="0">
+          <a:p>
+            <a:pPr marR="0" lvl="1" rtl="0"/>
+            <a:r>
+              <a:rPr lang="en-US" b="1" i="0" u="none" strike="noStrike" baseline="0" dirty="0" smtClean="0">
                 <a:solidFill>
                   <a:srgbClr val="4F81BD"/>
                 </a:solidFill>
                 <a:latin typeface="Calibri"/>
                 <a:ea typeface="ＭＳ ゴシック"/>
               </a:rPr>
-              <a:t>Just as you can set a single observable in your view model to change sections of content out dynamically, you can also make it more modular with several instances of a child view model and multiple versions of the same observable</a:t>
-            </a:r>
-          </a:p>
-          <a:p>
-            <a:pPr marR="0" lvl="1" rtl="0"/>
-            <a:r>
-              <a:rPr lang="en-US" b="1" i="0" u="none" strike="noStrike" baseline="0" smtClean="0">
+              <a:t>Why would you need to do this?</a:t>
+            </a:r>
+          </a:p>
+          <a:p>
+            <a:pPr marR="0" lvl="2" rtl="0"/>
+            <a:r>
+              <a:rPr lang="en-US" b="1" i="1" u="none" strike="noStrike" baseline="0" dirty="0" smtClean="0">
                 <a:solidFill>
                   <a:srgbClr val="4F81BD"/>
                 </a:solidFill>
                 <a:latin typeface="Calibri"/>
                 <a:ea typeface="ＭＳ ゴシック"/>
               </a:rPr>
-              <a:t>Why would you need to do this?</a:t>
+              <a:t>Say you are using Knockout and you have to deal with a very large data set. Knockout </a:t>
+            </a:r>
+            <a:r>
+              <a:rPr lang="en-US" b="1" i="1" u="none" strike="noStrike" baseline="0" dirty="0" err="1" smtClean="0">
+                <a:solidFill>
+                  <a:srgbClr val="4F81BD"/>
+                </a:solidFill>
+                <a:latin typeface="Calibri"/>
+                <a:ea typeface="ＭＳ ゴシック"/>
+              </a:rPr>
+              <a:t>templating</a:t>
+            </a:r>
+            <a:r>
+              <a:rPr lang="en-US" b="1" i="1" u="none" strike="noStrike" baseline="0" dirty="0" smtClean="0">
+                <a:solidFill>
+                  <a:srgbClr val="4F81BD"/>
+                </a:solidFill>
+                <a:latin typeface="Calibri"/>
+                <a:ea typeface="ＭＳ ゴシック"/>
+              </a:rPr>
+              <a:t> is great for minimizing markup and tracking the state of your model, but every system has its limitations.</a:t>
+            </a:r>
+          </a:p>
+          <a:p>
+            <a:pPr marR="0" lvl="3" rtl="0"/>
+            <a:r>
+              <a:rPr lang="en-US" b="0" i="0" u="none" strike="noStrike" baseline="0" dirty="0" smtClean="0">
+                <a:solidFill>
+                  <a:srgbClr val="243F60"/>
+                </a:solidFill>
+                <a:latin typeface="Calibri"/>
+                <a:ea typeface="ＭＳ ゴシック"/>
+              </a:rPr>
+              <a:t>So for example, say your large data-set is divided into 30+ categories, and within each of those are a dozen sub-categories, and inside each of those are several dozen database records</a:t>
+            </a:r>
+          </a:p>
+          <a:p>
+            <a:pPr marR="0" lvl="3" rtl="0"/>
+            <a:r>
+              <a:rPr lang="en-US" b="0" i="0" u="none" strike="noStrike" baseline="0" dirty="0" smtClean="0">
+                <a:solidFill>
+                  <a:srgbClr val="243F60"/>
+                </a:solidFill>
+                <a:latin typeface="Calibri"/>
+                <a:ea typeface="ＭＳ ゴシック"/>
+              </a:rPr>
+              <a:t>If each of those levels in your data uses its own template and set of observables, loading all of that markup into your DOM at the same time can drastically affect performance</a:t>
             </a:r>
           </a:p>
           <a:p>
             <a:pPr marR="0" lvl="2" rtl="0"/>
             <a:r>
-              <a:rPr lang="en-US" b="1" i="1" u="none" strike="noStrike" baseline="0" smtClean="0">
+              <a:rPr lang="en-US" b="1" i="1" u="none" strike="noStrike" baseline="0" dirty="0" smtClean="0">
                 <a:solidFill>
                   <a:srgbClr val="4F81BD"/>
                 </a:solidFill>
                 <a:latin typeface="Calibri"/>
                 <a:ea typeface="ＭＳ ゴシック"/>
               </a:rPr>
-              <a:t>Say you are using Knockout and you have to deal with a very large data set. Knockout templating is great for minimizing markup and tracking the state of your model, but every system has its limitations.</a:t>
+              <a:t>How can you work around this?</a:t>
             </a:r>
           </a:p>
           <a:p>
             <a:pPr marR="0" lvl="3" rtl="0"/>
             <a:r>
-              <a:rPr lang="en-US" b="0" i="0" u="none" strike="noStrike" baseline="0" smtClean="0">
+              <a:rPr lang="en-US" b="0" i="0" u="none" strike="noStrike" baseline="0" dirty="0" smtClean="0">
                 <a:solidFill>
                   <a:srgbClr val="243F60"/>
                 </a:solidFill>
                 <a:latin typeface="Calibri"/>
                 <a:ea typeface="ＭＳ ゴシック"/>
               </a:rPr>
-              <a:t>So for example, say your large data-set is divided into 30+ categories, and within each of those are a dozen sub-categories, and inside each of those are several dozen database records</a:t>
+              <a:t>Deferred content updating</a:t>
+            </a:r>
+          </a:p>
+          <a:p>
+            <a:pPr marR="0" lvl="4" rtl="0"/>
+            <a:r>
+              <a:rPr lang="en-US" b="0" i="1" u="none" strike="noStrike" baseline="0" dirty="0" smtClean="0">
+                <a:solidFill>
+                  <a:srgbClr val="243F60"/>
+                </a:solidFill>
+                <a:latin typeface="Calibri"/>
+                <a:ea typeface="ＭＳ ゴシック"/>
+              </a:rPr>
+              <a:t>In this example, every top level category in the data is represented by a header that functions as an accordion</a:t>
+            </a:r>
+          </a:p>
+          <a:p>
+            <a:pPr marR="0" lvl="4" rtl="0"/>
+            <a:r>
+              <a:rPr lang="en-US" b="0" i="1" u="none" strike="noStrike" baseline="0" dirty="0" smtClean="0">
+                <a:solidFill>
+                  <a:srgbClr val="243F60"/>
+                </a:solidFill>
+                <a:latin typeface="Calibri"/>
+                <a:ea typeface="ＭＳ ゴシック"/>
+              </a:rPr>
+              <a:t>Since the initial state of this template is the header with the accordion collapsed, you can put off displaying all the subsequent data in the DOM until it’s actually needed.</a:t>
+            </a:r>
+          </a:p>
+          <a:p>
+            <a:pPr marR="0" lvl="5" rtl="0"/>
+            <a:r>
+              <a:rPr lang="en-US" b="0" i="1" u="none" strike="noStrike" baseline="0" dirty="0" smtClean="0">
+                <a:solidFill>
+                  <a:srgbClr val="404040"/>
+                </a:solidFill>
+                <a:latin typeface="Calibri"/>
+                <a:ea typeface="ＭＳ ゴシック"/>
+              </a:rPr>
+              <a:t>You can still load all the complete data into your model; my experience is the cost to your DOM for that tends to be dramatically less than the display</a:t>
+            </a:r>
+          </a:p>
+          <a:p>
+            <a:pPr marR="0" lvl="4" rtl="0"/>
+            <a:r>
+              <a:rPr lang="en-US" b="0" i="1" u="none" strike="noStrike" baseline="0" dirty="0" smtClean="0">
+                <a:solidFill>
+                  <a:srgbClr val="243F60"/>
+                </a:solidFill>
+                <a:latin typeface="Calibri"/>
+                <a:ea typeface="ＭＳ ゴシック"/>
+              </a:rPr>
+              <a:t>Each instance of this top-level category can have it’s own observable that the template bind is using for its name property</a:t>
+            </a:r>
+            <a:r>
+              <a:rPr lang="en-US" b="0" i="1" u="none" strike="noStrike" baseline="0" dirty="0" smtClean="0">
+                <a:solidFill>
+                  <a:srgbClr val="243F60"/>
+                </a:solidFill>
+                <a:latin typeface="Times New Roman"/>
+                <a:ea typeface="ＭＳ ゴシック"/>
+              </a:rPr>
+              <a:t>.</a:t>
+            </a:r>
+          </a:p>
+          <a:p>
+            <a:pPr marR="0" lvl="4" rtl="0"/>
+            <a:r>
+              <a:rPr lang="en-US" b="0" i="1" u="none" strike="noStrike" baseline="0" dirty="0" err="1" smtClean="0">
+                <a:solidFill>
+                  <a:srgbClr val="243F60"/>
+                </a:solidFill>
+                <a:latin typeface="Calibri"/>
+                <a:ea typeface="ＭＳ ゴシック"/>
+              </a:rPr>
+              <a:t>Intitially</a:t>
+            </a:r>
+            <a:r>
+              <a:rPr lang="en-US" b="0" i="1" u="none" strike="noStrike" baseline="0" dirty="0" smtClean="0">
+                <a:solidFill>
+                  <a:srgbClr val="243F60"/>
+                </a:solidFill>
+                <a:latin typeface="Calibri"/>
+                <a:ea typeface="ＭＳ ゴシック"/>
+              </a:rPr>
+              <a:t> the DOM will only have to display minimal elements for the complete data set</a:t>
+            </a:r>
+          </a:p>
+          <a:p>
+            <a:pPr marR="0" lvl="4" rtl="0"/>
+            <a:r>
+              <a:rPr lang="en-US" b="0" i="1" u="none" strike="noStrike" baseline="0" dirty="0" smtClean="0">
+                <a:solidFill>
+                  <a:srgbClr val="243F60"/>
+                </a:solidFill>
+                <a:latin typeface="Calibri"/>
+                <a:ea typeface="ＭＳ ゴシック"/>
+              </a:rPr>
+              <a:t>Then by using a click event, change templates by changing that individual instance of the template name observable to your new value.</a:t>
+            </a:r>
+          </a:p>
+          <a:p>
+            <a:pPr marR="0" lvl="5" rtl="0"/>
+            <a:r>
+              <a:rPr lang="en-US" b="0" i="1" u="none" strike="noStrike" baseline="0" dirty="0" smtClean="0">
+                <a:solidFill>
+                  <a:srgbClr val="404040"/>
+                </a:solidFill>
+                <a:latin typeface="Calibri"/>
+                <a:ea typeface="ＭＳ ゴシック"/>
+              </a:rPr>
+              <a:t>This significantly reduces the load on the performance of the browser</a:t>
+            </a:r>
+          </a:p>
+          <a:p>
+            <a:pPr marR="0" lvl="4" rtl="0"/>
+            <a:r>
+              <a:rPr lang="en-US" b="0" i="1" u="none" strike="noStrike" baseline="0" dirty="0" smtClean="0">
+                <a:solidFill>
+                  <a:srgbClr val="243F60"/>
+                </a:solidFill>
+                <a:latin typeface="Calibri"/>
+                <a:ea typeface="ＭＳ ゴシック"/>
+              </a:rPr>
+              <a:t>After the remaining data has been added to the DOM the simplified template isn’t needed anymore. A simple </a:t>
+            </a:r>
+            <a:r>
+              <a:rPr lang="en-US" b="0" i="1" u="none" strike="noStrike" baseline="0" dirty="0" err="1" smtClean="0">
+                <a:solidFill>
+                  <a:srgbClr val="243F60"/>
+                </a:solidFill>
+                <a:latin typeface="Calibri"/>
+                <a:ea typeface="ＭＳ ゴシック"/>
+              </a:rPr>
+              <a:t>jQuery</a:t>
+            </a:r>
+            <a:r>
+              <a:rPr lang="en-US" b="0" i="1" u="none" strike="noStrike" baseline="0" dirty="0" smtClean="0">
+                <a:solidFill>
+                  <a:srgbClr val="243F60"/>
+                </a:solidFill>
+                <a:latin typeface="Calibri"/>
+                <a:ea typeface="ＭＳ ゴシック"/>
+              </a:rPr>
+              <a:t> </a:t>
+            </a:r>
+            <a:r>
+              <a:rPr lang="en-US" b="0" i="1" u="none" strike="noStrike" baseline="0" dirty="0" err="1" smtClean="0">
+                <a:solidFill>
+                  <a:srgbClr val="243F60"/>
+                </a:solidFill>
+                <a:latin typeface="Calibri"/>
+                <a:ea typeface="ＭＳ ゴシック"/>
+              </a:rPr>
+              <a:t>slideToggle</a:t>
+            </a:r>
+            <a:r>
+              <a:rPr lang="en-US" b="0" i="1" u="none" strike="noStrike" baseline="0" dirty="0" smtClean="0">
+                <a:solidFill>
+                  <a:srgbClr val="243F60"/>
+                </a:solidFill>
+                <a:latin typeface="Calibri"/>
+                <a:ea typeface="ＭＳ ゴシック"/>
+              </a:rPr>
+              <a:t> will work just fine.</a:t>
             </a:r>
           </a:p>
           <a:p>
             <a:pPr marR="0" lvl="3" rtl="0"/>
             <a:r>
-              <a:rPr lang="en-US" b="0" i="0" u="none" strike="noStrike" baseline="0" smtClean="0">
+              <a:rPr lang="en-US" b="0" i="0" u="none" strike="noStrike" baseline="0" dirty="0" smtClean="0">
                 <a:solidFill>
                   <a:srgbClr val="243F60"/>
                 </a:solidFill>
                 <a:latin typeface="Calibri"/>
                 <a:ea typeface="ＭＳ ゴシック"/>
               </a:rPr>
-              <a:t>If each of those levels in your data uses its own template and set of observables, loading all of that markup into your DOM at the same time can drastically affect performance</a:t>
-            </a:r>
-          </a:p>
-          <a:p>
-            <a:pPr marR="0" lvl="2" rtl="0"/>
-            <a:r>
-              <a:rPr lang="en-US" b="1" i="1" u="none" strike="noStrike" baseline="0" smtClean="0">
-                <a:solidFill>
-                  <a:srgbClr val="4F81BD"/>
-                </a:solidFill>
-                <a:latin typeface="Calibri"/>
-                <a:ea typeface="ＭＳ ゴシック"/>
-              </a:rPr>
-              <a:t>How can you work around this?</a:t>
-            </a:r>
-          </a:p>
-          <a:p>
-            <a:pPr marR="0" lvl="3" rtl="0"/>
-            <a:r>
-              <a:rPr lang="en-US" b="0" i="0" u="none" strike="noStrike" baseline="0" smtClean="0">
-                <a:solidFill>
-                  <a:srgbClr val="243F60"/>
-                </a:solidFill>
-                <a:latin typeface="Calibri"/>
-                <a:ea typeface="ＭＳ ゴシック"/>
-              </a:rPr>
-              <a:t>Deferred content updating</a:t>
-            </a:r>
-          </a:p>
-          <a:p>
-            <a:pPr marR="0" lvl="4" rtl="0"/>
-            <a:r>
-              <a:rPr lang="en-US" b="0" i="1" u="none" strike="noStrike" baseline="0" smtClean="0">
-                <a:solidFill>
-                  <a:srgbClr val="243F60"/>
-                </a:solidFill>
-                <a:latin typeface="Calibri"/>
-                <a:ea typeface="ＭＳ ゴシック"/>
-              </a:rPr>
-              <a:t>In this example, every top level category in the data is represented by a header that functions as an accordion</a:t>
-            </a:r>
-          </a:p>
-          <a:p>
-            <a:pPr marR="0" lvl="4" rtl="0"/>
-            <a:r>
-              <a:rPr lang="en-US" b="0" i="1" u="none" strike="noStrike" baseline="0" smtClean="0">
-                <a:solidFill>
-                  <a:srgbClr val="243F60"/>
-                </a:solidFill>
-                <a:latin typeface="Calibri"/>
-                <a:ea typeface="ＭＳ ゴシック"/>
-              </a:rPr>
-              <a:t>Since the initial state of this template is the header with the accordion collapsed, you can put off displaying all the subsequent data in the DOM until it’s actually needed.</a:t>
-            </a:r>
-          </a:p>
-          <a:p>
-            <a:pPr marR="0" lvl="5" rtl="0"/>
-            <a:r>
-              <a:rPr lang="en-US" b="0" i="1" u="none" strike="noStrike" baseline="0" smtClean="0">
-                <a:solidFill>
-                  <a:srgbClr val="404040"/>
-                </a:solidFill>
-                <a:latin typeface="Calibri"/>
-                <a:ea typeface="ＭＳ ゴシック"/>
-              </a:rPr>
-              <a:t>You can still load all the complete data into your model; my experience is the cost to your DOM for that tends to be dramatically less than the display</a:t>
-            </a:r>
-          </a:p>
-          <a:p>
-            <a:pPr marR="0" lvl="4" rtl="0"/>
-            <a:r>
-              <a:rPr lang="en-US" b="0" i="1" u="none" strike="noStrike" baseline="0" smtClean="0">
-                <a:solidFill>
-                  <a:srgbClr val="243F60"/>
-                </a:solidFill>
-                <a:latin typeface="Calibri"/>
-                <a:ea typeface="ＭＳ ゴシック"/>
-              </a:rPr>
-              <a:t>Each instance of this top-level category can have it’s own observable that the template bind is using for its name property</a:t>
-            </a:r>
-            <a:r>
-              <a:rPr lang="en-US" b="0" i="1" u="none" strike="noStrike" baseline="0" smtClean="0">
-                <a:solidFill>
-                  <a:srgbClr val="243F60"/>
-                </a:solidFill>
-                <a:latin typeface="Times New Roman"/>
-                <a:ea typeface="ＭＳ ゴシック"/>
-              </a:rPr>
-              <a:t>.</a:t>
-            </a:r>
-          </a:p>
-          <a:p>
-            <a:pPr marR="0" lvl="4" rtl="0"/>
-            <a:r>
-              <a:rPr lang="en-US" b="0" i="1" u="none" strike="noStrike" baseline="0" smtClean="0">
-                <a:solidFill>
-                  <a:srgbClr val="243F60"/>
-                </a:solidFill>
-                <a:latin typeface="Calibri"/>
-                <a:ea typeface="ＭＳ ゴシック"/>
-              </a:rPr>
-              <a:t>Intitially the DOM will only have to display minimal elements for the complete data set</a:t>
-            </a:r>
-          </a:p>
-          <a:p>
-            <a:pPr marR="0" lvl="4" rtl="0"/>
-            <a:r>
-              <a:rPr lang="en-US" b="0" i="1" u="none" strike="noStrike" baseline="0" smtClean="0">
-                <a:solidFill>
-                  <a:srgbClr val="243F60"/>
-                </a:solidFill>
-                <a:latin typeface="Calibri"/>
-                <a:ea typeface="ＭＳ ゴシック"/>
-              </a:rPr>
-              <a:t>Then by using a click event, change templates by changing that individual instance of the template name observable to your new value.</a:t>
-            </a:r>
-          </a:p>
-          <a:p>
-            <a:pPr marR="0" lvl="5" rtl="0"/>
-            <a:r>
-              <a:rPr lang="en-US" b="0" i="1" u="none" strike="noStrike" baseline="0" smtClean="0">
-                <a:solidFill>
-                  <a:srgbClr val="404040"/>
-                </a:solidFill>
-                <a:latin typeface="Calibri"/>
-                <a:ea typeface="ＭＳ ゴシック"/>
-              </a:rPr>
-              <a:t>This significantly reduces the load on the performance of the browser</a:t>
-            </a:r>
-          </a:p>
-          <a:p>
-            <a:pPr marR="0" lvl="4" rtl="0"/>
-            <a:r>
-              <a:rPr lang="en-US" b="0" i="1" u="none" strike="noStrike" baseline="0" smtClean="0">
-                <a:solidFill>
-                  <a:srgbClr val="243F60"/>
-                </a:solidFill>
-                <a:latin typeface="Calibri"/>
-                <a:ea typeface="ＭＳ ゴシック"/>
-              </a:rPr>
-              <a:t>After the remaining data has been added to the DOM the simplified template isn’t needed anymore. A simple jQuery slideToggle will work just fine.</a:t>
-            </a:r>
-          </a:p>
-          <a:p>
-            <a:pPr marR="0" lvl="3" rtl="0"/>
-            <a:r>
-              <a:rPr lang="en-US" b="0" i="0" u="none" strike="noStrike" baseline="0" smtClean="0">
-                <a:solidFill>
-                  <a:srgbClr val="243F60"/>
-                </a:solidFill>
-                <a:latin typeface="Calibri"/>
-                <a:ea typeface="ＭＳ ゴシック"/>
-              </a:rPr>
               <a:t>If your situation wouldn’t allow for this approach, optimizing large data sets for Knockout would prove more difficult, but I’m sure there could be something to be done.</a:t>
             </a:r>
-            <a:endParaRPr lang="en-US" b="0" i="0" u="none" strike="noStrike" baseline="0" smtClean="0">
+            <a:endParaRPr lang="en-US" b="0" i="0" u="none" strike="noStrike" baseline="0" dirty="0" smtClean="0">
               <a:solidFill>
                 <a:srgbClr val="243F60"/>
               </a:solidFill>
@@ -5060,7 +4922,10 @@
           <a:bodyPr/>
           <a:lstStyle/>
           <a:p>
-            <a:endParaRPr lang="en-US" dirty="0"/>
+            <a:r>
+              <a:rPr lang="en-US" i="1" dirty="0"/>
+              <a:t>View Models, Observables and Data-binds</a:t>
+            </a:r>
           </a:p>
         </p:txBody>
       </p:sp>
@@ -5125,7 +4990,7 @@
                 <a:latin typeface="Calibri"/>
                 <a:ea typeface="ＭＳ ゴシック"/>
               </a:rPr>
-              <a:t>View Models, Observables and Data-binds</a:t>
+              <a:t> View Models</a:t>
             </a:r>
           </a:p>
         </p:txBody>
@@ -5145,14 +5010,143 @@
           <a:bodyPr/>
           <a:lstStyle/>
           <a:p>
-            <a:endParaRPr lang="en-US"/>
+            <a:r>
+              <a:rPr lang="en-US" b="1" i="0" u="none" strike="noStrike" baseline="0" dirty="0" smtClean="0">
+                <a:solidFill>
+                  <a:srgbClr val="4F81BD"/>
+                </a:solidFill>
+                <a:latin typeface="Calibri"/>
+                <a:ea typeface="ＭＳ ゴシック"/>
+              </a:rPr>
+              <a:t>View Models are just data structures to organize your observables and various other parts of your </a:t>
+            </a:r>
+            <a:r>
+              <a:rPr lang="en-US" b="1" i="0" u="none" strike="noStrike" baseline="0" dirty="0" smtClean="0">
+                <a:solidFill>
+                  <a:srgbClr val="4F81BD"/>
+                </a:solidFill>
+                <a:latin typeface="Calibri"/>
+                <a:ea typeface="ＭＳ ゴシック"/>
+              </a:rPr>
+              <a:t>JavaScript, </a:t>
+            </a:r>
+            <a:r>
+              <a:rPr lang="en-US" b="1" i="0" u="none" strike="noStrike" baseline="0" dirty="0" smtClean="0">
+                <a:solidFill>
+                  <a:srgbClr val="4F81BD"/>
+                </a:solidFill>
+                <a:latin typeface="Calibri"/>
+                <a:ea typeface="ＭＳ ゴシック"/>
+              </a:rPr>
+              <a:t>typically as a JSON </a:t>
+            </a:r>
+            <a:r>
+              <a:rPr lang="en-US" b="1" i="0" u="none" strike="noStrike" baseline="0" dirty="0" smtClean="0">
+                <a:solidFill>
+                  <a:srgbClr val="4F81BD"/>
+                </a:solidFill>
+                <a:latin typeface="Calibri"/>
+                <a:ea typeface="ＭＳ ゴシック"/>
+              </a:rPr>
+              <a:t>object </a:t>
+            </a:r>
+            <a:r>
+              <a:rPr lang="en-US" i="1" dirty="0">
+                <a:solidFill>
+                  <a:schemeClr val="tx1"/>
+                </a:solidFill>
+                <a:latin typeface="Calibri"/>
+                <a:ea typeface="ＭＳ ゴシック"/>
+              </a:rPr>
+              <a:t>❑ </a:t>
+            </a:r>
+            <a:r>
+              <a:rPr lang="en-US" sz="1400" i="1" dirty="0">
+                <a:solidFill>
+                  <a:schemeClr val="bg1">
+                    <a:lumMod val="65000"/>
+                  </a:schemeClr>
+                </a:solidFill>
+                <a:latin typeface="Calibri"/>
+                <a:ea typeface="ＭＳ ゴシック"/>
+              </a:rPr>
+              <a:t>see </a:t>
+            </a:r>
+            <a:r>
+              <a:rPr lang="en-US" sz="1400" i="1" dirty="0" err="1" smtClean="0">
+                <a:solidFill>
+                  <a:schemeClr val="bg1">
+                    <a:lumMod val="65000"/>
+                  </a:schemeClr>
+                </a:solidFill>
+                <a:latin typeface="Calibri"/>
+                <a:ea typeface="ＭＳ ゴシック"/>
+              </a:rPr>
+              <a:t>jsonViewModel_basic.js</a:t>
+            </a:r>
+            <a:endParaRPr lang="en-US" sz="1400" b="1" i="0" u="none" strike="noStrike" baseline="0" dirty="0" smtClean="0">
+              <a:solidFill>
+                <a:srgbClr val="4F81BD"/>
+              </a:solidFill>
+              <a:latin typeface="Calibri"/>
+              <a:ea typeface="ＭＳ ゴシック"/>
+            </a:endParaRPr>
+          </a:p>
+          <a:p>
+            <a:pPr lvl="1"/>
+            <a:r>
+              <a:rPr lang="en-US" b="0" i="1" u="none" strike="noStrike" baseline="0" dirty="0" smtClean="0">
+                <a:solidFill>
+                  <a:schemeClr val="tx1"/>
+                </a:solidFill>
+                <a:latin typeface="Calibri"/>
+                <a:ea typeface="ＭＳ ゴシック"/>
+              </a:rPr>
+              <a:t>But a</a:t>
+            </a:r>
+            <a:r>
+              <a:rPr lang="en-US" b="0" i="1" u="none" strike="noStrike" dirty="0" smtClean="0">
+                <a:solidFill>
+                  <a:schemeClr val="tx1"/>
+                </a:solidFill>
+                <a:latin typeface="Calibri"/>
+                <a:ea typeface="ＭＳ ゴシック"/>
+              </a:rPr>
+              <a:t> simple function/variable declaration works </a:t>
+            </a:r>
+            <a:r>
+              <a:rPr lang="en-US" i="1" dirty="0">
+                <a:solidFill>
+                  <a:schemeClr val="tx1"/>
+                </a:solidFill>
+                <a:latin typeface="Calibri"/>
+                <a:ea typeface="ＭＳ ゴシック"/>
+              </a:rPr>
+              <a:t>as well </a:t>
+            </a:r>
+            <a:br>
+              <a:rPr lang="en-US" i="1" dirty="0">
+                <a:solidFill>
+                  <a:schemeClr val="tx1"/>
+                </a:solidFill>
+                <a:latin typeface="Calibri"/>
+                <a:ea typeface="ＭＳ ゴシック"/>
+              </a:rPr>
+            </a:br>
+            <a:endParaRPr lang="en-US" b="0" i="1" u="none" strike="noStrike" baseline="0" dirty="0" smtClean="0">
+              <a:solidFill>
+                <a:schemeClr val="tx1"/>
+              </a:solidFill>
+              <a:latin typeface="Calibri"/>
+              <a:ea typeface="ＭＳ ゴシック"/>
+            </a:endParaRPr>
           </a:p>
         </p:txBody>
       </p:sp>
     </p:spTree>
     <p:extLst>
       <p:ext uri="{BB962C8B-B14F-4D97-AF65-F5344CB8AC3E}">
-        <p14:creationId xmlns:p14="http://schemas.microsoft.com/office/powerpoint/2010/main" val="1902037773"/>
+        <p14:creationId xmlns:p14="http://schemas.microsoft.com/office/powerpoint/2010/main" val="845023380"/>
       </p:ext>
     </p:extLst>
   </p:cSld>
@@ -5239,27 +5233,7 @@
                 <a:latin typeface="Calibri"/>
                 <a:ea typeface="ＭＳ ゴシック"/>
               </a:rPr>
-              <a:t>View Models are just data structures to organize your observables and various other parts of your </a:t>
-            </a:r>
-            <a:r>
-              <a:rPr lang="en-US" b="1" i="0" u="none" strike="noStrike" baseline="0" dirty="0" smtClean="0">
-                <a:solidFill>
-                  <a:srgbClr val="4F81BD"/>
-                </a:solidFill>
-                <a:latin typeface="Calibri"/>
-                <a:ea typeface="ＭＳ ゴシック"/>
-              </a:rPr>
-              <a:t>JavaScript, </a:t>
-            </a:r>
-            <a:r>
-              <a:rPr lang="en-US" b="1" i="0" u="none" strike="noStrike" baseline="0" dirty="0" smtClean="0">
-                <a:solidFill>
-                  <a:srgbClr val="4F81BD"/>
-                </a:solidFill>
-                <a:latin typeface="Calibri"/>
-                <a:ea typeface="ＭＳ ゴシック"/>
-              </a:rPr>
-              <a:t>typically as a JSON object</a:t>
+              <a:t>View Models are just data structures to organize your observables and various other parts of your JavaScript typically as a JSON object</a:t>
             </a:r>
           </a:p>
           <a:p>
@@ -5292,7 +5266,60 @@
                 <a:latin typeface="Calibri"/>
                 <a:ea typeface="ＭＳ ゴシック"/>
               </a:rPr>
-              <a:t>as well ❑</a:t>
+              <a:t>as well </a:t>
+            </a:r>
+            <a:r>
+              <a:rPr lang="en-US" i="1" dirty="0" smtClean="0">
+                <a:solidFill>
+                  <a:schemeClr val="tx1"/>
+                </a:solidFill>
+                <a:latin typeface="Calibri"/>
+                <a:ea typeface="ＭＳ ゴシック"/>
+              </a:rPr>
+              <a:t/>
+            </a:r>
+            <a:br>
+              <a:rPr lang="en-US" i="1" dirty="0" smtClean="0">
+                <a:solidFill>
+                  <a:schemeClr val="tx1"/>
+                </a:solidFill>
+                <a:latin typeface="Calibri"/>
+                <a:ea typeface="ＭＳ ゴシック"/>
+              </a:rPr>
+            </a:br>
+            <a:r>
+              <a:rPr lang="en-US" i="1" dirty="0" smtClean="0">
+                <a:solidFill>
+                  <a:schemeClr val="tx1"/>
+                </a:solidFill>
+                <a:latin typeface="Calibri"/>
+                <a:ea typeface="ＭＳ ゴシック"/>
+              </a:rPr>
+              <a:t>❑ </a:t>
+            </a:r>
+            <a:r>
+              <a:rPr lang="en-US" sz="1400" i="1" dirty="0">
+                <a:solidFill>
+                  <a:schemeClr val="bg1">
+                    <a:lumMod val="65000"/>
+                  </a:schemeClr>
+                </a:solidFill>
+                <a:latin typeface="Calibri"/>
+                <a:ea typeface="ＭＳ ゴシック"/>
+              </a:rPr>
+              <a:t>see </a:t>
+            </a:r>
+            <a:r>
+              <a:rPr lang="en-US" sz="1400" i="1" dirty="0" err="1" smtClean="0">
+                <a:solidFill>
+                  <a:schemeClr val="bg1">
+                    <a:lumMod val="65000"/>
+                  </a:schemeClr>
+                </a:solidFill>
+                <a:latin typeface="Calibri"/>
+                <a:ea typeface="ＭＳ ゴシック"/>
+              </a:rPr>
+              <a:t>functionViewModel.js</a:t>
             </a:r>
             <a:endParaRPr lang="en-US" b="0" i="1" u="none" strike="noStrike" dirty="0" smtClean="0">
               <a:solidFill>
@@ -5301,6 +5328,19 @@
               <a:latin typeface="Calibri"/>
               <a:ea typeface="ＭＳ ゴシック"/>
             </a:endParaRPr>
+          </a:p>
+          <a:p>
+            <a:pPr lvl="0"/>
+            <a:r>
+              <a:rPr lang="en-US" b="1" dirty="0">
+                <a:solidFill>
+                  <a:srgbClr val="4F81BD"/>
+                </a:solidFill>
+                <a:latin typeface="Calibri"/>
+                <a:ea typeface="ＭＳ ゴシック"/>
+              </a:rPr>
+              <a:t>This allows you to set up a hierarchy for you to organize how your each component of your data should relate to each other</a:t>
+            </a:r>
           </a:p>
           <a:p>
             <a:pPr marL="0" indent="0">
@@ -5319,7 +5359,7 @@
     </p:spTree>
     <p:extLst>
       <p:ext uri="{BB962C8B-B14F-4D97-AF65-F5344CB8AC3E}">
-        <p14:creationId xmlns:p14="http://schemas.microsoft.com/office/powerpoint/2010/main" val="845023380"/>
+        <p14:creationId xmlns:p14="http://schemas.microsoft.com/office/powerpoint/2010/main" val="1939111276"/>
       </p:ext>
     </p:extLst>
   </p:cSld>
@@ -5370,14 +5410,14 @@
           <a:p>
             <a:pPr marR="0" rtl="0"/>
             <a:r>
-              <a:rPr lang="en-US" b="1" i="0" u="none" strike="noStrike" baseline="0" smtClean="0">
+              <a:rPr lang="en-US" b="1" i="0" u="none" strike="noStrike" baseline="0" dirty="0" smtClean="0">
                 <a:solidFill>
                   <a:srgbClr val="345A8A"/>
                 </a:solidFill>
                 <a:latin typeface="Calibri"/>
                 <a:ea typeface="ＭＳ ゴシック"/>
               </a:rPr>
-              <a:t> View Models</a:t>
+              <a:t>Observables</a:t>
             </a:r>
           </a:p>
         </p:txBody>
@@ -5394,7 +5434,9 @@
         </p:nvSpPr>
         <p:spPr/>
         <p:txBody>
-          <a:bodyPr/>
+          <a:bodyPr>
+            <a:normAutofit/>
+          </a:bodyPr>
           <a:lstStyle/>
           <a:p>
             <a:pPr marR="0" lvl="0" rtl="0"/>
@@ -5406,80 +5448,145 @@
                 <a:latin typeface="Calibri"/>
                 <a:ea typeface="ＭＳ ゴシック"/>
               </a:rPr>
-              <a:t>View Models are just data structures to organize your observables and various other parts of your JavaScript typically as a JSON object</a:t>
+              <a:t>Typically they are just containers for data, like variables or objects</a:t>
             </a:r>
           </a:p>
           <a:p>
             <a:pPr lvl="1"/>
             <a:r>
-              <a:rPr lang="en-US" b="0" i="1" u="none" strike="noStrike" baseline="0" dirty="0" smtClean="0">
-                <a:solidFill>
-                  <a:schemeClr val="tx1"/>
-                </a:solidFill>
-                <a:latin typeface="Calibri"/>
-                <a:ea typeface="ＭＳ ゴシック"/>
-              </a:rPr>
-              <a:t>But a</a:t>
-            </a:r>
-            <a:r>
-              <a:rPr lang="en-US" b="0" i="1" u="none" strike="noStrike" dirty="0" smtClean="0">
-                <a:solidFill>
-                  <a:schemeClr val="tx1"/>
-                </a:solidFill>
-                <a:latin typeface="Calibri"/>
-                <a:ea typeface="ＭＳ ゴシック"/>
-              </a:rPr>
-              <a:t> simple function/variable declaration works </a:t>
-            </a:r>
-            <a:r>
-              <a:rPr lang="en-US" i="1" dirty="0">
-                <a:solidFill>
-                  <a:schemeClr val="tx1"/>
-                </a:solidFill>
-                <a:latin typeface="Calibri"/>
-                <a:ea typeface="ＭＳ ゴシック"/>
-              </a:rPr>
-              <a:t>as well ❑</a:t>
-            </a:r>
-            <a:endParaRPr lang="en-US" b="0" i="1" u="none" strike="noStrike" dirty="0" smtClean="0">
+              <a:rPr lang="en-US" b="1" i="0" u="none" strike="noStrike" baseline="0" dirty="0" smtClean="0">
+                <a:solidFill>
+                  <a:srgbClr val="4F81BD"/>
+                </a:solidFill>
+                <a:latin typeface="Calibri"/>
+                <a:ea typeface="ＭＳ ゴシック"/>
+              </a:rPr>
+              <a:t>The main difference is that they come with built-in listeners that will </a:t>
+            </a:r>
+            <a:r>
+              <a:rPr lang="en-US" b="1" dirty="0" smtClean="0">
+                <a:solidFill>
+                  <a:srgbClr val="4F81BD"/>
+                </a:solidFill>
+                <a:latin typeface="Calibri"/>
+                <a:ea typeface="ＭＳ ゴシック"/>
+              </a:rPr>
+              <a:t>automatically </a:t>
+            </a:r>
+            <a:r>
+              <a:rPr lang="en-US" b="1" i="0" u="none" strike="noStrike" baseline="0" dirty="0" smtClean="0">
+                <a:solidFill>
+                  <a:srgbClr val="4F81BD"/>
+                </a:solidFill>
+                <a:latin typeface="Calibri"/>
+                <a:ea typeface="ＭＳ ゴシック"/>
+              </a:rPr>
+              <a:t>notify </a:t>
+            </a:r>
+            <a:r>
+              <a:rPr lang="en-US" b="1" i="0" u="none" strike="noStrike" baseline="0" dirty="0" smtClean="0">
+                <a:solidFill>
+                  <a:srgbClr val="4F81BD"/>
+                </a:solidFill>
+                <a:latin typeface="Calibri"/>
+                <a:ea typeface="ＭＳ ゴシック"/>
+              </a:rPr>
+              <a:t>any other part of your data or display if that value </a:t>
+            </a:r>
+            <a:r>
+              <a:rPr lang="en-US" b="1" i="0" u="none" strike="noStrike" baseline="0" dirty="0" smtClean="0">
+                <a:solidFill>
+                  <a:srgbClr val="4F81BD"/>
+                </a:solidFill>
+                <a:latin typeface="Calibri"/>
+                <a:ea typeface="ＭＳ ゴシック"/>
+              </a:rPr>
+              <a:t>changes</a:t>
+            </a:r>
+            <a:endParaRPr lang="en-US" b="1" i="0" u="none" strike="noStrike" baseline="0" dirty="0" smtClean="0">
               <a:solidFill>
-                <a:schemeClr val="tx1"/>
+                <a:srgbClr val="4F81BD"/>
               </a:solidFill>
               <a:latin typeface="Calibri"/>
               <a:ea typeface="ＭＳ ゴシック"/>
             </a:endParaRPr>
           </a:p>
           <a:p>
-            <a:pPr lvl="0"/>
-            <a:r>
-              <a:rPr lang="en-US" b="1" dirty="0">
+            <a:pPr lvl="2"/>
+            <a:r>
+              <a:rPr lang="en-US" b="1" i="1" u="none" strike="noStrike" baseline="0" dirty="0" smtClean="0">
                 <a:solidFill>
                   <a:srgbClr val="4F81BD"/>
                 </a:solidFill>
                 <a:latin typeface="Calibri"/>
                 <a:ea typeface="ＭＳ ゴシック"/>
               </a:rPr>
-              <a:t>This allows you to set up a hierarchy for you to organize how your each component of your data should relate to each other</a:t>
-            </a:r>
-          </a:p>
-          <a:p>
-            <a:pPr marL="0" indent="0">
-              <a:buNone/>
-            </a:pPr>
-            <a:endParaRPr lang="en-US" b="0" i="1" u="none" strike="noStrike" baseline="0" dirty="0" smtClean="0">
+              <a:t>Creating an observable is </a:t>
+            </a:r>
+            <a:r>
+              <a:rPr lang="en-US" b="1" i="1" dirty="0">
+                <a:solidFill>
+                  <a:srgbClr val="4F81BD"/>
+                </a:solidFill>
+                <a:latin typeface="Calibri"/>
+                <a:ea typeface="ＭＳ ゴシック"/>
+              </a:rPr>
+              <a:t>simple ❑</a:t>
+            </a:r>
+            <a:endParaRPr lang="en-US" b="1" i="1" u="none" strike="noStrike" baseline="0" dirty="0" smtClean="0">
               <a:solidFill>
-                <a:schemeClr val="tx1"/>
+                <a:srgbClr val="4F81BD"/>
               </a:solidFill>
               <a:latin typeface="Calibri"/>
               <a:ea typeface="ＭＳ ゴシック"/>
             </a:endParaRPr>
           </a:p>
+          <a:p>
+            <a:pPr marR="0" lvl="2" rtl="0"/>
+            <a:r>
+              <a:rPr lang="en-US" b="1" i="1" u="none" strike="noStrike" baseline="0" dirty="0" smtClean="0">
+                <a:solidFill>
+                  <a:srgbClr val="4F81BD"/>
+                </a:solidFill>
+                <a:latin typeface="Calibri"/>
+                <a:ea typeface="ＭＳ ゴシック"/>
+              </a:rPr>
+              <a:t>There </a:t>
+            </a:r>
+            <a:r>
+              <a:rPr lang="en-US" b="1" i="1" u="none" strike="noStrike" baseline="0" dirty="0" smtClean="0">
+                <a:solidFill>
+                  <a:srgbClr val="4F81BD"/>
+                </a:solidFill>
+                <a:latin typeface="Calibri"/>
+                <a:ea typeface="ＭＳ ゴシック"/>
+              </a:rPr>
+              <a:t>are also computed observables that allow you set an observable based off of the result of a function and observable arrays, but I won’t go into detail about </a:t>
+            </a:r>
+            <a:r>
+              <a:rPr lang="en-US" b="1" i="1" u="none" strike="noStrike" baseline="0" dirty="0" smtClean="0">
+                <a:solidFill>
+                  <a:srgbClr val="4F81BD"/>
+                </a:solidFill>
+                <a:latin typeface="Calibri"/>
+                <a:ea typeface="ＭＳ ゴシック"/>
+              </a:rPr>
+              <a:t>those</a:t>
+            </a:r>
+            <a:endParaRPr lang="en-US" b="1" i="1" u="none" strike="noStrike" baseline="0" dirty="0" smtClean="0">
+              <a:solidFill>
+                <a:srgbClr val="4F81BD"/>
+              </a:solidFill>
+              <a:latin typeface="Calibri"/>
+              <a:ea typeface="ＭＳ ゴシック"/>
+            </a:endParaRPr>
+          </a:p>
         </p:txBody>
       </p:sp>
     </p:spTree>
     <p:extLst>
       <p:ext uri="{BB962C8B-B14F-4D97-AF65-F5344CB8AC3E}">
-        <p14:creationId xmlns:p14="http://schemas.microsoft.com/office/powerpoint/2010/main" val="1939111276"/>
+        <p14:creationId xmlns:p14="http://schemas.microsoft.com/office/powerpoint/2010/main" val="3747089053"/>
       </p:ext>
     </p:extLst>
   </p:cSld>
@@ -5528,102 +5635,17 @@
           <a:bodyPr/>
           <a:lstStyle/>
           <a:p>
-            <a:pPr marR="0" rtl="0"/>
-            <a:r>
-              <a:rPr lang="en-US" b="1" i="0" u="none" strike="noStrike" baseline="0" dirty="0" smtClean="0">
+            <a:r>
+              <a:rPr lang="en-US" b="1" dirty="0" smtClean="0">
                 <a:solidFill>
                   <a:srgbClr val="345A8A"/>
                 </a:solidFill>
                 <a:latin typeface="Calibri"/>
                 <a:ea typeface="ＭＳ ゴシック"/>
               </a:rPr>
-              <a:t>Observables</a:t>
-            </a:r>
-          </a:p>
-        </p:txBody>
-      </p:sp>
-      <p:sp>
-        <p:nvSpPr>
-          <p:cNvPr id="3" name="Text Placeholder 2"/>
-          <p:cNvSpPr>
-            <a:spLocks noGrp="1"/>
-          </p:cNvSpPr>
-          <p:nvPr>
-            <p:ph type="body" idx="1"/>
-          </p:nvPr>
-        </p:nvSpPr>
-        <p:spPr/>
-        <p:txBody>
-          <a:bodyPr>
-            <a:normAutofit/>
-          </a:bodyPr>
-          <a:lstStyle/>
-          <a:p>
-            <a:pPr marR="0" lvl="0" rtl="0"/>
-            <a:r>
-              <a:rPr lang="en-US" b="1" i="0" u="none" strike="noStrike" baseline="0" dirty="0" smtClean="0">
-                <a:solidFill>
-                  <a:srgbClr val="4F81BD"/>
-                </a:solidFill>
-                <a:latin typeface="Calibri"/>
-                <a:ea typeface="ＭＳ ゴシック"/>
-              </a:rPr>
-              <a:t>Typically they are just containers for data, like variables or objects</a:t>
-            </a:r>
-          </a:p>
-          <a:p>
-            <a:pPr lvl="1"/>
-            <a:r>
-              <a:rPr lang="en-US" b="1" i="0" u="none" strike="noStrike" baseline="0" dirty="0" smtClean="0">
-                <a:solidFill>
-                  <a:srgbClr val="4F81BD"/>
-                </a:solidFill>
-                <a:latin typeface="Calibri"/>
-                <a:ea typeface="ＭＳ ゴシック"/>
-              </a:rPr>
-              <a:t>The main difference is that they come with built-in listeners that will </a:t>
-            </a:r>
-            <a:r>
-              <a:rPr lang="en-US" b="1" dirty="0" smtClean="0">
-                <a:solidFill>
-                  <a:srgbClr val="4F81BD"/>
-                </a:solidFill>
-                <a:latin typeface="Calibri"/>
-                <a:ea typeface="ＭＳ ゴシック"/>
-              </a:rPr>
-              <a:t>automatically </a:t>
-            </a:r>
-            <a:r>
-              <a:rPr lang="en-US" b="1" i="0" u="none" strike="noStrike" baseline="0" dirty="0" smtClean="0">
-                <a:solidFill>
-                  <a:srgbClr val="4F81BD"/>
-                </a:solidFill>
-                <a:latin typeface="Calibri"/>
-                <a:ea typeface="ＭＳ ゴシック"/>
-              </a:rPr>
-              <a:t>notify </a:t>
-            </a:r>
-            <a:r>
-              <a:rPr lang="en-US" b="1" i="0" u="none" strike="noStrike" baseline="0" dirty="0" smtClean="0">
-                <a:solidFill>
-                  <a:srgbClr val="4F81BD"/>
-                </a:solidFill>
-                <a:latin typeface="Calibri"/>
-                <a:ea typeface="ＭＳ ゴシック"/>
-              </a:rPr>
-              <a:t>any other part of your data or display if that value </a:t>
-            </a:r>
-            <a:r>
-              <a:rPr lang="en-US" b="1" i="0" u="none" strike="noStrike" baseline="0" dirty="0" smtClean="0">
-                <a:solidFill>
-                  <a:srgbClr val="4F81BD"/>
-                </a:solidFill>
-                <a:latin typeface="Calibri"/>
-                <a:ea typeface="ＭＳ ゴシック"/>
-              </a:rPr>
-              <a:t>changes</a:t>
-            </a:r>
-            <a:endParaRPr lang="en-US" b="1" i="0" u="none" strike="noStrike" baseline="0" dirty="0" smtClean="0">
+              <a:t>Data-Binds</a:t>
+            </a:r>
+            <a:endParaRPr lang="en-US" b="1" dirty="0">
               <a:solidFill>
                 <a:srgbClr val="4F81BD"/>
               </a:solidFill>
@@ -5631,8 +5653,26 @@
               <a:ea typeface="ＭＳ ゴシック"/>
             </a:endParaRPr>
           </a:p>
-          <a:p>
-            <a:pPr lvl="2"/>
+        </p:txBody>
+      </p:sp>
+      <p:sp>
+        <p:nvSpPr>
+          <p:cNvPr id="3" name="Text Placeholder 2"/>
+          <p:cNvSpPr>
+            <a:spLocks noGrp="1"/>
+          </p:cNvSpPr>
+          <p:nvPr>
+            <p:ph type="body" idx="1"/>
+          </p:nvPr>
+        </p:nvSpPr>
+        <p:spPr/>
+        <p:txBody>
+          <a:bodyPr>
+            <a:normAutofit/>
+          </a:bodyPr>
+          <a:lstStyle/>
+          <a:p>
+            <a:pPr lvl="1"/>
             <a:r>
               <a:rPr lang="en-US" b="1" i="1" u="none" strike="noStrike" baseline="0" dirty="0" smtClean="0">
                 <a:solidFill>
@@ -5641,72 +5681,161 @@
                 <a:latin typeface="Calibri"/>
                 <a:ea typeface="ＭＳ ゴシック"/>
               </a:rPr>
-              <a:t>Creating an observable is </a:t>
-            </a:r>
-            <a:r>
-              <a:rPr lang="en-US" b="1" i="1" dirty="0">
+              <a:t>So </a:t>
+            </a:r>
+            <a:r>
+              <a:rPr lang="en-US" b="1" i="1" u="none" strike="noStrike" baseline="0" dirty="0" smtClean="0">
                 <a:solidFill>
                   <a:srgbClr val="4F81BD"/>
                 </a:solidFill>
                 <a:latin typeface="Calibri"/>
                 <a:ea typeface="ＭＳ ゴシック"/>
               </a:rPr>
-              <a:t>simple ❑</a:t>
-            </a:r>
-            <a:endParaRPr lang="en-US" b="1" i="1" u="none" strike="noStrike" baseline="0" dirty="0" smtClean="0">
+              <a:t>now what do you do with these view-models and observables? That’s where data-binds come into play.</a:t>
+            </a:r>
+          </a:p>
+          <a:p>
+            <a:pPr lvl="3"/>
+            <a:r>
+              <a:rPr lang="en-US" b="0" i="0" u="none" strike="noStrike" baseline="0" dirty="0" smtClean="0">
+                <a:solidFill>
+                  <a:srgbClr val="243F60"/>
+                </a:solidFill>
+                <a:latin typeface="Calibri"/>
+                <a:ea typeface="ＭＳ ゴシック"/>
+              </a:rPr>
+              <a:t>Just add a new attribute to any HTML </a:t>
+            </a:r>
+            <a:r>
+              <a:rPr lang="en-US" dirty="0">
+                <a:solidFill>
+                  <a:srgbClr val="243F60"/>
+                </a:solidFill>
+                <a:latin typeface="Calibri"/>
+                <a:ea typeface="ＭＳ ゴシック"/>
+              </a:rPr>
+              <a:t>tag. </a:t>
+            </a:r>
+            <a:r>
+              <a:rPr lang="en-US" dirty="0" smtClean="0">
+                <a:solidFill>
+                  <a:srgbClr val="243F60"/>
+                </a:solidFill>
+                <a:latin typeface="Calibri"/>
+                <a:ea typeface="ＭＳ ゴシック"/>
+              </a:rPr>
+              <a:t>❑</a:t>
+            </a:r>
+            <a:r>
+              <a:rPr lang="en-US" sz="1400" i="1" dirty="0" smtClean="0">
+                <a:solidFill>
+                  <a:srgbClr val="A6A6A6"/>
+                </a:solidFill>
+                <a:latin typeface="Calibri"/>
+                <a:ea typeface="ＭＳ ゴシック"/>
+              </a:rPr>
+              <a:t>see </a:t>
+            </a:r>
+            <a:r>
+              <a:rPr lang="en-US" sz="1400" i="1" dirty="0" err="1" smtClean="0">
+                <a:solidFill>
+                  <a:srgbClr val="A6A6A6"/>
+                </a:solidFill>
+                <a:latin typeface="Calibri"/>
+                <a:ea typeface="ＭＳ ゴシック"/>
+              </a:rPr>
+              <a:t>dataBind.html</a:t>
+            </a:r>
+            <a:endParaRPr lang="en-US" sz="1400" b="0" i="1" u="none" strike="noStrike" baseline="0" dirty="0" smtClean="0">
               <a:solidFill>
-                <a:srgbClr val="4F81BD"/>
+                <a:srgbClr val="A6A6A6"/>
               </a:solidFill>
               <a:latin typeface="Calibri"/>
               <a:ea typeface="ＭＳ ゴシック"/>
             </a:endParaRPr>
           </a:p>
           <a:p>
-            <a:pPr marR="0" lvl="2" rtl="0"/>
-            <a:r>
-              <a:rPr lang="en-US" b="1" i="1" u="none" strike="noStrike" baseline="0" dirty="0" smtClean="0">
-                <a:solidFill>
-                  <a:srgbClr val="4F81BD"/>
-                </a:solidFill>
-                <a:latin typeface="Calibri"/>
-                <a:ea typeface="ＭＳ ゴシック"/>
-              </a:rPr>
-              <a:t>There </a:t>
-            </a:r>
-            <a:r>
-              <a:rPr lang="en-US" b="1" i="1" u="none" strike="noStrike" baseline="0" dirty="0" smtClean="0">
-                <a:solidFill>
-                  <a:srgbClr val="4F81BD"/>
-                </a:solidFill>
-                <a:latin typeface="Calibri"/>
-                <a:ea typeface="ＭＳ ゴシック"/>
-              </a:rPr>
-              <a:t>are also computed observables that allow you set an observable based off of the result of a function and observable arrays, but I won’t go into detail about </a:t>
-            </a:r>
-            <a:r>
-              <a:rPr lang="en-US" b="1" i="1" u="none" strike="noStrike" baseline="0" dirty="0" smtClean="0">
-                <a:solidFill>
-                  <a:srgbClr val="4F81BD"/>
-                </a:solidFill>
-                <a:latin typeface="Calibri"/>
-                <a:ea typeface="ＭＳ ゴシック"/>
-              </a:rPr>
-              <a:t>those</a:t>
-            </a:r>
-            <a:endParaRPr lang="en-US" b="1" i="1" u="none" strike="noStrike" baseline="0" dirty="0" smtClean="0">
-              <a:solidFill>
-                <a:srgbClr val="4F81BD"/>
-              </a:solidFill>
-              <a:latin typeface="Calibri"/>
-              <a:ea typeface="ＭＳ ゴシック"/>
-            </a:endParaRPr>
+            <a:pPr marR="0" lvl="3" rtl="0"/>
+            <a:r>
+              <a:rPr lang="en-US" b="0" i="0" u="none" strike="noStrike" baseline="0" dirty="0" smtClean="0">
+                <a:solidFill>
+                  <a:srgbClr val="243F60"/>
+                </a:solidFill>
+                <a:latin typeface="Calibri"/>
+                <a:ea typeface="ＭＳ ゴシック"/>
+              </a:rPr>
+              <a:t>What </a:t>
+            </a:r>
+            <a:r>
+              <a:rPr lang="en-US" b="0" i="0" u="none" strike="noStrike" baseline="0" dirty="0" smtClean="0">
+                <a:solidFill>
+                  <a:srgbClr val="243F60"/>
+                </a:solidFill>
+                <a:latin typeface="Calibri"/>
+                <a:ea typeface="ＭＳ ゴシック"/>
+              </a:rPr>
+              <a:t>this allows you to do is any time </a:t>
+            </a:r>
+            <a:r>
+              <a:rPr lang="en-US" b="0" i="0" u="none" strike="noStrike" baseline="0" dirty="0" smtClean="0">
+                <a:solidFill>
+                  <a:srgbClr val="243F60"/>
+                </a:solidFill>
+                <a:latin typeface="Calibri"/>
+                <a:ea typeface="ＭＳ ゴシック"/>
+              </a:rPr>
+              <a:t>“</a:t>
+            </a:r>
+            <a:r>
+              <a:rPr lang="en-US" b="0" i="0" u="none" strike="noStrike" baseline="0" dirty="0" err="1" smtClean="0">
+                <a:solidFill>
+                  <a:srgbClr val="243F60"/>
+                </a:solidFill>
+                <a:latin typeface="Calibri"/>
+                <a:ea typeface="ＭＳ ゴシック"/>
+              </a:rPr>
+              <a:t>firstName</a:t>
+            </a:r>
+            <a:r>
+              <a:rPr lang="en-US" b="0" i="0" u="none" strike="noStrike" baseline="0" dirty="0" smtClean="0">
+                <a:solidFill>
+                  <a:srgbClr val="243F60"/>
+                </a:solidFill>
+                <a:latin typeface="Calibri"/>
+                <a:ea typeface="ＭＳ ゴシック"/>
+              </a:rPr>
+              <a:t>” </a:t>
+            </a:r>
+            <a:r>
+              <a:rPr lang="en-US" b="0" i="0" u="none" strike="noStrike" baseline="0" dirty="0" smtClean="0">
+                <a:solidFill>
+                  <a:srgbClr val="243F60"/>
+                </a:solidFill>
+                <a:latin typeface="Calibri"/>
+                <a:ea typeface="ＭＳ ゴシック"/>
+              </a:rPr>
+              <a:t>changes all elements that are bound to it will update automatically. There’s no need to write any additional code to listen for changes or make updates.</a:t>
+            </a:r>
+          </a:p>
+          <a:p>
+            <a:pPr marR="0" lvl="3" rtl="0"/>
+            <a:r>
+              <a:rPr lang="en-US" b="0" i="0" u="none" strike="noStrike" baseline="0" dirty="0" smtClean="0">
+                <a:solidFill>
+                  <a:srgbClr val="243F60"/>
+                </a:solidFill>
+                <a:latin typeface="Calibri"/>
+                <a:ea typeface="ＭＳ ゴシック"/>
+              </a:rPr>
+              <a:t>It may seem counterintuitive to add all this extra markup to you tags, but what you gain by adding it offsets the additional code.</a:t>
+            </a:r>
           </a:p>
         </p:txBody>
       </p:sp>
     </p:spTree>
     <p:extLst>
       <p:ext uri="{BB962C8B-B14F-4D97-AF65-F5344CB8AC3E}">
-        <p14:creationId xmlns:p14="http://schemas.microsoft.com/office/powerpoint/2010/main" val="3747089053"/>
+        <p14:creationId xmlns:p14="http://schemas.microsoft.com/office/powerpoint/2010/main" val="2548166475"/>
       </p:ext>
     </p:extLst>
   </p:cSld>
@@ -5747,185 +5876,45 @@
             <a:spLocks noGrp="1"/>
           </p:cNvSpPr>
           <p:nvPr>
-            <p:ph type="title"/>
-          </p:nvPr>
-        </p:nvSpPr>
-        <p:spPr/>
-        <p:txBody>
-          <a:bodyPr/>
-          <a:lstStyle/>
-          <a:p>
-            <a:r>
-              <a:rPr lang="en-US" b="1" dirty="0" smtClean="0">
-                <a:solidFill>
-                  <a:srgbClr val="345A8A"/>
-                </a:solidFill>
-                <a:latin typeface="Calibri"/>
-                <a:ea typeface="ＭＳ ゴシック"/>
-              </a:rPr>
-              <a:t>Data-Binds</a:t>
-            </a:r>
-            <a:endParaRPr lang="en-US" b="1" dirty="0">
-              <a:solidFill>
-                <a:srgbClr val="4F81BD"/>
-              </a:solidFill>
-              <a:latin typeface="Calibri"/>
-              <a:ea typeface="ＭＳ ゴシック"/>
-            </a:endParaRPr>
-          </a:p>
-        </p:txBody>
-      </p:sp>
-      <p:sp>
-        <p:nvSpPr>
-          <p:cNvPr id="3" name="Text Placeholder 2"/>
-          <p:cNvSpPr>
-            <a:spLocks noGrp="1"/>
-          </p:cNvSpPr>
-          <p:nvPr>
-            <p:ph type="body" idx="1"/>
-          </p:nvPr>
-        </p:nvSpPr>
-        <p:spPr/>
-        <p:txBody>
-          <a:bodyPr>
-            <a:normAutofit/>
-          </a:bodyPr>
-          <a:lstStyle/>
-          <a:p>
-            <a:pPr lvl="1"/>
-            <a:r>
-              <a:rPr lang="en-US" b="1" i="1" u="none" strike="noStrike" baseline="0" dirty="0" smtClean="0">
-                <a:solidFill>
-                  <a:srgbClr val="4F81BD"/>
-                </a:solidFill>
-                <a:latin typeface="Calibri"/>
-                <a:ea typeface="ＭＳ ゴシック"/>
-              </a:rPr>
-              <a:t>So </a:t>
-            </a:r>
-            <a:r>
-              <a:rPr lang="en-US" b="1" i="1" u="none" strike="noStrike" baseline="0" dirty="0" smtClean="0">
-                <a:solidFill>
-                  <a:srgbClr val="4F81BD"/>
-                </a:solidFill>
-                <a:latin typeface="Calibri"/>
-                <a:ea typeface="ＭＳ ゴシック"/>
-              </a:rPr>
-              <a:t>now what do you do with these view-models and observables? That’s where data-binds come into play.</a:t>
-            </a:r>
-          </a:p>
-          <a:p>
-            <a:pPr lvl="3"/>
-            <a:r>
-              <a:rPr lang="en-US" b="0" i="0" u="none" strike="noStrike" baseline="0" dirty="0" smtClean="0">
-                <a:solidFill>
-                  <a:srgbClr val="243F60"/>
-                </a:solidFill>
-                <a:latin typeface="Calibri"/>
-                <a:ea typeface="ＭＳ ゴシック"/>
-              </a:rPr>
-              <a:t>Just add a new attribute to any HTML </a:t>
-            </a:r>
-            <a:r>
-              <a:rPr lang="en-US" dirty="0">
-                <a:solidFill>
-                  <a:srgbClr val="243F60"/>
-                </a:solidFill>
-                <a:latin typeface="Calibri"/>
-                <a:ea typeface="ＭＳ ゴシック"/>
-              </a:rPr>
-              <a:t>tag. ❑</a:t>
-            </a:r>
-            <a:endParaRPr lang="en-US" b="0" i="0" u="none" strike="noStrike" baseline="0" dirty="0" smtClean="0">
-              <a:solidFill>
-                <a:srgbClr val="243F60"/>
-              </a:solidFill>
-              <a:latin typeface="Calibri"/>
-              <a:ea typeface="ＭＳ ゴシック"/>
-            </a:endParaRPr>
-          </a:p>
-          <a:p>
-            <a:pPr marR="0" lvl="3" rtl="0"/>
-            <a:r>
-              <a:rPr lang="en-US" b="0" i="0" u="none" strike="noStrike" baseline="0" dirty="0" smtClean="0">
-                <a:solidFill>
-                  <a:srgbClr val="243F60"/>
-                </a:solidFill>
-                <a:latin typeface="Calibri"/>
-                <a:ea typeface="ＭＳ ゴシック"/>
-              </a:rPr>
-              <a:t>What </a:t>
-            </a:r>
-            <a:r>
-              <a:rPr lang="en-US" b="0" i="0" u="none" strike="noStrike" baseline="0" dirty="0" smtClean="0">
-                <a:solidFill>
-                  <a:srgbClr val="243F60"/>
-                </a:solidFill>
-                <a:latin typeface="Calibri"/>
-                <a:ea typeface="ＭＳ ゴシック"/>
-              </a:rPr>
-              <a:t>this allows you to do is any time </a:t>
-            </a:r>
-            <a:r>
-              <a:rPr lang="en-US" b="0" i="0" u="none" strike="noStrike" baseline="0" dirty="0" smtClean="0">
-                <a:solidFill>
-                  <a:srgbClr val="243F60"/>
-                </a:solidFill>
-                <a:latin typeface="Calibri"/>
-                <a:ea typeface="ＭＳ ゴシック"/>
-              </a:rPr>
-              <a:t>“</a:t>
-            </a:r>
-            <a:r>
-              <a:rPr lang="en-US" b="0" i="0" u="none" strike="noStrike" baseline="0" dirty="0" err="1" smtClean="0">
-                <a:solidFill>
-                  <a:srgbClr val="243F60"/>
-                </a:solidFill>
-                <a:latin typeface="Calibri"/>
-                <a:ea typeface="ＭＳ ゴシック"/>
-              </a:rPr>
-              <a:t>firstName</a:t>
-            </a:r>
-            <a:r>
-              <a:rPr lang="en-US" b="0" i="0" u="none" strike="noStrike" baseline="0" dirty="0" smtClean="0">
-                <a:solidFill>
-                  <a:srgbClr val="243F60"/>
-                </a:solidFill>
-                <a:latin typeface="Calibri"/>
-                <a:ea typeface="ＭＳ ゴシック"/>
-              </a:rPr>
-              <a:t>” </a:t>
-            </a:r>
-            <a:r>
-              <a:rPr lang="en-US" b="0" i="0" u="none" strike="noStrike" baseline="0" dirty="0" smtClean="0">
-                <a:solidFill>
-                  <a:srgbClr val="243F60"/>
-                </a:solidFill>
-                <a:latin typeface="Calibri"/>
-                <a:ea typeface="ＭＳ ゴシック"/>
-              </a:rPr>
-              <a:t>changes all elements that are bound to it will update automatically. There’s no need to write any additional code to listen for changes or make updates.</a:t>
-            </a:r>
-          </a:p>
-          <a:p>
-            <a:pPr marR="0" lvl="3" rtl="0"/>
-            <a:r>
-              <a:rPr lang="en-US" b="0" i="0" u="none" strike="noStrike" baseline="0" dirty="0" smtClean="0">
-                <a:solidFill>
-                  <a:srgbClr val="243F60"/>
-                </a:solidFill>
-                <a:latin typeface="Calibri"/>
-                <a:ea typeface="ＭＳ ゴシック"/>
-              </a:rPr>
-              <a:t>It may seem counterintuitive to add all this extra markup to you tags, but what you gain by adding it offsets the additional code.</a:t>
-            </a:r>
+            <p:ph type="ctrTitle"/>
+          </p:nvPr>
+        </p:nvSpPr>
+        <p:spPr/>
+        <p:txBody>
+          <a:bodyPr/>
+          <a:lstStyle/>
+          <a:p>
+            <a:r>
+              <a:rPr lang="en-US" sz="3600" dirty="0" err="1" smtClean="0"/>
+              <a:t>Templating</a:t>
+            </a:r>
+            <a:endParaRPr lang="en-US" sz="3600" dirty="0"/>
+          </a:p>
+        </p:txBody>
+      </p:sp>
+      <p:sp>
+        <p:nvSpPr>
+          <p:cNvPr id="3" name="Subtitle 2"/>
+          <p:cNvSpPr>
+            <a:spLocks noGrp="1"/>
+          </p:cNvSpPr>
+          <p:nvPr>
+            <p:ph type="subTitle" idx="1"/>
+          </p:nvPr>
+        </p:nvSpPr>
+        <p:spPr/>
+        <p:txBody>
+          <a:bodyPr/>
+          <a:lstStyle/>
+          <a:p>
+            <a:endParaRPr lang="en-US" dirty="0"/>
           </a:p>
         </p:txBody>
       </p:sp>
     </p:spTree>
     <p:extLst>
       <p:ext uri="{BB962C8B-B14F-4D97-AF65-F5344CB8AC3E}">
-        <p14:creationId xmlns:p14="http://schemas.microsoft.com/office/powerpoint/2010/main" val="2548166475"/>
+        <p14:creationId xmlns:p14="http://schemas.microsoft.com/office/powerpoint/2010/main" val="2349990538"/>
       </p:ext>
     </p:extLst>
   </p:cSld>
@@ -5966,58 +5955,106 @@
             <a:spLocks noGrp="1"/>
           </p:cNvSpPr>
           <p:nvPr>
-            <p:ph type="ctrTitle"/>
-          </p:nvPr>
-        </p:nvSpPr>
-        <p:spPr/>
-        <p:txBody>
-          <a:bodyPr/>
-          <a:lstStyle/>
-          <a:p>
-            <a:r>
-              <a:rPr lang="en-US" sz="3600" dirty="0" err="1" smtClean="0"/>
+            <p:ph type="title"/>
+          </p:nvPr>
+        </p:nvSpPr>
+        <p:spPr>
+          <a:xfrm>
+            <a:off x="549275" y="-800183"/>
+            <a:ext cx="8042276" cy="3152475"/>
+          </a:xfrm>
+        </p:spPr>
+        <p:txBody>
+          <a:bodyPr>
+            <a:normAutofit/>
+          </a:bodyPr>
+          <a:lstStyle/>
+          <a:p>
+            <a:pPr marR="0" rtl="0"/>
+            <a:r>
+              <a:rPr lang="en-US" b="1" i="0" u="none" strike="noStrike" baseline="0" dirty="0" smtClean="0">
+                <a:solidFill>
+                  <a:srgbClr val="345A8A"/>
+                </a:solidFill>
+                <a:latin typeface="Calibri"/>
+                <a:ea typeface="ＭＳ ゴシック"/>
+              </a:rPr>
+              <a:t>KO </a:t>
+            </a:r>
+            <a:r>
+              <a:rPr lang="en-US" b="1" i="0" u="none" strike="noStrike" baseline="0" dirty="0" err="1" smtClean="0">
+                <a:solidFill>
+                  <a:srgbClr val="345A8A"/>
+                </a:solidFill>
+                <a:latin typeface="Calibri"/>
+                <a:ea typeface="ＭＳ ゴシック"/>
+              </a:rPr>
               <a:t>Templating</a:t>
             </a:r>
-            <a:endParaRPr lang="en-US" sz="3600" dirty="0"/>
-          </a:p>
-        </p:txBody>
-      </p:sp>
-      <p:sp>
-        <p:nvSpPr>
-          <p:cNvPr id="3" name="Subtitle 2"/>
-          <p:cNvSpPr>
-            <a:spLocks noGrp="1"/>
-          </p:cNvSpPr>
-          <p:nvPr>
-            <p:ph type="subTitle" idx="1"/>
-          </p:nvPr>
-        </p:nvSpPr>
-        <p:spPr/>
-        <p:txBody>
-          <a:bodyPr/>
-          <a:lstStyle/>
-          <a:p>
-            <a:endParaRPr lang="en-US" dirty="0"/>
+            <a:r>
+              <a:rPr lang="en-US" b="1" i="0" u="none" strike="noStrike" baseline="0" dirty="0" smtClean="0">
+                <a:solidFill>
+                  <a:srgbClr val="345A8A"/>
+                </a:solidFill>
+                <a:latin typeface="Calibri"/>
+                <a:ea typeface="ＭＳ ゴシック"/>
+              </a:rPr>
+              <a:t> offers a powerful way to reuse and condense your code base</a:t>
+            </a:r>
+            <a:endParaRPr lang="en-US" b="1" i="0" u="none" strike="noStrike" baseline="0" dirty="0" smtClean="0">
+              <a:solidFill>
+                <a:srgbClr val="345A8A"/>
+              </a:solidFill>
+              <a:latin typeface="Times New Roman"/>
+              <a:ea typeface="ＭＳ ゴシック"/>
+            </a:endParaRPr>
+          </a:p>
+        </p:txBody>
+      </p:sp>
+      <p:sp>
+        <p:nvSpPr>
+          <p:cNvPr id="3" name="Text Placeholder 2"/>
+          <p:cNvSpPr>
+            <a:spLocks noGrp="1"/>
+          </p:cNvSpPr>
+          <p:nvPr>
+            <p:ph type="body" idx="1"/>
+          </p:nvPr>
+        </p:nvSpPr>
+        <p:spPr>
+          <a:xfrm>
+            <a:off x="457200" y="2606253"/>
+            <a:ext cx="8229600" cy="3519910"/>
+          </a:xfrm>
+        </p:spPr>
+        <p:txBody>
+          <a:bodyPr/>
+          <a:lstStyle/>
+          <a:p>
+            <a:pPr marR="0" lvl="0" rtl="0"/>
+            <a:r>
+              <a:rPr lang="en-US" b="1" i="0" u="none" strike="noStrike" baseline="0" dirty="0" smtClean="0">
+                <a:solidFill>
+                  <a:srgbClr val="4F81BD"/>
+                </a:solidFill>
+                <a:latin typeface="Calibri"/>
+                <a:ea typeface="ＭＳ ゴシック"/>
+              </a:rPr>
+              <a:t>KO allows other template engines, but KO has a very handy built in template system</a:t>
+            </a:r>
           </a:p>
         </p:txBody>
       </p:sp>
     </p:spTree>
     <p:extLst>
       <p:ext uri="{BB962C8B-B14F-4D97-AF65-F5344CB8AC3E}">
-        <p14:creationId xmlns:p14="http://schemas.microsoft.com/office/powerpoint/2010/main" val="2349990538"/>
+        <p14:creationId xmlns:p14="http://schemas.microsoft.com/office/powerpoint/2010/main" val="2168605684"/>
       </p:ext>
     </p:extLst>
   </p:cSld>
   <p:clrMapOvr>
     <a:masterClrMapping/>
   </p:clrMapOvr>
-  <p:timing>
-    <p:tnLst>
-      <p:par>
-        <p:cTn xmlns:p14="http://schemas.microsoft.com/office/powerpoint/2010/main" id="1" dur="indefinite" restart="never" nodeType="tmRoot"/>
-      </p:par>
-    </p:tnLst>
-  </p:timing>
 </p:sld>
 </file>
 
@@ -6048,78 +6085,174 @@
             <p:ph type="title"/>
           </p:nvPr>
         </p:nvSpPr>
-        <p:spPr>
-          <a:xfrm>
-            <a:off x="549275" y="-800183"/>
-            <a:ext cx="8042276" cy="3152475"/>
-          </a:xfrm>
-        </p:spPr>
+        <p:spPr/>
+        <p:txBody>
+          <a:bodyPr/>
+          <a:lstStyle/>
+          <a:p>
+            <a:pPr marR="0" rtl="0"/>
+            <a:r>
+              <a:rPr lang="en-US" b="1" i="0" u="none" strike="noStrike" baseline="0" dirty="0" err="1" smtClean="0">
+                <a:solidFill>
+                  <a:srgbClr val="345A8A"/>
+                </a:solidFill>
+                <a:latin typeface="Calibri"/>
+                <a:ea typeface="ＭＳ ゴシック"/>
+              </a:rPr>
+              <a:t>Templating</a:t>
+            </a:r>
+            <a:r>
+              <a:rPr lang="en-US" b="1" i="0" u="none" strike="noStrike" baseline="0" dirty="0" smtClean="0">
+                <a:solidFill>
+                  <a:srgbClr val="345A8A"/>
+                </a:solidFill>
+                <a:latin typeface="Calibri"/>
+                <a:ea typeface="ＭＳ ゴシック"/>
+              </a:rPr>
+              <a:t> requires </a:t>
+            </a:r>
+            <a:r>
+              <a:rPr lang="en-US" b="1" i="0" u="none" strike="noStrike" baseline="0" dirty="0" smtClean="0">
+                <a:solidFill>
+                  <a:srgbClr val="345A8A"/>
+                </a:solidFill>
+                <a:latin typeface="Calibri"/>
+                <a:ea typeface="ＭＳ ゴシック"/>
+              </a:rPr>
+              <a:t>2 parts</a:t>
+            </a:r>
+          </a:p>
+        </p:txBody>
+      </p:sp>
+      <p:sp>
+        <p:nvSpPr>
+          <p:cNvPr id="3" name="Text Placeholder 2"/>
+          <p:cNvSpPr>
+            <a:spLocks noGrp="1"/>
+          </p:cNvSpPr>
+          <p:nvPr>
+            <p:ph type="body" idx="1"/>
+          </p:nvPr>
+        </p:nvSpPr>
+        <p:spPr/>
         <p:txBody>
           <a:bodyPr>
-            <a:normAutofit/>
+            <a:normAutofit fontScale="70000" lnSpcReduction="20000"/>
           </a:bodyPr>
           <a:lstStyle/>
           <a:p>
-            <a:pPr marR="0" rtl="0"/>
+            <a:pPr lvl="0"/>
             <a:r>
               <a:rPr lang="en-US" b="1" i="0" u="none" strike="noStrike" baseline="0" dirty="0" smtClean="0">
                 <a:solidFill>
-                  <a:srgbClr val="345A8A"/>
-                </a:solidFill>
-                <a:latin typeface="Calibri"/>
-                <a:ea typeface="ＭＳ ゴシック"/>
-              </a:rPr>
-              <a:t>KO </a:t>
-            </a:r>
-            <a:r>
-              <a:rPr lang="en-US" b="1" i="0" u="none" strike="noStrike" baseline="0" dirty="0" err="1" smtClean="0">
-                <a:solidFill>
-                  <a:srgbClr val="345A8A"/>
-                </a:solidFill>
-                <a:latin typeface="Calibri"/>
-                <a:ea typeface="ＭＳ ゴシック"/>
-              </a:rPr>
-              <a:t>Templating</a:t>
-            </a:r>
-            <a:r>
-              <a:rPr lang="en-US" b="1" i="0" u="none" strike="noStrike" baseline="0" dirty="0" smtClean="0">
-                <a:solidFill>
-                  <a:srgbClr val="345A8A"/>
-                </a:solidFill>
-                <a:latin typeface="Calibri"/>
-                <a:ea typeface="ＭＳ ゴシック"/>
-              </a:rPr>
-              <a:t> offers a powerful way to reuse and condense your code base</a:t>
+                  <a:srgbClr val="4F81BD"/>
+                </a:solidFill>
+                <a:latin typeface="Calibri"/>
+                <a:ea typeface="ＭＳ ゴシック"/>
+              </a:rPr>
+              <a:t>“template” data-</a:t>
+            </a:r>
+            <a:r>
+              <a:rPr lang="en-US" b="1" dirty="0">
+                <a:solidFill>
+                  <a:srgbClr val="4F81BD"/>
+                </a:solidFill>
+                <a:latin typeface="Calibri"/>
+                <a:ea typeface="ＭＳ ゴシック"/>
+              </a:rPr>
+              <a:t>bind ❒</a:t>
             </a:r>
             <a:endParaRPr lang="en-US" b="1" i="0" u="none" strike="noStrike" baseline="0" dirty="0" smtClean="0">
               <a:solidFill>
-                <a:srgbClr val="345A8A"/>
+                <a:srgbClr val="4F81BD"/>
               </a:solidFill>
-              <a:latin typeface="Times New Roman"/>
+              <a:latin typeface="Calibri"/>
               <a:ea typeface="ＭＳ ゴシック"/>
             </a:endParaRPr>
           </a:p>
-        </p:txBody>
-      </p:sp>
-      <p:sp>
-        <p:nvSpPr>
-          <p:cNvPr id="3" name="Text Placeholder 2"/>
-          <p:cNvSpPr>
-            <a:spLocks noGrp="1"/>
-          </p:cNvSpPr>
-          <p:nvPr>
-            <p:ph type="body" idx="1"/>
-          </p:nvPr>
-        </p:nvSpPr>
-        <p:spPr>
-          <a:xfrm>
-            <a:off x="457200" y="2606253"/>
-            <a:ext cx="8229600" cy="3519910"/>
-          </a:xfrm>
-        </p:spPr>
-        <p:txBody>
-          <a:bodyPr/>
-          <a:lstStyle/>
+          <a:p>
+            <a:pPr lvl="0"/>
+            <a:r>
+              <a:rPr lang="en-US" b="1" i="0" u="none" strike="noStrike" baseline="0" dirty="0" smtClean="0">
+                <a:solidFill>
+                  <a:srgbClr val="4F81BD"/>
+                </a:solidFill>
+                <a:latin typeface="Calibri"/>
+                <a:ea typeface="ＭＳ ゴシック"/>
+              </a:rPr>
+              <a:t>A custom script tag that contains your template </a:t>
+            </a:r>
+            <a:r>
+              <a:rPr lang="en-US" b="1" dirty="0">
+                <a:solidFill>
+                  <a:srgbClr val="4F81BD"/>
+                </a:solidFill>
+                <a:latin typeface="Calibri"/>
+                <a:ea typeface="ＭＳ ゴシック"/>
+              </a:rPr>
+              <a:t>content ❒ </a:t>
+            </a:r>
+            <a:r>
+              <a:rPr lang="en-US" sz="2000" i="1" dirty="0" smtClean="0">
+                <a:solidFill>
+                  <a:srgbClr val="A6A6A6"/>
+                </a:solidFill>
+                <a:latin typeface="Calibri"/>
+                <a:ea typeface="ＭＳ ゴシック"/>
+              </a:rPr>
+              <a:t>see </a:t>
+            </a:r>
+            <a:r>
+              <a:rPr lang="en-US" sz="2000" i="1" dirty="0" err="1" smtClean="0">
+                <a:solidFill>
+                  <a:srgbClr val="A6A6A6"/>
+                </a:solidFill>
+                <a:latin typeface="Calibri"/>
+                <a:ea typeface="ＭＳ ゴシック"/>
+              </a:rPr>
+              <a:t>templateBinding.html</a:t>
+            </a:r>
+            <a:endParaRPr lang="en-US" sz="2000" i="1" u="none" strike="noStrike" baseline="0" dirty="0" smtClean="0">
+              <a:solidFill>
+                <a:srgbClr val="A6A6A6"/>
+              </a:solidFill>
+              <a:latin typeface="Calibri"/>
+              <a:ea typeface="ＭＳ ゴシック"/>
+            </a:endParaRPr>
+          </a:p>
+          <a:p>
+            <a:pPr marR="0" lvl="1" rtl="0"/>
+            <a:r>
+              <a:rPr lang="en-US" b="1" i="0" u="none" strike="noStrike" baseline="0" dirty="0" smtClean="0">
+                <a:solidFill>
+                  <a:srgbClr val="4F81BD"/>
+                </a:solidFill>
+                <a:latin typeface="Calibri"/>
+                <a:ea typeface="ＭＳ ゴシック"/>
+              </a:rPr>
+              <a:t>Combine this with the ‘</a:t>
+            </a:r>
+            <a:r>
+              <a:rPr lang="en-US" b="1" i="0" u="none" strike="noStrike" baseline="0" dirty="0" err="1" smtClean="0">
+                <a:solidFill>
+                  <a:srgbClr val="4F81BD"/>
+                </a:solidFill>
+                <a:latin typeface="Calibri"/>
+                <a:ea typeface="ＭＳ ゴシック"/>
+              </a:rPr>
+              <a:t>foreach</a:t>
+            </a:r>
+            <a:r>
+              <a:rPr lang="en-US" b="1" i="0" u="none" strike="noStrike" baseline="0" dirty="0" smtClean="0">
+                <a:solidFill>
+                  <a:srgbClr val="4F81BD"/>
+                </a:solidFill>
+                <a:latin typeface="Calibri"/>
+                <a:ea typeface="ＭＳ ゴシック"/>
+              </a:rPr>
+              <a:t>’ property of the template bind and you can render several instances of the same template with different values.</a:t>
+            </a:r>
+          </a:p>
           <a:p>
             <a:pPr marR="0" lvl="0" rtl="0"/>
             <a:r>
@@ -6130,15 +6263,241 @@
                 <a:latin typeface="Calibri"/>
                 <a:ea typeface="ＭＳ ゴシック"/>
               </a:rPr>
-              <a:t>KO allows other template engines, but KO has a very handy built in template system</a:t>
-            </a:r>
+              <a:t>Adding a template bind is simple:</a:t>
+            </a:r>
+          </a:p>
+          <a:p>
+            <a:pPr marR="0" lvl="1" rtl="0"/>
+            <a:r>
+              <a:rPr lang="en-US" b="1" i="0" u="none" strike="noStrike" baseline="0" dirty="0" smtClean="0">
+                <a:solidFill>
+                  <a:srgbClr val="4F81BD"/>
+                </a:solidFill>
+                <a:latin typeface="Calibri"/>
+                <a:ea typeface="ＭＳ ゴシック"/>
+              </a:rPr>
+              <a:t>At face value this data bind will find your template with the “</a:t>
+            </a:r>
+            <a:r>
+              <a:rPr lang="en-US" b="1" i="0" u="none" strike="noStrike" baseline="0" dirty="0" err="1" smtClean="0">
+                <a:solidFill>
+                  <a:srgbClr val="4F81BD"/>
+                </a:solidFill>
+                <a:latin typeface="Calibri"/>
+                <a:ea typeface="ＭＳ ゴシック"/>
+              </a:rPr>
+              <a:t>myTemplate</a:t>
+            </a:r>
+            <a:r>
+              <a:rPr lang="en-US" b="1" i="0" u="none" strike="noStrike" baseline="0" dirty="0" smtClean="0">
+                <a:solidFill>
+                  <a:srgbClr val="4F81BD"/>
+                </a:solidFill>
+                <a:latin typeface="Calibri"/>
+                <a:ea typeface="ＭＳ ゴシック"/>
+              </a:rPr>
+              <a:t>” name and render it in your display</a:t>
+            </a:r>
+          </a:p>
+          <a:p>
+            <a:pPr marR="0" lvl="1" rtl="0"/>
+            <a:r>
+              <a:rPr lang="en-US" b="1" i="0" u="none" strike="noStrike" baseline="0" dirty="0" smtClean="0">
+                <a:solidFill>
+                  <a:srgbClr val="4F81BD"/>
+                </a:solidFill>
+                <a:latin typeface="Calibri"/>
+                <a:ea typeface="ＭＳ ゴシック"/>
+              </a:rPr>
+              <a:t>If you don’t provide it a context, it will assume the context of the current level in your view </a:t>
+            </a:r>
+            <a:r>
+              <a:rPr lang="en-US" b="1" i="0" u="none" strike="noStrike" baseline="0" dirty="0" smtClean="0">
+                <a:solidFill>
+                  <a:srgbClr val="4F81BD"/>
+                </a:solidFill>
+                <a:latin typeface="Calibri"/>
+                <a:ea typeface="ＭＳ ゴシック"/>
+              </a:rPr>
+              <a:t>model </a:t>
+            </a:r>
+            <a:endParaRPr lang="en-US" b="1" i="0" u="none" strike="noStrike" baseline="0" dirty="0" smtClean="0">
+              <a:solidFill>
+                <a:srgbClr val="4F81BD"/>
+              </a:solidFill>
+              <a:latin typeface="Calibri"/>
+              <a:ea typeface="ＭＳ ゴシック"/>
+            </a:endParaRPr>
+          </a:p>
+          <a:p>
+            <a:pPr lvl="1"/>
+            <a:r>
+              <a:rPr lang="en-US" b="1" i="0" u="none" strike="noStrike" baseline="0" dirty="0" smtClean="0">
+                <a:solidFill>
+                  <a:srgbClr val="4F81BD"/>
+                </a:solidFill>
+                <a:latin typeface="Calibri"/>
+                <a:ea typeface="ＭＳ ゴシック"/>
+              </a:rPr>
+              <a:t>Control the context of your template by supplying a data parameter</a:t>
+            </a:r>
+            <a:r>
+              <a:rPr lang="en-US" b="1" dirty="0">
+                <a:solidFill>
+                  <a:srgbClr val="4F81BD"/>
+                </a:solidFill>
+                <a:latin typeface="Calibri"/>
+                <a:ea typeface="ＭＳ ゴシック"/>
+              </a:rPr>
+              <a:t>: </a:t>
+            </a:r>
+            <a:r>
+              <a:rPr lang="en-US" b="1" dirty="0" smtClean="0">
+                <a:solidFill>
+                  <a:srgbClr val="4F81BD"/>
+                </a:solidFill>
+                <a:latin typeface="Calibri"/>
+                <a:ea typeface="ＭＳ ゴシック"/>
+              </a:rPr>
+              <a:t>❒</a:t>
+            </a:r>
+            <a:r>
+              <a:rPr lang="en-US" sz="2000" i="1" dirty="0" smtClean="0">
+                <a:solidFill>
+                  <a:srgbClr val="A6A6A6"/>
+                </a:solidFill>
+                <a:latin typeface="Calibri"/>
+                <a:ea typeface="ＭＳ ゴシック"/>
+              </a:rPr>
+              <a:t> </a:t>
+            </a:r>
+            <a:r>
+              <a:rPr lang="en-US" sz="1600" i="1" dirty="0">
+                <a:solidFill>
+                  <a:srgbClr val="A6A6A6"/>
+                </a:solidFill>
+                <a:latin typeface="Calibri"/>
+                <a:ea typeface="ＭＳ ゴシック"/>
+              </a:rPr>
+              <a:t>see </a:t>
+            </a:r>
+            <a:r>
+              <a:rPr lang="en-US" sz="1600" i="1" dirty="0" err="1">
+                <a:solidFill>
+                  <a:srgbClr val="A6A6A6"/>
+                </a:solidFill>
+                <a:latin typeface="Calibri"/>
+                <a:ea typeface="ＭＳ ゴシック"/>
+              </a:rPr>
+              <a:t>templateContext.html</a:t>
+            </a:r>
+            <a:endParaRPr lang="en-US" sz="1600" i="1" u="none" strike="noStrike" baseline="0" dirty="0" smtClean="0">
+              <a:solidFill>
+                <a:srgbClr val="A6A6A6"/>
+              </a:solidFill>
+              <a:latin typeface="Calibri"/>
+              <a:ea typeface="ＭＳ ゴシック"/>
+            </a:endParaRPr>
+          </a:p>
+          <a:p>
+            <a:pPr marR="0" lvl="2" rtl="0"/>
+            <a:r>
+              <a:rPr lang="en-US" b="1" i="1" u="none" strike="noStrike" baseline="0" dirty="0" smtClean="0">
+                <a:solidFill>
+                  <a:srgbClr val="4F81BD"/>
+                </a:solidFill>
+                <a:latin typeface="Calibri"/>
+                <a:ea typeface="ＭＳ ゴシック"/>
+              </a:rPr>
+              <a:t>Any bindings for this instance of the template will be in context of the specific item instead of the root level view model</a:t>
+            </a:r>
+          </a:p>
+          <a:p>
+            <a:pPr marR="0" lvl="1" rtl="0"/>
+            <a:r>
+              <a:rPr lang="en-US" b="1" i="0" u="none" strike="noStrike" baseline="0" dirty="0" smtClean="0">
+                <a:solidFill>
+                  <a:srgbClr val="4F81BD"/>
+                </a:solidFill>
+                <a:latin typeface="Calibri"/>
+                <a:ea typeface="ＭＳ ゴシック"/>
+              </a:rPr>
+              <a:t>You can iterate over a collection in your data model to repeat the template for each item</a:t>
+            </a:r>
+            <a:r>
+              <a:rPr lang="en-US" b="1" i="0" u="none" strike="noStrike" baseline="0" dirty="0" smtClean="0">
+                <a:solidFill>
+                  <a:srgbClr val="4F81BD"/>
+                </a:solidFill>
+                <a:latin typeface="Calibri"/>
+                <a:ea typeface="ＭＳ ゴシック"/>
+              </a:rPr>
+              <a:t>. </a:t>
+            </a:r>
+            <a:endParaRPr lang="en-US" b="1" i="0" u="none" strike="noStrike" baseline="0" dirty="0" smtClean="0">
+              <a:solidFill>
+                <a:srgbClr val="4F81BD"/>
+              </a:solidFill>
+              <a:latin typeface="Calibri"/>
+              <a:ea typeface="ＭＳ ゴシック"/>
+            </a:endParaRPr>
+          </a:p>
+          <a:p>
+            <a:pPr lvl="2"/>
+            <a:r>
+              <a:rPr lang="en-US" b="1" i="1" u="none" strike="noStrike" baseline="0" dirty="0" smtClean="0">
+                <a:solidFill>
+                  <a:srgbClr val="4F81BD"/>
+                </a:solidFill>
+                <a:latin typeface="Calibri"/>
+                <a:ea typeface="ＭＳ ゴシック"/>
+              </a:rPr>
+              <a:t>This will repeat the template for each item in the ‘guys’ object and also put the template in the context of ‘guys</a:t>
+            </a:r>
+            <a:r>
+              <a:rPr lang="en-US" b="1" i="1" dirty="0">
+                <a:solidFill>
+                  <a:srgbClr val="4F81BD"/>
+                </a:solidFill>
+                <a:latin typeface="Calibri"/>
+                <a:ea typeface="ＭＳ ゴシック"/>
+              </a:rPr>
+              <a:t>’ ❒ </a:t>
+            </a:r>
+            <a:r>
+              <a:rPr lang="en-US" i="1" dirty="0">
+                <a:solidFill>
+                  <a:srgbClr val="A6A6A6"/>
+                </a:solidFill>
+                <a:latin typeface="Calibri"/>
+                <a:ea typeface="ＭＳ ゴシック"/>
+              </a:rPr>
+              <a:t>see </a:t>
+            </a:r>
+            <a:r>
+              <a:rPr lang="en-US" i="1" dirty="0" err="1">
+                <a:solidFill>
+                  <a:srgbClr val="A6A6A6"/>
+                </a:solidFill>
+                <a:latin typeface="Calibri"/>
+                <a:ea typeface="ＭＳ ゴシック"/>
+              </a:rPr>
+              <a:t>templateIteration.html</a:t>
+            </a:r>
+            <a:endParaRPr lang="en-US" i="1" u="none" strike="noStrike" baseline="0" dirty="0" smtClean="0">
+              <a:solidFill>
+                <a:srgbClr val="A6A6A6"/>
+              </a:solidFill>
+              <a:latin typeface="Calibri"/>
+              <a:ea typeface="ＭＳ ゴシック"/>
+            </a:endParaRPr>
           </a:p>
         </p:txBody>
       </p:sp>
     </p:spTree>
     <p:extLst>
       <p:ext uri="{BB962C8B-B14F-4D97-AF65-F5344CB8AC3E}">
-        <p14:creationId xmlns:p14="http://schemas.microsoft.com/office/powerpoint/2010/main" val="2168605684"/>
+        <p14:creationId xmlns:p14="http://schemas.microsoft.com/office/powerpoint/2010/main" val="910141512"/>
       </p:ext>
     </p:extLst>
   </p:cSld>

</xml_diff>

<commit_message>
added new example and updated titles for each example
</commit_message>
<xml_diff>
--- a/Knockout Templating - slides.pptx
+++ b/Knockout Templating - slides.pptx
@@ -22,6 +22,26 @@
   </p:sldIdLst>
   <p:sldSz cx="9144000" cy="6858000" type="screen4x3"/>
   <p:notesSz cx="6858000" cy="9144000"/>
+  <p:custShowLst>
+    <p:custShow name="Custom Show 1" id="0">
+      <p:sldLst>
+        <p:sld r:id="rId2"/>
+        <p:sld r:id="rId3"/>
+        <p:sld r:id="rId4"/>
+        <p:sld r:id="rId5"/>
+        <p:sld r:id="rId6"/>
+        <p:sld r:id="rId7"/>
+        <p:sld r:id="rId8"/>
+        <p:sld r:id="rId9"/>
+        <p:sld r:id="rId10"/>
+        <p:sld r:id="rId11"/>
+        <p:sld r:id="rId12"/>
+        <p:sld r:id="rId13"/>
+        <p:sld r:id="rId14"/>
+        <p:sld r:id="rId15"/>
+      </p:sldLst>
+    </p:custShow>
+  </p:custShowLst>
   <p:defaultTextStyle>
     <a:defPPr>
       <a:defRPr lang="en-US"/>
@@ -403,7 +423,7 @@
           <a:p>
             <a:fld id="{B01F9CA3-105E-4857-9057-6DB6197DA786}" type="datetimeFigureOut">
               <a:rPr lang="en-US" smtClean="0"/>
-              <a:t>8/20/12</a:t>
+              <a:t>8/21/12</a:t>
             </a:fld>
             <a:endParaRPr lang="en-US"/>
           </a:p>
@@ -595,7 +615,7 @@
           <a:p>
             <a:fld id="{B01F9CA3-105E-4857-9057-6DB6197DA786}" type="datetimeFigureOut">
               <a:rPr lang="en-US" smtClean="0"/>
-              <a:t>8/20/12</a:t>
+              <a:t>8/21/12</a:t>
             </a:fld>
             <a:endParaRPr lang="en-US"/>
           </a:p>
@@ -864,7 +884,7 @@
           <a:p>
             <a:fld id="{B01F9CA3-105E-4857-9057-6DB6197DA786}" type="datetimeFigureOut">
               <a:rPr lang="en-US" smtClean="0"/>
-              <a:t>8/20/12</a:t>
+              <a:t>8/21/12</a:t>
             </a:fld>
             <a:endParaRPr lang="en-US"/>
           </a:p>
@@ -1043,7 +1063,7 @@
           <a:p>
             <a:fld id="{B01F9CA3-105E-4857-9057-6DB6197DA786}" type="datetimeFigureOut">
               <a:rPr lang="en-US" smtClean="0"/>
-              <a:t>8/20/12</a:t>
+              <a:t>8/21/12</a:t>
             </a:fld>
             <a:endParaRPr lang="en-US"/>
           </a:p>
@@ -1208,7 +1228,7 @@
           <a:p>
             <a:fld id="{5C57DCF7-E8A4-6F41-9F8E-7D2FF09A063F}" type="datetimeFigureOut">
               <a:rPr lang="en-US" smtClean="0"/>
-              <a:t>8/20/12</a:t>
+              <a:t>8/21/12</a:t>
             </a:fld>
             <a:endParaRPr lang="en-US"/>
           </a:p>
@@ -1382,7 +1402,7 @@
           <a:p>
             <a:fld id="{B01F9CA3-105E-4857-9057-6DB6197DA786}" type="datetimeFigureOut">
               <a:rPr lang="en-US" smtClean="0"/>
-              <a:t>8/20/12</a:t>
+              <a:t>8/21/12</a:t>
             </a:fld>
             <a:endParaRPr lang="en-US"/>
           </a:p>
@@ -1624,7 +1644,7 @@
           <a:p>
             <a:fld id="{B01F9CA3-105E-4857-9057-6DB6197DA786}" type="datetimeFigureOut">
               <a:rPr lang="en-US" smtClean="0"/>
-              <a:t>8/20/12</a:t>
+              <a:t>8/21/12</a:t>
             </a:fld>
             <a:endParaRPr lang="en-US"/>
           </a:p>
@@ -1947,7 +1967,7 @@
           <a:p>
             <a:fld id="{B01F9CA3-105E-4857-9057-6DB6197DA786}" type="datetimeFigureOut">
               <a:rPr lang="en-US" smtClean="0"/>
-              <a:t>8/20/12</a:t>
+              <a:t>8/21/12</a:t>
             </a:fld>
             <a:endParaRPr lang="en-US"/>
           </a:p>
@@ -2245,7 +2265,7 @@
           <a:p>
             <a:fld id="{B01F9CA3-105E-4857-9057-6DB6197DA786}" type="datetimeFigureOut">
               <a:rPr lang="en-US" smtClean="0"/>
-              <a:t>8/20/12</a:t>
+              <a:t>8/21/12</a:t>
             </a:fld>
             <a:endParaRPr lang="en-US"/>
           </a:p>
@@ -2701,7 +2721,7 @@
           <a:p>
             <a:fld id="{B01F9CA3-105E-4857-9057-6DB6197DA786}" type="datetimeFigureOut">
               <a:rPr lang="en-US" smtClean="0"/>
-              <a:t>8/20/12</a:t>
+              <a:t>8/21/12</a:t>
             </a:fld>
             <a:endParaRPr lang="en-US"/>
           </a:p>
@@ -2814,7 +2834,7 @@
           <a:p>
             <a:fld id="{B01F9CA3-105E-4857-9057-6DB6197DA786}" type="datetimeFigureOut">
               <a:rPr lang="en-US" smtClean="0"/>
-              <a:t>8/20/12</a:t>
+              <a:t>8/21/12</a:t>
             </a:fld>
             <a:endParaRPr lang="en-US"/>
           </a:p>
@@ -2904,7 +2924,7 @@
           <a:p>
             <a:fld id="{B01F9CA3-105E-4857-9057-6DB6197DA786}" type="datetimeFigureOut">
               <a:rPr lang="en-US" smtClean="0"/>
-              <a:t>8/20/12</a:t>
+              <a:t>8/21/12</a:t>
             </a:fld>
             <a:endParaRPr lang="en-US"/>
           </a:p>
@@ -3186,7 +3206,7 @@
           <a:p>
             <a:fld id="{B01F9CA3-105E-4857-9057-6DB6197DA786}" type="datetimeFigureOut">
               <a:rPr lang="en-US" smtClean="0"/>
-              <a:t>8/20/12</a:t>
+              <a:t>8/21/12</a:t>
             </a:fld>
             <a:endParaRPr lang="en-US"/>
           </a:p>
@@ -3392,7 +3412,7 @@
           <a:p>
             <a:fld id="{B01F9CA3-105E-4857-9057-6DB6197DA786}" type="datetimeFigureOut">
               <a:rPr lang="en-US" smtClean="0"/>
-              <a:t>8/20/12</a:t>
+              <a:t>8/21/12</a:t>
             </a:fld>
             <a:endParaRPr lang="en-US"/>
           </a:p>
@@ -3992,8 +4012,13 @@
             </a:r>
             <a:r>
               <a:rPr lang="en-US" dirty="0"/>
-              <a:t>, Independent Template Observables &amp; Delayed content updating</a:t>
-            </a:r>
+              <a:t>, Independent Template Observables &amp; Delayed </a:t>
+            </a:r>
+            <a:r>
+              <a:rPr lang="en-US" dirty="0" smtClean="0"/>
+              <a:t>Content Updating</a:t>
+            </a:r>
+            <a:endParaRPr lang="en-US" dirty="0"/>
           </a:p>
         </p:txBody>
       </p:sp>
@@ -4095,12 +4120,12 @@
               <a:t>see </a:t>
             </a:r>
             <a:r>
-              <a:rPr lang="en-US" sz="1400" i="1" dirty="0" err="1">
+              <a:rPr lang="en-US" sz="1400" i="1">
                 <a:solidFill>
                   <a:srgbClr val="A6A6A6"/>
                 </a:solidFill>
               </a:rPr>
-              <a:t>templateTechniques.html</a:t>
+              <a:t>templateNesting.html</a:t>
             </a:r>
             <a:endParaRPr lang="en-US" sz="1400" i="1" dirty="0">
               <a:solidFill>
@@ -4174,7 +4199,7 @@
                 <a:latin typeface="Calibri"/>
                 <a:ea typeface="ＭＳ ゴシック"/>
               </a:rPr>
-              <a:t>templating</a:t>
+              <a:t>Templating</a:t>
             </a:r>
             <a:endParaRPr lang="en-US" b="1" i="0" u="none" strike="noStrike" baseline="0" dirty="0" smtClean="0">
               <a:solidFill>
@@ -5018,37 +5043,7 @@
                 <a:latin typeface="Calibri"/>
                 <a:ea typeface="ＭＳ ゴシック"/>
               </a:rPr>
-              <a:t>View Models are just data structures to organize your observables and various other parts of your </a:t>
-            </a:r>
-            <a:r>
-              <a:rPr lang="en-US" b="1" i="0" u="none" strike="noStrike" baseline="0" dirty="0" smtClean="0">
-                <a:solidFill>
-                  <a:srgbClr val="4F81BD"/>
-                </a:solidFill>
-                <a:latin typeface="Calibri"/>
-                <a:ea typeface="ＭＳ ゴシック"/>
-              </a:rPr>
-              <a:t>JavaScript, </a:t>
-            </a:r>
-            <a:r>
-              <a:rPr lang="en-US" b="1" i="0" u="none" strike="noStrike" baseline="0" dirty="0" smtClean="0">
-                <a:solidFill>
-                  <a:srgbClr val="4F81BD"/>
-                </a:solidFill>
-                <a:latin typeface="Calibri"/>
-                <a:ea typeface="ＭＳ ゴシック"/>
-              </a:rPr>
-              <a:t>typically as a JSON </a:t>
-            </a:r>
-            <a:r>
-              <a:rPr lang="en-US" b="1" i="0" u="none" strike="noStrike" baseline="0" dirty="0" smtClean="0">
-                <a:solidFill>
-                  <a:srgbClr val="4F81BD"/>
-                </a:solidFill>
-                <a:latin typeface="Calibri"/>
-                <a:ea typeface="ＭＳ ゴシック"/>
-              </a:rPr>
-              <a:t>object </a:t>
+              <a:t>View Models are just data structures to organize your observables and various other parts of your JavaScript, typically as a JSON object </a:t>
             </a:r>
             <a:r>
               <a:rPr lang="en-US" i="1" dirty="0">
@@ -5481,35 +5476,8 @@
                 <a:latin typeface="Calibri"/>
                 <a:ea typeface="ＭＳ ゴシック"/>
               </a:rPr>
-              <a:t>notify </a:t>
-            </a:r>
-            <a:r>
-              <a:rPr lang="en-US" b="1" i="0" u="none" strike="noStrike" baseline="0" dirty="0" smtClean="0">
-                <a:solidFill>
-                  <a:srgbClr val="4F81BD"/>
-                </a:solidFill>
-                <a:latin typeface="Calibri"/>
-                <a:ea typeface="ＭＳ ゴシック"/>
-              </a:rPr>
-              <a:t>any other part of your data or display if that value </a:t>
-            </a:r>
-            <a:r>
-              <a:rPr lang="en-US" b="1" i="0" u="none" strike="noStrike" baseline="0" dirty="0" smtClean="0">
-                <a:solidFill>
-                  <a:srgbClr val="4F81BD"/>
-                </a:solidFill>
-                <a:latin typeface="Calibri"/>
-                <a:ea typeface="ＭＳ ゴシック"/>
-              </a:rPr>
-              <a:t>changes</a:t>
-            </a:r>
-            <a:endParaRPr lang="en-US" b="1" i="0" u="none" strike="noStrike" baseline="0" dirty="0" smtClean="0">
-              <a:solidFill>
-                <a:srgbClr val="4F81BD"/>
-              </a:solidFill>
-              <a:latin typeface="Calibri"/>
-              <a:ea typeface="ＭＳ ゴシック"/>
-            </a:endParaRPr>
+              <a:t>notify any other part of your data or display if that value changes</a:t>
+            </a:r>
           </a:p>
           <a:p>
             <a:pPr lvl="2"/>
@@ -5551,35 +5519,8 @@
                 <a:latin typeface="Calibri"/>
                 <a:ea typeface="ＭＳ ゴシック"/>
               </a:rPr>
-              <a:t>There </a:t>
-            </a:r>
-            <a:r>
-              <a:rPr lang="en-US" b="1" i="1" u="none" strike="noStrike" baseline="0" dirty="0" smtClean="0">
-                <a:solidFill>
-                  <a:srgbClr val="4F81BD"/>
-                </a:solidFill>
-                <a:latin typeface="Calibri"/>
-                <a:ea typeface="ＭＳ ゴシック"/>
-              </a:rPr>
-              <a:t>are also computed observables that allow you set an observable based off of the result of a function and observable arrays, but I won’t go into detail about </a:t>
-            </a:r>
-            <a:r>
-              <a:rPr lang="en-US" b="1" i="1" u="none" strike="noStrike" baseline="0" dirty="0" smtClean="0">
-                <a:solidFill>
-                  <a:srgbClr val="4F81BD"/>
-                </a:solidFill>
-                <a:latin typeface="Calibri"/>
-                <a:ea typeface="ＭＳ ゴシック"/>
-              </a:rPr>
-              <a:t>those</a:t>
-            </a:r>
-            <a:endParaRPr lang="en-US" b="1" i="1" u="none" strike="noStrike" baseline="0" dirty="0" smtClean="0">
-              <a:solidFill>
-                <a:srgbClr val="4F81BD"/>
-              </a:solidFill>
-              <a:latin typeface="Calibri"/>
-              <a:ea typeface="ＭＳ ゴシック"/>
-            </a:endParaRPr>
+              <a:t>There are also computed observables that allow you set an observable based off of the result of a function and observable arrays, but I won’t go into detail about those</a:t>
+            </a:r>
           </a:p>
         </p:txBody>
       </p:sp>
@@ -5681,17 +5622,7 @@
                 <a:latin typeface="Calibri"/>
                 <a:ea typeface="ＭＳ ゴシック"/>
               </a:rPr>
-              <a:t>So </a:t>
-            </a:r>
-            <a:r>
-              <a:rPr lang="en-US" b="1" i="1" u="none" strike="noStrike" baseline="0" dirty="0" smtClean="0">
-                <a:solidFill>
-                  <a:srgbClr val="4F81BD"/>
-                </a:solidFill>
-                <a:latin typeface="Calibri"/>
-                <a:ea typeface="ＭＳ ゴシック"/>
-              </a:rPr>
-              <a:t>now what do you do with these view-models and observables? That’s where data-binds come into play.</a:t>
+              <a:t>So now what do you do with these view-models and observables? That’s where data-binds come into play.</a:t>
             </a:r>
           </a:p>
           <a:p>
@@ -5764,7 +5695,17 @@
                 <a:latin typeface="Calibri"/>
                 <a:ea typeface="ＭＳ ゴシック"/>
               </a:rPr>
-              <a:t>What </a:t>
+              <a:t>What this allows you to do is any time “</a:t>
+            </a:r>
+            <a:r>
+              <a:rPr lang="en-US" b="0" i="0" u="none" strike="noStrike" baseline="0" dirty="0" err="1" smtClean="0">
+                <a:solidFill>
+                  <a:srgbClr val="243F60"/>
+                </a:solidFill>
+                <a:latin typeface="Calibri"/>
+                <a:ea typeface="ＭＳ ゴシック"/>
+              </a:rPr>
+              <a:t>firstName</a:t>
             </a:r>
             <a:r>
               <a:rPr lang="en-US" b="0" i="0" u="none" strike="noStrike" baseline="0" dirty="0" smtClean="0">
@@ -5774,47 +5715,7 @@
                 <a:latin typeface="Calibri"/>
                 <a:ea typeface="ＭＳ ゴシック"/>
               </a:rPr>
-              <a:t>this allows you to do is any time </a:t>
-            </a:r>
-            <a:r>
-              <a:rPr lang="en-US" b="0" i="0" u="none" strike="noStrike" baseline="0" dirty="0" smtClean="0">
-                <a:solidFill>
-                  <a:srgbClr val="243F60"/>
-                </a:solidFill>
-                <a:latin typeface="Calibri"/>
-                <a:ea typeface="ＭＳ ゴシック"/>
-              </a:rPr>
-              <a:t>“</a:t>
-            </a:r>
-            <a:r>
-              <a:rPr lang="en-US" b="0" i="0" u="none" strike="noStrike" baseline="0" dirty="0" err="1" smtClean="0">
-                <a:solidFill>
-                  <a:srgbClr val="243F60"/>
-                </a:solidFill>
-                <a:latin typeface="Calibri"/>
-                <a:ea typeface="ＭＳ ゴシック"/>
-              </a:rPr>
-              <a:t>firstName</a:t>
-            </a:r>
-            <a:r>
-              <a:rPr lang="en-US" b="0" i="0" u="none" strike="noStrike" baseline="0" dirty="0" smtClean="0">
-                <a:solidFill>
-                  <a:srgbClr val="243F60"/>
-                </a:solidFill>
-                <a:latin typeface="Calibri"/>
-                <a:ea typeface="ＭＳ ゴシック"/>
-              </a:rPr>
-              <a:t>” </a:t>
-            </a:r>
-            <a:r>
-              <a:rPr lang="en-US" b="0" i="0" u="none" strike="noStrike" baseline="0" dirty="0" smtClean="0">
-                <a:solidFill>
-                  <a:srgbClr val="243F60"/>
-                </a:solidFill>
-                <a:latin typeface="Calibri"/>
-                <a:ea typeface="ＭＳ ゴシック"/>
-              </a:rPr>
-              <a:t>changes all elements that are bound to it will update automatically. There’s no need to write any additional code to listen for changes or make updates.</a:t>
+              <a:t>” changes all elements that are bound to it will update automatically. There’s no need to write any additional code to listen for changes or make updates.</a:t>
             </a:r>
           </a:p>
           <a:p>
@@ -6109,17 +6010,7 @@
                 <a:latin typeface="Calibri"/>
                 <a:ea typeface="ＭＳ ゴシック"/>
               </a:rPr>
-              <a:t> requires </a:t>
-            </a:r>
-            <a:r>
-              <a:rPr lang="en-US" b="1" i="0" u="none" strike="noStrike" baseline="0" dirty="0" smtClean="0">
-                <a:solidFill>
-                  <a:srgbClr val="345A8A"/>
-                </a:solidFill>
-                <a:latin typeface="Calibri"/>
-                <a:ea typeface="ＭＳ ゴシック"/>
-              </a:rPr>
-              <a:t>2 parts</a:t>
+              <a:t> requires 2 parts</a:t>
             </a:r>
           </a:p>
         </p:txBody>
@@ -6309,25 +6200,8 @@
                 <a:latin typeface="Calibri"/>
                 <a:ea typeface="ＭＳ ゴシック"/>
               </a:rPr>
-              <a:t>If you don’t provide it a context, it will assume the context of the current level in your view </a:t>
-            </a:r>
-            <a:r>
-              <a:rPr lang="en-US" b="1" i="0" u="none" strike="noStrike" baseline="0" dirty="0" smtClean="0">
-                <a:solidFill>
-                  <a:srgbClr val="4F81BD"/>
-                </a:solidFill>
-                <a:latin typeface="Calibri"/>
-                <a:ea typeface="ＭＳ ゴシック"/>
-              </a:rPr>
-              <a:t>model </a:t>
-            </a:r>
-            <a:endParaRPr lang="en-US" b="1" i="0" u="none" strike="noStrike" baseline="0" dirty="0" smtClean="0">
-              <a:solidFill>
-                <a:srgbClr val="4F81BD"/>
-              </a:solidFill>
-              <a:latin typeface="Calibri"/>
-              <a:ea typeface="ＭＳ ゴシック"/>
-            </a:endParaRPr>
+              <a:t>If you don’t provide it a context, it will assume the context of the current level in your view model </a:t>
+            </a:r>
           </a:p>
           <a:p>
             <a:pPr lvl="1"/>
@@ -6409,38 +6283,51 @@
                 <a:latin typeface="Calibri"/>
                 <a:ea typeface="ＭＳ ゴシック"/>
               </a:rPr>
-              <a:t>Any bindings for this instance of the template will be in context of the specific item instead of the root level view model</a:t>
-            </a:r>
-          </a:p>
-          <a:p>
-            <a:pPr marR="0" lvl="1" rtl="0"/>
-            <a:r>
-              <a:rPr lang="en-US" b="1" i="0" u="none" strike="noStrike" baseline="0" dirty="0" smtClean="0">
+              <a:t>Any bindings for this instance of the template will be in context of the specific item instead of the root level view </a:t>
+            </a:r>
+            <a:r>
+              <a:rPr lang="en-US" b="1" i="1" u="none" strike="noStrike" baseline="0" dirty="0" smtClean="0">
                 <a:solidFill>
                   <a:srgbClr val="4F81BD"/>
                 </a:solidFill>
                 <a:latin typeface="Calibri"/>
                 <a:ea typeface="ＭＳ ゴシック"/>
               </a:rPr>
-              <a:t>You can iterate over a collection in your data model to repeat the template for each item</a:t>
-            </a:r>
-            <a:r>
-              <a:rPr lang="en-US" b="1" i="0" u="none" strike="noStrike" baseline="0" dirty="0" smtClean="0">
+              <a:t>model</a:t>
+            </a:r>
+          </a:p>
+          <a:p>
+            <a:pPr marR="0" lvl="2" rtl="0"/>
+            <a:r>
+              <a:rPr lang="en-US" b="1" i="1" dirty="0" smtClean="0">
                 <a:solidFill>
                   <a:srgbClr val="4F81BD"/>
                 </a:solidFill>
                 <a:latin typeface="Calibri"/>
                 <a:ea typeface="ＭＳ ゴシック"/>
               </a:rPr>
-              <a:t>. </a:t>
-            </a:r>
-            <a:endParaRPr lang="en-US" b="1" i="0" u="none" strike="noStrike" baseline="0" dirty="0" smtClean="0">
+              <a:t>Additionally, KO has a set of context variables: $root, $parent, &amp; $data. These give you shortcuts to simplify your bindings and context.</a:t>
+            </a:r>
+            <a:endParaRPr lang="en-US" b="1" i="1" u="none" strike="noStrike" baseline="0" dirty="0" smtClean="0">
               <a:solidFill>
                 <a:srgbClr val="4F81BD"/>
               </a:solidFill>
               <a:latin typeface="Calibri"/>
               <a:ea typeface="ＭＳ ゴシック"/>
             </a:endParaRPr>
+          </a:p>
+          <a:p>
+            <a:pPr marR="0" lvl="1" rtl="0"/>
+            <a:r>
+              <a:rPr lang="en-US" b="1" i="0" u="none" strike="noStrike" baseline="0" dirty="0" smtClean="0">
+                <a:solidFill>
+                  <a:srgbClr val="4F81BD"/>
+                </a:solidFill>
+                <a:latin typeface="Calibri"/>
+                <a:ea typeface="ＭＳ ゴシック"/>
+              </a:rPr>
+              <a:t>You can iterate over a collection in your data model to repeat the template for each item. </a:t>
+            </a:r>
           </a:p>
           <a:p>
             <a:pPr lvl="2"/>

</xml_diff>

<commit_message>
updated examples and slides
</commit_message>
<xml_diff>
--- a/Knockout Templating - slides.pptx
+++ b/Knockout Templating - slides.pptx
@@ -14,11 +14,14 @@
     <p:sldId id="274" r:id="rId8"/>
     <p:sldId id="267" r:id="rId9"/>
     <p:sldId id="268" r:id="rId10"/>
-    <p:sldId id="275" r:id="rId11"/>
-    <p:sldId id="270" r:id="rId12"/>
-    <p:sldId id="271" r:id="rId13"/>
-    <p:sldId id="272" r:id="rId14"/>
-    <p:sldId id="273" r:id="rId15"/>
+    <p:sldId id="278" r:id="rId11"/>
+    <p:sldId id="279" r:id="rId12"/>
+    <p:sldId id="275" r:id="rId13"/>
+    <p:sldId id="270" r:id="rId14"/>
+    <p:sldId id="271" r:id="rId15"/>
+    <p:sldId id="272" r:id="rId16"/>
+    <p:sldId id="273" r:id="rId17"/>
+    <p:sldId id="276" r:id="rId18"/>
   </p:sldIdLst>
   <p:sldSz cx="9144000" cy="6858000" type="screen4x3"/>
   <p:notesSz cx="6858000" cy="9144000"/>
@@ -34,11 +37,11 @@
         <p:sld r:id="rId8"/>
         <p:sld r:id="rId9"/>
         <p:sld r:id="rId10"/>
-        <p:sld r:id="rId11"/>
-        <p:sld r:id="rId12"/>
         <p:sld r:id="rId13"/>
         <p:sld r:id="rId14"/>
         <p:sld r:id="rId15"/>
+        <p:sld r:id="rId16"/>
+        <p:sld r:id="rId17"/>
       </p:sldLst>
     </p:custShow>
   </p:custShowLst>
@@ -423,7 +426,7 @@
           <a:p>
             <a:fld id="{B01F9CA3-105E-4857-9057-6DB6197DA786}" type="datetimeFigureOut">
               <a:rPr lang="en-US" smtClean="0"/>
-              <a:t>8/21/12</a:t>
+              <a:t>8/23/12</a:t>
             </a:fld>
             <a:endParaRPr lang="en-US"/>
           </a:p>
@@ -615,7 +618,7 @@
           <a:p>
             <a:fld id="{B01F9CA3-105E-4857-9057-6DB6197DA786}" type="datetimeFigureOut">
               <a:rPr lang="en-US" smtClean="0"/>
-              <a:t>8/21/12</a:t>
+              <a:t>8/23/12</a:t>
             </a:fld>
             <a:endParaRPr lang="en-US"/>
           </a:p>
@@ -884,7 +887,7 @@
           <a:p>
             <a:fld id="{B01F9CA3-105E-4857-9057-6DB6197DA786}" type="datetimeFigureOut">
               <a:rPr lang="en-US" smtClean="0"/>
-              <a:t>8/21/12</a:t>
+              <a:t>8/23/12</a:t>
             </a:fld>
             <a:endParaRPr lang="en-US"/>
           </a:p>
@@ -1063,7 +1066,7 @@
           <a:p>
             <a:fld id="{B01F9CA3-105E-4857-9057-6DB6197DA786}" type="datetimeFigureOut">
               <a:rPr lang="en-US" smtClean="0"/>
-              <a:t>8/21/12</a:t>
+              <a:t>8/23/12</a:t>
             </a:fld>
             <a:endParaRPr lang="en-US"/>
           </a:p>
@@ -1228,7 +1231,7 @@
           <a:p>
             <a:fld id="{5C57DCF7-E8A4-6F41-9F8E-7D2FF09A063F}" type="datetimeFigureOut">
               <a:rPr lang="en-US" smtClean="0"/>
-              <a:t>8/21/12</a:t>
+              <a:t>8/23/12</a:t>
             </a:fld>
             <a:endParaRPr lang="en-US"/>
           </a:p>
@@ -1402,7 +1405,7 @@
           <a:p>
             <a:fld id="{B01F9CA3-105E-4857-9057-6DB6197DA786}" type="datetimeFigureOut">
               <a:rPr lang="en-US" smtClean="0"/>
-              <a:t>8/21/12</a:t>
+              <a:t>8/23/12</a:t>
             </a:fld>
             <a:endParaRPr lang="en-US"/>
           </a:p>
@@ -1644,7 +1647,7 @@
           <a:p>
             <a:fld id="{B01F9CA3-105E-4857-9057-6DB6197DA786}" type="datetimeFigureOut">
               <a:rPr lang="en-US" smtClean="0"/>
-              <a:t>8/21/12</a:t>
+              <a:t>8/23/12</a:t>
             </a:fld>
             <a:endParaRPr lang="en-US"/>
           </a:p>
@@ -1967,7 +1970,7 @@
           <a:p>
             <a:fld id="{B01F9CA3-105E-4857-9057-6DB6197DA786}" type="datetimeFigureOut">
               <a:rPr lang="en-US" smtClean="0"/>
-              <a:t>8/21/12</a:t>
+              <a:t>8/23/12</a:t>
             </a:fld>
             <a:endParaRPr lang="en-US"/>
           </a:p>
@@ -2265,7 +2268,7 @@
           <a:p>
             <a:fld id="{B01F9CA3-105E-4857-9057-6DB6197DA786}" type="datetimeFigureOut">
               <a:rPr lang="en-US" smtClean="0"/>
-              <a:t>8/21/12</a:t>
+              <a:t>8/23/12</a:t>
             </a:fld>
             <a:endParaRPr lang="en-US"/>
           </a:p>
@@ -2721,7 +2724,7 @@
           <a:p>
             <a:fld id="{B01F9CA3-105E-4857-9057-6DB6197DA786}" type="datetimeFigureOut">
               <a:rPr lang="en-US" smtClean="0"/>
-              <a:t>8/21/12</a:t>
+              <a:t>8/23/12</a:t>
             </a:fld>
             <a:endParaRPr lang="en-US"/>
           </a:p>
@@ -2834,7 +2837,7 @@
           <a:p>
             <a:fld id="{B01F9CA3-105E-4857-9057-6DB6197DA786}" type="datetimeFigureOut">
               <a:rPr lang="en-US" smtClean="0"/>
-              <a:t>8/21/12</a:t>
+              <a:t>8/23/12</a:t>
             </a:fld>
             <a:endParaRPr lang="en-US"/>
           </a:p>
@@ -2924,7 +2927,7 @@
           <a:p>
             <a:fld id="{B01F9CA3-105E-4857-9057-6DB6197DA786}" type="datetimeFigureOut">
               <a:rPr lang="en-US" smtClean="0"/>
-              <a:t>8/21/12</a:t>
+              <a:t>8/23/12</a:t>
             </a:fld>
             <a:endParaRPr lang="en-US"/>
           </a:p>
@@ -3206,7 +3209,7 @@
           <a:p>
             <a:fld id="{B01F9CA3-105E-4857-9057-6DB6197DA786}" type="datetimeFigureOut">
               <a:rPr lang="en-US" smtClean="0"/>
-              <a:t>8/21/12</a:t>
+              <a:t>8/23/12</a:t>
             </a:fld>
             <a:endParaRPr lang="en-US"/>
           </a:p>
@@ -3412,7 +3415,7 @@
           <a:p>
             <a:fld id="{B01F9CA3-105E-4857-9057-6DB6197DA786}" type="datetimeFigureOut">
               <a:rPr lang="en-US" smtClean="0"/>
-              <a:t>8/21/12</a:t>
+              <a:t>8/23/12</a:t>
             </a:fld>
             <a:endParaRPr lang="en-US"/>
           </a:p>
@@ -3964,68 +3967,144 @@
             <a:spLocks noGrp="1"/>
           </p:cNvSpPr>
           <p:nvPr>
-            <p:ph type="ctrTitle"/>
-          </p:nvPr>
-        </p:nvSpPr>
-        <p:spPr/>
-        <p:txBody>
-          <a:bodyPr/>
-          <a:lstStyle/>
-          <a:p>
-            <a:r>
-              <a:rPr lang="en-US" sz="3600" dirty="0"/>
-              <a:t> Advanced </a:t>
-            </a:r>
-            <a:r>
-              <a:rPr lang="en-US" sz="3600" dirty="0" err="1"/>
-              <a:t>Templating</a:t>
-            </a:r>
-            <a:r>
-              <a:rPr lang="en-US" sz="3600" dirty="0"/>
-              <a:t> Techniques</a:t>
-            </a:r>
-          </a:p>
-        </p:txBody>
-      </p:sp>
-      <p:sp>
-        <p:nvSpPr>
-          <p:cNvPr id="3" name="Subtitle 2"/>
-          <p:cNvSpPr>
-            <a:spLocks noGrp="1"/>
-          </p:cNvSpPr>
-          <p:nvPr>
-            <p:ph type="subTitle" idx="1"/>
-          </p:nvPr>
-        </p:nvSpPr>
-        <p:spPr/>
-        <p:txBody>
-          <a:bodyPr/>
-          <a:lstStyle/>
-          <a:p>
-            <a:r>
-              <a:rPr lang="en-US" dirty="0"/>
-              <a:t>Template Nesting, Dynamic </a:t>
-            </a:r>
-            <a:r>
-              <a:rPr lang="en-US" dirty="0" err="1" smtClean="0"/>
-              <a:t>Templating</a:t>
-            </a:r>
-            <a:r>
-              <a:rPr lang="en-US" dirty="0"/>
-              <a:t>, Independent Template Observables &amp; Delayed </a:t>
-            </a:r>
-            <a:r>
-              <a:rPr lang="en-US" dirty="0" smtClean="0"/>
-              <a:t>Content Updating</a:t>
-            </a:r>
-            <a:endParaRPr lang="en-US" dirty="0"/>
+            <p:ph type="title"/>
+          </p:nvPr>
+        </p:nvSpPr>
+        <p:spPr/>
+        <p:txBody>
+          <a:bodyPr/>
+          <a:lstStyle/>
+          <a:p>
+            <a:pPr marR="0" rtl="0"/>
+            <a:r>
+              <a:rPr lang="en-US" b="1" i="0" u="none" strike="noStrike" baseline="0" dirty="0" smtClean="0">
+                <a:solidFill>
+                  <a:srgbClr val="345A8A"/>
+                </a:solidFill>
+                <a:latin typeface="Calibri"/>
+                <a:ea typeface="ＭＳ ゴシック"/>
+              </a:rPr>
+              <a:t>Template Context</a:t>
+            </a:r>
+          </a:p>
+        </p:txBody>
+      </p:sp>
+      <p:sp>
+        <p:nvSpPr>
+          <p:cNvPr id="3" name="Text Placeholder 2"/>
+          <p:cNvSpPr>
+            <a:spLocks noGrp="1"/>
+          </p:cNvSpPr>
+          <p:nvPr>
+            <p:ph type="body" idx="1"/>
+          </p:nvPr>
+        </p:nvSpPr>
+        <p:spPr/>
+        <p:txBody>
+          <a:bodyPr/>
+          <a:lstStyle/>
+          <a:p>
+            <a:pPr lvl="1"/>
+            <a:r>
+              <a:rPr lang="en-US" b="1" dirty="0">
+                <a:solidFill>
+                  <a:srgbClr val="4F81BD"/>
+                </a:solidFill>
+                <a:latin typeface="Calibri"/>
+                <a:ea typeface="ＭＳ ゴシック"/>
+              </a:rPr>
+              <a:t>If you don’t provide it a context, it will assume the context of the current level in your view model </a:t>
+            </a:r>
+          </a:p>
+          <a:p>
+            <a:pPr lvl="1"/>
+            <a:r>
+              <a:rPr lang="en-US" b="1" dirty="0" smtClean="0">
+                <a:solidFill>
+                  <a:srgbClr val="4F81BD"/>
+                </a:solidFill>
+                <a:latin typeface="Calibri"/>
+                <a:ea typeface="ＭＳ ゴシック"/>
+              </a:rPr>
+              <a:t>Control </a:t>
+            </a:r>
+            <a:r>
+              <a:rPr lang="en-US" b="1" dirty="0">
+                <a:solidFill>
+                  <a:srgbClr val="4F81BD"/>
+                </a:solidFill>
+                <a:latin typeface="Calibri"/>
+                <a:ea typeface="ＭＳ ゴシック"/>
+              </a:rPr>
+              <a:t>the context of your template by supplying a data parameter: ❒</a:t>
+            </a:r>
+            <a:r>
+              <a:rPr lang="en-US" sz="2000" i="1" dirty="0">
+                <a:solidFill>
+                  <a:srgbClr val="A6A6A6"/>
+                </a:solidFill>
+                <a:latin typeface="Calibri"/>
+                <a:ea typeface="ＭＳ ゴシック"/>
+              </a:rPr>
+              <a:t> </a:t>
+            </a:r>
+            <a:r>
+              <a:rPr lang="en-US" sz="1600" i="1" dirty="0">
+                <a:solidFill>
+                  <a:srgbClr val="A6A6A6"/>
+                </a:solidFill>
+                <a:latin typeface="Calibri"/>
+                <a:ea typeface="ＭＳ ゴシック"/>
+              </a:rPr>
+              <a:t>see </a:t>
+            </a:r>
+            <a:r>
+              <a:rPr lang="en-US" sz="1600" i="1" dirty="0" err="1" smtClean="0">
+                <a:solidFill>
+                  <a:srgbClr val="A6A6A6"/>
+                </a:solidFill>
+                <a:latin typeface="Calibri"/>
+                <a:ea typeface="ＭＳ ゴシック"/>
+              </a:rPr>
+              <a:t>templateContext.html</a:t>
+            </a:r>
+            <a:endParaRPr lang="en-US" sz="1600" i="1" dirty="0" smtClean="0">
+              <a:solidFill>
+                <a:srgbClr val="A6A6A6"/>
+              </a:solidFill>
+              <a:latin typeface="Calibri"/>
+              <a:ea typeface="ＭＳ ゴシック"/>
+            </a:endParaRPr>
+          </a:p>
+          <a:p>
+            <a:pPr lvl="1"/>
+            <a:r>
+              <a:rPr lang="en-US" sz="1600" b="1" i="1" dirty="0">
+                <a:solidFill>
+                  <a:srgbClr val="4F81BD"/>
+                </a:solidFill>
+                <a:latin typeface="Calibri"/>
+                <a:ea typeface="ＭＳ ゴシック"/>
+              </a:rPr>
+              <a:t>Additionally, KO has a set of context variables: $root, $parent, &amp; $data. These give you shortcuts to simplify your bindings and context.</a:t>
+            </a:r>
+          </a:p>
+          <a:p>
+            <a:pPr lvl="1"/>
+            <a:endParaRPr lang="en-US" sz="1600" i="1" dirty="0">
+              <a:solidFill>
+                <a:srgbClr val="A6A6A6"/>
+              </a:solidFill>
+              <a:latin typeface="Calibri"/>
+              <a:ea typeface="ＭＳ ゴシック"/>
+            </a:endParaRPr>
           </a:p>
         </p:txBody>
       </p:sp>
     </p:spTree>
     <p:extLst>
       <p:ext uri="{BB962C8B-B14F-4D97-AF65-F5344CB8AC3E}">
-        <p14:creationId xmlns:p14="http://schemas.microsoft.com/office/powerpoint/2010/main" val="71867692"/>
+        <p14:creationId xmlns:p14="http://schemas.microsoft.com/office/powerpoint/2010/main" val="1130182513"/>
       </p:ext>
     </p:extLst>
   </p:cSld>
@@ -4076,15 +4155,22 @@
           <a:p>
             <a:pPr marR="0" rtl="0"/>
             <a:r>
-              <a:rPr lang="en-US" b="1" i="0" u="none" strike="noStrike" baseline="0" dirty="0" smtClean="0">
+              <a:rPr lang="en-US" b="1" dirty="0" smtClean="0">
                 <a:solidFill>
                   <a:srgbClr val="345A8A"/>
                 </a:solidFill>
                 <a:latin typeface="Calibri"/>
                 <a:ea typeface="ＭＳ ゴシック"/>
               </a:rPr>
-              <a:t>Template Nesting</a:t>
-            </a:r>
+              <a:t>Repeat, Repeat, Repeat</a:t>
+            </a:r>
+            <a:endParaRPr lang="en-US" b="1" i="0" u="none" strike="noStrike" baseline="0" dirty="0" smtClean="0">
+              <a:solidFill>
+                <a:srgbClr val="345A8A"/>
+              </a:solidFill>
+              <a:latin typeface="Calibri"/>
+              <a:ea typeface="ＭＳ ゴシック"/>
+            </a:endParaRPr>
           </a:p>
         </p:txBody>
       </p:sp>
@@ -4103,34 +4189,149 @@
           <a:bodyPr/>
           <a:lstStyle/>
           <a:p>
-            <a:r>
-              <a:rPr lang="en-US" dirty="0" smtClean="0"/>
-              <a:t>You can place templates within other templates to render out complex collections containing collections of </a:t>
-            </a:r>
-            <a:r>
-              <a:rPr lang="en-US" dirty="0"/>
-              <a:t>their own. ❒ </a:t>
-            </a:r>
-            <a:r>
-              <a:rPr lang="en-US" sz="1400" i="1" dirty="0">
+            <a:pPr lvl="1"/>
+            <a:r>
+              <a:rPr lang="en-US" b="1" dirty="0">
+                <a:solidFill>
+                  <a:srgbClr val="4F81BD"/>
+                </a:solidFill>
+                <a:latin typeface="Calibri"/>
+                <a:ea typeface="ＭＳ ゴシック"/>
+              </a:rPr>
+              <a:t>You can iterate over a collection in your data model to repeat the template for each </a:t>
+            </a:r>
+            <a:r>
+              <a:rPr lang="en-US" b="1" dirty="0" smtClean="0">
+                <a:solidFill>
+                  <a:srgbClr val="4F81BD"/>
+                </a:solidFill>
+                <a:latin typeface="Calibri"/>
+                <a:ea typeface="ＭＳ ゴシック"/>
+              </a:rPr>
+              <a:t>item, by using the ‘</a:t>
+            </a:r>
+            <a:r>
+              <a:rPr lang="en-US" b="1" dirty="0" err="1" smtClean="0">
+                <a:solidFill>
+                  <a:srgbClr val="4F81BD"/>
+                </a:solidFill>
+                <a:latin typeface="Calibri"/>
+                <a:ea typeface="ＭＳ ゴシック"/>
+              </a:rPr>
+              <a:t>foreach</a:t>
+            </a:r>
+            <a:r>
+              <a:rPr lang="en-US" b="1" dirty="0" smtClean="0">
+                <a:solidFill>
+                  <a:srgbClr val="4F81BD"/>
+                </a:solidFill>
+                <a:latin typeface="Calibri"/>
+                <a:ea typeface="ＭＳ ゴシック"/>
+              </a:rPr>
+              <a:t>’ parameter.</a:t>
+            </a:r>
+          </a:p>
+          <a:p>
+            <a:pPr lvl="1"/>
+            <a:r>
+              <a:rPr lang="en-US" b="1" dirty="0" smtClean="0">
+                <a:solidFill>
+                  <a:srgbClr val="4F81BD"/>
+                </a:solidFill>
+                <a:latin typeface="Calibri"/>
+                <a:ea typeface="ＭＳ ゴシック"/>
+              </a:rPr>
+              <a:t>This allows you to </a:t>
+            </a:r>
+            <a:r>
+              <a:rPr lang="en-US" b="1" dirty="0" err="1" smtClean="0">
+                <a:solidFill>
+                  <a:srgbClr val="4F81BD"/>
+                </a:solidFill>
+                <a:latin typeface="Calibri"/>
+                <a:ea typeface="ＭＳ ゴシック"/>
+              </a:rPr>
+              <a:t>resuse</a:t>
+            </a:r>
+            <a:r>
+              <a:rPr lang="en-US" b="1" dirty="0" smtClean="0">
+                <a:solidFill>
+                  <a:srgbClr val="4F81BD"/>
+                </a:solidFill>
+                <a:latin typeface="Calibri"/>
+                <a:ea typeface="ＭＳ ゴシック"/>
+              </a:rPr>
+              <a:t> the same HMTL several times with different values.</a:t>
+            </a:r>
+          </a:p>
+          <a:p>
+            <a:pPr lvl="2"/>
+            <a:r>
+              <a:rPr lang="en-US" b="1" i="1" dirty="0" smtClean="0">
+                <a:solidFill>
+                  <a:srgbClr val="4F81BD"/>
+                </a:solidFill>
+                <a:latin typeface="Calibri"/>
+                <a:ea typeface="ＭＳ ゴシック"/>
+              </a:rPr>
+              <a:t>In the following example, this </a:t>
+            </a:r>
+            <a:r>
+              <a:rPr lang="en-US" b="1" i="1" dirty="0">
+                <a:solidFill>
+                  <a:srgbClr val="4F81BD"/>
+                </a:solidFill>
+                <a:latin typeface="Calibri"/>
+                <a:ea typeface="ＭＳ ゴシック"/>
+              </a:rPr>
+              <a:t>will repeat the template for each item in the ‘guys’ object and also put the template in the context of ‘guys’ ❒ </a:t>
+            </a:r>
+            <a:r>
+              <a:rPr lang="en-US" i="1" dirty="0">
                 <a:solidFill>
                   <a:srgbClr val="A6A6A6"/>
                 </a:solidFill>
+                <a:latin typeface="Calibri"/>
+                <a:ea typeface="ＭＳ ゴシック"/>
               </a:rPr>
               <a:t>see </a:t>
             </a:r>
             <a:r>
-              <a:rPr lang="en-US" sz="1400" i="1">
+              <a:rPr lang="en-US" i="1" dirty="0" err="1">
                 <a:solidFill>
                   <a:srgbClr val="A6A6A6"/>
                 </a:solidFill>
-              </a:rPr>
-              <a:t>templateNesting.html</a:t>
-            </a:r>
-            <a:endParaRPr lang="en-US" sz="1400" i="1" dirty="0">
+                <a:latin typeface="Calibri"/>
+                <a:ea typeface="ＭＳ ゴシック"/>
+              </a:rPr>
+              <a:t>templateIteration.html</a:t>
+            </a:r>
+            <a:r>
+              <a:rPr lang="en-US" b="1" dirty="0" smtClean="0">
+                <a:solidFill>
+                  <a:srgbClr val="4F81BD"/>
+                </a:solidFill>
+                <a:latin typeface="Calibri"/>
+                <a:ea typeface="ＭＳ ゴシック"/>
+              </a:rPr>
+              <a:t> </a:t>
+            </a:r>
+            <a:endParaRPr lang="en-US" b="1" dirty="0">
+              <a:solidFill>
+                <a:srgbClr val="4F81BD"/>
+              </a:solidFill>
+              <a:latin typeface="Calibri"/>
+              <a:ea typeface="ＭＳ ゴシック"/>
+            </a:endParaRPr>
+          </a:p>
+          <a:p>
+            <a:pPr lvl="1"/>
+            <a:endParaRPr lang="en-US" sz="1600" i="1" dirty="0">
               <a:solidFill>
                 <a:srgbClr val="A6A6A6"/>
               </a:solidFill>
+              <a:latin typeface="Calibri"/>
+              <a:ea typeface="ＭＳ ゴシック"/>
             </a:endParaRPr>
           </a:p>
         </p:txBody>
@@ -4138,13 +4339,20 @@
     </p:spTree>
     <p:extLst>
       <p:ext uri="{BB962C8B-B14F-4D97-AF65-F5344CB8AC3E}">
-        <p14:creationId xmlns:p14="http://schemas.microsoft.com/office/powerpoint/2010/main" val="3695262174"/>
+        <p14:creationId xmlns:p14="http://schemas.microsoft.com/office/powerpoint/2010/main" val="2322801326"/>
       </p:ext>
     </p:extLst>
   </p:cSld>
   <p:clrMapOvr>
     <a:masterClrMapping/>
   </p:clrMapOvr>
+  <p:timing>
+    <p:tnLst>
+      <p:par>
+        <p:cTn xmlns:p14="http://schemas.microsoft.com/office/powerpoint/2010/main" id="1" dur="indefinite" restart="never" nodeType="tmRoot"/>
+      </p:par>
+    </p:tnLst>
+  </p:timing>
 </p:sld>
 </file>
 
@@ -4172,163 +4380,81 @@
             <a:spLocks noGrp="1"/>
           </p:cNvSpPr>
           <p:nvPr>
-            <p:ph type="title"/>
-          </p:nvPr>
-        </p:nvSpPr>
-        <p:spPr/>
-        <p:txBody>
-          <a:bodyPr/>
-          <a:lstStyle/>
-          <a:p>
-            <a:pPr marR="0" rtl="0"/>
-            <a:r>
-              <a:rPr lang="en-US" b="1" i="0" u="none" strike="noStrike" baseline="0" dirty="0" smtClean="0">
-                <a:solidFill>
-                  <a:srgbClr val="345A8A"/>
-                </a:solidFill>
-                <a:latin typeface="Calibri"/>
-                <a:ea typeface="ＭＳ ゴシック"/>
-              </a:rPr>
-              <a:t>Dynamic </a:t>
-            </a:r>
-            <a:r>
-              <a:rPr lang="en-US" b="1" i="0" u="none" strike="noStrike" baseline="0" dirty="0" err="1" smtClean="0">
-                <a:solidFill>
-                  <a:srgbClr val="345A8A"/>
-                </a:solidFill>
-                <a:latin typeface="Calibri"/>
-                <a:ea typeface="ＭＳ ゴシック"/>
-              </a:rPr>
+            <p:ph type="ctrTitle"/>
+          </p:nvPr>
+        </p:nvSpPr>
+        <p:spPr/>
+        <p:txBody>
+          <a:bodyPr/>
+          <a:lstStyle/>
+          <a:p>
+            <a:r>
+              <a:rPr lang="en-US" sz="3600" dirty="0"/>
+              <a:t> Advanced </a:t>
+            </a:r>
+            <a:r>
+              <a:rPr lang="en-US" sz="3600" dirty="0" err="1"/>
               <a:t>Templating</a:t>
             </a:r>
-            <a:endParaRPr lang="en-US" b="1" i="0" u="none" strike="noStrike" baseline="0" dirty="0" smtClean="0">
-              <a:solidFill>
-                <a:srgbClr val="345A8A"/>
-              </a:solidFill>
-              <a:latin typeface="Calibri"/>
-              <a:ea typeface="ＭＳ ゴシック"/>
-            </a:endParaRPr>
-          </a:p>
-        </p:txBody>
-      </p:sp>
-      <p:sp>
-        <p:nvSpPr>
-          <p:cNvPr id="3" name="Text Placeholder 2"/>
-          <p:cNvSpPr>
-            <a:spLocks noGrp="1"/>
-          </p:cNvSpPr>
-          <p:nvPr>
-            <p:ph type="body" idx="1"/>
-          </p:nvPr>
-        </p:nvSpPr>
-        <p:spPr/>
-        <p:txBody>
-          <a:bodyPr/>
-          <a:lstStyle/>
-          <a:p>
-            <a:pPr marR="0" lvl="0" rtl="0"/>
-            <a:r>
-              <a:rPr lang="en-US" b="1" i="0" u="none" strike="noStrike" baseline="0" dirty="0" smtClean="0">
-                <a:solidFill>
-                  <a:srgbClr val="4F81BD"/>
-                </a:solidFill>
-                <a:latin typeface="Calibri"/>
-                <a:ea typeface="ＭＳ ゴシック"/>
-              </a:rPr>
-              <a:t>Observable template names</a:t>
-            </a:r>
-          </a:p>
-          <a:p>
-            <a:pPr marR="0" lvl="1" rtl="0"/>
-            <a:r>
-              <a:rPr lang="en-US" b="1" i="0" u="none" strike="noStrike" baseline="0" dirty="0" smtClean="0">
-                <a:solidFill>
-                  <a:srgbClr val="4F81BD"/>
-                </a:solidFill>
-                <a:latin typeface="Calibri"/>
-                <a:ea typeface="ＭＳ ゴシック"/>
-              </a:rPr>
-              <a:t>Just like you can bind other properties to observables, the name property of a template bind is in exception</a:t>
-            </a:r>
-          </a:p>
-          <a:p>
-            <a:pPr lvl="2"/>
-            <a:r>
-              <a:rPr lang="en-US" b="1" i="1" u="none" strike="noStrike" baseline="0" dirty="0" smtClean="0">
-                <a:solidFill>
-                  <a:srgbClr val="4F81BD"/>
-                </a:solidFill>
-                <a:latin typeface="Calibri"/>
-                <a:ea typeface="ＭＳ ゴシック"/>
-              </a:rPr>
-              <a:t>What this allows you to do is switch out whole sections of markup in your HTML just by changing one observable value in your view model</a:t>
-            </a:r>
-            <a:r>
-              <a:rPr lang="en-US" b="1" i="1" dirty="0">
-                <a:solidFill>
-                  <a:srgbClr val="4F81BD"/>
-                </a:solidFill>
-                <a:latin typeface="Calibri"/>
-                <a:ea typeface="ＭＳ ゴシック"/>
-              </a:rPr>
-              <a:t>. </a:t>
-            </a:r>
-            <a:r>
-              <a:rPr lang="en-US" b="1" i="1" dirty="0" smtClean="0">
-                <a:solidFill>
-                  <a:srgbClr val="4F81BD"/>
-                </a:solidFill>
-                <a:latin typeface="Calibri"/>
-                <a:ea typeface="ＭＳ ゴシック"/>
-              </a:rPr>
-              <a:t>❒ </a:t>
-            </a:r>
-            <a:r>
-              <a:rPr lang="en-US" sz="1400" i="1" dirty="0">
-                <a:solidFill>
-                  <a:srgbClr val="A6A6A6"/>
-                </a:solidFill>
-              </a:rPr>
-              <a:t>see </a:t>
-            </a:r>
-            <a:r>
-              <a:rPr lang="en-US" sz="1400" i="1" dirty="0" err="1">
-                <a:solidFill>
-                  <a:srgbClr val="A6A6A6"/>
-                </a:solidFill>
-              </a:rPr>
-              <a:t>templateTechniques.html</a:t>
-            </a:r>
-            <a:endParaRPr lang="en-US" sz="1400" i="1" dirty="0">
-              <a:solidFill>
-                <a:srgbClr val="A6A6A6"/>
-              </a:solidFill>
-            </a:endParaRPr>
-          </a:p>
-          <a:p>
-            <a:pPr marL="685800" lvl="2" indent="0">
-              <a:buNone/>
-            </a:pPr>
-            <a:endParaRPr lang="en-US" b="1" i="1" u="none" strike="noStrike" baseline="0" dirty="0" smtClean="0">
-              <a:solidFill>
-                <a:srgbClr val="4F81BD"/>
-              </a:solidFill>
-              <a:latin typeface="Calibri"/>
-              <a:ea typeface="ＭＳ ゴシック"/>
-            </a:endParaRPr>
+            <a:r>
+              <a:rPr lang="en-US" sz="3600" dirty="0"/>
+              <a:t> Techniques</a:t>
+            </a:r>
+          </a:p>
+        </p:txBody>
+      </p:sp>
+      <p:sp>
+        <p:nvSpPr>
+          <p:cNvPr id="3" name="Subtitle 2"/>
+          <p:cNvSpPr>
+            <a:spLocks noGrp="1"/>
+          </p:cNvSpPr>
+          <p:nvPr>
+            <p:ph type="subTitle" idx="1"/>
+          </p:nvPr>
+        </p:nvSpPr>
+        <p:spPr/>
+        <p:txBody>
+          <a:bodyPr/>
+          <a:lstStyle/>
+          <a:p>
+            <a:r>
+              <a:rPr lang="en-US" dirty="0"/>
+              <a:t>Template Nesting, Dynamic </a:t>
+            </a:r>
+            <a:r>
+              <a:rPr lang="en-US" dirty="0" err="1" smtClean="0"/>
+              <a:t>Templating</a:t>
+            </a:r>
+            <a:r>
+              <a:rPr lang="en-US" dirty="0"/>
+              <a:t>, Independent Template Observables &amp; Delayed </a:t>
+            </a:r>
+            <a:r>
+              <a:rPr lang="en-US" dirty="0" smtClean="0"/>
+              <a:t>Content Updating</a:t>
+            </a:r>
+            <a:endParaRPr lang="en-US" dirty="0"/>
           </a:p>
         </p:txBody>
       </p:sp>
     </p:spTree>
     <p:extLst>
       <p:ext uri="{BB962C8B-B14F-4D97-AF65-F5344CB8AC3E}">
-        <p14:creationId xmlns:p14="http://schemas.microsoft.com/office/powerpoint/2010/main" val="4128002099"/>
+        <p14:creationId xmlns:p14="http://schemas.microsoft.com/office/powerpoint/2010/main" val="71867692"/>
       </p:ext>
     </p:extLst>
   </p:cSld>
   <p:clrMapOvr>
     <a:masterClrMapping/>
   </p:clrMapOvr>
+  <p:timing>
+    <p:tnLst>
+      <p:par>
+        <p:cTn xmlns:p14="http://schemas.microsoft.com/office/powerpoint/2010/main" id="1" dur="indefinite" restart="never" nodeType="tmRoot"/>
+      </p:par>
+    </p:tnLst>
+  </p:timing>
 </p:sld>
 </file>
 
@@ -4361,9 +4487,7 @@
         </p:nvSpPr>
         <p:spPr/>
         <p:txBody>
-          <a:bodyPr>
-            <a:normAutofit fontScale="90000"/>
-          </a:bodyPr>
+          <a:bodyPr/>
           <a:lstStyle/>
           <a:p>
             <a:pPr marR="0" rtl="0"/>
@@ -4375,7 +4499,7 @@
                 <a:latin typeface="Calibri"/>
                 <a:ea typeface="ＭＳ ゴシック"/>
               </a:rPr>
-              <a:t>Independent Template Observables</a:t>
+              <a:t>Template Nesting</a:t>
             </a:r>
           </a:p>
         </p:txBody>
@@ -4396,34 +4520,12 @@
           <a:lstStyle/>
           <a:p>
             <a:r>
-              <a:rPr lang="en-US" b="1" i="0" u="none" strike="noStrike" baseline="0" dirty="0" smtClean="0">
-                <a:solidFill>
-                  <a:srgbClr val="4F81BD"/>
-                </a:solidFill>
-                <a:latin typeface="Calibri"/>
-                <a:ea typeface="ＭＳ ゴシック"/>
-              </a:rPr>
-              <a:t>If you iterate over a collection and give each item a commonly named observable to track it’s template, you can change each item’s template independently from each </a:t>
-            </a:r>
-            <a:r>
-              <a:rPr lang="en-US" b="1" dirty="0">
-                <a:solidFill>
-                  <a:srgbClr val="4F81BD"/>
-                </a:solidFill>
-                <a:latin typeface="Calibri"/>
-                <a:ea typeface="ＭＳ ゴシック"/>
-              </a:rPr>
-              <a:t>other </a:t>
-            </a:r>
-            <a:r>
-              <a:rPr lang="en-US" b="1" dirty="0" smtClean="0">
-                <a:solidFill>
-                  <a:srgbClr val="4F81BD"/>
-                </a:solidFill>
-                <a:latin typeface="Calibri"/>
-                <a:ea typeface="ＭＳ ゴシック"/>
-              </a:rPr>
-              <a:t>❒</a:t>
+              <a:rPr lang="en-US" dirty="0" smtClean="0"/>
+              <a:t>You can place templates within other templates to render out complex collections containing collections of </a:t>
+            </a:r>
+            <a:r>
+              <a:rPr lang="en-US" dirty="0"/>
+              <a:t>their own. ❒ </a:t>
             </a:r>
             <a:r>
               <a:rPr lang="en-US" sz="1400" i="1" dirty="0">
@@ -4439,7 +4541,7 @@
                   <a:srgbClr val="A6A6A6"/>
                 </a:solidFill>
               </a:rPr>
-              <a:t>templateTechniques.html</a:t>
+              <a:t>templateNesting.html</a:t>
             </a:r>
             <a:endParaRPr lang="en-US" sz="1400" i="1" dirty="0">
               <a:solidFill>
@@ -4447,30 +4549,25 @@
               </a:solidFill>
             </a:endParaRPr>
           </a:p>
-          <a:p>
-            <a:pPr marL="0" lvl="0" indent="0">
-              <a:buNone/>
-            </a:pPr>
-            <a:endParaRPr lang="en-US" b="1" i="0" u="none" strike="noStrike" baseline="0" dirty="0" smtClean="0">
-              <a:solidFill>
-                <a:srgbClr val="4F81BD"/>
-              </a:solidFill>
-              <a:latin typeface="Calibri"/>
-              <a:ea typeface="ＭＳ ゴシック"/>
-            </a:endParaRPr>
-          </a:p>
         </p:txBody>
       </p:sp>
     </p:spTree>
     <p:extLst>
       <p:ext uri="{BB962C8B-B14F-4D97-AF65-F5344CB8AC3E}">
-        <p14:creationId xmlns:p14="http://schemas.microsoft.com/office/powerpoint/2010/main" val="3733725666"/>
+        <p14:creationId xmlns:p14="http://schemas.microsoft.com/office/powerpoint/2010/main" val="3695262174"/>
       </p:ext>
     </p:extLst>
   </p:cSld>
   <p:clrMapOvr>
     <a:masterClrMapping/>
   </p:clrMapOvr>
+  <p:timing>
+    <p:tnLst>
+      <p:par>
+        <p:cTn xmlns:p14="http://schemas.microsoft.com/office/powerpoint/2010/main" id="1" dur="indefinite" restart="never" nodeType="tmRoot"/>
+      </p:par>
+    </p:tnLst>
+  </p:timing>
 </p:sld>
 </file>
 
@@ -4515,6 +4612,346 @@
                 <a:latin typeface="Calibri"/>
                 <a:ea typeface="ＭＳ ゴシック"/>
               </a:rPr>
+              <a:t>Dynamic </a:t>
+            </a:r>
+            <a:r>
+              <a:rPr lang="en-US" b="1" i="0" u="none" strike="noStrike" baseline="0" dirty="0" err="1" smtClean="0">
+                <a:solidFill>
+                  <a:srgbClr val="345A8A"/>
+                </a:solidFill>
+                <a:latin typeface="Calibri"/>
+                <a:ea typeface="ＭＳ ゴシック"/>
+              </a:rPr>
+              <a:t>Templating</a:t>
+            </a:r>
+            <a:endParaRPr lang="en-US" b="1" i="0" u="none" strike="noStrike" baseline="0" dirty="0" smtClean="0">
+              <a:solidFill>
+                <a:srgbClr val="345A8A"/>
+              </a:solidFill>
+              <a:latin typeface="Calibri"/>
+              <a:ea typeface="ＭＳ ゴシック"/>
+            </a:endParaRPr>
+          </a:p>
+        </p:txBody>
+      </p:sp>
+      <p:sp>
+        <p:nvSpPr>
+          <p:cNvPr id="3" name="Text Placeholder 2"/>
+          <p:cNvSpPr>
+            <a:spLocks noGrp="1"/>
+          </p:cNvSpPr>
+          <p:nvPr>
+            <p:ph type="body" idx="1"/>
+          </p:nvPr>
+        </p:nvSpPr>
+        <p:spPr/>
+        <p:txBody>
+          <a:bodyPr/>
+          <a:lstStyle/>
+          <a:p>
+            <a:pPr marR="0" lvl="0" rtl="0"/>
+            <a:r>
+              <a:rPr lang="en-US" b="1" i="0" u="none" strike="noStrike" baseline="0" dirty="0" smtClean="0">
+                <a:solidFill>
+                  <a:srgbClr val="4F81BD"/>
+                </a:solidFill>
+                <a:latin typeface="Calibri"/>
+                <a:ea typeface="ＭＳ ゴシック"/>
+              </a:rPr>
+              <a:t>Observable template names</a:t>
+            </a:r>
+          </a:p>
+          <a:p>
+            <a:pPr marR="0" lvl="1" rtl="0"/>
+            <a:r>
+              <a:rPr lang="en-US" b="1" i="0" u="none" strike="noStrike" baseline="0" dirty="0" smtClean="0">
+                <a:solidFill>
+                  <a:srgbClr val="4F81BD"/>
+                </a:solidFill>
+                <a:latin typeface="Calibri"/>
+                <a:ea typeface="ＭＳ ゴシック"/>
+              </a:rPr>
+              <a:t>Just like you can bind other properties to observables, the name property of a template bind is in exception</a:t>
+            </a:r>
+          </a:p>
+          <a:p>
+            <a:pPr lvl="2"/>
+            <a:r>
+              <a:rPr lang="en-US" b="1" i="1" u="none" strike="noStrike" baseline="0" dirty="0" smtClean="0">
+                <a:solidFill>
+                  <a:srgbClr val="4F81BD"/>
+                </a:solidFill>
+                <a:latin typeface="Calibri"/>
+                <a:ea typeface="ＭＳ ゴシック"/>
+              </a:rPr>
+              <a:t>What this allows you to do is switch out whole sections of markup in your HTML just by changing one observable value in your view model</a:t>
+            </a:r>
+            <a:r>
+              <a:rPr lang="en-US" b="1" i="1" dirty="0">
+                <a:solidFill>
+                  <a:srgbClr val="4F81BD"/>
+                </a:solidFill>
+                <a:latin typeface="Calibri"/>
+                <a:ea typeface="ＭＳ ゴシック"/>
+              </a:rPr>
+              <a:t>. </a:t>
+            </a:r>
+            <a:r>
+              <a:rPr lang="en-US" b="1" i="1" dirty="0" smtClean="0">
+                <a:solidFill>
+                  <a:srgbClr val="4F81BD"/>
+                </a:solidFill>
+                <a:latin typeface="Calibri"/>
+                <a:ea typeface="ＭＳ ゴシック"/>
+              </a:rPr>
+              <a:t>❒ </a:t>
+            </a:r>
+            <a:r>
+              <a:rPr lang="en-US" sz="1400" i="1" dirty="0">
+                <a:solidFill>
+                  <a:srgbClr val="A6A6A6"/>
+                </a:solidFill>
+              </a:rPr>
+              <a:t>see </a:t>
+            </a:r>
+            <a:r>
+              <a:rPr lang="en-US" sz="1400" i="1" dirty="0" err="1">
+                <a:solidFill>
+                  <a:srgbClr val="A6A6A6"/>
+                </a:solidFill>
+              </a:rPr>
+              <a:t>templateTechniques.html</a:t>
+            </a:r>
+            <a:endParaRPr lang="en-US" sz="1400" i="1" dirty="0">
+              <a:solidFill>
+                <a:srgbClr val="A6A6A6"/>
+              </a:solidFill>
+            </a:endParaRPr>
+          </a:p>
+          <a:p>
+            <a:pPr marL="685800" lvl="2" indent="0">
+              <a:buNone/>
+            </a:pPr>
+            <a:endParaRPr lang="en-US" b="1" i="1" u="none" strike="noStrike" baseline="0" dirty="0" smtClean="0">
+              <a:solidFill>
+                <a:srgbClr val="4F81BD"/>
+              </a:solidFill>
+              <a:latin typeface="Calibri"/>
+              <a:ea typeface="ＭＳ ゴシック"/>
+            </a:endParaRPr>
+          </a:p>
+        </p:txBody>
+      </p:sp>
+    </p:spTree>
+    <p:extLst>
+      <p:ext uri="{BB962C8B-B14F-4D97-AF65-F5344CB8AC3E}">
+        <p14:creationId xmlns:p14="http://schemas.microsoft.com/office/powerpoint/2010/main" val="4128002099"/>
+      </p:ext>
+    </p:extLst>
+  </p:cSld>
+  <p:clrMapOvr>
+    <a:masterClrMapping/>
+  </p:clrMapOvr>
+  <p:timing>
+    <p:tnLst>
+      <p:par>
+        <p:cTn xmlns:p14="http://schemas.microsoft.com/office/powerpoint/2010/main" id="1" dur="indefinite" restart="never" nodeType="tmRoot"/>
+      </p:par>
+    </p:tnLst>
+  </p:timing>
+</p:sld>
+</file>
+
+<file path=ppt/slides/slide15.xml><?xml version="1.0" encoding="utf-8"?>
+<p:sld xmlns:a="http://schemas.openxmlformats.org/drawingml/2006/main" xmlns:r="http://schemas.openxmlformats.org/officeDocument/2006/relationships" xmlns:p="http://schemas.openxmlformats.org/presentationml/2006/main">
+  <p:cSld>
+    <p:spTree>
+      <p:nvGrpSpPr>
+        <p:cNvPr id="1" name=""/>
+        <p:cNvGrpSpPr/>
+        <p:nvPr/>
+      </p:nvGrpSpPr>
+      <p:grpSpPr>
+        <a:xfrm>
+          <a:off x="0" y="0"/>
+          <a:ext cx="0" cy="0"/>
+          <a:chOff x="0" y="0"/>
+          <a:chExt cx="0" cy="0"/>
+        </a:xfrm>
+      </p:grpSpPr>
+      <p:sp>
+        <p:nvSpPr>
+          <p:cNvPr id="2" name="Title 1"/>
+          <p:cNvSpPr>
+            <a:spLocks noGrp="1"/>
+          </p:cNvSpPr>
+          <p:nvPr>
+            <p:ph type="title"/>
+          </p:nvPr>
+        </p:nvSpPr>
+        <p:spPr/>
+        <p:txBody>
+          <a:bodyPr>
+            <a:normAutofit fontScale="90000"/>
+          </a:bodyPr>
+          <a:lstStyle/>
+          <a:p>
+            <a:pPr marR="0" rtl="0"/>
+            <a:r>
+              <a:rPr lang="en-US" b="1" i="0" u="none" strike="noStrike" baseline="0" dirty="0" smtClean="0">
+                <a:solidFill>
+                  <a:srgbClr val="345A8A"/>
+                </a:solidFill>
+                <a:latin typeface="Calibri"/>
+                <a:ea typeface="ＭＳ ゴシック"/>
+              </a:rPr>
+              <a:t>Independent Template Observables</a:t>
+            </a:r>
+          </a:p>
+        </p:txBody>
+      </p:sp>
+      <p:sp>
+        <p:nvSpPr>
+          <p:cNvPr id="3" name="Text Placeholder 2"/>
+          <p:cNvSpPr>
+            <a:spLocks noGrp="1"/>
+          </p:cNvSpPr>
+          <p:nvPr>
+            <p:ph type="body" idx="1"/>
+          </p:nvPr>
+        </p:nvSpPr>
+        <p:spPr/>
+        <p:txBody>
+          <a:bodyPr/>
+          <a:lstStyle/>
+          <a:p>
+            <a:r>
+              <a:rPr lang="en-US" b="1" i="0" u="none" strike="noStrike" baseline="0" dirty="0" smtClean="0">
+                <a:solidFill>
+                  <a:srgbClr val="4F81BD"/>
+                </a:solidFill>
+                <a:latin typeface="Calibri"/>
+                <a:ea typeface="ＭＳ ゴシック"/>
+              </a:rPr>
+              <a:t>If you iterate over a collection and give each item a commonly named observable to track it’s template, you can change each item’s template independently from each </a:t>
+            </a:r>
+            <a:r>
+              <a:rPr lang="en-US" b="1" dirty="0">
+                <a:solidFill>
+                  <a:srgbClr val="4F81BD"/>
+                </a:solidFill>
+                <a:latin typeface="Calibri"/>
+                <a:ea typeface="ＭＳ ゴシック"/>
+              </a:rPr>
+              <a:t>other </a:t>
+            </a:r>
+            <a:r>
+              <a:rPr lang="en-US" b="1" dirty="0" smtClean="0">
+                <a:solidFill>
+                  <a:srgbClr val="4F81BD"/>
+                </a:solidFill>
+                <a:latin typeface="Calibri"/>
+                <a:ea typeface="ＭＳ ゴシック"/>
+              </a:rPr>
+              <a:t>❒</a:t>
+            </a:r>
+            <a:r>
+              <a:rPr lang="en-US" sz="1400" i="1" dirty="0">
+                <a:solidFill>
+                  <a:srgbClr val="A6A6A6"/>
+                </a:solidFill>
+              </a:rPr>
+              <a:t>see </a:t>
+            </a:r>
+            <a:r>
+              <a:rPr lang="en-US" sz="1400" i="1" dirty="0" err="1">
+                <a:solidFill>
+                  <a:srgbClr val="A6A6A6"/>
+                </a:solidFill>
+              </a:rPr>
+              <a:t>templateTechniques.html</a:t>
+            </a:r>
+            <a:endParaRPr lang="en-US" sz="1400" i="1" dirty="0">
+              <a:solidFill>
+                <a:srgbClr val="A6A6A6"/>
+              </a:solidFill>
+            </a:endParaRPr>
+          </a:p>
+          <a:p>
+            <a:pPr marL="0" lvl="0" indent="0">
+              <a:buNone/>
+            </a:pPr>
+            <a:endParaRPr lang="en-US" b="1" i="0" u="none" strike="noStrike" baseline="0" dirty="0" smtClean="0">
+              <a:solidFill>
+                <a:srgbClr val="4F81BD"/>
+              </a:solidFill>
+              <a:latin typeface="Calibri"/>
+              <a:ea typeface="ＭＳ ゴシック"/>
+            </a:endParaRPr>
+          </a:p>
+        </p:txBody>
+      </p:sp>
+    </p:spTree>
+    <p:extLst>
+      <p:ext uri="{BB962C8B-B14F-4D97-AF65-F5344CB8AC3E}">
+        <p14:creationId xmlns:p14="http://schemas.microsoft.com/office/powerpoint/2010/main" val="3733725666"/>
+      </p:ext>
+    </p:extLst>
+  </p:cSld>
+  <p:clrMapOvr>
+    <a:masterClrMapping/>
+  </p:clrMapOvr>
+  <p:timing>
+    <p:tnLst>
+      <p:par>
+        <p:cTn xmlns:p14="http://schemas.microsoft.com/office/powerpoint/2010/main" id="1" dur="indefinite" restart="never" nodeType="tmRoot"/>
+      </p:par>
+    </p:tnLst>
+  </p:timing>
+</p:sld>
+</file>
+
+<file path=ppt/slides/slide16.xml><?xml version="1.0" encoding="utf-8"?>
+<p:sld xmlns:a="http://schemas.openxmlformats.org/drawingml/2006/main" xmlns:r="http://schemas.openxmlformats.org/officeDocument/2006/relationships" xmlns:p="http://schemas.openxmlformats.org/presentationml/2006/main">
+  <p:cSld>
+    <p:spTree>
+      <p:nvGrpSpPr>
+        <p:cNvPr id="1" name=""/>
+        <p:cNvGrpSpPr/>
+        <p:nvPr/>
+      </p:nvGrpSpPr>
+      <p:grpSpPr>
+        <a:xfrm>
+          <a:off x="0" y="0"/>
+          <a:ext cx="0" cy="0"/>
+          <a:chOff x="0" y="0"/>
+          <a:chExt cx="0" cy="0"/>
+        </a:xfrm>
+      </p:grpSpPr>
+      <p:sp>
+        <p:nvSpPr>
+          <p:cNvPr id="2" name="Title 1"/>
+          <p:cNvSpPr>
+            <a:spLocks noGrp="1"/>
+          </p:cNvSpPr>
+          <p:nvPr>
+            <p:ph type="title"/>
+          </p:nvPr>
+        </p:nvSpPr>
+        <p:spPr/>
+        <p:txBody>
+          <a:bodyPr/>
+          <a:lstStyle/>
+          <a:p>
+            <a:pPr marR="0" rtl="0"/>
+            <a:r>
+              <a:rPr lang="en-US" b="1" i="0" u="none" strike="noStrike" baseline="0" dirty="0" smtClean="0">
+                <a:solidFill>
+                  <a:srgbClr val="345A8A"/>
+                </a:solidFill>
+                <a:latin typeface="Calibri"/>
+                <a:ea typeface="ＭＳ ゴシック"/>
+              </a:rPr>
               <a:t>Delayed content updating</a:t>
             </a:r>
           </a:p>
@@ -4885,6 +5322,178 @@
   <p:clrMapOvr>
     <a:masterClrMapping/>
   </p:clrMapOvr>
+  <p:timing>
+    <p:tnLst>
+      <p:par>
+        <p:cTn xmlns:p14="http://schemas.microsoft.com/office/powerpoint/2010/main" id="1" dur="indefinite" restart="never" nodeType="tmRoot"/>
+      </p:par>
+    </p:tnLst>
+  </p:timing>
+</p:sld>
+</file>
+
+<file path=ppt/slides/slide17.xml><?xml version="1.0" encoding="utf-8"?>
+<p:sld xmlns:a="http://schemas.openxmlformats.org/drawingml/2006/main" xmlns:r="http://schemas.openxmlformats.org/officeDocument/2006/relationships" xmlns:p="http://schemas.openxmlformats.org/presentationml/2006/main">
+  <p:cSld>
+    <p:spTree>
+      <p:nvGrpSpPr>
+        <p:cNvPr id="1" name=""/>
+        <p:cNvGrpSpPr/>
+        <p:nvPr/>
+      </p:nvGrpSpPr>
+      <p:grpSpPr>
+        <a:xfrm>
+          <a:off x="0" y="0"/>
+          <a:ext cx="0" cy="0"/>
+          <a:chOff x="0" y="0"/>
+          <a:chExt cx="0" cy="0"/>
+        </a:xfrm>
+      </p:grpSpPr>
+      <p:sp>
+        <p:nvSpPr>
+          <p:cNvPr id="2" name="Title 1"/>
+          <p:cNvSpPr>
+            <a:spLocks noGrp="1"/>
+          </p:cNvSpPr>
+          <p:nvPr>
+            <p:ph type="title"/>
+          </p:nvPr>
+        </p:nvSpPr>
+        <p:spPr/>
+        <p:txBody>
+          <a:bodyPr>
+            <a:normAutofit/>
+          </a:bodyPr>
+          <a:lstStyle/>
+          <a:p>
+            <a:pPr marR="0" rtl="0"/>
+            <a:r>
+              <a:rPr lang="en-US" b="1" i="0" u="none" strike="noStrike" baseline="0" dirty="0" smtClean="0">
+                <a:solidFill>
+                  <a:srgbClr val="345A8A"/>
+                </a:solidFill>
+                <a:latin typeface="Calibri"/>
+                <a:ea typeface="ＭＳ ゴシック"/>
+              </a:rPr>
+              <a:t>Summary</a:t>
+            </a:r>
+          </a:p>
+        </p:txBody>
+      </p:sp>
+      <p:sp>
+        <p:nvSpPr>
+          <p:cNvPr id="3" name="Text Placeholder 2"/>
+          <p:cNvSpPr>
+            <a:spLocks noGrp="1"/>
+          </p:cNvSpPr>
+          <p:nvPr>
+            <p:ph type="body" idx="1"/>
+          </p:nvPr>
+        </p:nvSpPr>
+        <p:spPr/>
+        <p:txBody>
+          <a:bodyPr/>
+          <a:lstStyle/>
+          <a:p>
+            <a:r>
+              <a:rPr lang="en-US" b="1" dirty="0">
+                <a:solidFill>
+                  <a:srgbClr val="4F81BD"/>
+                </a:solidFill>
+                <a:latin typeface="Calibri"/>
+                <a:ea typeface="ＭＳ ゴシック"/>
+              </a:rPr>
+              <a:t>Knockout is a powerful </a:t>
+            </a:r>
+            <a:r>
+              <a:rPr lang="en-US" b="1" dirty="0" err="1">
+                <a:solidFill>
+                  <a:srgbClr val="4F81BD"/>
+                </a:solidFill>
+                <a:latin typeface="Calibri"/>
+                <a:ea typeface="ＭＳ ゴシック"/>
+              </a:rPr>
+              <a:t>javascript</a:t>
+            </a:r>
+            <a:r>
+              <a:rPr lang="en-US" b="1" dirty="0">
+                <a:solidFill>
+                  <a:srgbClr val="4F81BD"/>
+                </a:solidFill>
+                <a:latin typeface="Calibri"/>
+                <a:ea typeface="ＭＳ ゴシック"/>
+              </a:rPr>
+              <a:t> framework that offers many ways to handle large amounts of ever changing data with a minimal amount of code. The built-in </a:t>
+            </a:r>
+            <a:r>
+              <a:rPr lang="en-US" b="1" dirty="0" err="1">
+                <a:solidFill>
+                  <a:srgbClr val="4F81BD"/>
+                </a:solidFill>
+                <a:latin typeface="Calibri"/>
+                <a:ea typeface="ＭＳ ゴシック"/>
+              </a:rPr>
+              <a:t>templating</a:t>
+            </a:r>
+            <a:r>
+              <a:rPr lang="en-US" b="1" dirty="0">
+                <a:solidFill>
+                  <a:srgbClr val="4F81BD"/>
+                </a:solidFill>
+                <a:latin typeface="Calibri"/>
+                <a:ea typeface="ＭＳ ゴシック"/>
+              </a:rPr>
+              <a:t> engine in particular offers a great system for streamlining your HTML into easy-to-maintain chunks</a:t>
+            </a:r>
+            <a:r>
+              <a:rPr lang="en-US" b="1" dirty="0" smtClean="0">
+                <a:solidFill>
+                  <a:srgbClr val="4F81BD"/>
+                </a:solidFill>
+                <a:latin typeface="Calibri"/>
+                <a:ea typeface="ＭＳ ゴシック"/>
+              </a:rPr>
+              <a:t>.</a:t>
+            </a:r>
+          </a:p>
+          <a:p>
+            <a:r>
+              <a:rPr lang="en-US" b="1" dirty="0" smtClean="0">
+                <a:solidFill>
+                  <a:srgbClr val="4F81BD"/>
+                </a:solidFill>
+                <a:latin typeface="Calibri"/>
+                <a:ea typeface="ＭＳ ゴシック"/>
+              </a:rPr>
+              <a:t>By nesting templates together, dynamically changing template types with observable values, and making templates update independently of each other with their own observables, you can really maximize your templates’ ability to render complex amounts of data.</a:t>
+            </a:r>
+            <a:endParaRPr lang="en-US" b="1" i="0" u="none" strike="noStrike" baseline="0" dirty="0" smtClean="0">
+              <a:solidFill>
+                <a:srgbClr val="4F81BD"/>
+              </a:solidFill>
+              <a:latin typeface="Calibri"/>
+              <a:ea typeface="ＭＳ ゴシック"/>
+            </a:endParaRPr>
+          </a:p>
+        </p:txBody>
+      </p:sp>
+    </p:spTree>
+    <p:extLst>
+      <p:ext uri="{BB962C8B-B14F-4D97-AF65-F5344CB8AC3E}">
+        <p14:creationId xmlns:p14="http://schemas.microsoft.com/office/powerpoint/2010/main" val="2520460276"/>
+      </p:ext>
+    </p:extLst>
+  </p:cSld>
+  <p:clrMapOvr>
+    <a:masterClrMapping/>
+  </p:clrMapOvr>
+  <p:timing>
+    <p:tnLst>
+      <p:par>
+        <p:cTn xmlns:p14="http://schemas.microsoft.com/office/powerpoint/2010/main" id="1" dur="indefinite" restart="never" nodeType="tmRoot"/>
+      </p:par>
+    </p:tnLst>
+  </p:timing>
 </p:sld>
 </file>
 
@@ -5635,7 +6244,27 @@
                 <a:latin typeface="Calibri"/>
                 <a:ea typeface="ＭＳ ゴシック"/>
               </a:rPr>
-              <a:t>Just add a new attribute to any HTML </a:t>
+              <a:t>Just add a new data</a:t>
+            </a:r>
+            <a:r>
+              <a:rPr lang="en-US" b="0" i="0" u="none" strike="noStrike" baseline="0" smtClean="0">
+                <a:solidFill>
+                  <a:srgbClr val="243F60"/>
+                </a:solidFill>
+                <a:latin typeface="Calibri"/>
+                <a:ea typeface="ＭＳ ゴシック"/>
+              </a:rPr>
+              <a:t>-bind attribute </a:t>
+            </a:r>
+            <a:r>
+              <a:rPr lang="en-US" b="0" i="0" u="none" strike="noStrike" baseline="0" dirty="0" smtClean="0">
+                <a:solidFill>
+                  <a:srgbClr val="243F60"/>
+                </a:solidFill>
+                <a:latin typeface="Calibri"/>
+                <a:ea typeface="ＭＳ ゴシック"/>
+              </a:rPr>
+              <a:t>to any HTML </a:t>
             </a:r>
             <a:r>
               <a:rPr lang="en-US" dirty="0">
@@ -5808,6 +6437,10 @@
           <a:bodyPr/>
           <a:lstStyle/>
           <a:p>
+            <a:r>
+              <a:rPr lang="en-US" dirty="0" smtClean="0"/>
+              <a:t>Reusing your code.</a:t>
+            </a:r>
             <a:endParaRPr lang="en-US" dirty="0"/>
           </a:p>
         </p:txBody>
@@ -5956,6 +6589,13 @@
   <p:clrMapOvr>
     <a:masterClrMapping/>
   </p:clrMapOvr>
+  <p:timing>
+    <p:tnLst>
+      <p:par>
+        <p:cTn xmlns:p14="http://schemas.microsoft.com/office/powerpoint/2010/main" id="1" dur="indefinite" restart="never" nodeType="tmRoot"/>
+      </p:par>
+    </p:tnLst>
+  </p:timing>
 </p:sld>
 </file>
 
@@ -5993,44 +6633,69 @@
           <a:p>
             <a:pPr marR="0" rtl="0"/>
             <a:r>
-              <a:rPr lang="en-US" b="1" i="0" u="none" strike="noStrike" baseline="0" dirty="0" err="1" smtClean="0">
+              <a:rPr lang="en-US" b="1" i="0" u="none" strike="noStrike" baseline="0" dirty="0" smtClean="0">
                 <a:solidFill>
                   <a:srgbClr val="345A8A"/>
                 </a:solidFill>
                 <a:latin typeface="Calibri"/>
                 <a:ea typeface="ＭＳ ゴシック"/>
               </a:rPr>
-              <a:t>Templating</a:t>
-            </a:r>
+              <a:t>Adding a Template</a:t>
+            </a:r>
+            <a:r>
+              <a:rPr lang="en-US" b="1" i="0" u="none" strike="noStrike" dirty="0" smtClean="0">
+                <a:solidFill>
+                  <a:srgbClr val="345A8A"/>
+                </a:solidFill>
+                <a:latin typeface="Calibri"/>
+                <a:ea typeface="ＭＳ ゴシック"/>
+              </a:rPr>
+              <a:t> with KO</a:t>
+            </a:r>
+            <a:endParaRPr lang="en-US" b="1" i="0" u="none" strike="noStrike" baseline="0" dirty="0" smtClean="0">
+              <a:solidFill>
+                <a:srgbClr val="345A8A"/>
+              </a:solidFill>
+              <a:latin typeface="Calibri"/>
+              <a:ea typeface="ＭＳ ゴシック"/>
+            </a:endParaRPr>
+          </a:p>
+        </p:txBody>
+      </p:sp>
+      <p:sp>
+        <p:nvSpPr>
+          <p:cNvPr id="3" name="Text Placeholder 2"/>
+          <p:cNvSpPr>
+            <a:spLocks noGrp="1"/>
+          </p:cNvSpPr>
+          <p:nvPr>
+            <p:ph type="body" idx="1"/>
+          </p:nvPr>
+        </p:nvSpPr>
+        <p:spPr>
+          <a:xfrm>
+            <a:off x="549275" y="1600200"/>
+            <a:ext cx="8042276" cy="4731315"/>
+          </a:xfrm>
+        </p:spPr>
+        <p:txBody>
+          <a:bodyPr>
+            <a:normAutofit/>
+          </a:bodyPr>
+          <a:lstStyle/>
+          <a:p>
+            <a:pPr lvl="0"/>
             <a:r>
               <a:rPr lang="en-US" b="1" i="0" u="none" strike="noStrike" baseline="0" dirty="0" smtClean="0">
                 <a:solidFill>
-                  <a:srgbClr val="345A8A"/>
-                </a:solidFill>
-                <a:latin typeface="Calibri"/>
-                <a:ea typeface="ＭＳ ゴシック"/>
-              </a:rPr>
-              <a:t> requires 2 parts</a:t>
-            </a:r>
-          </a:p>
-        </p:txBody>
-      </p:sp>
-      <p:sp>
-        <p:nvSpPr>
-          <p:cNvPr id="3" name="Text Placeholder 2"/>
-          <p:cNvSpPr>
-            <a:spLocks noGrp="1"/>
-          </p:cNvSpPr>
-          <p:nvPr>
-            <p:ph type="body" idx="1"/>
-          </p:nvPr>
-        </p:nvSpPr>
-        <p:spPr/>
-        <p:txBody>
-          <a:bodyPr>
-            <a:normAutofit fontScale="70000" lnSpcReduction="20000"/>
-          </a:bodyPr>
-          <a:lstStyle/>
+                  <a:srgbClr val="4F81BD"/>
+                </a:solidFill>
+                <a:latin typeface="Calibri"/>
+                <a:ea typeface="ＭＳ ゴシック"/>
+              </a:rPr>
+              <a:t>Adding a template requires 2 parts…</a:t>
+            </a:r>
+          </a:p>
           <a:p>
             <a:pPr lvl="0"/>
             <a:r>
@@ -6104,274 +6769,6 @@
               <a:t>templateBinding.html</a:t>
             </a:r>
             <a:endParaRPr lang="en-US" sz="2000" i="1" u="none" strike="noStrike" baseline="0" dirty="0" smtClean="0">
-              <a:solidFill>
-                <a:srgbClr val="A6A6A6"/>
-              </a:solidFill>
-              <a:latin typeface="Calibri"/>
-              <a:ea typeface="ＭＳ ゴシック"/>
-            </a:endParaRPr>
-          </a:p>
-          <a:p>
-            <a:pPr marR="0" lvl="1" rtl="0"/>
-            <a:r>
-              <a:rPr lang="en-US" b="1" i="0" u="none" strike="noStrike" baseline="0" dirty="0" smtClean="0">
-                <a:solidFill>
-                  <a:srgbClr val="4F81BD"/>
-                </a:solidFill>
-                <a:latin typeface="Calibri"/>
-                <a:ea typeface="ＭＳ ゴシック"/>
-              </a:rPr>
-              <a:t>Combine this with the ‘</a:t>
-            </a:r>
-            <a:r>
-              <a:rPr lang="en-US" b="1" i="0" u="none" strike="noStrike" baseline="0" dirty="0" err="1" smtClean="0">
-                <a:solidFill>
-                  <a:srgbClr val="4F81BD"/>
-                </a:solidFill>
-                <a:latin typeface="Calibri"/>
-                <a:ea typeface="ＭＳ ゴシック"/>
-              </a:rPr>
-              <a:t>foreach</a:t>
-            </a:r>
-            <a:r>
-              <a:rPr lang="en-US" b="1" i="0" u="none" strike="noStrike" baseline="0" dirty="0" smtClean="0">
-                <a:solidFill>
-                  <a:srgbClr val="4F81BD"/>
-                </a:solidFill>
-                <a:latin typeface="Calibri"/>
-                <a:ea typeface="ＭＳ ゴシック"/>
-              </a:rPr>
-              <a:t>’ property of the template bind and you can render several instances of the same template with different values.</a:t>
-            </a:r>
-          </a:p>
-          <a:p>
-            <a:pPr marR="0" lvl="0" rtl="0"/>
-            <a:r>
-              <a:rPr lang="en-US" b="1" i="0" u="none" strike="noStrike" baseline="0" dirty="0" smtClean="0">
-                <a:solidFill>
-                  <a:srgbClr val="4F81BD"/>
-                </a:solidFill>
-                <a:latin typeface="Calibri"/>
-                <a:ea typeface="ＭＳ ゴシック"/>
-              </a:rPr>
-              <a:t>Adding a template bind is simple:</a:t>
-            </a:r>
-          </a:p>
-          <a:p>
-            <a:pPr marR="0" lvl="1" rtl="0"/>
-            <a:r>
-              <a:rPr lang="en-US" b="1" i="0" u="none" strike="noStrike" baseline="0" dirty="0" smtClean="0">
-                <a:solidFill>
-                  <a:srgbClr val="4F81BD"/>
-                </a:solidFill>
-                <a:latin typeface="Calibri"/>
-                <a:ea typeface="ＭＳ ゴシック"/>
-              </a:rPr>
-              <a:t>At face value this data bind will find your template with the “</a:t>
-            </a:r>
-            <a:r>
-              <a:rPr lang="en-US" b="1" i="0" u="none" strike="noStrike" baseline="0" dirty="0" err="1" smtClean="0">
-                <a:solidFill>
-                  <a:srgbClr val="4F81BD"/>
-                </a:solidFill>
-                <a:latin typeface="Calibri"/>
-                <a:ea typeface="ＭＳ ゴシック"/>
-              </a:rPr>
-              <a:t>myTemplate</a:t>
-            </a:r>
-            <a:r>
-              <a:rPr lang="en-US" b="1" i="0" u="none" strike="noStrike" baseline="0" dirty="0" smtClean="0">
-                <a:solidFill>
-                  <a:srgbClr val="4F81BD"/>
-                </a:solidFill>
-                <a:latin typeface="Calibri"/>
-                <a:ea typeface="ＭＳ ゴシック"/>
-              </a:rPr>
-              <a:t>” name and render it in your display</a:t>
-            </a:r>
-          </a:p>
-          <a:p>
-            <a:pPr marR="0" lvl="1" rtl="0"/>
-            <a:r>
-              <a:rPr lang="en-US" b="1" i="0" u="none" strike="noStrike" baseline="0" dirty="0" smtClean="0">
-                <a:solidFill>
-                  <a:srgbClr val="4F81BD"/>
-                </a:solidFill>
-                <a:latin typeface="Calibri"/>
-                <a:ea typeface="ＭＳ ゴシック"/>
-              </a:rPr>
-              <a:t>If you don’t provide it a context, it will assume the context of the current level in your view model </a:t>
-            </a:r>
-          </a:p>
-          <a:p>
-            <a:pPr lvl="1"/>
-            <a:r>
-              <a:rPr lang="en-US" b="1" i="0" u="none" strike="noStrike" baseline="0" dirty="0" smtClean="0">
-                <a:solidFill>
-                  <a:srgbClr val="4F81BD"/>
-                </a:solidFill>
-                <a:latin typeface="Calibri"/>
-                <a:ea typeface="ＭＳ ゴシック"/>
-              </a:rPr>
-              <a:t>Control the context of your template by supplying a data parameter</a:t>
-            </a:r>
-            <a:r>
-              <a:rPr lang="en-US" b="1" dirty="0">
-                <a:solidFill>
-                  <a:srgbClr val="4F81BD"/>
-                </a:solidFill>
-                <a:latin typeface="Calibri"/>
-                <a:ea typeface="ＭＳ ゴシック"/>
-              </a:rPr>
-              <a:t>: </a:t>
-            </a:r>
-            <a:r>
-              <a:rPr lang="en-US" b="1" dirty="0" smtClean="0">
-                <a:solidFill>
-                  <a:srgbClr val="4F81BD"/>
-                </a:solidFill>
-                <a:latin typeface="Calibri"/>
-                <a:ea typeface="ＭＳ ゴシック"/>
-              </a:rPr>
-              <a:t>❒</a:t>
-            </a:r>
-            <a:r>
-              <a:rPr lang="en-US" sz="2000" i="1" dirty="0" smtClean="0">
-                <a:solidFill>
-                  <a:srgbClr val="A6A6A6"/>
-                </a:solidFill>
-                <a:latin typeface="Calibri"/>
-                <a:ea typeface="ＭＳ ゴシック"/>
-              </a:rPr>
-              <a:t> </a:t>
-            </a:r>
-            <a:r>
-              <a:rPr lang="en-US" sz="1600" i="1" dirty="0">
-                <a:solidFill>
-                  <a:srgbClr val="A6A6A6"/>
-                </a:solidFill>
-                <a:latin typeface="Calibri"/>
-                <a:ea typeface="ＭＳ ゴシック"/>
-              </a:rPr>
-              <a:t>see </a:t>
-            </a:r>
-            <a:r>
-              <a:rPr lang="en-US" sz="1600" i="1" dirty="0" err="1">
-                <a:solidFill>
-                  <a:srgbClr val="A6A6A6"/>
-                </a:solidFill>
-                <a:latin typeface="Calibri"/>
-                <a:ea typeface="ＭＳ ゴシック"/>
-              </a:rPr>
-              <a:t>templateContext.html</a:t>
-            </a:r>
-            <a:endParaRPr lang="en-US" sz="1600" i="1" u="none" strike="noStrike" baseline="0" dirty="0" smtClean="0">
-              <a:solidFill>
-                <a:srgbClr val="A6A6A6"/>
-              </a:solidFill>
-              <a:latin typeface="Calibri"/>
-              <a:ea typeface="ＭＳ ゴシック"/>
-            </a:endParaRPr>
-          </a:p>
-          <a:p>
-            <a:pPr marR="0" lvl="2" rtl="0"/>
-            <a:r>
-              <a:rPr lang="en-US" b="1" i="1" u="none" strike="noStrike" baseline="0" dirty="0" smtClean="0">
-                <a:solidFill>
-                  <a:srgbClr val="4F81BD"/>
-                </a:solidFill>
-                <a:latin typeface="Calibri"/>
-                <a:ea typeface="ＭＳ ゴシック"/>
-              </a:rPr>
-              <a:t>Any bindings for this instance of the template will be in context of the specific item instead of the root level view </a:t>
-            </a:r>
-            <a:r>
-              <a:rPr lang="en-US" b="1" i="1" u="none" strike="noStrike" baseline="0" dirty="0" smtClean="0">
-                <a:solidFill>
-                  <a:srgbClr val="4F81BD"/>
-                </a:solidFill>
-                <a:latin typeface="Calibri"/>
-                <a:ea typeface="ＭＳ ゴシック"/>
-              </a:rPr>
-              <a:t>model</a:t>
-            </a:r>
-          </a:p>
-          <a:p>
-            <a:pPr marR="0" lvl="2" rtl="0"/>
-            <a:r>
-              <a:rPr lang="en-US" b="1" i="1" dirty="0" smtClean="0">
-                <a:solidFill>
-                  <a:srgbClr val="4F81BD"/>
-                </a:solidFill>
-                <a:latin typeface="Calibri"/>
-                <a:ea typeface="ＭＳ ゴシック"/>
-              </a:rPr>
-              <a:t>Additionally, KO has a set of context variables: $root, $parent, &amp; $data. These give you shortcuts to simplify your bindings and context.</a:t>
-            </a:r>
-            <a:endParaRPr lang="en-US" b="1" i="1" u="none" strike="noStrike" baseline="0" dirty="0" smtClean="0">
-              <a:solidFill>
-                <a:srgbClr val="4F81BD"/>
-              </a:solidFill>
-              <a:latin typeface="Calibri"/>
-              <a:ea typeface="ＭＳ ゴシック"/>
-            </a:endParaRPr>
-          </a:p>
-          <a:p>
-            <a:pPr marR="0" lvl="1" rtl="0"/>
-            <a:r>
-              <a:rPr lang="en-US" b="1" i="0" u="none" strike="noStrike" baseline="0" dirty="0" smtClean="0">
-                <a:solidFill>
-                  <a:srgbClr val="4F81BD"/>
-                </a:solidFill>
-                <a:latin typeface="Calibri"/>
-                <a:ea typeface="ＭＳ ゴシック"/>
-              </a:rPr>
-              <a:t>You can iterate over a collection in your data model to repeat the template for each item. </a:t>
-            </a:r>
-          </a:p>
-          <a:p>
-            <a:pPr lvl="2"/>
-            <a:r>
-              <a:rPr lang="en-US" b="1" i="1" u="none" strike="noStrike" baseline="0" dirty="0" smtClean="0">
-                <a:solidFill>
-                  <a:srgbClr val="4F81BD"/>
-                </a:solidFill>
-                <a:latin typeface="Calibri"/>
-                <a:ea typeface="ＭＳ ゴシック"/>
-              </a:rPr>
-              <a:t>This will repeat the template for each item in the ‘guys’ object and also put the template in the context of ‘guys</a:t>
-            </a:r>
-            <a:r>
-              <a:rPr lang="en-US" b="1" i="1" dirty="0">
-                <a:solidFill>
-                  <a:srgbClr val="4F81BD"/>
-                </a:solidFill>
-                <a:latin typeface="Calibri"/>
-                <a:ea typeface="ＭＳ ゴシック"/>
-              </a:rPr>
-              <a:t>’ ❒ </a:t>
-            </a:r>
-            <a:r>
-              <a:rPr lang="en-US" i="1" dirty="0">
-                <a:solidFill>
-                  <a:srgbClr val="A6A6A6"/>
-                </a:solidFill>
-                <a:latin typeface="Calibri"/>
-                <a:ea typeface="ＭＳ ゴシック"/>
-              </a:rPr>
-              <a:t>see </a:t>
-            </a:r>
-            <a:r>
-              <a:rPr lang="en-US" i="1" dirty="0" err="1">
-                <a:solidFill>
-                  <a:srgbClr val="A6A6A6"/>
-                </a:solidFill>
-                <a:latin typeface="Calibri"/>
-                <a:ea typeface="ＭＳ ゴシック"/>
-              </a:rPr>
-              <a:t>templateIteration.html</a:t>
-            </a:r>
-            <a:endParaRPr lang="en-US" i="1" u="none" strike="noStrike" baseline="0" dirty="0" smtClean="0">
               <a:solidFill>
                 <a:srgbClr val="A6A6A6"/>
               </a:solidFill>
@@ -6391,6 +6788,13 @@
   <p:clrMapOvr>
     <a:masterClrMapping/>
   </p:clrMapOvr>
+  <p:timing>
+    <p:tnLst>
+      <p:par>
+        <p:cTn xmlns:p14="http://schemas.microsoft.com/office/powerpoint/2010/main" id="1" dur="indefinite" restart="never" nodeType="tmRoot"/>
+      </p:par>
+    </p:tnLst>
+  </p:timing>
 </p:sld>
 </file>
 

</xml_diff>

<commit_message>
Minor change to the slides
</commit_message>
<xml_diff>
--- a/Knockout Templating - slides.pptx
+++ b/Knockout Templating - slides.pptx
@@ -6,22 +6,25 @@
   </p:sldMasterIdLst>
   <p:sldIdLst>
     <p:sldId id="256" r:id="rId2"/>
-    <p:sldId id="265" r:id="rId3"/>
-    <p:sldId id="259" r:id="rId4"/>
-    <p:sldId id="263" r:id="rId5"/>
-    <p:sldId id="260" r:id="rId6"/>
-    <p:sldId id="264" r:id="rId7"/>
-    <p:sldId id="274" r:id="rId8"/>
-    <p:sldId id="267" r:id="rId9"/>
-    <p:sldId id="268" r:id="rId10"/>
-    <p:sldId id="278" r:id="rId11"/>
-    <p:sldId id="279" r:id="rId12"/>
-    <p:sldId id="275" r:id="rId13"/>
-    <p:sldId id="270" r:id="rId14"/>
-    <p:sldId id="271" r:id="rId15"/>
-    <p:sldId id="272" r:id="rId16"/>
-    <p:sldId id="273" r:id="rId17"/>
-    <p:sldId id="276" r:id="rId18"/>
+    <p:sldId id="280" r:id="rId3"/>
+    <p:sldId id="281" r:id="rId4"/>
+    <p:sldId id="282" r:id="rId5"/>
+    <p:sldId id="283" r:id="rId6"/>
+    <p:sldId id="265" r:id="rId7"/>
+    <p:sldId id="263" r:id="rId8"/>
+    <p:sldId id="260" r:id="rId9"/>
+    <p:sldId id="264" r:id="rId10"/>
+    <p:sldId id="274" r:id="rId11"/>
+    <p:sldId id="267" r:id="rId12"/>
+    <p:sldId id="268" r:id="rId13"/>
+    <p:sldId id="278" r:id="rId14"/>
+    <p:sldId id="279" r:id="rId15"/>
+    <p:sldId id="275" r:id="rId16"/>
+    <p:sldId id="270" r:id="rId17"/>
+    <p:sldId id="271" r:id="rId18"/>
+    <p:sldId id="272" r:id="rId19"/>
+    <p:sldId id="273" r:id="rId20"/>
+    <p:sldId id="276" r:id="rId21"/>
   </p:sldIdLst>
   <p:sldSz cx="9144000" cy="6858000" type="screen4x3"/>
   <p:notesSz cx="6858000" cy="9144000"/>
@@ -29,19 +32,18 @@
     <p:custShow name="Custom Show 1" id="0">
       <p:sldLst>
         <p:sld r:id="rId2"/>
-        <p:sld r:id="rId3"/>
-        <p:sld r:id="rId4"/>
-        <p:sld r:id="rId5"/>
-        <p:sld r:id="rId6"/>
         <p:sld r:id="rId7"/>
         <p:sld r:id="rId8"/>
         <p:sld r:id="rId9"/>
         <p:sld r:id="rId10"/>
+        <p:sld r:id="rId11"/>
+        <p:sld r:id="rId12"/>
         <p:sld r:id="rId13"/>
-        <p:sld r:id="rId14"/>
-        <p:sld r:id="rId15"/>
         <p:sld r:id="rId16"/>
         <p:sld r:id="rId17"/>
+        <p:sld r:id="rId18"/>
+        <p:sld r:id="rId19"/>
+        <p:sld r:id="rId20"/>
       </p:sldLst>
     </p:custShow>
   </p:custShowLst>
@@ -426,7 +428,7 @@
           <a:p>
             <a:fld id="{B01F9CA3-105E-4857-9057-6DB6197DA786}" type="datetimeFigureOut">
               <a:rPr lang="en-US" smtClean="0"/>
-              <a:t>8/23/12</a:t>
+              <a:t>9/26/12</a:t>
             </a:fld>
             <a:endParaRPr lang="en-US"/>
           </a:p>
@@ -618,7 +620,7 @@
           <a:p>
             <a:fld id="{B01F9CA3-105E-4857-9057-6DB6197DA786}" type="datetimeFigureOut">
               <a:rPr lang="en-US" smtClean="0"/>
-              <a:t>8/23/12</a:t>
+              <a:t>9/26/12</a:t>
             </a:fld>
             <a:endParaRPr lang="en-US"/>
           </a:p>
@@ -887,7 +889,7 @@
           <a:p>
             <a:fld id="{B01F9CA3-105E-4857-9057-6DB6197DA786}" type="datetimeFigureOut">
               <a:rPr lang="en-US" smtClean="0"/>
-              <a:t>8/23/12</a:t>
+              <a:t>9/26/12</a:t>
             </a:fld>
             <a:endParaRPr lang="en-US"/>
           </a:p>
@@ -1066,7 +1068,7 @@
           <a:p>
             <a:fld id="{B01F9CA3-105E-4857-9057-6DB6197DA786}" type="datetimeFigureOut">
               <a:rPr lang="en-US" smtClean="0"/>
-              <a:t>8/23/12</a:t>
+              <a:t>9/26/12</a:t>
             </a:fld>
             <a:endParaRPr lang="en-US"/>
           </a:p>
@@ -1231,7 +1233,7 @@
           <a:p>
             <a:fld id="{5C57DCF7-E8A4-6F41-9F8E-7D2FF09A063F}" type="datetimeFigureOut">
               <a:rPr lang="en-US" smtClean="0"/>
-              <a:t>8/23/12</a:t>
+              <a:t>9/26/12</a:t>
             </a:fld>
             <a:endParaRPr lang="en-US"/>
           </a:p>
@@ -1405,7 +1407,7 @@
           <a:p>
             <a:fld id="{B01F9CA3-105E-4857-9057-6DB6197DA786}" type="datetimeFigureOut">
               <a:rPr lang="en-US" smtClean="0"/>
-              <a:t>8/23/12</a:t>
+              <a:t>9/26/12</a:t>
             </a:fld>
             <a:endParaRPr lang="en-US"/>
           </a:p>
@@ -1647,7 +1649,7 @@
           <a:p>
             <a:fld id="{B01F9CA3-105E-4857-9057-6DB6197DA786}" type="datetimeFigureOut">
               <a:rPr lang="en-US" smtClean="0"/>
-              <a:t>8/23/12</a:t>
+              <a:t>9/26/12</a:t>
             </a:fld>
             <a:endParaRPr lang="en-US"/>
           </a:p>
@@ -1970,7 +1972,7 @@
           <a:p>
             <a:fld id="{B01F9CA3-105E-4857-9057-6DB6197DA786}" type="datetimeFigureOut">
               <a:rPr lang="en-US" smtClean="0"/>
-              <a:t>8/23/12</a:t>
+              <a:t>9/26/12</a:t>
             </a:fld>
             <a:endParaRPr lang="en-US"/>
           </a:p>
@@ -2268,7 +2270,7 @@
           <a:p>
             <a:fld id="{B01F9CA3-105E-4857-9057-6DB6197DA786}" type="datetimeFigureOut">
               <a:rPr lang="en-US" smtClean="0"/>
-              <a:t>8/23/12</a:t>
+              <a:t>9/26/12</a:t>
             </a:fld>
             <a:endParaRPr lang="en-US"/>
           </a:p>
@@ -2724,7 +2726,7 @@
           <a:p>
             <a:fld id="{B01F9CA3-105E-4857-9057-6DB6197DA786}" type="datetimeFigureOut">
               <a:rPr lang="en-US" smtClean="0"/>
-              <a:t>8/23/12</a:t>
+              <a:t>9/26/12</a:t>
             </a:fld>
             <a:endParaRPr lang="en-US"/>
           </a:p>
@@ -2837,7 +2839,7 @@
           <a:p>
             <a:fld id="{B01F9CA3-105E-4857-9057-6DB6197DA786}" type="datetimeFigureOut">
               <a:rPr lang="en-US" smtClean="0"/>
-              <a:t>8/23/12</a:t>
+              <a:t>9/26/12</a:t>
             </a:fld>
             <a:endParaRPr lang="en-US"/>
           </a:p>
@@ -2927,7 +2929,7 @@
           <a:p>
             <a:fld id="{B01F9CA3-105E-4857-9057-6DB6197DA786}" type="datetimeFigureOut">
               <a:rPr lang="en-US" smtClean="0"/>
-              <a:t>8/23/12</a:t>
+              <a:t>9/26/12</a:t>
             </a:fld>
             <a:endParaRPr lang="en-US"/>
           </a:p>
@@ -3209,7 +3211,7 @@
           <a:p>
             <a:fld id="{B01F9CA3-105E-4857-9057-6DB6197DA786}" type="datetimeFigureOut">
               <a:rPr lang="en-US" smtClean="0"/>
-              <a:t>8/23/12</a:t>
+              <a:t>9/26/12</a:t>
             </a:fld>
             <a:endParaRPr lang="en-US"/>
           </a:p>
@@ -3415,7 +3417,7 @@
           <a:p>
             <a:fld id="{B01F9CA3-105E-4857-9057-6DB6197DA786}" type="datetimeFigureOut">
               <a:rPr lang="en-US" smtClean="0"/>
-              <a:t>8/23/12</a:t>
+              <a:t>9/26/12</a:t>
             </a:fld>
             <a:endParaRPr lang="en-US"/>
           </a:p>
@@ -3875,7 +3877,12 @@
             <p:ph type="ctrTitle"/>
           </p:nvPr>
         </p:nvSpPr>
-        <p:spPr/>
+        <p:spPr>
+          <a:xfrm>
+            <a:off x="1322921" y="180891"/>
+            <a:ext cx="6498158" cy="1724867"/>
+          </a:xfrm>
+        </p:spPr>
         <p:txBody>
           <a:bodyPr/>
           <a:lstStyle/>
@@ -3923,6 +3930,66 @@
           </a:p>
         </p:txBody>
       </p:sp>
+      <p:pic>
+        <p:nvPicPr>
+          <p:cNvPr id="4" name="Picture 3" descr="littleMac.psd"/>
+          <p:cNvPicPr>
+            <a:picLocks noChangeAspect="1"/>
+          </p:cNvPicPr>
+          <p:nvPr/>
+        </p:nvPicPr>
+        <p:blipFill>
+          <a:blip r:embed="rId2">
+            <a:extLst>
+              <a:ext uri="{28A0092B-C50C-407E-A947-70E740481C1C}">
+                <a14:useLocalDpi xmlns:a14="http://schemas.microsoft.com/office/drawing/2010/main" val="0"/>
+              </a:ext>
+            </a:extLst>
+          </a:blip>
+          <a:stretch>
+            <a:fillRect/>
+          </a:stretch>
+        </p:blipFill>
+        <p:spPr>
+          <a:xfrm>
+            <a:off x="1812924" y="2541541"/>
+            <a:ext cx="1219200" cy="3556000"/>
+          </a:xfrm>
+          <a:prstGeom prst="rect">
+            <a:avLst/>
+          </a:prstGeom>
+        </p:spPr>
+      </p:pic>
+      <p:pic>
+        <p:nvPicPr>
+          <p:cNvPr id="6" name="Picture 5" descr="punchoutMario.psd"/>
+          <p:cNvPicPr>
+            <a:picLocks noChangeAspect="1"/>
+          </p:cNvPicPr>
+          <p:nvPr/>
+        </p:nvPicPr>
+        <p:blipFill>
+          <a:blip r:embed="rId3">
+            <a:extLst>
+              <a:ext uri="{28A0092B-C50C-407E-A947-70E740481C1C}">
+                <a14:useLocalDpi xmlns:a14="http://schemas.microsoft.com/office/drawing/2010/main" val="0"/>
+              </a:ext>
+            </a:extLst>
+          </a:blip>
+          <a:stretch>
+            <a:fillRect/>
+          </a:stretch>
+        </p:blipFill>
+        <p:spPr>
+          <a:xfrm>
+            <a:off x="4063597" y="3132149"/>
+            <a:ext cx="2762636" cy="2076740"/>
+          </a:xfrm>
+          <a:prstGeom prst="rect">
+            <a:avLst/>
+          </a:prstGeom>
+        </p:spPr>
+      </p:pic>
     </p:spTree>
     <p:extLst>
       <p:ext uri="{BB962C8B-B14F-4D97-AF65-F5344CB8AC3E}">
@@ -3967,7 +4034,7 @@
             <a:spLocks noGrp="1"/>
           </p:cNvSpPr>
           <p:nvPr>
-            <p:ph type="title"/>
+            <p:ph type="ctrTitle"/>
           </p:nvPr>
         </p:nvSpPr>
         <p:spPr/>
@@ -3975,28 +4042,22 @@
           <a:bodyPr/>
           <a:lstStyle/>
           <a:p>
-            <a:pPr marR="0" rtl="0"/>
-            <a:r>
-              <a:rPr lang="en-US" b="1" i="0" u="none" strike="noStrike" baseline="0" dirty="0" smtClean="0">
-                <a:solidFill>
-                  <a:srgbClr val="345A8A"/>
-                </a:solidFill>
-                <a:latin typeface="Calibri"/>
-                <a:ea typeface="ＭＳ ゴシック"/>
-              </a:rPr>
-              <a:t>Template Context</a:t>
-            </a:r>
-          </a:p>
-        </p:txBody>
-      </p:sp>
-      <p:sp>
-        <p:nvSpPr>
-          <p:cNvPr id="3" name="Text Placeholder 2"/>
-          <p:cNvSpPr>
-            <a:spLocks noGrp="1"/>
-          </p:cNvSpPr>
-          <p:nvPr>
-            <p:ph type="body" idx="1"/>
+            <a:r>
+              <a:rPr lang="en-US" sz="3600" dirty="0" err="1" smtClean="0"/>
+              <a:t>Templating</a:t>
+            </a:r>
+            <a:endParaRPr lang="en-US" sz="3600" dirty="0"/>
+          </a:p>
+        </p:txBody>
+      </p:sp>
+      <p:sp>
+        <p:nvSpPr>
+          <p:cNvPr id="3" name="Subtitle 2"/>
+          <p:cNvSpPr>
+            <a:spLocks noGrp="1"/>
+          </p:cNvSpPr>
+          <p:nvPr>
+            <p:ph type="subTitle" idx="1"/>
           </p:nvPr>
         </p:nvSpPr>
         <p:spPr/>
@@ -4004,107 +4065,18 @@
           <a:bodyPr/>
           <a:lstStyle/>
           <a:p>
-            <a:pPr lvl="1"/>
-            <a:r>
-              <a:rPr lang="en-US" b="1" dirty="0">
-                <a:solidFill>
-                  <a:srgbClr val="4F81BD"/>
-                </a:solidFill>
-                <a:latin typeface="Calibri"/>
-                <a:ea typeface="ＭＳ ゴシック"/>
-              </a:rPr>
-              <a:t>If you don’t provide it a context, it will assume the context of the current level in your view model </a:t>
-            </a:r>
-          </a:p>
-          <a:p>
-            <a:pPr lvl="1"/>
-            <a:r>
-              <a:rPr lang="en-US" b="1" dirty="0" smtClean="0">
-                <a:solidFill>
-                  <a:srgbClr val="4F81BD"/>
-                </a:solidFill>
-                <a:latin typeface="Calibri"/>
-                <a:ea typeface="ＭＳ ゴシック"/>
-              </a:rPr>
-              <a:t>Control </a:t>
-            </a:r>
-            <a:r>
-              <a:rPr lang="en-US" b="1" dirty="0">
-                <a:solidFill>
-                  <a:srgbClr val="4F81BD"/>
-                </a:solidFill>
-                <a:latin typeface="Calibri"/>
-                <a:ea typeface="ＭＳ ゴシック"/>
-              </a:rPr>
-              <a:t>the context of your template by supplying a data parameter: ❒</a:t>
-            </a:r>
-            <a:r>
-              <a:rPr lang="en-US" sz="2000" i="1" dirty="0">
-                <a:solidFill>
-                  <a:srgbClr val="A6A6A6"/>
-                </a:solidFill>
-                <a:latin typeface="Calibri"/>
-                <a:ea typeface="ＭＳ ゴシック"/>
-              </a:rPr>
-              <a:t> </a:t>
-            </a:r>
-            <a:r>
-              <a:rPr lang="en-US" sz="1600" i="1" dirty="0">
-                <a:solidFill>
-                  <a:srgbClr val="A6A6A6"/>
-                </a:solidFill>
-                <a:latin typeface="Calibri"/>
-                <a:ea typeface="ＭＳ ゴシック"/>
-              </a:rPr>
-              <a:t>see </a:t>
-            </a:r>
-            <a:r>
-              <a:rPr lang="en-US" sz="1600" i="1" dirty="0" err="1" smtClean="0">
-                <a:solidFill>
-                  <a:srgbClr val="A6A6A6"/>
-                </a:solidFill>
-                <a:latin typeface="Calibri"/>
-                <a:ea typeface="ＭＳ ゴシック"/>
-              </a:rPr>
-              <a:t>templateContext.html</a:t>
-            </a:r>
-            <a:endParaRPr lang="en-US" sz="1600" i="1" dirty="0" smtClean="0">
-              <a:solidFill>
-                <a:srgbClr val="A6A6A6"/>
-              </a:solidFill>
-              <a:latin typeface="Calibri"/>
-              <a:ea typeface="ＭＳ ゴシック"/>
-            </a:endParaRPr>
-          </a:p>
-          <a:p>
-            <a:pPr lvl="1"/>
-            <a:r>
-              <a:rPr lang="en-US" sz="1600" b="1" i="1" dirty="0">
-                <a:solidFill>
-                  <a:srgbClr val="4F81BD"/>
-                </a:solidFill>
-                <a:latin typeface="Calibri"/>
-                <a:ea typeface="ＭＳ ゴシック"/>
-              </a:rPr>
-              <a:t>Additionally, KO has a set of context variables: $root, $parent, &amp; $data. These give you shortcuts to simplify your bindings and context.</a:t>
-            </a:r>
-          </a:p>
-          <a:p>
-            <a:pPr lvl="1"/>
-            <a:endParaRPr lang="en-US" sz="1600" i="1" dirty="0">
-              <a:solidFill>
-                <a:srgbClr val="A6A6A6"/>
-              </a:solidFill>
-              <a:latin typeface="Calibri"/>
-              <a:ea typeface="ＭＳ ゴシック"/>
-            </a:endParaRPr>
+            <a:r>
+              <a:rPr lang="en-US" dirty="0" smtClean="0"/>
+              <a:t>Reusing your code.</a:t>
+            </a:r>
+            <a:endParaRPr lang="en-US" dirty="0"/>
           </a:p>
         </p:txBody>
       </p:sp>
     </p:spTree>
     <p:extLst>
       <p:ext uri="{BB962C8B-B14F-4D97-AF65-F5344CB8AC3E}">
-        <p14:creationId xmlns:p14="http://schemas.microsoft.com/office/powerpoint/2010/main" val="1130182513"/>
+        <p14:creationId xmlns:p14="http://schemas.microsoft.com/office/powerpoint/2010/main" val="2349990538"/>
       </p:ext>
     </p:extLst>
   </p:cSld>
@@ -4148,27 +4120,54 @@
             <p:ph type="title"/>
           </p:nvPr>
         </p:nvSpPr>
-        <p:spPr/>
-        <p:txBody>
-          <a:bodyPr/>
+        <p:spPr>
+          <a:xfrm>
+            <a:off x="549275" y="-800183"/>
+            <a:ext cx="8042276" cy="3152475"/>
+          </a:xfrm>
+        </p:spPr>
+        <p:txBody>
+          <a:bodyPr>
+            <a:normAutofit/>
+          </a:bodyPr>
           <a:lstStyle/>
           <a:p>
             <a:pPr marR="0" rtl="0"/>
             <a:r>
-              <a:rPr lang="en-US" b="1" dirty="0" smtClean="0">
+              <a:rPr lang="en-US" b="1" i="0" u="none" strike="noStrike" baseline="0" dirty="0" smtClean="0">
                 <a:solidFill>
                   <a:srgbClr val="345A8A"/>
                 </a:solidFill>
                 <a:latin typeface="Calibri"/>
                 <a:ea typeface="ＭＳ ゴシック"/>
               </a:rPr>
-              <a:t>Repeat, Repeat, Repeat</a:t>
+              <a:t>KO </a:t>
+            </a:r>
+            <a:r>
+              <a:rPr lang="en-US" b="1" i="0" u="none" strike="noStrike" baseline="0" dirty="0" err="1" smtClean="0">
+                <a:solidFill>
+                  <a:srgbClr val="345A8A"/>
+                </a:solidFill>
+                <a:latin typeface="Calibri"/>
+                <a:ea typeface="ＭＳ ゴシック"/>
+              </a:rPr>
+              <a:t>Templating</a:t>
+            </a:r>
+            <a:r>
+              <a:rPr lang="en-US" b="1" i="0" u="none" strike="noStrike" baseline="0" dirty="0" smtClean="0">
+                <a:solidFill>
+                  <a:srgbClr val="345A8A"/>
+                </a:solidFill>
+                <a:latin typeface="Calibri"/>
+                <a:ea typeface="ＭＳ ゴシック"/>
+              </a:rPr>
+              <a:t> offers a powerful way to reuse and condense your code base</a:t>
             </a:r>
             <a:endParaRPr lang="en-US" b="1" i="0" u="none" strike="noStrike" baseline="0" dirty="0" smtClean="0">
               <a:solidFill>
                 <a:srgbClr val="345A8A"/>
               </a:solidFill>
-              <a:latin typeface="Calibri"/>
+              <a:latin typeface="Times New Roman"/>
               <a:ea typeface="ＭＳ ゴシック"/>
             </a:endParaRPr>
           </a:p>
@@ -4184,162 +4183,34 @@
             <p:ph type="body" idx="1"/>
           </p:nvPr>
         </p:nvSpPr>
-        <p:spPr/>
-        <p:txBody>
-          <a:bodyPr/>
-          <a:lstStyle/>
-          <a:p>
-            <a:pPr lvl="1"/>
-            <a:r>
-              <a:rPr lang="en-US" b="1" dirty="0">
+        <p:spPr>
+          <a:xfrm>
+            <a:off x="457200" y="2606253"/>
+            <a:ext cx="8229600" cy="3519910"/>
+          </a:xfrm>
+        </p:spPr>
+        <p:txBody>
+          <a:bodyPr/>
+          <a:lstStyle/>
+          <a:p>
+            <a:pPr marR="0" lvl="0" rtl="0"/>
+            <a:r>
+              <a:rPr lang="en-US" b="1" i="0" u="none" strike="noStrike" baseline="0" dirty="0" smtClean="0">
                 <a:solidFill>
                   <a:srgbClr val="4F81BD"/>
                 </a:solidFill>
                 <a:latin typeface="Calibri"/>
                 <a:ea typeface="ＭＳ ゴシック"/>
               </a:rPr>
-              <a:t>You can iterate over a collection in your data model to repeat the template for each </a:t>
-            </a:r>
-            <a:r>
-              <a:rPr lang="en-US" b="1" dirty="0" smtClean="0">
-                <a:solidFill>
-                  <a:srgbClr val="4F81BD"/>
-                </a:solidFill>
-                <a:latin typeface="Calibri"/>
-                <a:ea typeface="ＭＳ ゴシック"/>
-              </a:rPr>
-              <a:t>item, by using the ‘</a:t>
-            </a:r>
-            <a:r>
-              <a:rPr lang="en-US" b="1" dirty="0" err="1" smtClean="0">
-                <a:solidFill>
-                  <a:srgbClr val="4F81BD"/>
-                </a:solidFill>
-                <a:latin typeface="Calibri"/>
-                <a:ea typeface="ＭＳ ゴシック"/>
-              </a:rPr>
-              <a:t>foreach</a:t>
-            </a:r>
-            <a:r>
-              <a:rPr lang="en-US" b="1" dirty="0" smtClean="0">
-                <a:solidFill>
-                  <a:srgbClr val="4F81BD"/>
-                </a:solidFill>
-                <a:latin typeface="Calibri"/>
-                <a:ea typeface="ＭＳ ゴシック"/>
-              </a:rPr>
-              <a:t>’ parameter.</a:t>
-            </a:r>
-          </a:p>
-          <a:p>
-            <a:pPr lvl="1"/>
-            <a:r>
-              <a:rPr lang="en-US" b="1" dirty="0" smtClean="0">
-                <a:solidFill>
-                  <a:srgbClr val="4F81BD"/>
-                </a:solidFill>
-                <a:latin typeface="Calibri"/>
-                <a:ea typeface="ＭＳ ゴシック"/>
-              </a:rPr>
-              <a:t>This allows you to </a:t>
-            </a:r>
-            <a:r>
-              <a:rPr lang="en-US" b="1" dirty="0" err="1" smtClean="0">
-                <a:solidFill>
-                  <a:srgbClr val="4F81BD"/>
-                </a:solidFill>
-                <a:latin typeface="Calibri"/>
-                <a:ea typeface="ＭＳ ゴシック"/>
-              </a:rPr>
-              <a:t>resuse</a:t>
-            </a:r>
-            <a:r>
-              <a:rPr lang="en-US" b="1" dirty="0" smtClean="0">
-                <a:solidFill>
-                  <a:srgbClr val="4F81BD"/>
-                </a:solidFill>
-                <a:latin typeface="Calibri"/>
-                <a:ea typeface="ＭＳ ゴシック"/>
-              </a:rPr>
-              <a:t> the same HMTL several times with different values.</a:t>
-            </a:r>
-          </a:p>
-          <a:p>
-            <a:pPr lvl="2"/>
-            <a:r>
-              <a:rPr lang="en-US" b="1" i="1" dirty="0" smtClean="0">
-                <a:solidFill>
-                  <a:srgbClr val="4F81BD"/>
-                </a:solidFill>
-                <a:latin typeface="Calibri"/>
-                <a:ea typeface="ＭＳ ゴシック"/>
-              </a:rPr>
-              <a:t>In the following example, this </a:t>
-            </a:r>
-            <a:r>
-              <a:rPr lang="en-US" b="1" i="1" dirty="0">
-                <a:solidFill>
-                  <a:srgbClr val="4F81BD"/>
-                </a:solidFill>
-                <a:latin typeface="Calibri"/>
-                <a:ea typeface="ＭＳ ゴシック"/>
-              </a:rPr>
-              <a:t>will repeat the template for each item in the ‘guys’ object and also put the template in the context of ‘guys’ ❒ </a:t>
-            </a:r>
-            <a:r>
-              <a:rPr lang="en-US" i="1" dirty="0">
-                <a:solidFill>
-                  <a:srgbClr val="A6A6A6"/>
-                </a:solidFill>
-                <a:latin typeface="Calibri"/>
-                <a:ea typeface="ＭＳ ゴシック"/>
-              </a:rPr>
-              <a:t>see </a:t>
-            </a:r>
-            <a:r>
-              <a:rPr lang="en-US" i="1" dirty="0" err="1">
-                <a:solidFill>
-                  <a:srgbClr val="A6A6A6"/>
-                </a:solidFill>
-                <a:latin typeface="Calibri"/>
-                <a:ea typeface="ＭＳ ゴシック"/>
-              </a:rPr>
-              <a:t>templateIteration.html</a:t>
-            </a:r>
-            <a:r>
-              <a:rPr lang="en-US" b="1" dirty="0" smtClean="0">
-                <a:solidFill>
-                  <a:srgbClr val="4F81BD"/>
-                </a:solidFill>
-                <a:latin typeface="Calibri"/>
-                <a:ea typeface="ＭＳ ゴシック"/>
-              </a:rPr>
-              <a:t> </a:t>
-            </a:r>
-            <a:endParaRPr lang="en-US" b="1" dirty="0">
-              <a:solidFill>
-                <a:srgbClr val="4F81BD"/>
-              </a:solidFill>
-              <a:latin typeface="Calibri"/>
-              <a:ea typeface="ＭＳ ゴシック"/>
-            </a:endParaRPr>
-          </a:p>
-          <a:p>
-            <a:pPr lvl="1"/>
-            <a:endParaRPr lang="en-US" sz="1600" i="1" dirty="0">
-              <a:solidFill>
-                <a:srgbClr val="A6A6A6"/>
-              </a:solidFill>
-              <a:latin typeface="Calibri"/>
-              <a:ea typeface="ＭＳ ゴシック"/>
-            </a:endParaRPr>
+              <a:t>KO allows other template engines, but KO has a very handy built in template system</a:t>
+            </a:r>
           </a:p>
         </p:txBody>
       </p:sp>
     </p:spTree>
     <p:extLst>
       <p:ext uri="{BB962C8B-B14F-4D97-AF65-F5344CB8AC3E}">
-        <p14:creationId xmlns:p14="http://schemas.microsoft.com/office/powerpoint/2010/main" val="2322801326"/>
+        <p14:creationId xmlns:p14="http://schemas.microsoft.com/office/powerpoint/2010/main" val="2168605684"/>
       </p:ext>
     </p:extLst>
   </p:cSld>
@@ -4380,7 +4251,7 @@
             <a:spLocks noGrp="1"/>
           </p:cNvSpPr>
           <p:nvPr>
-            <p:ph type="ctrTitle"/>
+            <p:ph type="title"/>
           </p:nvPr>
         </p:nvSpPr>
         <p:spPr/>
@@ -4388,60 +4259,157 @@
           <a:bodyPr/>
           <a:lstStyle/>
           <a:p>
-            <a:r>
-              <a:rPr lang="en-US" sz="3600" dirty="0"/>
-              <a:t> Advanced </a:t>
-            </a:r>
-            <a:r>
-              <a:rPr lang="en-US" sz="3600" dirty="0" err="1"/>
-              <a:t>Templating</a:t>
-            </a:r>
-            <a:r>
-              <a:rPr lang="en-US" sz="3600" dirty="0"/>
-              <a:t> Techniques</a:t>
-            </a:r>
-          </a:p>
-        </p:txBody>
-      </p:sp>
-      <p:sp>
-        <p:nvSpPr>
-          <p:cNvPr id="3" name="Subtitle 2"/>
-          <p:cNvSpPr>
-            <a:spLocks noGrp="1"/>
-          </p:cNvSpPr>
-          <p:nvPr>
-            <p:ph type="subTitle" idx="1"/>
-          </p:nvPr>
-        </p:nvSpPr>
-        <p:spPr/>
-        <p:txBody>
-          <a:bodyPr/>
-          <a:lstStyle/>
-          <a:p>
-            <a:r>
-              <a:rPr lang="en-US" dirty="0"/>
-              <a:t>Template Nesting, Dynamic </a:t>
-            </a:r>
-            <a:r>
-              <a:rPr lang="en-US" dirty="0" err="1" smtClean="0"/>
-              <a:t>Templating</a:t>
-            </a:r>
-            <a:r>
-              <a:rPr lang="en-US" dirty="0"/>
-              <a:t>, Independent Template Observables &amp; Delayed </a:t>
-            </a:r>
-            <a:r>
-              <a:rPr lang="en-US" dirty="0" smtClean="0"/>
-              <a:t>Content Updating</a:t>
-            </a:r>
-            <a:endParaRPr lang="en-US" dirty="0"/>
+            <a:pPr marR="0" rtl="0"/>
+            <a:r>
+              <a:rPr lang="en-US" b="1" i="0" u="none" strike="noStrike" baseline="0" dirty="0" smtClean="0">
+                <a:solidFill>
+                  <a:srgbClr val="345A8A"/>
+                </a:solidFill>
+                <a:latin typeface="Calibri"/>
+                <a:ea typeface="ＭＳ ゴシック"/>
+              </a:rPr>
+              <a:t>Adding a Template</a:t>
+            </a:r>
+            <a:r>
+              <a:rPr lang="en-US" b="1" i="0" u="none" strike="noStrike" dirty="0" smtClean="0">
+                <a:solidFill>
+                  <a:srgbClr val="345A8A"/>
+                </a:solidFill>
+                <a:latin typeface="Calibri"/>
+                <a:ea typeface="ＭＳ ゴシック"/>
+              </a:rPr>
+              <a:t> with KO</a:t>
+            </a:r>
+            <a:endParaRPr lang="en-US" b="1" i="0" u="none" strike="noStrike" baseline="0" dirty="0" smtClean="0">
+              <a:solidFill>
+                <a:srgbClr val="345A8A"/>
+              </a:solidFill>
+              <a:latin typeface="Calibri"/>
+              <a:ea typeface="ＭＳ ゴシック"/>
+            </a:endParaRPr>
+          </a:p>
+        </p:txBody>
+      </p:sp>
+      <p:sp>
+        <p:nvSpPr>
+          <p:cNvPr id="3" name="Text Placeholder 2"/>
+          <p:cNvSpPr>
+            <a:spLocks noGrp="1"/>
+          </p:cNvSpPr>
+          <p:nvPr>
+            <p:ph type="body" idx="1"/>
+          </p:nvPr>
+        </p:nvSpPr>
+        <p:spPr>
+          <a:xfrm>
+            <a:off x="549275" y="1600200"/>
+            <a:ext cx="8042276" cy="4731315"/>
+          </a:xfrm>
+        </p:spPr>
+        <p:txBody>
+          <a:bodyPr>
+            <a:normAutofit/>
+          </a:bodyPr>
+          <a:lstStyle/>
+          <a:p>
+            <a:pPr lvl="0"/>
+            <a:r>
+              <a:rPr lang="en-US" b="1" i="0" u="none" strike="noStrike" baseline="0" dirty="0" smtClean="0">
+                <a:solidFill>
+                  <a:srgbClr val="4F81BD"/>
+                </a:solidFill>
+                <a:latin typeface="Calibri"/>
+                <a:ea typeface="ＭＳ ゴシック"/>
+              </a:rPr>
+              <a:t>Adding a template requires 2 parts…</a:t>
+            </a:r>
+          </a:p>
+          <a:p>
+            <a:pPr lvl="0"/>
+            <a:r>
+              <a:rPr lang="en-US" b="1" i="0" u="none" strike="noStrike" baseline="0" dirty="0" smtClean="0">
+                <a:solidFill>
+                  <a:srgbClr val="4F81BD"/>
+                </a:solidFill>
+                <a:latin typeface="Calibri"/>
+                <a:ea typeface="ＭＳ ゴシック"/>
+              </a:rPr>
+              <a:t>“template” data-</a:t>
+            </a:r>
+            <a:r>
+              <a:rPr lang="en-US" b="1" dirty="0">
+                <a:solidFill>
+                  <a:srgbClr val="4F81BD"/>
+                </a:solidFill>
+                <a:latin typeface="Calibri"/>
+                <a:ea typeface="ＭＳ ゴシック"/>
+              </a:rPr>
+              <a:t>bind ❒</a:t>
+            </a:r>
+            <a:endParaRPr lang="en-US" b="1" i="0" u="none" strike="noStrike" baseline="0" dirty="0" smtClean="0">
+              <a:solidFill>
+                <a:srgbClr val="4F81BD"/>
+              </a:solidFill>
+              <a:latin typeface="Calibri"/>
+              <a:ea typeface="ＭＳ ゴシック"/>
+            </a:endParaRPr>
+          </a:p>
+          <a:p>
+            <a:pPr lvl="0"/>
+            <a:r>
+              <a:rPr lang="en-US" b="1" i="0" u="none" strike="noStrike" baseline="0" dirty="0" smtClean="0">
+                <a:solidFill>
+                  <a:srgbClr val="4F81BD"/>
+                </a:solidFill>
+                <a:latin typeface="Calibri"/>
+                <a:ea typeface="ＭＳ ゴシック"/>
+              </a:rPr>
+              <a:t>A custom script tag that contains your template </a:t>
+            </a:r>
+            <a:r>
+              <a:rPr lang="en-US" b="1" dirty="0">
+                <a:solidFill>
+                  <a:srgbClr val="4F81BD"/>
+                </a:solidFill>
+                <a:latin typeface="Calibri"/>
+                <a:ea typeface="ＭＳ ゴシック"/>
+              </a:rPr>
+              <a:t>content ❒ </a:t>
+            </a:r>
+            <a:r>
+              <a:rPr lang="en-US" sz="2000" i="1" dirty="0" smtClean="0">
+                <a:solidFill>
+                  <a:srgbClr val="A6A6A6"/>
+                </a:solidFill>
+                <a:latin typeface="Calibri"/>
+                <a:ea typeface="ＭＳ ゴシック"/>
+              </a:rPr>
+              <a:t>see </a:t>
+            </a:r>
+            <a:r>
+              <a:rPr lang="en-US" sz="2000" i="1" dirty="0" err="1" smtClean="0">
+                <a:solidFill>
+                  <a:srgbClr val="A6A6A6"/>
+                </a:solidFill>
+                <a:latin typeface="Calibri"/>
+                <a:ea typeface="ＭＳ ゴシック"/>
+              </a:rPr>
+              <a:t>templateBinding.html</a:t>
+            </a:r>
+            <a:endParaRPr lang="en-US" sz="2000" i="1" u="none" strike="noStrike" baseline="0" dirty="0" smtClean="0">
+              <a:solidFill>
+                <a:srgbClr val="A6A6A6"/>
+              </a:solidFill>
+              <a:latin typeface="Calibri"/>
+              <a:ea typeface="ＭＳ ゴシック"/>
+            </a:endParaRPr>
           </a:p>
         </p:txBody>
       </p:sp>
     </p:spTree>
     <p:extLst>
       <p:ext uri="{BB962C8B-B14F-4D97-AF65-F5344CB8AC3E}">
-        <p14:creationId xmlns:p14="http://schemas.microsoft.com/office/powerpoint/2010/main" val="71867692"/>
+        <p14:creationId xmlns:p14="http://schemas.microsoft.com/office/powerpoint/2010/main" val="910141512"/>
       </p:ext>
     </p:extLst>
   </p:cSld>
@@ -4499,7 +4467,7 @@
                 <a:latin typeface="Calibri"/>
                 <a:ea typeface="ＭＳ ゴシック"/>
               </a:rPr>
-              <a:t>Template Nesting</a:t>
+              <a:t>Template Context</a:t>
             </a:r>
           </a:p>
         </p:txBody>
@@ -4519,34 +4487,99 @@
           <a:bodyPr/>
           <a:lstStyle/>
           <a:p>
-            <a:r>
-              <a:rPr lang="en-US" dirty="0" smtClean="0"/>
-              <a:t>You can place templates within other templates to render out complex collections containing collections of </a:t>
-            </a:r>
-            <a:r>
-              <a:rPr lang="en-US" dirty="0"/>
-              <a:t>their own. ❒ </a:t>
-            </a:r>
-            <a:r>
-              <a:rPr lang="en-US" sz="1400" i="1" dirty="0">
+            <a:pPr lvl="1"/>
+            <a:r>
+              <a:rPr lang="en-US" b="1" dirty="0">
+                <a:solidFill>
+                  <a:srgbClr val="4F81BD"/>
+                </a:solidFill>
+                <a:latin typeface="Calibri"/>
+                <a:ea typeface="ＭＳ ゴシック"/>
+              </a:rPr>
+              <a:t>If you don’t provide it a context, it will assume the context of the current level in your view model </a:t>
+            </a:r>
+          </a:p>
+          <a:p>
+            <a:pPr lvl="1"/>
+            <a:r>
+              <a:rPr lang="en-US" b="1" dirty="0" smtClean="0">
+                <a:solidFill>
+                  <a:srgbClr val="4F81BD"/>
+                </a:solidFill>
+                <a:latin typeface="Calibri"/>
+                <a:ea typeface="ＭＳ ゴシック"/>
+              </a:rPr>
+              <a:t>Control </a:t>
+            </a:r>
+            <a:r>
+              <a:rPr lang="en-US" b="1" dirty="0">
+                <a:solidFill>
+                  <a:srgbClr val="4F81BD"/>
+                </a:solidFill>
+                <a:latin typeface="Calibri"/>
+                <a:ea typeface="ＭＳ ゴシック"/>
+              </a:rPr>
+              <a:t>the context of your template by supplying a data parameter: ❒</a:t>
+            </a:r>
+            <a:r>
+              <a:rPr lang="en-US" sz="2000" i="1" dirty="0">
                 <a:solidFill>
                   <a:srgbClr val="A6A6A6"/>
                 </a:solidFill>
+                <a:latin typeface="Calibri"/>
+                <a:ea typeface="ＭＳ ゴシック"/>
+              </a:rPr>
+              <a:t> </a:t>
+            </a:r>
+            <a:r>
+              <a:rPr lang="en-US" sz="1600" i="1" dirty="0">
+                <a:solidFill>
+                  <a:srgbClr val="A6A6A6"/>
+                </a:solidFill>
+                <a:latin typeface="Calibri"/>
+                <a:ea typeface="ＭＳ ゴシック"/>
               </a:rPr>
               <a:t>see </a:t>
             </a:r>
             <a:r>
-              <a:rPr lang="en-US" sz="1400" i="1" dirty="0" err="1">
+              <a:rPr lang="en-US" sz="1600" i="1" dirty="0" err="1" smtClean="0">
                 <a:solidFill>
                   <a:srgbClr val="A6A6A6"/>
                 </a:solidFill>
-              </a:rPr>
-              <a:t>templateNesting.html</a:t>
-            </a:r>
-            <a:endParaRPr lang="en-US" sz="1400" i="1" dirty="0">
+                <a:latin typeface="Calibri"/>
+                <a:ea typeface="ＭＳ ゴシック"/>
+              </a:rPr>
+              <a:t>templateContext.html</a:t>
+            </a:r>
+            <a:endParaRPr lang="en-US" sz="1600" i="1" dirty="0" smtClean="0">
               <a:solidFill>
                 <a:srgbClr val="A6A6A6"/>
               </a:solidFill>
+              <a:latin typeface="Calibri"/>
+              <a:ea typeface="ＭＳ ゴシック"/>
+            </a:endParaRPr>
+          </a:p>
+          <a:p>
+            <a:pPr lvl="1"/>
+            <a:r>
+              <a:rPr lang="en-US" sz="1600" b="1" i="1" dirty="0">
+                <a:solidFill>
+                  <a:srgbClr val="4F81BD"/>
+                </a:solidFill>
+                <a:latin typeface="Calibri"/>
+                <a:ea typeface="ＭＳ ゴシック"/>
+              </a:rPr>
+              <a:t>Additionally, KO has a set of context variables: $root, $parent, &amp; $data. These give you shortcuts to simplify your bindings and context.</a:t>
+            </a:r>
+          </a:p>
+          <a:p>
+            <a:pPr lvl="1"/>
+            <a:endParaRPr lang="en-US" sz="1600" i="1" dirty="0">
+              <a:solidFill>
+                <a:srgbClr val="A6A6A6"/>
+              </a:solidFill>
+              <a:latin typeface="Calibri"/>
+              <a:ea typeface="ＭＳ ゴシック"/>
             </a:endParaRPr>
           </a:p>
         </p:txBody>
@@ -4554,7 +4587,7 @@
     </p:spTree>
     <p:extLst>
       <p:ext uri="{BB962C8B-B14F-4D97-AF65-F5344CB8AC3E}">
-        <p14:creationId xmlns:p14="http://schemas.microsoft.com/office/powerpoint/2010/main" val="3695262174"/>
+        <p14:creationId xmlns:p14="http://schemas.microsoft.com/office/powerpoint/2010/main" val="1130182513"/>
       </p:ext>
     </p:extLst>
   </p:cSld>
@@ -4605,24 +4638,14 @@
           <a:p>
             <a:pPr marR="0" rtl="0"/>
             <a:r>
-              <a:rPr lang="en-US" b="1" i="0" u="none" strike="noStrike" baseline="0" dirty="0" smtClean="0">
+              <a:rPr lang="en-US" b="1" dirty="0" smtClean="0">
                 <a:solidFill>
                   <a:srgbClr val="345A8A"/>
                 </a:solidFill>
                 <a:latin typeface="Calibri"/>
                 <a:ea typeface="ＭＳ ゴシック"/>
               </a:rPr>
-              <a:t>Dynamic </a:t>
-            </a:r>
-            <a:r>
-              <a:rPr lang="en-US" b="1" i="0" u="none" strike="noStrike" baseline="0" dirty="0" err="1" smtClean="0">
-                <a:solidFill>
-                  <a:srgbClr val="345A8A"/>
-                </a:solidFill>
-                <a:latin typeface="Calibri"/>
-                <a:ea typeface="ＭＳ ゴシック"/>
-              </a:rPr>
-              <a:t>Templating</a:t>
+              <a:t>Repeat, Repeat, Repeat</a:t>
             </a:r>
             <a:endParaRPr lang="en-US" b="1" i="0" u="none" strike="noStrike" baseline="0" dirty="0" smtClean="0">
               <a:solidFill>
@@ -4649,42 +4672,92 @@
           <a:bodyPr/>
           <a:lstStyle/>
           <a:p>
-            <a:pPr marR="0" lvl="0" rtl="0"/>
-            <a:r>
-              <a:rPr lang="en-US" b="1" i="0" u="none" strike="noStrike" baseline="0" dirty="0" smtClean="0">
+            <a:pPr lvl="1"/>
+            <a:r>
+              <a:rPr lang="en-US" b="1" dirty="0">
                 <a:solidFill>
                   <a:srgbClr val="4F81BD"/>
                 </a:solidFill>
                 <a:latin typeface="Calibri"/>
                 <a:ea typeface="ＭＳ ゴシック"/>
               </a:rPr>
-              <a:t>Observable template names</a:t>
-            </a:r>
-          </a:p>
-          <a:p>
-            <a:pPr marR="0" lvl="1" rtl="0"/>
-            <a:r>
-              <a:rPr lang="en-US" b="1" i="0" u="none" strike="noStrike" baseline="0" dirty="0" smtClean="0">
+              <a:t>You can iterate over a collection in your data model to repeat the template for each </a:t>
+            </a:r>
+            <a:r>
+              <a:rPr lang="en-US" b="1" dirty="0" smtClean="0">
                 <a:solidFill>
                   <a:srgbClr val="4F81BD"/>
                 </a:solidFill>
                 <a:latin typeface="Calibri"/>
                 <a:ea typeface="ＭＳ ゴシック"/>
               </a:rPr>
-              <a:t>Just like you can bind other properties to observables, the name property of a template bind is in exception</a:t>
+              <a:t>item, by using the ‘</a:t>
+            </a:r>
+            <a:r>
+              <a:rPr lang="en-US" b="1" dirty="0" err="1" smtClean="0">
+                <a:solidFill>
+                  <a:srgbClr val="4F81BD"/>
+                </a:solidFill>
+                <a:latin typeface="Calibri"/>
+                <a:ea typeface="ＭＳ ゴシック"/>
+              </a:rPr>
+              <a:t>foreach</a:t>
+            </a:r>
+            <a:r>
+              <a:rPr lang="en-US" b="1" dirty="0" smtClean="0">
+                <a:solidFill>
+                  <a:srgbClr val="4F81BD"/>
+                </a:solidFill>
+                <a:latin typeface="Calibri"/>
+                <a:ea typeface="ＭＳ ゴシック"/>
+              </a:rPr>
+              <a:t>’ parameter.</a:t>
+            </a:r>
+          </a:p>
+          <a:p>
+            <a:pPr lvl="1"/>
+            <a:r>
+              <a:rPr lang="en-US" b="1" dirty="0" smtClean="0">
+                <a:solidFill>
+                  <a:srgbClr val="4F81BD"/>
+                </a:solidFill>
+                <a:latin typeface="Calibri"/>
+                <a:ea typeface="ＭＳ ゴシック"/>
+              </a:rPr>
+              <a:t>This allows you to </a:t>
+            </a:r>
+            <a:r>
+              <a:rPr lang="en-US" b="1" dirty="0" err="1" smtClean="0">
+                <a:solidFill>
+                  <a:srgbClr val="4F81BD"/>
+                </a:solidFill>
+                <a:latin typeface="Calibri"/>
+                <a:ea typeface="ＭＳ ゴシック"/>
+              </a:rPr>
+              <a:t>resuse</a:t>
+            </a:r>
+            <a:r>
+              <a:rPr lang="en-US" b="1" dirty="0" smtClean="0">
+                <a:solidFill>
+                  <a:srgbClr val="4F81BD"/>
+                </a:solidFill>
+                <a:latin typeface="Calibri"/>
+                <a:ea typeface="ＭＳ ゴシック"/>
+              </a:rPr>
+              <a:t> the same HMTL several times with different values.</a:t>
             </a:r>
           </a:p>
           <a:p>
             <a:pPr lvl="2"/>
             <a:r>
-              <a:rPr lang="en-US" b="1" i="1" u="none" strike="noStrike" baseline="0" dirty="0" smtClean="0">
+              <a:rPr lang="en-US" b="1" i="1" dirty="0" smtClean="0">
                 <a:solidFill>
                   <a:srgbClr val="4F81BD"/>
                 </a:solidFill>
                 <a:latin typeface="Calibri"/>
                 <a:ea typeface="ＭＳ ゴシック"/>
               </a:rPr>
-              <a:t>What this allows you to do is switch out whole sections of markup in your HTML just by changing one observable value in your view model</a:t>
+              <a:t>In the following example, this </a:t>
             </a:r>
             <a:r>
               <a:rPr lang="en-US" b="1" i="1" dirty="0">
@@ -4694,45 +4767,39 @@
                 <a:latin typeface="Calibri"/>
                 <a:ea typeface="ＭＳ ゴシック"/>
               </a:rPr>
-              <a:t>. </a:t>
-            </a:r>
-            <a:r>
-              <a:rPr lang="en-US" b="1" i="1" dirty="0" smtClean="0">
+              <a:t>will repeat the template for each item in the ‘guys’ object and also put the template in the context of ‘guys’ ❒ </a:t>
+            </a:r>
+            <a:r>
+              <a:rPr lang="en-US" i="1" dirty="0">
+                <a:solidFill>
+                  <a:srgbClr val="A6A6A6"/>
+                </a:solidFill>
+                <a:latin typeface="Calibri"/>
+                <a:ea typeface="ＭＳ ゴシック"/>
+              </a:rPr>
+              <a:t>see </a:t>
+            </a:r>
+            <a:r>
+              <a:rPr lang="en-US" i="1" dirty="0" err="1">
+                <a:solidFill>
+                  <a:srgbClr val="A6A6A6"/>
+                </a:solidFill>
+                <a:latin typeface="Calibri"/>
+                <a:ea typeface="ＭＳ ゴシック"/>
+              </a:rPr>
+              <a:t>templateIteration.html</a:t>
+            </a:r>
+            <a:r>
+              <a:rPr lang="en-US" b="1" dirty="0" smtClean="0">
                 <a:solidFill>
                   <a:srgbClr val="4F81BD"/>
                 </a:solidFill>
                 <a:latin typeface="Calibri"/>
                 <a:ea typeface="ＭＳ ゴシック"/>
               </a:rPr>
-              <a:t>❒ </a:t>
-            </a:r>
-            <a:r>
-              <a:rPr lang="en-US" sz="1400" i="1" dirty="0">
-                <a:solidFill>
-                  <a:srgbClr val="A6A6A6"/>
-                </a:solidFill>
-              </a:rPr>
-              <a:t>see </a:t>
-            </a:r>
-            <a:r>
-              <a:rPr lang="en-US" sz="1400" i="1" dirty="0" err="1">
-                <a:solidFill>
-                  <a:srgbClr val="A6A6A6"/>
-                </a:solidFill>
-              </a:rPr>
-              <a:t>templateTechniques.html</a:t>
-            </a:r>
-            <a:endParaRPr lang="en-US" sz="1400" i="1" dirty="0">
-              <a:solidFill>
-                <a:srgbClr val="A6A6A6"/>
-              </a:solidFill>
-            </a:endParaRPr>
-          </a:p>
-          <a:p>
-            <a:pPr marL="685800" lvl="2" indent="0">
-              <a:buNone/>
-            </a:pPr>
-            <a:endParaRPr lang="en-US" b="1" i="1" u="none" strike="noStrike" baseline="0" dirty="0" smtClean="0">
+              <a:t> </a:t>
+            </a:r>
+            <a:endParaRPr lang="en-US" b="1" dirty="0">
               <a:solidFill>
                 <a:srgbClr val="4F81BD"/>
               </a:solidFill>
@@ -4740,12 +4807,22 @@
               <a:ea typeface="ＭＳ ゴシック"/>
             </a:endParaRPr>
           </a:p>
+          <a:p>
+            <a:pPr lvl="1"/>
+            <a:endParaRPr lang="en-US" sz="1600" i="1" dirty="0">
+              <a:solidFill>
+                <a:srgbClr val="A6A6A6"/>
+              </a:solidFill>
+              <a:latin typeface="Calibri"/>
+              <a:ea typeface="ＭＳ ゴシック"/>
+            </a:endParaRPr>
+          </a:p>
         </p:txBody>
       </p:sp>
     </p:spTree>
     <p:extLst>
       <p:ext uri="{BB962C8B-B14F-4D97-AF65-F5344CB8AC3E}">
-        <p14:creationId xmlns:p14="http://schemas.microsoft.com/office/powerpoint/2010/main" val="4128002099"/>
+        <p14:creationId xmlns:p14="http://schemas.microsoft.com/office/powerpoint/2010/main" val="2322801326"/>
       </p:ext>
     </p:extLst>
   </p:cSld>
@@ -4786,38 +4863,37 @@
             <a:spLocks noGrp="1"/>
           </p:cNvSpPr>
           <p:nvPr>
-            <p:ph type="title"/>
+            <p:ph type="ctrTitle"/>
           </p:nvPr>
         </p:nvSpPr>
         <p:spPr/>
         <p:txBody>
-          <a:bodyPr>
-            <a:normAutofit fontScale="90000"/>
-          </a:bodyPr>
-          <a:lstStyle/>
-          <a:p>
-            <a:pPr marR="0" rtl="0"/>
-            <a:r>
-              <a:rPr lang="en-US" b="1" i="0" u="none" strike="noStrike" baseline="0" dirty="0" smtClean="0">
-                <a:solidFill>
-                  <a:srgbClr val="345A8A"/>
-                </a:solidFill>
-                <a:latin typeface="Calibri"/>
-                <a:ea typeface="ＭＳ ゴシック"/>
-              </a:rPr>
-              <a:t>Independent Template Observables</a:t>
-            </a:r>
-          </a:p>
-        </p:txBody>
-      </p:sp>
-      <p:sp>
-        <p:nvSpPr>
-          <p:cNvPr id="3" name="Text Placeholder 2"/>
-          <p:cNvSpPr>
-            <a:spLocks noGrp="1"/>
-          </p:cNvSpPr>
-          <p:nvPr>
-            <p:ph type="body" idx="1"/>
+          <a:bodyPr/>
+          <a:lstStyle/>
+          <a:p>
+            <a:r>
+              <a:rPr lang="en-US" sz="3600" dirty="0"/>
+              <a:t> Advanced </a:t>
+            </a:r>
+            <a:r>
+              <a:rPr lang="en-US" sz="3600" dirty="0" err="1"/>
+              <a:t>Templating</a:t>
+            </a:r>
+            <a:r>
+              <a:rPr lang="en-US" sz="3600" dirty="0"/>
+              <a:t> Techniques</a:t>
+            </a:r>
+          </a:p>
+        </p:txBody>
+      </p:sp>
+      <p:sp>
+        <p:nvSpPr>
+          <p:cNvPr id="3" name="Subtitle 2"/>
+          <p:cNvSpPr>
+            <a:spLocks noGrp="1"/>
+          </p:cNvSpPr>
+          <p:nvPr>
+            <p:ph type="subTitle" idx="1"/>
           </p:nvPr>
         </p:nvSpPr>
         <p:spPr/>
@@ -4826,75 +4902,29 @@
           <a:lstStyle/>
           <a:p>
             <a:r>
-              <a:rPr lang="en-US" b="1" i="0" u="none" strike="noStrike" baseline="0" dirty="0" smtClean="0">
-                <a:solidFill>
-                  <a:srgbClr val="4F81BD"/>
-                </a:solidFill>
-                <a:latin typeface="Calibri"/>
-                <a:ea typeface="ＭＳ ゴシック"/>
-              </a:rPr>
-              <a:t>If you iterate over a collection and give each item a commonly named observable to track it’s template, you can change each item’s template independently from each </a:t>
-            </a:r>
-            <a:r>
-              <a:rPr lang="en-US" b="1" dirty="0">
-                <a:solidFill>
-                  <a:srgbClr val="4F81BD"/>
-                </a:solidFill>
-                <a:latin typeface="Calibri"/>
-                <a:ea typeface="ＭＳ ゴシック"/>
-              </a:rPr>
-              <a:t>other </a:t>
-            </a:r>
-            <a:r>
-              <a:rPr lang="en-US" b="1" dirty="0" smtClean="0">
-                <a:solidFill>
-                  <a:srgbClr val="4F81BD"/>
-                </a:solidFill>
-                <a:latin typeface="Calibri"/>
-                <a:ea typeface="ＭＳ ゴシック"/>
-              </a:rPr>
-              <a:t>❒</a:t>
-            </a:r>
-            <a:r>
-              <a:rPr lang="en-US" sz="1400" i="1" dirty="0">
-                <a:solidFill>
-                  <a:srgbClr val="A6A6A6"/>
-                </a:solidFill>
-              </a:rPr>
-              <a:t>see </a:t>
-            </a:r>
-            <a:r>
-              <a:rPr lang="en-US" sz="1400" i="1" dirty="0" err="1">
-                <a:solidFill>
-                  <a:srgbClr val="A6A6A6"/>
-                </a:solidFill>
-              </a:rPr>
-              <a:t>templateTechniques.html</a:t>
-            </a:r>
-            <a:endParaRPr lang="en-US" sz="1400" i="1" dirty="0">
-              <a:solidFill>
-                <a:srgbClr val="A6A6A6"/>
-              </a:solidFill>
-            </a:endParaRPr>
-          </a:p>
-          <a:p>
-            <a:pPr marL="0" lvl="0" indent="0">
-              <a:buNone/>
-            </a:pPr>
-            <a:endParaRPr lang="en-US" b="1" i="0" u="none" strike="noStrike" baseline="0" dirty="0" smtClean="0">
-              <a:solidFill>
-                <a:srgbClr val="4F81BD"/>
-              </a:solidFill>
-              <a:latin typeface="Calibri"/>
-              <a:ea typeface="ＭＳ ゴシック"/>
-            </a:endParaRPr>
+              <a:rPr lang="en-US" dirty="0"/>
+              <a:t>Template Nesting, Dynamic </a:t>
+            </a:r>
+            <a:r>
+              <a:rPr lang="en-US" dirty="0" err="1" smtClean="0"/>
+              <a:t>Templating</a:t>
+            </a:r>
+            <a:r>
+              <a:rPr lang="en-US" dirty="0"/>
+              <a:t>, Independent Template Observables &amp; Delayed </a:t>
+            </a:r>
+            <a:r>
+              <a:rPr lang="en-US" dirty="0" smtClean="0"/>
+              <a:t>Content Updating</a:t>
+            </a:r>
+            <a:endParaRPr lang="en-US" dirty="0"/>
           </a:p>
         </p:txBody>
       </p:sp>
     </p:spTree>
     <p:extLst>
       <p:ext uri="{BB962C8B-B14F-4D97-AF65-F5344CB8AC3E}">
-        <p14:creationId xmlns:p14="http://schemas.microsoft.com/office/powerpoint/2010/main" val="3733725666"/>
+        <p14:creationId xmlns:p14="http://schemas.microsoft.com/office/powerpoint/2010/main" val="71867692"/>
       </p:ext>
     </p:extLst>
   </p:cSld>
@@ -4952,7 +4982,7 @@
                 <a:latin typeface="Calibri"/>
                 <a:ea typeface="ＭＳ ゴシック"/>
               </a:rPr>
-              <a:t>Delayed content updating</a:t>
+              <a:t>Template Nesting</a:t>
             </a:r>
           </a:p>
         </p:txBody>
@@ -4967,347 +4997,39 @@
             <p:ph type="body" idx="1"/>
           </p:nvPr>
         </p:nvSpPr>
-        <p:spPr>
-          <a:xfrm>
-            <a:off x="549275" y="1600200"/>
-            <a:ext cx="8042276" cy="5043375"/>
-          </a:xfrm>
-        </p:spPr>
-        <p:txBody>
-          <a:bodyPr>
-            <a:normAutofit fontScale="62500" lnSpcReduction="20000"/>
-          </a:bodyPr>
-          <a:lstStyle/>
-          <a:p>
-            <a:pPr lvl="0"/>
-            <a:r>
-              <a:rPr lang="en-US" b="1" i="0" u="none" strike="noStrike" baseline="0" dirty="0" smtClean="0">
-                <a:solidFill>
-                  <a:srgbClr val="4F81BD"/>
-                </a:solidFill>
-                <a:latin typeface="Calibri"/>
-                <a:ea typeface="ＭＳ ゴシック"/>
-              </a:rPr>
-              <a:t>Expanding </a:t>
-            </a:r>
-            <a:r>
-              <a:rPr lang="en-US" b="1" dirty="0">
-                <a:solidFill>
-                  <a:srgbClr val="4F81BD"/>
-                </a:solidFill>
-                <a:latin typeface="Calibri"/>
-                <a:ea typeface="ＭＳ ゴシック"/>
-              </a:rPr>
-              <a:t>on the Independent Template </a:t>
-            </a:r>
-            <a:r>
-              <a:rPr lang="en-US" b="1" dirty="0" smtClean="0">
-                <a:solidFill>
-                  <a:srgbClr val="4F81BD"/>
-                </a:solidFill>
-                <a:latin typeface="Calibri"/>
-                <a:ea typeface="ＭＳ ゴシック"/>
-              </a:rPr>
-              <a:t>Observables example, you can use this to improve KO performance with </a:t>
-            </a:r>
-            <a:r>
-              <a:rPr lang="en-US" b="1" smtClean="0">
-                <a:solidFill>
-                  <a:srgbClr val="4F81BD"/>
-                </a:solidFill>
-                <a:latin typeface="Calibri"/>
-                <a:ea typeface="ＭＳ ゴシック"/>
-              </a:rPr>
-              <a:t>large data sets</a:t>
-            </a:r>
-            <a:endParaRPr lang="en-US" b="1" i="0" u="none" strike="noStrike" baseline="0" dirty="0" smtClean="0">
+        <p:spPr/>
+        <p:txBody>
+          <a:bodyPr/>
+          <a:lstStyle/>
+          <a:p>
+            <a:r>
+              <a:rPr lang="en-US" dirty="0" smtClean="0"/>
+              <a:t>You can place templates within other templates to render out complex collections containing collections of </a:t>
+            </a:r>
+            <a:r>
+              <a:rPr lang="en-US" dirty="0"/>
+              <a:t>their own. ❒ </a:t>
+            </a:r>
+            <a:r>
+              <a:rPr lang="en-US" sz="1400" i="1" dirty="0">
+                <a:solidFill>
+                  <a:srgbClr val="A6A6A6"/>
+                </a:solidFill>
+              </a:rPr>
+              <a:t>see </a:t>
+            </a:r>
+            <a:r>
+              <a:rPr lang="en-US" sz="1400" i="1" dirty="0" err="1">
+                <a:solidFill>
+                  <a:srgbClr val="A6A6A6"/>
+                </a:solidFill>
+              </a:rPr>
+              <a:t>templateNesting.html</a:t>
+            </a:r>
+            <a:endParaRPr lang="en-US" sz="1400" i="1" dirty="0">
               <a:solidFill>
-                <a:srgbClr val="4F81BD"/>
+                <a:srgbClr val="A6A6A6"/>
               </a:solidFill>
-              <a:latin typeface="Calibri"/>
-              <a:ea typeface="ＭＳ ゴシック"/>
-            </a:endParaRPr>
-          </a:p>
-          <a:p>
-            <a:pPr marR="0" lvl="1" rtl="0"/>
-            <a:r>
-              <a:rPr lang="en-US" b="1" i="0" u="none" strike="noStrike" baseline="0" dirty="0" smtClean="0">
-                <a:solidFill>
-                  <a:srgbClr val="4F81BD"/>
-                </a:solidFill>
-                <a:latin typeface="Calibri"/>
-                <a:ea typeface="ＭＳ ゴシック"/>
-              </a:rPr>
-              <a:t>Why would you need to do this?</a:t>
-            </a:r>
-          </a:p>
-          <a:p>
-            <a:pPr marR="0" lvl="2" rtl="0"/>
-            <a:r>
-              <a:rPr lang="en-US" b="1" i="1" u="none" strike="noStrike" baseline="0" dirty="0" smtClean="0">
-                <a:solidFill>
-                  <a:srgbClr val="4F81BD"/>
-                </a:solidFill>
-                <a:latin typeface="Calibri"/>
-                <a:ea typeface="ＭＳ ゴシック"/>
-              </a:rPr>
-              <a:t>Say you are using Knockout and you have to deal with a very large data set. Knockout </a:t>
-            </a:r>
-            <a:r>
-              <a:rPr lang="en-US" b="1" i="1" u="none" strike="noStrike" baseline="0" dirty="0" err="1" smtClean="0">
-                <a:solidFill>
-                  <a:srgbClr val="4F81BD"/>
-                </a:solidFill>
-                <a:latin typeface="Calibri"/>
-                <a:ea typeface="ＭＳ ゴシック"/>
-              </a:rPr>
-              <a:t>templating</a:t>
-            </a:r>
-            <a:r>
-              <a:rPr lang="en-US" b="1" i="1" u="none" strike="noStrike" baseline="0" dirty="0" smtClean="0">
-                <a:solidFill>
-                  <a:srgbClr val="4F81BD"/>
-                </a:solidFill>
-                <a:latin typeface="Calibri"/>
-                <a:ea typeface="ＭＳ ゴシック"/>
-              </a:rPr>
-              <a:t> is great for minimizing markup and tracking the state of your model, but every system has its limitations.</a:t>
-            </a:r>
-          </a:p>
-          <a:p>
-            <a:pPr marR="0" lvl="3" rtl="0"/>
-            <a:r>
-              <a:rPr lang="en-US" b="0" i="0" u="none" strike="noStrike" baseline="0" dirty="0" smtClean="0">
-                <a:solidFill>
-                  <a:srgbClr val="243F60"/>
-                </a:solidFill>
-                <a:latin typeface="Calibri"/>
-                <a:ea typeface="ＭＳ ゴシック"/>
-              </a:rPr>
-              <a:t>So for example, say your large data-set is divided into 30+ categories, and within each of those are a dozen sub-categories, and inside each of those are several dozen database records</a:t>
-            </a:r>
-          </a:p>
-          <a:p>
-            <a:pPr marR="0" lvl="3" rtl="0"/>
-            <a:r>
-              <a:rPr lang="en-US" b="0" i="0" u="none" strike="noStrike" baseline="0" dirty="0" smtClean="0">
-                <a:solidFill>
-                  <a:srgbClr val="243F60"/>
-                </a:solidFill>
-                <a:latin typeface="Calibri"/>
-                <a:ea typeface="ＭＳ ゴシック"/>
-              </a:rPr>
-              <a:t>If each of those levels in your data uses its own template and set of observables, loading all of that markup into your DOM at the same time can drastically affect performance</a:t>
-            </a:r>
-          </a:p>
-          <a:p>
-            <a:pPr marR="0" lvl="2" rtl="0"/>
-            <a:r>
-              <a:rPr lang="en-US" b="1" i="1" u="none" strike="noStrike" baseline="0" dirty="0" smtClean="0">
-                <a:solidFill>
-                  <a:srgbClr val="4F81BD"/>
-                </a:solidFill>
-                <a:latin typeface="Calibri"/>
-                <a:ea typeface="ＭＳ ゴシック"/>
-              </a:rPr>
-              <a:t>How can you work around this?</a:t>
-            </a:r>
-          </a:p>
-          <a:p>
-            <a:pPr marR="0" lvl="3" rtl="0"/>
-            <a:r>
-              <a:rPr lang="en-US" b="0" i="0" u="none" strike="noStrike" baseline="0" dirty="0" smtClean="0">
-                <a:solidFill>
-                  <a:srgbClr val="243F60"/>
-                </a:solidFill>
-                <a:latin typeface="Calibri"/>
-                <a:ea typeface="ＭＳ ゴシック"/>
-              </a:rPr>
-              <a:t>Deferred content updating</a:t>
-            </a:r>
-          </a:p>
-          <a:p>
-            <a:pPr marR="0" lvl="4" rtl="0"/>
-            <a:r>
-              <a:rPr lang="en-US" b="0" i="1" u="none" strike="noStrike" baseline="0" dirty="0" smtClean="0">
-                <a:solidFill>
-                  <a:srgbClr val="243F60"/>
-                </a:solidFill>
-                <a:latin typeface="Calibri"/>
-                <a:ea typeface="ＭＳ ゴシック"/>
-              </a:rPr>
-              <a:t>In this example, every top level category in the data is represented by a header that functions as an accordion</a:t>
-            </a:r>
-          </a:p>
-          <a:p>
-            <a:pPr marR="0" lvl="4" rtl="0"/>
-            <a:r>
-              <a:rPr lang="en-US" b="0" i="1" u="none" strike="noStrike" baseline="0" dirty="0" smtClean="0">
-                <a:solidFill>
-                  <a:srgbClr val="243F60"/>
-                </a:solidFill>
-                <a:latin typeface="Calibri"/>
-                <a:ea typeface="ＭＳ ゴシック"/>
-              </a:rPr>
-              <a:t>Since the initial state of this template is the header with the accordion collapsed, you can put off displaying all the subsequent data in the DOM until it’s actually needed.</a:t>
-            </a:r>
-          </a:p>
-          <a:p>
-            <a:pPr marR="0" lvl="5" rtl="0"/>
-            <a:r>
-              <a:rPr lang="en-US" b="0" i="1" u="none" strike="noStrike" baseline="0" dirty="0" smtClean="0">
-                <a:solidFill>
-                  <a:srgbClr val="404040"/>
-                </a:solidFill>
-                <a:latin typeface="Calibri"/>
-                <a:ea typeface="ＭＳ ゴシック"/>
-              </a:rPr>
-              <a:t>You can still load all the complete data into your model; my experience is the cost to your DOM for that tends to be dramatically less than the display</a:t>
-            </a:r>
-          </a:p>
-          <a:p>
-            <a:pPr marR="0" lvl="4" rtl="0"/>
-            <a:r>
-              <a:rPr lang="en-US" b="0" i="1" u="none" strike="noStrike" baseline="0" dirty="0" smtClean="0">
-                <a:solidFill>
-                  <a:srgbClr val="243F60"/>
-                </a:solidFill>
-                <a:latin typeface="Calibri"/>
-                <a:ea typeface="ＭＳ ゴシック"/>
-              </a:rPr>
-              <a:t>Each instance of this top-level category can have it’s own observable that the template bind is using for its name property</a:t>
-            </a:r>
-            <a:r>
-              <a:rPr lang="en-US" b="0" i="1" u="none" strike="noStrike" baseline="0" dirty="0" smtClean="0">
-                <a:solidFill>
-                  <a:srgbClr val="243F60"/>
-                </a:solidFill>
-                <a:latin typeface="Times New Roman"/>
-                <a:ea typeface="ＭＳ ゴシック"/>
-              </a:rPr>
-              <a:t>.</a:t>
-            </a:r>
-          </a:p>
-          <a:p>
-            <a:pPr marR="0" lvl="4" rtl="0"/>
-            <a:r>
-              <a:rPr lang="en-US" b="0" i="1" u="none" strike="noStrike" baseline="0" dirty="0" err="1" smtClean="0">
-                <a:solidFill>
-                  <a:srgbClr val="243F60"/>
-                </a:solidFill>
-                <a:latin typeface="Calibri"/>
-                <a:ea typeface="ＭＳ ゴシック"/>
-              </a:rPr>
-              <a:t>Intitially</a:t>
-            </a:r>
-            <a:r>
-              <a:rPr lang="en-US" b="0" i="1" u="none" strike="noStrike" baseline="0" dirty="0" smtClean="0">
-                <a:solidFill>
-                  <a:srgbClr val="243F60"/>
-                </a:solidFill>
-                <a:latin typeface="Calibri"/>
-                <a:ea typeface="ＭＳ ゴシック"/>
-              </a:rPr>
-              <a:t> the DOM will only have to display minimal elements for the complete data set</a:t>
-            </a:r>
-          </a:p>
-          <a:p>
-            <a:pPr marR="0" lvl="4" rtl="0"/>
-            <a:r>
-              <a:rPr lang="en-US" b="0" i="1" u="none" strike="noStrike" baseline="0" dirty="0" smtClean="0">
-                <a:solidFill>
-                  <a:srgbClr val="243F60"/>
-                </a:solidFill>
-                <a:latin typeface="Calibri"/>
-                <a:ea typeface="ＭＳ ゴシック"/>
-              </a:rPr>
-              <a:t>Then by using a click event, change templates by changing that individual instance of the template name observable to your new value.</a:t>
-            </a:r>
-          </a:p>
-          <a:p>
-            <a:pPr marR="0" lvl="5" rtl="0"/>
-            <a:r>
-              <a:rPr lang="en-US" b="0" i="1" u="none" strike="noStrike" baseline="0" dirty="0" smtClean="0">
-                <a:solidFill>
-                  <a:srgbClr val="404040"/>
-                </a:solidFill>
-                <a:latin typeface="Calibri"/>
-                <a:ea typeface="ＭＳ ゴシック"/>
-              </a:rPr>
-              <a:t>This significantly reduces the load on the performance of the browser</a:t>
-            </a:r>
-          </a:p>
-          <a:p>
-            <a:pPr marR="0" lvl="4" rtl="0"/>
-            <a:r>
-              <a:rPr lang="en-US" b="0" i="1" u="none" strike="noStrike" baseline="0" dirty="0" smtClean="0">
-                <a:solidFill>
-                  <a:srgbClr val="243F60"/>
-                </a:solidFill>
-                <a:latin typeface="Calibri"/>
-                <a:ea typeface="ＭＳ ゴシック"/>
-              </a:rPr>
-              <a:t>After the remaining data has been added to the DOM the simplified template isn’t needed anymore. A simple </a:t>
-            </a:r>
-            <a:r>
-              <a:rPr lang="en-US" b="0" i="1" u="none" strike="noStrike" baseline="0" dirty="0" err="1" smtClean="0">
-                <a:solidFill>
-                  <a:srgbClr val="243F60"/>
-                </a:solidFill>
-                <a:latin typeface="Calibri"/>
-                <a:ea typeface="ＭＳ ゴシック"/>
-              </a:rPr>
-              <a:t>jQuery</a:t>
-            </a:r>
-            <a:r>
-              <a:rPr lang="en-US" b="0" i="1" u="none" strike="noStrike" baseline="0" dirty="0" smtClean="0">
-                <a:solidFill>
-                  <a:srgbClr val="243F60"/>
-                </a:solidFill>
-                <a:latin typeface="Calibri"/>
-                <a:ea typeface="ＭＳ ゴシック"/>
-              </a:rPr>
-              <a:t> </a:t>
-            </a:r>
-            <a:r>
-              <a:rPr lang="en-US" b="0" i="1" u="none" strike="noStrike" baseline="0" dirty="0" err="1" smtClean="0">
-                <a:solidFill>
-                  <a:srgbClr val="243F60"/>
-                </a:solidFill>
-                <a:latin typeface="Calibri"/>
-                <a:ea typeface="ＭＳ ゴシック"/>
-              </a:rPr>
-              <a:t>slideToggle</a:t>
-            </a:r>
-            <a:r>
-              <a:rPr lang="en-US" b="0" i="1" u="none" strike="noStrike" baseline="0" dirty="0" smtClean="0">
-                <a:solidFill>
-                  <a:srgbClr val="243F60"/>
-                </a:solidFill>
-                <a:latin typeface="Calibri"/>
-                <a:ea typeface="ＭＳ ゴシック"/>
-              </a:rPr>
-              <a:t> will work just fine.</a:t>
-            </a:r>
-          </a:p>
-          <a:p>
-            <a:pPr marR="0" lvl="3" rtl="0"/>
-            <a:r>
-              <a:rPr lang="en-US" b="0" i="0" u="none" strike="noStrike" baseline="0" dirty="0" smtClean="0">
-                <a:solidFill>
-                  <a:srgbClr val="243F60"/>
-                </a:solidFill>
-                <a:latin typeface="Calibri"/>
-                <a:ea typeface="ＭＳ ゴシック"/>
-              </a:rPr>
-              <a:t>If your situation wouldn’t allow for this approach, optimizing large data sets for Knockout would prove more difficult, but I’m sure there could be something to be done.</a:t>
-            </a:r>
-            <a:endParaRPr lang="en-US" b="0" i="0" u="none" strike="noStrike" baseline="0" dirty="0" smtClean="0">
-              <a:solidFill>
-                <a:srgbClr val="243F60"/>
-              </a:solidFill>
-              <a:latin typeface="Times New Roman"/>
-              <a:ea typeface="ＭＳ ゴシック"/>
             </a:endParaRPr>
           </a:p>
         </p:txBody>
@@ -5315,7 +5037,7 @@
     </p:spTree>
     <p:extLst>
       <p:ext uri="{BB962C8B-B14F-4D97-AF65-F5344CB8AC3E}">
-        <p14:creationId xmlns:p14="http://schemas.microsoft.com/office/powerpoint/2010/main" val="406494359"/>
+        <p14:creationId xmlns:p14="http://schemas.microsoft.com/office/powerpoint/2010/main" val="3695262174"/>
       </p:ext>
     </p:extLst>
   </p:cSld>
@@ -5361,9 +5083,7 @@
         </p:nvSpPr>
         <p:spPr/>
         <p:txBody>
-          <a:bodyPr>
-            <a:normAutofit/>
-          </a:bodyPr>
+          <a:bodyPr/>
           <a:lstStyle/>
           <a:p>
             <a:pPr marR="0" rtl="0"/>
@@ -5375,8 +5095,25 @@
                 <a:latin typeface="Calibri"/>
                 <a:ea typeface="ＭＳ ゴシック"/>
               </a:rPr>
-              <a:t>Summary</a:t>
-            </a:r>
+              <a:t>Dynamic </a:t>
+            </a:r>
+            <a:r>
+              <a:rPr lang="en-US" b="1" i="0" u="none" strike="noStrike" baseline="0" dirty="0" err="1" smtClean="0">
+                <a:solidFill>
+                  <a:srgbClr val="345A8A"/>
+                </a:solidFill>
+                <a:latin typeface="Calibri"/>
+                <a:ea typeface="ＭＳ ゴシック"/>
+              </a:rPr>
+              <a:t>Templating</a:t>
+            </a:r>
+            <a:endParaRPr lang="en-US" b="1" i="0" u="none" strike="noStrike" baseline="0" dirty="0" smtClean="0">
+              <a:solidFill>
+                <a:srgbClr val="345A8A"/>
+              </a:solidFill>
+              <a:latin typeface="Calibri"/>
+              <a:ea typeface="ＭＳ ゴシック"/>
+            </a:endParaRPr>
           </a:p>
         </p:txBody>
       </p:sp>
@@ -5395,77 +5132,49 @@
           <a:bodyPr/>
           <a:lstStyle/>
           <a:p>
-            <a:r>
-              <a:rPr lang="en-US" b="1" dirty="0">
+            <a:pPr marR="0" lvl="0" rtl="0"/>
+            <a:r>
+              <a:rPr lang="en-US" b="1" i="0" u="none" strike="noStrike" baseline="0" dirty="0" smtClean="0">
                 <a:solidFill>
                   <a:srgbClr val="4F81BD"/>
                 </a:solidFill>
                 <a:latin typeface="Calibri"/>
                 <a:ea typeface="ＭＳ ゴシック"/>
               </a:rPr>
-              <a:t>Knockout is a powerful </a:t>
-            </a:r>
-            <a:r>
-              <a:rPr lang="en-US" b="1" dirty="0" err="1">
+              <a:t>Observable template names</a:t>
+            </a:r>
+          </a:p>
+          <a:p>
+            <a:pPr marR="0" lvl="1" rtl="0"/>
+            <a:r>
+              <a:rPr lang="en-US" b="1" i="0" u="none" strike="noStrike" baseline="0" dirty="0" smtClean="0">
                 <a:solidFill>
                   <a:srgbClr val="4F81BD"/>
                 </a:solidFill>
                 <a:latin typeface="Calibri"/>
                 <a:ea typeface="ＭＳ ゴシック"/>
               </a:rPr>
-              <a:t>javascript</a:t>
-            </a:r>
-            <a:r>
-              <a:rPr lang="en-US" b="1" dirty="0">
+              <a:t>Just like you can bind other properties to observables, the name property of a template bind </a:t>
+            </a:r>
+            <a:r>
+              <a:rPr lang="en-US" b="1" i="0" u="none" strike="noStrike" baseline="0" smtClean="0">
                 <a:solidFill>
                   <a:srgbClr val="4F81BD"/>
                 </a:solidFill>
                 <a:latin typeface="Calibri"/>
                 <a:ea typeface="ＭＳ ゴシック"/>
               </a:rPr>
-              <a:t> framework that offers many ways to handle large amounts of ever changing data with a minimal amount of code. The built-in </a:t>
-            </a:r>
-            <a:r>
-              <a:rPr lang="en-US" b="1" dirty="0" err="1">
+              <a:t>is </a:t>
+            </a:r>
+            <a:r>
+              <a:rPr lang="en-US" b="1" i="0" u="none" strike="noStrike" baseline="0" smtClean="0">
                 <a:solidFill>
                   <a:srgbClr val="4F81BD"/>
                 </a:solidFill>
                 <a:latin typeface="Calibri"/>
                 <a:ea typeface="ＭＳ ゴシック"/>
               </a:rPr>
-              <a:t>templating</a:t>
-            </a:r>
-            <a:r>
-              <a:rPr lang="en-US" b="1" dirty="0">
-                <a:solidFill>
-                  <a:srgbClr val="4F81BD"/>
-                </a:solidFill>
-                <a:latin typeface="Calibri"/>
-                <a:ea typeface="ＭＳ ゴシック"/>
-              </a:rPr>
-              <a:t> engine in particular offers a great system for streamlining your HTML into easy-to-maintain chunks</a:t>
-            </a:r>
-            <a:r>
-              <a:rPr lang="en-US" b="1" dirty="0" smtClean="0">
-                <a:solidFill>
-                  <a:srgbClr val="4F81BD"/>
-                </a:solidFill>
-                <a:latin typeface="Calibri"/>
-                <a:ea typeface="ＭＳ ゴシック"/>
-              </a:rPr>
-              <a:t>.</a:t>
-            </a:r>
-          </a:p>
-          <a:p>
-            <a:r>
-              <a:rPr lang="en-US" b="1" dirty="0" smtClean="0">
-                <a:solidFill>
-                  <a:srgbClr val="4F81BD"/>
-                </a:solidFill>
-                <a:latin typeface="Calibri"/>
-                <a:ea typeface="ＭＳ ゴシック"/>
-              </a:rPr>
-              <a:t>By nesting templates together, dynamically changing template types with observable values, and making templates update independently of each other with their own observables, you can really maximize your templates’ ability to render complex amounts of data.</a:t>
+              <a:t>no exception</a:t>
             </a:r>
             <a:endParaRPr lang="en-US" b="1" i="0" u="none" strike="noStrike" baseline="0" dirty="0" smtClean="0">
               <a:solidFill>
@@ -5475,12 +5184,648 @@
               <a:ea typeface="ＭＳ ゴシック"/>
             </a:endParaRPr>
           </a:p>
+          <a:p>
+            <a:pPr lvl="2"/>
+            <a:r>
+              <a:rPr lang="en-US" b="1" i="1" u="none" strike="noStrike" baseline="0" dirty="0" smtClean="0">
+                <a:solidFill>
+                  <a:srgbClr val="4F81BD"/>
+                </a:solidFill>
+                <a:latin typeface="Calibri"/>
+                <a:ea typeface="ＭＳ ゴシック"/>
+              </a:rPr>
+              <a:t>What this allows you to do is switch out whole sections of markup in your HTML just by changing one observable value in your view model</a:t>
+            </a:r>
+            <a:r>
+              <a:rPr lang="en-US" b="1" i="1" dirty="0">
+                <a:solidFill>
+                  <a:srgbClr val="4F81BD"/>
+                </a:solidFill>
+                <a:latin typeface="Calibri"/>
+                <a:ea typeface="ＭＳ ゴシック"/>
+              </a:rPr>
+              <a:t>. </a:t>
+            </a:r>
+            <a:r>
+              <a:rPr lang="en-US" b="1" i="1" dirty="0" smtClean="0">
+                <a:solidFill>
+                  <a:srgbClr val="4F81BD"/>
+                </a:solidFill>
+                <a:latin typeface="Calibri"/>
+                <a:ea typeface="ＭＳ ゴシック"/>
+              </a:rPr>
+              <a:t>❒ </a:t>
+            </a:r>
+            <a:r>
+              <a:rPr lang="en-US" sz="1400" i="1" dirty="0">
+                <a:solidFill>
+                  <a:srgbClr val="A6A6A6"/>
+                </a:solidFill>
+              </a:rPr>
+              <a:t>see </a:t>
+            </a:r>
+            <a:r>
+              <a:rPr lang="en-US" sz="1400" i="1" dirty="0" err="1">
+                <a:solidFill>
+                  <a:srgbClr val="A6A6A6"/>
+                </a:solidFill>
+              </a:rPr>
+              <a:t>templateTechniques.html</a:t>
+            </a:r>
+            <a:endParaRPr lang="en-US" sz="1400" i="1" dirty="0">
+              <a:solidFill>
+                <a:srgbClr val="A6A6A6"/>
+              </a:solidFill>
+            </a:endParaRPr>
+          </a:p>
+          <a:p>
+            <a:pPr marL="685800" lvl="2" indent="0">
+              <a:buNone/>
+            </a:pPr>
+            <a:endParaRPr lang="en-US" b="1" i="1" u="none" strike="noStrike" baseline="0" dirty="0" smtClean="0">
+              <a:solidFill>
+                <a:srgbClr val="4F81BD"/>
+              </a:solidFill>
+              <a:latin typeface="Calibri"/>
+              <a:ea typeface="ＭＳ ゴシック"/>
+            </a:endParaRPr>
+          </a:p>
         </p:txBody>
       </p:sp>
     </p:spTree>
     <p:extLst>
       <p:ext uri="{BB962C8B-B14F-4D97-AF65-F5344CB8AC3E}">
-        <p14:creationId xmlns:p14="http://schemas.microsoft.com/office/powerpoint/2010/main" val="2520460276"/>
+        <p14:creationId xmlns:p14="http://schemas.microsoft.com/office/powerpoint/2010/main" val="4128002099"/>
+      </p:ext>
+    </p:extLst>
+  </p:cSld>
+  <p:clrMapOvr>
+    <a:masterClrMapping/>
+  </p:clrMapOvr>
+  <p:timing>
+    <p:tnLst>
+      <p:par>
+        <p:cTn xmlns:p14="http://schemas.microsoft.com/office/powerpoint/2010/main" id="1" dur="indefinite" restart="never" nodeType="tmRoot"/>
+      </p:par>
+    </p:tnLst>
+  </p:timing>
+</p:sld>
+</file>
+
+<file path=ppt/slides/slide18.xml><?xml version="1.0" encoding="utf-8"?>
+<p:sld xmlns:a="http://schemas.openxmlformats.org/drawingml/2006/main" xmlns:r="http://schemas.openxmlformats.org/officeDocument/2006/relationships" xmlns:p="http://schemas.openxmlformats.org/presentationml/2006/main">
+  <p:cSld>
+    <p:spTree>
+      <p:nvGrpSpPr>
+        <p:cNvPr id="1" name=""/>
+        <p:cNvGrpSpPr/>
+        <p:nvPr/>
+      </p:nvGrpSpPr>
+      <p:grpSpPr>
+        <a:xfrm>
+          <a:off x="0" y="0"/>
+          <a:ext cx="0" cy="0"/>
+          <a:chOff x="0" y="0"/>
+          <a:chExt cx="0" cy="0"/>
+        </a:xfrm>
+      </p:grpSpPr>
+      <p:sp>
+        <p:nvSpPr>
+          <p:cNvPr id="2" name="Title 1"/>
+          <p:cNvSpPr>
+            <a:spLocks noGrp="1"/>
+          </p:cNvSpPr>
+          <p:nvPr>
+            <p:ph type="title"/>
+          </p:nvPr>
+        </p:nvSpPr>
+        <p:spPr/>
+        <p:txBody>
+          <a:bodyPr>
+            <a:normAutofit fontScale="90000"/>
+          </a:bodyPr>
+          <a:lstStyle/>
+          <a:p>
+            <a:pPr marR="0" rtl="0"/>
+            <a:r>
+              <a:rPr lang="en-US" b="1" i="0" u="none" strike="noStrike" baseline="0" dirty="0" smtClean="0">
+                <a:solidFill>
+                  <a:srgbClr val="345A8A"/>
+                </a:solidFill>
+                <a:latin typeface="Calibri"/>
+                <a:ea typeface="ＭＳ ゴシック"/>
+              </a:rPr>
+              <a:t>Independent Template Observables</a:t>
+            </a:r>
+          </a:p>
+        </p:txBody>
+      </p:sp>
+      <p:sp>
+        <p:nvSpPr>
+          <p:cNvPr id="3" name="Text Placeholder 2"/>
+          <p:cNvSpPr>
+            <a:spLocks noGrp="1"/>
+          </p:cNvSpPr>
+          <p:nvPr>
+            <p:ph type="body" idx="1"/>
+          </p:nvPr>
+        </p:nvSpPr>
+        <p:spPr/>
+        <p:txBody>
+          <a:bodyPr/>
+          <a:lstStyle/>
+          <a:p>
+            <a:r>
+              <a:rPr lang="en-US" b="1" i="0" u="none" strike="noStrike" baseline="0" dirty="0" smtClean="0">
+                <a:solidFill>
+                  <a:srgbClr val="4F81BD"/>
+                </a:solidFill>
+                <a:latin typeface="Calibri"/>
+                <a:ea typeface="ＭＳ ゴシック"/>
+              </a:rPr>
+              <a:t>If you iterate over a collection and give each item a commonly named observable to track it’s template, you can change each item’s template independently from each </a:t>
+            </a:r>
+            <a:r>
+              <a:rPr lang="en-US" b="1" dirty="0">
+                <a:solidFill>
+                  <a:srgbClr val="4F81BD"/>
+                </a:solidFill>
+                <a:latin typeface="Calibri"/>
+                <a:ea typeface="ＭＳ ゴシック"/>
+              </a:rPr>
+              <a:t>other </a:t>
+            </a:r>
+            <a:r>
+              <a:rPr lang="en-US" b="1" dirty="0" smtClean="0">
+                <a:solidFill>
+                  <a:srgbClr val="4F81BD"/>
+                </a:solidFill>
+                <a:latin typeface="Calibri"/>
+                <a:ea typeface="ＭＳ ゴシック"/>
+              </a:rPr>
+              <a:t>❒</a:t>
+            </a:r>
+            <a:r>
+              <a:rPr lang="en-US" sz="1400" i="1" dirty="0">
+                <a:solidFill>
+                  <a:srgbClr val="A6A6A6"/>
+                </a:solidFill>
+              </a:rPr>
+              <a:t>see </a:t>
+            </a:r>
+            <a:r>
+              <a:rPr lang="en-US" sz="1400" i="1" dirty="0" err="1">
+                <a:solidFill>
+                  <a:srgbClr val="A6A6A6"/>
+                </a:solidFill>
+              </a:rPr>
+              <a:t>templateTechniques.html</a:t>
+            </a:r>
+            <a:endParaRPr lang="en-US" sz="1400" i="1" dirty="0">
+              <a:solidFill>
+                <a:srgbClr val="A6A6A6"/>
+              </a:solidFill>
+            </a:endParaRPr>
+          </a:p>
+          <a:p>
+            <a:pPr marL="0" lvl="0" indent="0">
+              <a:buNone/>
+            </a:pPr>
+            <a:endParaRPr lang="en-US" b="1" i="0" u="none" strike="noStrike" baseline="0" dirty="0" smtClean="0">
+              <a:solidFill>
+                <a:srgbClr val="4F81BD"/>
+              </a:solidFill>
+              <a:latin typeface="Calibri"/>
+              <a:ea typeface="ＭＳ ゴシック"/>
+            </a:endParaRPr>
+          </a:p>
+        </p:txBody>
+      </p:sp>
+    </p:spTree>
+    <p:extLst>
+      <p:ext uri="{BB962C8B-B14F-4D97-AF65-F5344CB8AC3E}">
+        <p14:creationId xmlns:p14="http://schemas.microsoft.com/office/powerpoint/2010/main" val="3733725666"/>
+      </p:ext>
+    </p:extLst>
+  </p:cSld>
+  <p:clrMapOvr>
+    <a:masterClrMapping/>
+  </p:clrMapOvr>
+  <p:timing>
+    <p:tnLst>
+      <p:par>
+        <p:cTn xmlns:p14="http://schemas.microsoft.com/office/powerpoint/2010/main" id="1" dur="indefinite" restart="never" nodeType="tmRoot"/>
+      </p:par>
+    </p:tnLst>
+  </p:timing>
+</p:sld>
+</file>
+
+<file path=ppt/slides/slide19.xml><?xml version="1.0" encoding="utf-8"?>
+<p:sld xmlns:a="http://schemas.openxmlformats.org/drawingml/2006/main" xmlns:r="http://schemas.openxmlformats.org/officeDocument/2006/relationships" xmlns:p="http://schemas.openxmlformats.org/presentationml/2006/main">
+  <p:cSld>
+    <p:spTree>
+      <p:nvGrpSpPr>
+        <p:cNvPr id="1" name=""/>
+        <p:cNvGrpSpPr/>
+        <p:nvPr/>
+      </p:nvGrpSpPr>
+      <p:grpSpPr>
+        <a:xfrm>
+          <a:off x="0" y="0"/>
+          <a:ext cx="0" cy="0"/>
+          <a:chOff x="0" y="0"/>
+          <a:chExt cx="0" cy="0"/>
+        </a:xfrm>
+      </p:grpSpPr>
+      <p:sp>
+        <p:nvSpPr>
+          <p:cNvPr id="2" name="Title 1"/>
+          <p:cNvSpPr>
+            <a:spLocks noGrp="1"/>
+          </p:cNvSpPr>
+          <p:nvPr>
+            <p:ph type="title"/>
+          </p:nvPr>
+        </p:nvSpPr>
+        <p:spPr/>
+        <p:txBody>
+          <a:bodyPr/>
+          <a:lstStyle/>
+          <a:p>
+            <a:pPr marR="0" rtl="0"/>
+            <a:r>
+              <a:rPr lang="en-US" b="1" i="0" u="none" strike="noStrike" baseline="0" dirty="0" smtClean="0">
+                <a:solidFill>
+                  <a:srgbClr val="345A8A"/>
+                </a:solidFill>
+                <a:latin typeface="Calibri"/>
+                <a:ea typeface="ＭＳ ゴシック"/>
+              </a:rPr>
+              <a:t>Delayed content updating</a:t>
+            </a:r>
+          </a:p>
+        </p:txBody>
+      </p:sp>
+      <p:sp>
+        <p:nvSpPr>
+          <p:cNvPr id="3" name="Text Placeholder 2"/>
+          <p:cNvSpPr>
+            <a:spLocks noGrp="1"/>
+          </p:cNvSpPr>
+          <p:nvPr>
+            <p:ph type="body" idx="1"/>
+          </p:nvPr>
+        </p:nvSpPr>
+        <p:spPr>
+          <a:xfrm>
+            <a:off x="549275" y="1600200"/>
+            <a:ext cx="8042276" cy="5043375"/>
+          </a:xfrm>
+        </p:spPr>
+        <p:txBody>
+          <a:bodyPr>
+            <a:normAutofit fontScale="62500" lnSpcReduction="20000"/>
+          </a:bodyPr>
+          <a:lstStyle/>
+          <a:p>
+            <a:pPr lvl="0"/>
+            <a:r>
+              <a:rPr lang="en-US" b="1" i="0" u="none" strike="noStrike" baseline="0" dirty="0" smtClean="0">
+                <a:solidFill>
+                  <a:srgbClr val="4F81BD"/>
+                </a:solidFill>
+                <a:latin typeface="Calibri"/>
+                <a:ea typeface="ＭＳ ゴシック"/>
+              </a:rPr>
+              <a:t>Expanding </a:t>
+            </a:r>
+            <a:r>
+              <a:rPr lang="en-US" b="1" dirty="0">
+                <a:solidFill>
+                  <a:srgbClr val="4F81BD"/>
+                </a:solidFill>
+                <a:latin typeface="Calibri"/>
+                <a:ea typeface="ＭＳ ゴシック"/>
+              </a:rPr>
+              <a:t>on the Independent Template </a:t>
+            </a:r>
+            <a:r>
+              <a:rPr lang="en-US" b="1" dirty="0" smtClean="0">
+                <a:solidFill>
+                  <a:srgbClr val="4F81BD"/>
+                </a:solidFill>
+                <a:latin typeface="Calibri"/>
+                <a:ea typeface="ＭＳ ゴシック"/>
+              </a:rPr>
+              <a:t>Observables example, you can use this to improve KO performance with </a:t>
+            </a:r>
+            <a:r>
+              <a:rPr lang="en-US" b="1" smtClean="0">
+                <a:solidFill>
+                  <a:srgbClr val="4F81BD"/>
+                </a:solidFill>
+                <a:latin typeface="Calibri"/>
+                <a:ea typeface="ＭＳ ゴシック"/>
+              </a:rPr>
+              <a:t>large data sets</a:t>
+            </a:r>
+            <a:endParaRPr lang="en-US" b="1" i="0" u="none" strike="noStrike" baseline="0" dirty="0" smtClean="0">
+              <a:solidFill>
+                <a:srgbClr val="4F81BD"/>
+              </a:solidFill>
+              <a:latin typeface="Calibri"/>
+              <a:ea typeface="ＭＳ ゴシック"/>
+            </a:endParaRPr>
+          </a:p>
+          <a:p>
+            <a:pPr marR="0" lvl="1" rtl="0"/>
+            <a:r>
+              <a:rPr lang="en-US" b="1" i="0" u="none" strike="noStrike" baseline="0" dirty="0" smtClean="0">
+                <a:solidFill>
+                  <a:srgbClr val="4F81BD"/>
+                </a:solidFill>
+                <a:latin typeface="Calibri"/>
+                <a:ea typeface="ＭＳ ゴシック"/>
+              </a:rPr>
+              <a:t>Why would you need to do this?</a:t>
+            </a:r>
+          </a:p>
+          <a:p>
+            <a:pPr marR="0" lvl="2" rtl="0"/>
+            <a:r>
+              <a:rPr lang="en-US" b="1" i="1" u="none" strike="noStrike" baseline="0" dirty="0" smtClean="0">
+                <a:solidFill>
+                  <a:srgbClr val="4F81BD"/>
+                </a:solidFill>
+                <a:latin typeface="Calibri"/>
+                <a:ea typeface="ＭＳ ゴシック"/>
+              </a:rPr>
+              <a:t>Say you are using Knockout and you have to deal with a very large data set. Knockout </a:t>
+            </a:r>
+            <a:r>
+              <a:rPr lang="en-US" b="1" i="1" u="none" strike="noStrike" baseline="0" dirty="0" err="1" smtClean="0">
+                <a:solidFill>
+                  <a:srgbClr val="4F81BD"/>
+                </a:solidFill>
+                <a:latin typeface="Calibri"/>
+                <a:ea typeface="ＭＳ ゴシック"/>
+              </a:rPr>
+              <a:t>templating</a:t>
+            </a:r>
+            <a:r>
+              <a:rPr lang="en-US" b="1" i="1" u="none" strike="noStrike" baseline="0" dirty="0" smtClean="0">
+                <a:solidFill>
+                  <a:srgbClr val="4F81BD"/>
+                </a:solidFill>
+                <a:latin typeface="Calibri"/>
+                <a:ea typeface="ＭＳ ゴシック"/>
+              </a:rPr>
+              <a:t> is great for minimizing markup and tracking the state of your model, but every system has its limitations.</a:t>
+            </a:r>
+          </a:p>
+          <a:p>
+            <a:pPr marR="0" lvl="3" rtl="0"/>
+            <a:r>
+              <a:rPr lang="en-US" b="0" i="0" u="none" strike="noStrike" baseline="0" dirty="0" smtClean="0">
+                <a:solidFill>
+                  <a:srgbClr val="243F60"/>
+                </a:solidFill>
+                <a:latin typeface="Calibri"/>
+                <a:ea typeface="ＭＳ ゴシック"/>
+              </a:rPr>
+              <a:t>So for example, say your large data-set is divided into 30+ categories, and within each of those are a dozen sub-categories, and inside each of those are several dozen database records</a:t>
+            </a:r>
+          </a:p>
+          <a:p>
+            <a:pPr marR="0" lvl="3" rtl="0"/>
+            <a:r>
+              <a:rPr lang="en-US" b="0" i="0" u="none" strike="noStrike" baseline="0" dirty="0" smtClean="0">
+                <a:solidFill>
+                  <a:srgbClr val="243F60"/>
+                </a:solidFill>
+                <a:latin typeface="Calibri"/>
+                <a:ea typeface="ＭＳ ゴシック"/>
+              </a:rPr>
+              <a:t>If each of those levels in your data uses its own template and set of observables, loading all of that markup into your DOM at the same time can drastically affect performance</a:t>
+            </a:r>
+          </a:p>
+          <a:p>
+            <a:pPr marR="0" lvl="2" rtl="0"/>
+            <a:r>
+              <a:rPr lang="en-US" b="1" i="1" u="none" strike="noStrike" baseline="0" dirty="0" smtClean="0">
+                <a:solidFill>
+                  <a:srgbClr val="4F81BD"/>
+                </a:solidFill>
+                <a:latin typeface="Calibri"/>
+                <a:ea typeface="ＭＳ ゴシック"/>
+              </a:rPr>
+              <a:t>How can you work around this?</a:t>
+            </a:r>
+          </a:p>
+          <a:p>
+            <a:pPr marR="0" lvl="3" rtl="0"/>
+            <a:r>
+              <a:rPr lang="en-US" b="0" i="0" u="none" strike="noStrike" baseline="0" dirty="0" smtClean="0">
+                <a:solidFill>
+                  <a:srgbClr val="243F60"/>
+                </a:solidFill>
+                <a:latin typeface="Calibri"/>
+                <a:ea typeface="ＭＳ ゴシック"/>
+              </a:rPr>
+              <a:t>Deferred content updating</a:t>
+            </a:r>
+          </a:p>
+          <a:p>
+            <a:pPr marR="0" lvl="4" rtl="0"/>
+            <a:r>
+              <a:rPr lang="en-US" b="0" i="1" u="none" strike="noStrike" baseline="0" dirty="0" smtClean="0">
+                <a:solidFill>
+                  <a:srgbClr val="243F60"/>
+                </a:solidFill>
+                <a:latin typeface="Calibri"/>
+                <a:ea typeface="ＭＳ ゴシック"/>
+              </a:rPr>
+              <a:t>In this example, every top level category in the data is represented by a header that functions as an accordion</a:t>
+            </a:r>
+          </a:p>
+          <a:p>
+            <a:pPr marR="0" lvl="4" rtl="0"/>
+            <a:r>
+              <a:rPr lang="en-US" b="0" i="1" u="none" strike="noStrike" baseline="0" dirty="0" smtClean="0">
+                <a:solidFill>
+                  <a:srgbClr val="243F60"/>
+                </a:solidFill>
+                <a:latin typeface="Calibri"/>
+                <a:ea typeface="ＭＳ ゴシック"/>
+              </a:rPr>
+              <a:t>Since the initial state of this template is the header with the accordion collapsed, you can put off displaying all the subsequent data in the DOM until it’s actually needed.</a:t>
+            </a:r>
+          </a:p>
+          <a:p>
+            <a:pPr marR="0" lvl="5" rtl="0"/>
+            <a:r>
+              <a:rPr lang="en-US" b="0" i="1" u="none" strike="noStrike" baseline="0" dirty="0" smtClean="0">
+                <a:solidFill>
+                  <a:srgbClr val="404040"/>
+                </a:solidFill>
+                <a:latin typeface="Calibri"/>
+                <a:ea typeface="ＭＳ ゴシック"/>
+              </a:rPr>
+              <a:t>You can still load all the complete data into your model; my experience is the cost to your DOM for that tends to be dramatically less than the display</a:t>
+            </a:r>
+          </a:p>
+          <a:p>
+            <a:pPr marR="0" lvl="4" rtl="0"/>
+            <a:r>
+              <a:rPr lang="en-US" b="0" i="1" u="none" strike="noStrike" baseline="0" dirty="0" smtClean="0">
+                <a:solidFill>
+                  <a:srgbClr val="243F60"/>
+                </a:solidFill>
+                <a:latin typeface="Calibri"/>
+                <a:ea typeface="ＭＳ ゴシック"/>
+              </a:rPr>
+              <a:t>Each instance of this top-level category can have it’s own observable that the template bind is using for its name property</a:t>
+            </a:r>
+            <a:r>
+              <a:rPr lang="en-US" b="0" i="1" u="none" strike="noStrike" baseline="0" dirty="0" smtClean="0">
+                <a:solidFill>
+                  <a:srgbClr val="243F60"/>
+                </a:solidFill>
+                <a:latin typeface="Times New Roman"/>
+                <a:ea typeface="ＭＳ ゴシック"/>
+              </a:rPr>
+              <a:t>.</a:t>
+            </a:r>
+          </a:p>
+          <a:p>
+            <a:pPr marR="0" lvl="4" rtl="0"/>
+            <a:r>
+              <a:rPr lang="en-US" b="0" i="1" u="none" strike="noStrike" baseline="0" dirty="0" err="1" smtClean="0">
+                <a:solidFill>
+                  <a:srgbClr val="243F60"/>
+                </a:solidFill>
+                <a:latin typeface="Calibri"/>
+                <a:ea typeface="ＭＳ ゴシック"/>
+              </a:rPr>
+              <a:t>Intitially</a:t>
+            </a:r>
+            <a:r>
+              <a:rPr lang="en-US" b="0" i="1" u="none" strike="noStrike" baseline="0" dirty="0" smtClean="0">
+                <a:solidFill>
+                  <a:srgbClr val="243F60"/>
+                </a:solidFill>
+                <a:latin typeface="Calibri"/>
+                <a:ea typeface="ＭＳ ゴシック"/>
+              </a:rPr>
+              <a:t> the DOM will only have to display minimal elements for the complete data set</a:t>
+            </a:r>
+          </a:p>
+          <a:p>
+            <a:pPr marR="0" lvl="4" rtl="0"/>
+            <a:r>
+              <a:rPr lang="en-US" b="0" i="1" u="none" strike="noStrike" baseline="0" dirty="0" smtClean="0">
+                <a:solidFill>
+                  <a:srgbClr val="243F60"/>
+                </a:solidFill>
+                <a:latin typeface="Calibri"/>
+                <a:ea typeface="ＭＳ ゴシック"/>
+              </a:rPr>
+              <a:t>Then by using a click event, change templates by changing that individual instance of the template name observable to your new value.</a:t>
+            </a:r>
+          </a:p>
+          <a:p>
+            <a:pPr marR="0" lvl="5" rtl="0"/>
+            <a:r>
+              <a:rPr lang="en-US" b="0" i="1" u="none" strike="noStrike" baseline="0" dirty="0" smtClean="0">
+                <a:solidFill>
+                  <a:srgbClr val="404040"/>
+                </a:solidFill>
+                <a:latin typeface="Calibri"/>
+                <a:ea typeface="ＭＳ ゴシック"/>
+              </a:rPr>
+              <a:t>This significantly reduces the load on the performance of the browser</a:t>
+            </a:r>
+          </a:p>
+          <a:p>
+            <a:pPr marR="0" lvl="4" rtl="0"/>
+            <a:r>
+              <a:rPr lang="en-US" b="0" i="1" u="none" strike="noStrike" baseline="0" dirty="0" smtClean="0">
+                <a:solidFill>
+                  <a:srgbClr val="243F60"/>
+                </a:solidFill>
+                <a:latin typeface="Calibri"/>
+                <a:ea typeface="ＭＳ ゴシック"/>
+              </a:rPr>
+              <a:t>After the remaining data has been added to the DOM the simplified template isn’t needed anymore. A simple </a:t>
+            </a:r>
+            <a:r>
+              <a:rPr lang="en-US" b="0" i="1" u="none" strike="noStrike" baseline="0" dirty="0" err="1" smtClean="0">
+                <a:solidFill>
+                  <a:srgbClr val="243F60"/>
+                </a:solidFill>
+                <a:latin typeface="Calibri"/>
+                <a:ea typeface="ＭＳ ゴシック"/>
+              </a:rPr>
+              <a:t>jQuery</a:t>
+            </a:r>
+            <a:r>
+              <a:rPr lang="en-US" b="0" i="1" u="none" strike="noStrike" baseline="0" dirty="0" smtClean="0">
+                <a:solidFill>
+                  <a:srgbClr val="243F60"/>
+                </a:solidFill>
+                <a:latin typeface="Calibri"/>
+                <a:ea typeface="ＭＳ ゴシック"/>
+              </a:rPr>
+              <a:t> </a:t>
+            </a:r>
+            <a:r>
+              <a:rPr lang="en-US" b="0" i="1" u="none" strike="noStrike" baseline="0" dirty="0" err="1" smtClean="0">
+                <a:solidFill>
+                  <a:srgbClr val="243F60"/>
+                </a:solidFill>
+                <a:latin typeface="Calibri"/>
+                <a:ea typeface="ＭＳ ゴシック"/>
+              </a:rPr>
+              <a:t>slideToggle</a:t>
+            </a:r>
+            <a:r>
+              <a:rPr lang="en-US" b="0" i="1" u="none" strike="noStrike" baseline="0" dirty="0" smtClean="0">
+                <a:solidFill>
+                  <a:srgbClr val="243F60"/>
+                </a:solidFill>
+                <a:latin typeface="Calibri"/>
+                <a:ea typeface="ＭＳ ゴシック"/>
+              </a:rPr>
+              <a:t> will work just fine.</a:t>
+            </a:r>
+          </a:p>
+          <a:p>
+            <a:pPr marR="0" lvl="3" rtl="0"/>
+            <a:r>
+              <a:rPr lang="en-US" b="0" i="0" u="none" strike="noStrike" baseline="0" dirty="0" smtClean="0">
+                <a:solidFill>
+                  <a:srgbClr val="243F60"/>
+                </a:solidFill>
+                <a:latin typeface="Calibri"/>
+                <a:ea typeface="ＭＳ ゴシック"/>
+              </a:rPr>
+              <a:t>If your situation wouldn’t allow for this approach, optimizing large data sets for Knockout would prove more difficult, but I’m sure there could be something to be done.</a:t>
+            </a:r>
+            <a:endParaRPr lang="en-US" b="0" i="0" u="none" strike="noStrike" baseline="0" dirty="0" smtClean="0">
+              <a:solidFill>
+                <a:srgbClr val="243F60"/>
+              </a:solidFill>
+              <a:latin typeface="Times New Roman"/>
+              <a:ea typeface="ＭＳ ゴシック"/>
+            </a:endParaRPr>
+          </a:p>
+        </p:txBody>
+      </p:sp>
+    </p:spTree>
+    <p:extLst>
+      <p:ext uri="{BB962C8B-B14F-4D97-AF65-F5344CB8AC3E}">
+        <p14:creationId xmlns:p14="http://schemas.microsoft.com/office/powerpoint/2010/main" val="406494359"/>
       </p:ext>
     </p:extLst>
   </p:cSld>
@@ -5521,52 +5866,208 @@
             <a:spLocks noGrp="1"/>
           </p:cNvSpPr>
           <p:nvPr>
-            <p:ph type="ctrTitle"/>
-          </p:nvPr>
-        </p:nvSpPr>
-        <p:spPr/>
-        <p:txBody>
-          <a:bodyPr/>
-          <a:lstStyle/>
-          <a:p>
-            <a:r>
-              <a:rPr lang="en-US" sz="3600" dirty="0"/>
-              <a:t>Knockout </a:t>
-            </a:r>
-            <a:r>
-              <a:rPr lang="en-US" sz="3600" dirty="0" smtClean="0"/>
-              <a:t>Fundamentals</a:t>
-            </a:r>
-            <a:endParaRPr lang="en-US" sz="3600" dirty="0"/>
-          </a:p>
-        </p:txBody>
-      </p:sp>
-      <p:sp>
-        <p:nvSpPr>
-          <p:cNvPr id="3" name="Subtitle 2"/>
-          <p:cNvSpPr>
-            <a:spLocks noGrp="1"/>
-          </p:cNvSpPr>
-          <p:nvPr>
-            <p:ph type="subTitle" idx="1"/>
-          </p:nvPr>
-        </p:nvSpPr>
-        <p:spPr/>
-        <p:txBody>
-          <a:bodyPr/>
-          <a:lstStyle/>
-          <a:p>
-            <a:r>
-              <a:rPr lang="en-US" i="1" dirty="0"/>
-              <a:t>View Models, Observables and Data-binds</a:t>
-            </a:r>
+            <p:ph type="title"/>
+          </p:nvPr>
+        </p:nvSpPr>
+        <p:spPr>
+          <a:xfrm>
+            <a:off x="549275" y="2545652"/>
+            <a:ext cx="8042276" cy="1336956"/>
+          </a:xfrm>
+        </p:spPr>
+        <p:txBody>
+          <a:bodyPr/>
+          <a:lstStyle/>
+          <a:p>
+            <a:r>
+              <a:rPr lang="en-US" b="1" dirty="0">
+                <a:solidFill>
+                  <a:srgbClr val="345A8A"/>
+                </a:solidFill>
+                <a:latin typeface="Calibri"/>
+                <a:ea typeface="ＭＳ ゴシック"/>
+              </a:rPr>
+              <a:t>Do you need to display large amounts of ever changing data?</a:t>
+            </a:r>
+            <a:endParaRPr lang="en-US" b="1" i="0" u="none" strike="noStrike" baseline="0" dirty="0" smtClean="0">
+              <a:solidFill>
+                <a:srgbClr val="345A8A"/>
+              </a:solidFill>
+              <a:latin typeface="Calibri"/>
+              <a:ea typeface="ＭＳ ゴシック"/>
+            </a:endParaRPr>
           </a:p>
         </p:txBody>
       </p:sp>
     </p:spTree>
     <p:extLst>
       <p:ext uri="{BB962C8B-B14F-4D97-AF65-F5344CB8AC3E}">
-        <p14:creationId xmlns:p14="http://schemas.microsoft.com/office/powerpoint/2010/main" val="1473792740"/>
+        <p14:creationId xmlns:p14="http://schemas.microsoft.com/office/powerpoint/2010/main" val="2779431345"/>
+      </p:ext>
+    </p:extLst>
+  </p:cSld>
+  <p:clrMapOvr>
+    <a:masterClrMapping/>
+  </p:clrMapOvr>
+  <p:timing>
+    <p:tnLst>
+      <p:par>
+        <p:cTn xmlns:p14="http://schemas.microsoft.com/office/powerpoint/2010/main" id="1" dur="indefinite" restart="never" nodeType="tmRoot"/>
+      </p:par>
+    </p:tnLst>
+  </p:timing>
+</p:sld>
+</file>
+
+<file path=ppt/slides/slide20.xml><?xml version="1.0" encoding="utf-8"?>
+<p:sld xmlns:a="http://schemas.openxmlformats.org/drawingml/2006/main" xmlns:r="http://schemas.openxmlformats.org/officeDocument/2006/relationships" xmlns:p="http://schemas.openxmlformats.org/presentationml/2006/main">
+  <p:cSld>
+    <p:spTree>
+      <p:nvGrpSpPr>
+        <p:cNvPr id="1" name=""/>
+        <p:cNvGrpSpPr/>
+        <p:nvPr/>
+      </p:nvGrpSpPr>
+      <p:grpSpPr>
+        <a:xfrm>
+          <a:off x="0" y="0"/>
+          <a:ext cx="0" cy="0"/>
+          <a:chOff x="0" y="0"/>
+          <a:chExt cx="0" cy="0"/>
+        </a:xfrm>
+      </p:grpSpPr>
+      <p:sp>
+        <p:nvSpPr>
+          <p:cNvPr id="2" name="Title 1"/>
+          <p:cNvSpPr>
+            <a:spLocks noGrp="1"/>
+          </p:cNvSpPr>
+          <p:nvPr>
+            <p:ph type="title"/>
+          </p:nvPr>
+        </p:nvSpPr>
+        <p:spPr/>
+        <p:txBody>
+          <a:bodyPr>
+            <a:normAutofit/>
+          </a:bodyPr>
+          <a:lstStyle/>
+          <a:p>
+            <a:pPr marR="0" rtl="0"/>
+            <a:r>
+              <a:rPr lang="en-US" b="1" i="0" u="none" strike="noStrike" baseline="0" dirty="0" smtClean="0">
+                <a:solidFill>
+                  <a:srgbClr val="345A8A"/>
+                </a:solidFill>
+                <a:latin typeface="Calibri"/>
+                <a:ea typeface="ＭＳ ゴシック"/>
+              </a:rPr>
+              <a:t>Summary</a:t>
+            </a:r>
+          </a:p>
+        </p:txBody>
+      </p:sp>
+      <p:sp>
+        <p:nvSpPr>
+          <p:cNvPr id="3" name="Text Placeholder 2"/>
+          <p:cNvSpPr>
+            <a:spLocks noGrp="1"/>
+          </p:cNvSpPr>
+          <p:nvPr>
+            <p:ph type="body" idx="1"/>
+          </p:nvPr>
+        </p:nvSpPr>
+        <p:spPr/>
+        <p:txBody>
+          <a:bodyPr/>
+          <a:lstStyle/>
+          <a:p>
+            <a:r>
+              <a:rPr lang="en-US" b="1" dirty="0">
+                <a:solidFill>
+                  <a:srgbClr val="4F81BD"/>
+                </a:solidFill>
+                <a:latin typeface="Calibri"/>
+                <a:ea typeface="ＭＳ ゴシック"/>
+              </a:rPr>
+              <a:t>Knockout is a powerful </a:t>
+            </a:r>
+            <a:r>
+              <a:rPr lang="en-US" b="1" dirty="0" err="1">
+                <a:solidFill>
+                  <a:srgbClr val="4F81BD"/>
+                </a:solidFill>
+                <a:latin typeface="Calibri"/>
+                <a:ea typeface="ＭＳ ゴシック"/>
+              </a:rPr>
+              <a:t>javascript</a:t>
+            </a:r>
+            <a:r>
+              <a:rPr lang="en-US" b="1" dirty="0">
+                <a:solidFill>
+                  <a:srgbClr val="4F81BD"/>
+                </a:solidFill>
+                <a:latin typeface="Calibri"/>
+                <a:ea typeface="ＭＳ ゴシック"/>
+              </a:rPr>
+              <a:t> framework that offers many ways to handle large amounts of ever changing data with a minimal amount of code. The built-in </a:t>
+            </a:r>
+            <a:r>
+              <a:rPr lang="en-US" b="1" dirty="0" err="1">
+                <a:solidFill>
+                  <a:srgbClr val="4F81BD"/>
+                </a:solidFill>
+                <a:latin typeface="Calibri"/>
+                <a:ea typeface="ＭＳ ゴシック"/>
+              </a:rPr>
+              <a:t>templating</a:t>
+            </a:r>
+            <a:r>
+              <a:rPr lang="en-US" b="1" dirty="0">
+                <a:solidFill>
+                  <a:srgbClr val="4F81BD"/>
+                </a:solidFill>
+                <a:latin typeface="Calibri"/>
+                <a:ea typeface="ＭＳ ゴシック"/>
+              </a:rPr>
+              <a:t> engine in particular offers a great system for streamlining your HTML into easy-to-maintain chunks</a:t>
+            </a:r>
+            <a:r>
+              <a:rPr lang="en-US" b="1" dirty="0" smtClean="0">
+                <a:solidFill>
+                  <a:srgbClr val="4F81BD"/>
+                </a:solidFill>
+                <a:latin typeface="Calibri"/>
+                <a:ea typeface="ＭＳ ゴシック"/>
+              </a:rPr>
+              <a:t>.</a:t>
+            </a:r>
+          </a:p>
+          <a:p>
+            <a:r>
+              <a:rPr lang="en-US" b="1" dirty="0" smtClean="0">
+                <a:solidFill>
+                  <a:srgbClr val="4F81BD"/>
+                </a:solidFill>
+                <a:latin typeface="Calibri"/>
+                <a:ea typeface="ＭＳ ゴシック"/>
+              </a:rPr>
+              <a:t>By nesting templates together, dynamically changing template types with observable values, and making templates update independently of each other with their own observables, you can really maximize your templates’ ability to render complex amounts of data.</a:t>
+            </a:r>
+            <a:endParaRPr lang="en-US" b="1" i="0" u="none" strike="noStrike" baseline="0" dirty="0" smtClean="0">
+              <a:solidFill>
+                <a:srgbClr val="4F81BD"/>
+              </a:solidFill>
+              <a:latin typeface="Calibri"/>
+              <a:ea typeface="ＭＳ ゴシック"/>
+            </a:endParaRPr>
+          </a:p>
+        </p:txBody>
+      </p:sp>
+    </p:spTree>
+    <p:extLst>
+      <p:ext uri="{BB962C8B-B14F-4D97-AF65-F5344CB8AC3E}">
+        <p14:creationId xmlns:p14="http://schemas.microsoft.com/office/powerpoint/2010/main" val="2520460276"/>
       </p:ext>
     </p:extLst>
   </p:cSld>
@@ -5610,147 +6111,40 @@
             <p:ph type="title"/>
           </p:nvPr>
         </p:nvSpPr>
-        <p:spPr/>
-        <p:txBody>
-          <a:bodyPr/>
-          <a:lstStyle/>
-          <a:p>
-            <a:pPr marR="0" rtl="0"/>
-            <a:r>
-              <a:rPr lang="en-US" b="1" i="0" u="none" strike="noStrike" baseline="0" smtClean="0">
+        <p:spPr>
+          <a:xfrm>
+            <a:off x="162881" y="2545652"/>
+            <a:ext cx="8815064" cy="1336956"/>
+          </a:xfrm>
+        </p:spPr>
+        <p:txBody>
+          <a:bodyPr/>
+          <a:lstStyle/>
+          <a:p>
+            <a:r>
+              <a:rPr lang="en-US" b="1" dirty="0">
                 <a:solidFill>
                   <a:srgbClr val="345A8A"/>
                 </a:solidFill>
                 <a:latin typeface="Calibri"/>
                 <a:ea typeface="ＭＳ ゴシック"/>
               </a:rPr>
-              <a:t> View Models</a:t>
-            </a:r>
-          </a:p>
-        </p:txBody>
-      </p:sp>
-      <p:sp>
-        <p:nvSpPr>
-          <p:cNvPr id="3" name="Text Placeholder 2"/>
-          <p:cNvSpPr>
-            <a:spLocks noGrp="1"/>
-          </p:cNvSpPr>
-          <p:nvPr>
-            <p:ph type="body" idx="1"/>
-          </p:nvPr>
-        </p:nvSpPr>
-        <p:spPr/>
-        <p:txBody>
-          <a:bodyPr/>
-          <a:lstStyle/>
-          <a:p>
-            <a:r>
-              <a:rPr lang="en-US" b="1" i="0" u="none" strike="noStrike" baseline="0" dirty="0" smtClean="0">
-                <a:solidFill>
-                  <a:srgbClr val="4F81BD"/>
-                </a:solidFill>
-                <a:latin typeface="Calibri"/>
-                <a:ea typeface="ＭＳ ゴシック"/>
-              </a:rPr>
-              <a:t>View Models are just data structures to organize your observables and various other parts of your JavaScript, typically as a JSON object </a:t>
-            </a:r>
-            <a:r>
-              <a:rPr lang="en-US" i="1" dirty="0">
-                <a:solidFill>
-                  <a:schemeClr val="tx1"/>
-                </a:solidFill>
-                <a:latin typeface="Calibri"/>
-                <a:ea typeface="ＭＳ ゴシック"/>
-              </a:rPr>
-              <a:t>❑ </a:t>
-            </a:r>
-            <a:r>
-              <a:rPr lang="en-US" sz="1400" i="1" dirty="0">
-                <a:solidFill>
-                  <a:schemeClr val="bg1">
-                    <a:lumMod val="65000"/>
-                  </a:schemeClr>
-                </a:solidFill>
-                <a:latin typeface="Calibri"/>
-                <a:ea typeface="ＭＳ ゴシック"/>
-              </a:rPr>
-              <a:t>see </a:t>
-            </a:r>
-            <a:r>
-              <a:rPr lang="en-US" sz="1400" i="1" dirty="0" err="1" smtClean="0">
-                <a:solidFill>
-                  <a:schemeClr val="bg1">
-                    <a:lumMod val="65000"/>
-                  </a:schemeClr>
-                </a:solidFill>
-                <a:latin typeface="Calibri"/>
-                <a:ea typeface="ＭＳ ゴシック"/>
-              </a:rPr>
-              <a:t>jsonViewModel_basic.js</a:t>
-            </a:r>
-            <a:endParaRPr lang="en-US" sz="1400" b="1" i="0" u="none" strike="noStrike" baseline="0" dirty="0" smtClean="0">
+              <a:t>Ever wish you could simplify your HTML into reusable chunks?</a:t>
+            </a:r>
+            <a:endParaRPr lang="en-US" b="1" i="0" u="none" strike="noStrike" baseline="0" dirty="0" smtClean="0">
               <a:solidFill>
-                <a:srgbClr val="4F81BD"/>
+                <a:srgbClr val="345A8A"/>
               </a:solidFill>
               <a:latin typeface="Calibri"/>
               <a:ea typeface="ＭＳ ゴシック"/>
             </a:endParaRPr>
           </a:p>
-          <a:p>
-            <a:pPr lvl="1"/>
-            <a:r>
-              <a:rPr lang="en-US" b="0" i="1" u="none" strike="noStrike" baseline="0" dirty="0" smtClean="0">
-                <a:solidFill>
-                  <a:schemeClr val="tx1"/>
-                </a:solidFill>
-                <a:latin typeface="Calibri"/>
-                <a:ea typeface="ＭＳ ゴシック"/>
-              </a:rPr>
-              <a:t>But a</a:t>
-            </a:r>
-            <a:r>
-              <a:rPr lang="en-US" b="0" i="1" u="none" strike="noStrike" dirty="0" smtClean="0">
-                <a:solidFill>
-                  <a:schemeClr val="tx1"/>
-                </a:solidFill>
-                <a:latin typeface="Calibri"/>
-                <a:ea typeface="ＭＳ ゴシック"/>
-              </a:rPr>
-              <a:t> simple function/variable declaration works </a:t>
-            </a:r>
-            <a:r>
-              <a:rPr lang="en-US" i="1" dirty="0">
-                <a:solidFill>
-                  <a:schemeClr val="tx1"/>
-                </a:solidFill>
-                <a:latin typeface="Calibri"/>
-                <a:ea typeface="ＭＳ ゴシック"/>
-              </a:rPr>
-              <a:t>as well </a:t>
-            </a:r>
-            <a:br>
-              <a:rPr lang="en-US" i="1" dirty="0">
-                <a:solidFill>
-                  <a:schemeClr val="tx1"/>
-                </a:solidFill>
-                <a:latin typeface="Calibri"/>
-                <a:ea typeface="ＭＳ ゴシック"/>
-              </a:rPr>
-            </a:br>
-            <a:endParaRPr lang="en-US" b="0" i="1" u="none" strike="noStrike" baseline="0" dirty="0" smtClean="0">
-              <a:solidFill>
-                <a:schemeClr val="tx1"/>
-              </a:solidFill>
-              <a:latin typeface="Calibri"/>
-              <a:ea typeface="ＭＳ ゴシック"/>
-            </a:endParaRPr>
-          </a:p>
         </p:txBody>
       </p:sp>
     </p:spTree>
     <p:extLst>
       <p:ext uri="{BB962C8B-B14F-4D97-AF65-F5344CB8AC3E}">
-        <p14:creationId xmlns:p14="http://schemas.microsoft.com/office/powerpoint/2010/main" val="845023380"/>
+        <p14:creationId xmlns:p14="http://schemas.microsoft.com/office/powerpoint/2010/main" val="1210349601"/>
       </p:ext>
     </p:extLst>
   </p:cSld>
@@ -5794,176 +6188,70 @@
             <p:ph type="title"/>
           </p:nvPr>
         </p:nvSpPr>
-        <p:spPr/>
-        <p:txBody>
-          <a:bodyPr/>
-          <a:lstStyle/>
-          <a:p>
-            <a:pPr marR="0" rtl="0"/>
-            <a:r>
-              <a:rPr lang="en-US" b="1" i="0" u="none" strike="noStrike" baseline="0" smtClean="0">
+        <p:spPr>
+          <a:xfrm>
+            <a:off x="162881" y="2545652"/>
+            <a:ext cx="8815064" cy="1336956"/>
+          </a:xfrm>
+        </p:spPr>
+        <p:txBody>
+          <a:bodyPr/>
+          <a:lstStyle/>
+          <a:p>
+            <a:r>
+              <a:rPr lang="en-US" b="1" dirty="0" smtClean="0">
                 <a:solidFill>
                   <a:srgbClr val="345A8A"/>
                 </a:solidFill>
                 <a:latin typeface="Calibri"/>
                 <a:ea typeface="ＭＳ ゴシック"/>
               </a:rPr>
-              <a:t> View Models</a:t>
-            </a:r>
-          </a:p>
-        </p:txBody>
-      </p:sp>
-      <p:sp>
-        <p:nvSpPr>
-          <p:cNvPr id="3" name="Text Placeholder 2"/>
-          <p:cNvSpPr>
-            <a:spLocks noGrp="1"/>
-          </p:cNvSpPr>
-          <p:nvPr>
-            <p:ph type="body" idx="1"/>
-          </p:nvPr>
-        </p:nvSpPr>
-        <p:spPr/>
-        <p:txBody>
-          <a:bodyPr/>
-          <a:lstStyle/>
-          <a:p>
-            <a:pPr marR="0" lvl="0" rtl="0"/>
-            <a:r>
-              <a:rPr lang="en-US" b="1" i="0" u="none" strike="noStrike" baseline="0" dirty="0" smtClean="0">
-                <a:solidFill>
-                  <a:srgbClr val="4F81BD"/>
-                </a:solidFill>
-                <a:latin typeface="Calibri"/>
-                <a:ea typeface="ＭＳ ゴシック"/>
-              </a:rPr>
-              <a:t>View Models are just data structures to organize your observables and various other parts of your JavaScript typically as a JSON object</a:t>
-            </a:r>
-          </a:p>
-          <a:p>
-            <a:pPr lvl="1"/>
-            <a:r>
-              <a:rPr lang="en-US" b="0" i="1" u="none" strike="noStrike" baseline="0" dirty="0" smtClean="0">
-                <a:solidFill>
-                  <a:schemeClr val="tx1"/>
-                </a:solidFill>
-                <a:latin typeface="Calibri"/>
-                <a:ea typeface="ＭＳ ゴシック"/>
-              </a:rPr>
-              <a:t>But a</a:t>
-            </a:r>
-            <a:r>
-              <a:rPr lang="en-US" b="0" i="1" u="none" strike="noStrike" dirty="0" smtClean="0">
-                <a:solidFill>
-                  <a:schemeClr val="tx1"/>
-                </a:solidFill>
-                <a:latin typeface="Calibri"/>
-                <a:ea typeface="ＭＳ ゴシック"/>
-              </a:rPr>
-              <a:t> simple function/variable declaration works </a:t>
-            </a:r>
-            <a:r>
-              <a:rPr lang="en-US" i="1" dirty="0">
-                <a:solidFill>
-                  <a:schemeClr val="tx1"/>
-                </a:solidFill>
-                <a:latin typeface="Calibri"/>
-                <a:ea typeface="ＭＳ ゴシック"/>
-              </a:rPr>
-              <a:t>as well </a:t>
-            </a:r>
-            <a:r>
-              <a:rPr lang="en-US" i="1" dirty="0" smtClean="0">
-                <a:solidFill>
-                  <a:schemeClr val="tx1"/>
-                </a:solidFill>
-                <a:latin typeface="Calibri"/>
-                <a:ea typeface="ＭＳ ゴシック"/>
-              </a:rPr>
-              <a:t/>
-            </a:r>
-            <a:br>
-              <a:rPr lang="en-US" i="1" dirty="0" smtClean="0">
-                <a:solidFill>
-                  <a:schemeClr val="tx1"/>
-                </a:solidFill>
-                <a:latin typeface="Calibri"/>
-                <a:ea typeface="ＭＳ ゴシック"/>
-              </a:rPr>
-            </a:br>
-            <a:r>
-              <a:rPr lang="en-US" i="1" dirty="0" smtClean="0">
-                <a:solidFill>
-                  <a:schemeClr val="tx1"/>
-                </a:solidFill>
-                <a:latin typeface="Calibri"/>
-                <a:ea typeface="ＭＳ ゴシック"/>
-              </a:rPr>
-              <a:t>❑ </a:t>
-            </a:r>
-            <a:r>
-              <a:rPr lang="en-US" sz="1400" i="1" dirty="0">
-                <a:solidFill>
-                  <a:schemeClr val="bg1">
-                    <a:lumMod val="65000"/>
-                  </a:schemeClr>
-                </a:solidFill>
-                <a:latin typeface="Calibri"/>
-                <a:ea typeface="ＭＳ ゴシック"/>
-              </a:rPr>
-              <a:t>see </a:t>
-            </a:r>
-            <a:r>
-              <a:rPr lang="en-US" sz="1400" i="1" dirty="0" err="1" smtClean="0">
-                <a:solidFill>
-                  <a:schemeClr val="bg1">
-                    <a:lumMod val="65000"/>
-                  </a:schemeClr>
-                </a:solidFill>
-                <a:latin typeface="Calibri"/>
-                <a:ea typeface="ＭＳ ゴシック"/>
-              </a:rPr>
-              <a:t>functionViewModel.js</a:t>
-            </a:r>
-            <a:endParaRPr lang="en-US" b="0" i="1" u="none" strike="noStrike" dirty="0" smtClean="0">
+              <a:t>Need a </a:t>
+            </a:r>
+            <a:r>
+              <a:rPr lang="en-US" b="1" dirty="0">
+                <a:solidFill>
+                  <a:srgbClr val="345A8A"/>
+                </a:solidFill>
+                <a:latin typeface="Calibri"/>
+                <a:ea typeface="ＭＳ ゴシック"/>
+              </a:rPr>
+              <a:t>script library that slices, </a:t>
+            </a:r>
+            <a:r>
+              <a:rPr lang="en-US" b="1" dirty="0" smtClean="0">
+                <a:solidFill>
+                  <a:srgbClr val="345A8A"/>
+                </a:solidFill>
+                <a:latin typeface="Calibri"/>
+                <a:ea typeface="ＭＳ ゴシック"/>
+              </a:rPr>
+              <a:t>dices </a:t>
+            </a:r>
+            <a:r>
+              <a:rPr lang="en-US" b="1" dirty="0">
+                <a:solidFill>
+                  <a:srgbClr val="345A8A"/>
+                </a:solidFill>
+                <a:latin typeface="Calibri"/>
+                <a:ea typeface="ＭＳ ゴシック"/>
+              </a:rPr>
+              <a:t>and makes Julienne fries?</a:t>
+            </a:r>
+            <a:endParaRPr lang="en-US" b="1" i="0" u="none" strike="noStrike" baseline="0" dirty="0" smtClean="0">
               <a:solidFill>
-                <a:schemeClr val="tx1"/>
+                <a:srgbClr val="345A8A"/>
               </a:solidFill>
               <a:latin typeface="Calibri"/>
               <a:ea typeface="ＭＳ ゴシック"/>
             </a:endParaRPr>
           </a:p>
-          <a:p>
-            <a:pPr lvl="0"/>
-            <a:r>
-              <a:rPr lang="en-US" b="1" dirty="0">
-                <a:solidFill>
-                  <a:srgbClr val="4F81BD"/>
-                </a:solidFill>
-                <a:latin typeface="Calibri"/>
-                <a:ea typeface="ＭＳ ゴシック"/>
-              </a:rPr>
-              <a:t>This allows you to set up a hierarchy for you to organize how your each component of your data should relate to each other</a:t>
-            </a:r>
-          </a:p>
-          <a:p>
-            <a:pPr marL="0" indent="0">
-              <a:buNone/>
-            </a:pPr>
-            <a:endParaRPr lang="en-US" b="0" i="1" u="none" strike="noStrike" baseline="0" dirty="0" smtClean="0">
-              <a:solidFill>
-                <a:schemeClr val="tx1"/>
-              </a:solidFill>
-              <a:latin typeface="Calibri"/>
-              <a:ea typeface="ＭＳ ゴシック"/>
-            </a:endParaRPr>
-          </a:p>
         </p:txBody>
       </p:sp>
     </p:spTree>
     <p:extLst>
       <p:ext uri="{BB962C8B-B14F-4D97-AF65-F5344CB8AC3E}">
-        <p14:creationId xmlns:p14="http://schemas.microsoft.com/office/powerpoint/2010/main" val="1939111276"/>
+        <p14:creationId xmlns:p14="http://schemas.microsoft.com/office/powerpoint/2010/main" val="427000062"/>
       </p:ext>
     </p:extLst>
   </p:cSld>
@@ -6007,136 +6295,160 @@
             <p:ph type="title"/>
           </p:nvPr>
         </p:nvSpPr>
-        <p:spPr/>
-        <p:txBody>
-          <a:bodyPr/>
-          <a:lstStyle/>
-          <a:p>
-            <a:pPr marR="0" rtl="0"/>
-            <a:r>
-              <a:rPr lang="en-US" b="1" i="0" u="none" strike="noStrike" baseline="0" dirty="0" smtClean="0">
+        <p:spPr>
+          <a:xfrm>
+            <a:off x="298961" y="898062"/>
+            <a:ext cx="6420945" cy="2990009"/>
+          </a:xfrm>
+        </p:spPr>
+        <p:txBody>
+          <a:bodyPr/>
+          <a:lstStyle/>
+          <a:p>
+            <a:r>
+              <a:rPr lang="en-US" b="1" dirty="0">
                 <a:solidFill>
                   <a:srgbClr val="345A8A"/>
                 </a:solidFill>
                 <a:latin typeface="Calibri"/>
                 <a:ea typeface="ＭＳ ゴシック"/>
               </a:rPr>
-              <a:t>Observables</a:t>
-            </a:r>
-          </a:p>
-        </p:txBody>
-      </p:sp>
-      <p:sp>
-        <p:nvSpPr>
-          <p:cNvPr id="3" name="Text Placeholder 2"/>
-          <p:cNvSpPr>
-            <a:spLocks noGrp="1"/>
-          </p:cNvSpPr>
-          <p:nvPr>
-            <p:ph type="body" idx="1"/>
-          </p:nvPr>
-        </p:nvSpPr>
-        <p:spPr/>
-        <p:txBody>
-          <a:bodyPr>
-            <a:normAutofit/>
-          </a:bodyPr>
-          <a:lstStyle/>
-          <a:p>
-            <a:pPr marR="0" lvl="0" rtl="0"/>
-            <a:r>
-              <a:rPr lang="en-US" b="1" i="0" u="none" strike="noStrike" baseline="0" dirty="0" smtClean="0">
-                <a:solidFill>
-                  <a:srgbClr val="4F81BD"/>
-                </a:solidFill>
-                <a:latin typeface="Calibri"/>
-                <a:ea typeface="ＭＳ ゴシック"/>
-              </a:rPr>
-              <a:t>Typically they are just containers for data, like variables or objects</a:t>
-            </a:r>
-          </a:p>
-          <a:p>
-            <a:pPr lvl="1"/>
-            <a:r>
-              <a:rPr lang="en-US" b="1" i="0" u="none" strike="noStrike" baseline="0" dirty="0" smtClean="0">
-                <a:solidFill>
-                  <a:srgbClr val="4F81BD"/>
-                </a:solidFill>
-                <a:latin typeface="Calibri"/>
-                <a:ea typeface="ＭＳ ゴシック"/>
-              </a:rPr>
-              <a:t>The main difference is that they come with built-in listeners that will </a:t>
+              <a:t>Look no further, Knockout can do </a:t>
             </a:r>
             <a:r>
               <a:rPr lang="en-US" b="1" dirty="0" smtClean="0">
                 <a:solidFill>
-                  <a:srgbClr val="4F81BD"/>
-                </a:solidFill>
-                <a:latin typeface="Calibri"/>
-                <a:ea typeface="ＭＳ ゴシック"/>
-              </a:rPr>
-              <a:t>automatically </a:t>
-            </a:r>
-            <a:r>
-              <a:rPr lang="en-US" b="1" i="0" u="none" strike="noStrike" baseline="0" dirty="0" smtClean="0">
-                <a:solidFill>
-                  <a:srgbClr val="4F81BD"/>
-                </a:solidFill>
-                <a:latin typeface="Calibri"/>
-                <a:ea typeface="ＭＳ ゴシック"/>
-              </a:rPr>
-              <a:t>notify any other part of your data or display if that value changes</a:t>
-            </a:r>
-          </a:p>
-          <a:p>
-            <a:pPr lvl="2"/>
-            <a:r>
-              <a:rPr lang="en-US" b="1" i="1" u="none" strike="noStrike" baseline="0" dirty="0" smtClean="0">
-                <a:solidFill>
-                  <a:srgbClr val="4F81BD"/>
-                </a:solidFill>
-                <a:latin typeface="Calibri"/>
-                <a:ea typeface="ＭＳ ゴシック"/>
-              </a:rPr>
-              <a:t>Creating an observable is </a:t>
-            </a:r>
-            <a:r>
-              <a:rPr lang="en-US" b="1" i="1" dirty="0">
-                <a:solidFill>
-                  <a:srgbClr val="4F81BD"/>
-                </a:solidFill>
-                <a:latin typeface="Calibri"/>
-                <a:ea typeface="ＭＳ ゴシック"/>
-              </a:rPr>
-              <a:t>simple ❑</a:t>
-            </a:r>
-            <a:endParaRPr lang="en-US" b="1" i="1" u="none" strike="noStrike" baseline="0" dirty="0" smtClean="0">
+                  <a:srgbClr val="345A8A"/>
+                </a:solidFill>
+                <a:latin typeface="Calibri"/>
+                <a:ea typeface="ＭＳ ゴシック"/>
+              </a:rPr>
+              <a:t/>
+            </a:r>
+            <a:br>
+              <a:rPr lang="en-US" b="1" dirty="0" smtClean="0">
+                <a:solidFill>
+                  <a:srgbClr val="345A8A"/>
+                </a:solidFill>
+                <a:latin typeface="Calibri"/>
+                <a:ea typeface="ＭＳ ゴシック"/>
+              </a:rPr>
+            </a:br>
+            <a:r>
+              <a:rPr lang="en-US" b="1" dirty="0" smtClean="0">
+                <a:solidFill>
+                  <a:srgbClr val="345A8A"/>
+                </a:solidFill>
+                <a:latin typeface="Calibri"/>
+                <a:ea typeface="ＭＳ ゴシック"/>
+              </a:rPr>
+              <a:t>2 </a:t>
+            </a:r>
+            <a:r>
+              <a:rPr lang="en-US" b="1" dirty="0">
+                <a:solidFill>
+                  <a:srgbClr val="345A8A"/>
+                </a:solidFill>
+                <a:latin typeface="Calibri"/>
+                <a:ea typeface="ＭＳ ゴシック"/>
+              </a:rPr>
+              <a:t>out of 3 of those things!</a:t>
+            </a:r>
+            <a:endParaRPr lang="en-US" b="1" i="0" u="none" strike="noStrike" baseline="0" dirty="0" smtClean="0">
               <a:solidFill>
-                <a:srgbClr val="4F81BD"/>
+                <a:srgbClr val="345A8A"/>
               </a:solidFill>
               <a:latin typeface="Calibri"/>
               <a:ea typeface="ＭＳ ゴシック"/>
             </a:endParaRPr>
           </a:p>
-          <a:p>
-            <a:pPr marR="0" lvl="2" rtl="0"/>
-            <a:r>
-              <a:rPr lang="en-US" b="1" i="1" u="none" strike="noStrike" baseline="0" dirty="0" smtClean="0">
-                <a:solidFill>
-                  <a:srgbClr val="4F81BD"/>
-                </a:solidFill>
-                <a:latin typeface="Calibri"/>
-                <a:ea typeface="ＭＳ ゴシック"/>
-              </a:rPr>
-              <a:t>There are also computed observables that allow you set an observable based off of the result of a function and observable arrays, but I won’t go into detail about those</a:t>
-            </a:r>
-          </a:p>
-        </p:txBody>
-      </p:sp>
+        </p:txBody>
+      </p:sp>
+      <p:sp>
+        <p:nvSpPr>
+          <p:cNvPr id="3" name="Title 1"/>
+          <p:cNvSpPr txBox="1">
+            <a:spLocks/>
+          </p:cNvSpPr>
+          <p:nvPr/>
+        </p:nvSpPr>
+        <p:spPr>
+          <a:xfrm>
+            <a:off x="4822302" y="2379013"/>
+            <a:ext cx="7285177" cy="2613307"/>
+          </a:xfrm>
+          <a:prstGeom prst="rect">
+            <a:avLst/>
+          </a:prstGeom>
+        </p:spPr>
+        <p:txBody>
+          <a:bodyPr vert="horz" lIns="91440" tIns="45720" rIns="91440" bIns="45720" rtlCol="0" anchor="b" anchorCtr="0">
+            <a:noAutofit/>
+          </a:bodyPr>
+          <a:lstStyle>
+            <a:lvl1pPr algn="ctr" defTabSz="914400" rtl="0" eaLnBrk="1" latinLnBrk="0" hangingPunct="1">
+              <a:spcBef>
+                <a:spcPct val="0"/>
+              </a:spcBef>
+              <a:buNone/>
+              <a:defRPr sz="4600" kern="1200">
+                <a:solidFill>
+                  <a:schemeClr val="accent1"/>
+                </a:solidFill>
+                <a:latin typeface="+mj-lt"/>
+                <a:ea typeface="+mj-ea"/>
+                <a:cs typeface="+mj-cs"/>
+              </a:defRPr>
+            </a:lvl1pPr>
+          </a:lstStyle>
+          <a:p>
+            <a:r>
+              <a:rPr lang="en-US" sz="9600" b="1" dirty="0" smtClean="0">
+                <a:solidFill>
+                  <a:srgbClr val="345A8A"/>
+                </a:solidFill>
+                <a:latin typeface="Calibri"/>
+                <a:ea typeface="ＭＳ ゴシック"/>
+              </a:rPr>
+              <a:t>!</a:t>
+            </a:r>
+          </a:p>
+        </p:txBody>
+      </p:sp>
+      <p:pic>
+        <p:nvPicPr>
+          <p:cNvPr id="4" name="Picture 3" descr="twoThirds.png"/>
+          <p:cNvPicPr>
+            <a:picLocks noChangeAspect="1"/>
+          </p:cNvPicPr>
+          <p:nvPr/>
+        </p:nvPicPr>
+        <p:blipFill>
+          <a:blip r:embed="rId2">
+            <a:extLst>
+              <a:ext uri="{28A0092B-C50C-407E-A947-70E740481C1C}">
+                <a14:useLocalDpi xmlns:a14="http://schemas.microsoft.com/office/drawing/2010/main" val="0"/>
+              </a:ext>
+            </a:extLst>
+          </a:blip>
+          <a:stretch>
+            <a:fillRect/>
+          </a:stretch>
+        </p:blipFill>
+        <p:spPr>
+          <a:xfrm>
+            <a:off x="6590130" y="1142213"/>
+            <a:ext cx="2099174" cy="3621075"/>
+          </a:xfrm>
+          <a:prstGeom prst="rect">
+            <a:avLst/>
+          </a:prstGeom>
+        </p:spPr>
+      </p:pic>
     </p:spTree>
     <p:extLst>
       <p:ext uri="{BB962C8B-B14F-4D97-AF65-F5344CB8AC3E}">
-        <p14:creationId xmlns:p14="http://schemas.microsoft.com/office/powerpoint/2010/main" val="3747089053"/>
+        <p14:creationId xmlns:p14="http://schemas.microsoft.com/office/powerpoint/2010/main" val="1324460442"/>
       </p:ext>
     </p:extLst>
   </p:cSld>
@@ -6177,7 +6489,7 @@
             <a:spLocks noGrp="1"/>
           </p:cNvSpPr>
           <p:nvPr>
-            <p:ph type="title"/>
+            <p:ph type="ctrTitle"/>
           </p:nvPr>
         </p:nvSpPr>
         <p:spPr/>
@@ -6186,178 +6498,35 @@
           <a:lstStyle/>
           <a:p>
             <a:r>
-              <a:rPr lang="en-US" b="1" dirty="0" smtClean="0">
-                <a:solidFill>
-                  <a:srgbClr val="345A8A"/>
-                </a:solidFill>
-                <a:latin typeface="Calibri"/>
-                <a:ea typeface="ＭＳ ゴシック"/>
-              </a:rPr>
-              <a:t>Data-Binds</a:t>
-            </a:r>
-            <a:endParaRPr lang="en-US" b="1" dirty="0">
-              <a:solidFill>
-                <a:srgbClr val="4F81BD"/>
-              </a:solidFill>
-              <a:latin typeface="Calibri"/>
-              <a:ea typeface="ＭＳ ゴシック"/>
-            </a:endParaRPr>
-          </a:p>
-        </p:txBody>
-      </p:sp>
-      <p:sp>
-        <p:nvSpPr>
-          <p:cNvPr id="3" name="Text Placeholder 2"/>
-          <p:cNvSpPr>
-            <a:spLocks noGrp="1"/>
-          </p:cNvSpPr>
-          <p:nvPr>
-            <p:ph type="body" idx="1"/>
+              <a:rPr lang="en-US" sz="3600" dirty="0"/>
+              <a:t>Knockout </a:t>
+            </a:r>
+            <a:r>
+              <a:rPr lang="en-US" sz="3600" dirty="0" smtClean="0"/>
+              <a:t>Fundamentals</a:t>
+            </a:r>
+            <a:endParaRPr lang="en-US" sz="3600" dirty="0"/>
+          </a:p>
+        </p:txBody>
+      </p:sp>
+      <p:sp>
+        <p:nvSpPr>
+          <p:cNvPr id="3" name="Subtitle 2"/>
+          <p:cNvSpPr>
+            <a:spLocks noGrp="1"/>
+          </p:cNvSpPr>
+          <p:nvPr>
+            <p:ph type="subTitle" idx="1"/>
           </p:nvPr>
         </p:nvSpPr>
         <p:spPr/>
         <p:txBody>
-          <a:bodyPr>
-            <a:normAutofit/>
-          </a:bodyPr>
-          <a:lstStyle/>
-          <a:p>
-            <a:pPr lvl="1"/>
-            <a:r>
-              <a:rPr lang="en-US" b="1" i="1" u="none" strike="noStrike" baseline="0" dirty="0" smtClean="0">
-                <a:solidFill>
-                  <a:srgbClr val="4F81BD"/>
-                </a:solidFill>
-                <a:latin typeface="Calibri"/>
-                <a:ea typeface="ＭＳ ゴシック"/>
-              </a:rPr>
-              <a:t>So now what do you do with these view-models and observables? That’s where data-binds come into play.</a:t>
-            </a:r>
-          </a:p>
-          <a:p>
-            <a:pPr lvl="3"/>
-            <a:r>
-              <a:rPr lang="en-US" b="0" i="0" u="none" strike="noStrike" baseline="0" dirty="0" smtClean="0">
-                <a:solidFill>
-                  <a:srgbClr val="243F60"/>
-                </a:solidFill>
-                <a:latin typeface="Calibri"/>
-                <a:ea typeface="ＭＳ ゴシック"/>
-              </a:rPr>
-              <a:t>Just add a new data</a:t>
-            </a:r>
-            <a:r>
-              <a:rPr lang="en-US" b="0" i="0" u="none" strike="noStrike" baseline="0" smtClean="0">
-                <a:solidFill>
-                  <a:srgbClr val="243F60"/>
-                </a:solidFill>
-                <a:latin typeface="Calibri"/>
-                <a:ea typeface="ＭＳ ゴシック"/>
-              </a:rPr>
-              <a:t>-bind attribute </a:t>
-            </a:r>
-            <a:r>
-              <a:rPr lang="en-US" b="0" i="0" u="none" strike="noStrike" baseline="0" dirty="0" smtClean="0">
-                <a:solidFill>
-                  <a:srgbClr val="243F60"/>
-                </a:solidFill>
-                <a:latin typeface="Calibri"/>
-                <a:ea typeface="ＭＳ ゴシック"/>
-              </a:rPr>
-              <a:t>to any HTML </a:t>
-            </a:r>
-            <a:r>
-              <a:rPr lang="en-US" dirty="0">
-                <a:solidFill>
-                  <a:srgbClr val="243F60"/>
-                </a:solidFill>
-                <a:latin typeface="Calibri"/>
-                <a:ea typeface="ＭＳ ゴシック"/>
-              </a:rPr>
-              <a:t>tag. </a:t>
-            </a:r>
-            <a:r>
-              <a:rPr lang="en-US" dirty="0" smtClean="0">
-                <a:solidFill>
-                  <a:srgbClr val="243F60"/>
-                </a:solidFill>
-                <a:latin typeface="Calibri"/>
-                <a:ea typeface="ＭＳ ゴシック"/>
-              </a:rPr>
-              <a:t>❑</a:t>
-            </a:r>
-            <a:r>
-              <a:rPr lang="en-US" sz="1400" i="1" dirty="0" smtClean="0">
-                <a:solidFill>
-                  <a:srgbClr val="A6A6A6"/>
-                </a:solidFill>
-                <a:latin typeface="Calibri"/>
-                <a:ea typeface="ＭＳ ゴシック"/>
-              </a:rPr>
-              <a:t>see </a:t>
-            </a:r>
-            <a:r>
-              <a:rPr lang="en-US" sz="1400" i="1" dirty="0" err="1" smtClean="0">
-                <a:solidFill>
-                  <a:srgbClr val="A6A6A6"/>
-                </a:solidFill>
-                <a:latin typeface="Calibri"/>
-                <a:ea typeface="ＭＳ ゴシック"/>
-              </a:rPr>
-              <a:t>dataBind.html</a:t>
-            </a:r>
-            <a:endParaRPr lang="en-US" sz="1400" b="0" i="1" u="none" strike="noStrike" baseline="0" dirty="0" smtClean="0">
-              <a:solidFill>
-                <a:srgbClr val="A6A6A6"/>
-              </a:solidFill>
-              <a:latin typeface="Calibri"/>
-              <a:ea typeface="ＭＳ ゴシック"/>
-            </a:endParaRPr>
-          </a:p>
-          <a:p>
-            <a:pPr marR="0" lvl="3" rtl="0"/>
-            <a:r>
-              <a:rPr lang="en-US" b="0" i="0" u="none" strike="noStrike" baseline="0" dirty="0" smtClean="0">
-                <a:solidFill>
-                  <a:srgbClr val="243F60"/>
-                </a:solidFill>
-                <a:latin typeface="Calibri"/>
-                <a:ea typeface="ＭＳ ゴシック"/>
-              </a:rPr>
-              <a:t>What this allows you to do is any time “</a:t>
-            </a:r>
-            <a:r>
-              <a:rPr lang="en-US" b="0" i="0" u="none" strike="noStrike" baseline="0" dirty="0" err="1" smtClean="0">
-                <a:solidFill>
-                  <a:srgbClr val="243F60"/>
-                </a:solidFill>
-                <a:latin typeface="Calibri"/>
-                <a:ea typeface="ＭＳ ゴシック"/>
-              </a:rPr>
-              <a:t>firstName</a:t>
-            </a:r>
-            <a:r>
-              <a:rPr lang="en-US" b="0" i="0" u="none" strike="noStrike" baseline="0" dirty="0" smtClean="0">
-                <a:solidFill>
-                  <a:srgbClr val="243F60"/>
-                </a:solidFill>
-                <a:latin typeface="Calibri"/>
-                <a:ea typeface="ＭＳ ゴシック"/>
-              </a:rPr>
-              <a:t>” changes all elements that are bound to it will update automatically. There’s no need to write any additional code to listen for changes or make updates.</a:t>
-            </a:r>
-          </a:p>
-          <a:p>
-            <a:pPr marR="0" lvl="3" rtl="0"/>
-            <a:r>
-              <a:rPr lang="en-US" b="0" i="0" u="none" strike="noStrike" baseline="0" dirty="0" smtClean="0">
-                <a:solidFill>
-                  <a:srgbClr val="243F60"/>
-                </a:solidFill>
-                <a:latin typeface="Calibri"/>
-                <a:ea typeface="ＭＳ ゴシック"/>
-              </a:rPr>
-              <a:t>It may seem counterintuitive to add all this extra markup to you tags, but what you gain by adding it offsets the additional code.</a:t>
+          <a:bodyPr/>
+          <a:lstStyle/>
+          <a:p>
+            <a:r>
+              <a:rPr lang="en-US" i="1" dirty="0"/>
+              <a:t>View Models, Observables and Data-binds</a:t>
             </a:r>
           </a:p>
         </p:txBody>
@@ -6365,7 +6534,7 @@
     </p:spTree>
     <p:extLst>
       <p:ext uri="{BB962C8B-B14F-4D97-AF65-F5344CB8AC3E}">
-        <p14:creationId xmlns:p14="http://schemas.microsoft.com/office/powerpoint/2010/main" val="2548166475"/>
+        <p14:creationId xmlns:p14="http://schemas.microsoft.com/office/powerpoint/2010/main" val="1473792740"/>
       </p:ext>
     </p:extLst>
   </p:cSld>
@@ -6406,7 +6575,7 @@
             <a:spLocks noGrp="1"/>
           </p:cNvSpPr>
           <p:nvPr>
-            <p:ph type="ctrTitle"/>
+            <p:ph type="title"/>
           </p:nvPr>
         </p:nvSpPr>
         <p:spPr/>
@@ -6414,22 +6583,28 @@
           <a:bodyPr/>
           <a:lstStyle/>
           <a:p>
-            <a:r>
-              <a:rPr lang="en-US" sz="3600" dirty="0" err="1" smtClean="0"/>
-              <a:t>Templating</a:t>
-            </a:r>
-            <a:endParaRPr lang="en-US" sz="3600" dirty="0"/>
-          </a:p>
-        </p:txBody>
-      </p:sp>
-      <p:sp>
-        <p:nvSpPr>
-          <p:cNvPr id="3" name="Subtitle 2"/>
-          <p:cNvSpPr>
-            <a:spLocks noGrp="1"/>
-          </p:cNvSpPr>
-          <p:nvPr>
-            <p:ph type="subTitle" idx="1"/>
+            <a:pPr marR="0" rtl="0"/>
+            <a:r>
+              <a:rPr lang="en-US" b="1" i="0" u="none" strike="noStrike" baseline="0" smtClean="0">
+                <a:solidFill>
+                  <a:srgbClr val="345A8A"/>
+                </a:solidFill>
+                <a:latin typeface="Calibri"/>
+                <a:ea typeface="ＭＳ ゴシック"/>
+              </a:rPr>
+              <a:t> View Models</a:t>
+            </a:r>
+          </a:p>
+        </p:txBody>
+      </p:sp>
+      <p:sp>
+        <p:nvSpPr>
+          <p:cNvPr id="3" name="Text Placeholder 2"/>
+          <p:cNvSpPr>
+            <a:spLocks noGrp="1"/>
+          </p:cNvSpPr>
+          <p:nvPr>
+            <p:ph type="body" idx="1"/>
           </p:nvPr>
         </p:nvSpPr>
         <p:spPr/>
@@ -6437,18 +6612,193 @@
           <a:bodyPr/>
           <a:lstStyle/>
           <a:p>
-            <a:r>
-              <a:rPr lang="en-US" dirty="0" smtClean="0"/>
-              <a:t>Reusing your code.</a:t>
-            </a:r>
-            <a:endParaRPr lang="en-US" dirty="0"/>
+            <a:pPr lvl="0"/>
+            <a:r>
+              <a:rPr lang="en-US" b="1" i="0" u="none" strike="noStrike" baseline="0" dirty="0" smtClean="0">
+                <a:solidFill>
+                  <a:srgbClr val="4F81BD"/>
+                </a:solidFill>
+                <a:latin typeface="Calibri"/>
+                <a:ea typeface="ＭＳ ゴシック"/>
+              </a:rPr>
+              <a:t>View Models are just data structures to organize your observables and various other parts of your JavaScript, typically as a JSON object </a:t>
+            </a:r>
+            <a:r>
+              <a:rPr lang="en-US" i="1" dirty="0">
+                <a:solidFill>
+                  <a:schemeClr val="tx1"/>
+                </a:solidFill>
+                <a:latin typeface="Calibri"/>
+                <a:ea typeface="ＭＳ ゴシック"/>
+              </a:rPr>
+              <a:t>❑ </a:t>
+            </a:r>
+            <a:r>
+              <a:rPr lang="en-US" sz="1400" i="1" dirty="0">
+                <a:solidFill>
+                  <a:schemeClr val="bg1">
+                    <a:lumMod val="65000"/>
+                  </a:schemeClr>
+                </a:solidFill>
+                <a:latin typeface="Calibri"/>
+                <a:ea typeface="ＭＳ ゴシック"/>
+              </a:rPr>
+              <a:t>see </a:t>
+            </a:r>
+            <a:r>
+              <a:rPr lang="en-US" sz="1400" i="1" dirty="0" err="1" smtClean="0">
+                <a:solidFill>
+                  <a:schemeClr val="bg1">
+                    <a:lumMod val="65000"/>
+                  </a:schemeClr>
+                </a:solidFill>
+                <a:latin typeface="Calibri"/>
+                <a:ea typeface="ＭＳ ゴシック"/>
+              </a:rPr>
+              <a:t>jsonViewModel_basic.js</a:t>
+            </a:r>
+            <a:endParaRPr lang="en-US" sz="1400" b="1" i="0" u="none" strike="noStrike" baseline="0" dirty="0" smtClean="0">
+              <a:solidFill>
+                <a:srgbClr val="4F81BD"/>
+              </a:solidFill>
+              <a:latin typeface="Calibri"/>
+              <a:ea typeface="ＭＳ ゴシック"/>
+            </a:endParaRPr>
+          </a:p>
+          <a:p>
+            <a:pPr lvl="1"/>
+            <a:r>
+              <a:rPr lang="en-US" b="0" i="1" u="none" strike="noStrike" baseline="0" dirty="0" smtClean="0">
+                <a:solidFill>
+                  <a:schemeClr val="tx1"/>
+                </a:solidFill>
+                <a:latin typeface="Calibri"/>
+                <a:ea typeface="ＭＳ ゴシック"/>
+              </a:rPr>
+              <a:t>But </a:t>
+            </a:r>
+            <a:r>
+              <a:rPr lang="en-US" b="0" i="1" u="none" strike="noStrike" baseline="0" dirty="0" smtClean="0">
+                <a:solidFill>
+                  <a:schemeClr val="tx1"/>
+                </a:solidFill>
+                <a:latin typeface="Calibri"/>
+                <a:ea typeface="ＭＳ ゴシック"/>
+              </a:rPr>
+              <a:t>a</a:t>
+            </a:r>
+            <a:r>
+              <a:rPr lang="en-US" b="0" i="1" u="none" strike="noStrike" dirty="0" smtClean="0">
+                <a:solidFill>
+                  <a:schemeClr val="tx1"/>
+                </a:solidFill>
+                <a:latin typeface="Calibri"/>
+                <a:ea typeface="ＭＳ ゴシック"/>
+              </a:rPr>
+              <a:t> simple function/variable </a:t>
+            </a:r>
+            <a:r>
+              <a:rPr lang="en-US" b="0" i="1" u="none" strike="noStrike" dirty="0" smtClean="0">
+                <a:solidFill>
+                  <a:schemeClr val="tx1"/>
+                </a:solidFill>
+                <a:latin typeface="Calibri"/>
+                <a:ea typeface="ＭＳ ゴシック"/>
+              </a:rPr>
+              <a:t>declaration also works</a:t>
+            </a:r>
+            <a:r>
+              <a:rPr lang="en-US" i="1" dirty="0" smtClean="0">
+                <a:solidFill>
+                  <a:schemeClr val="tx1"/>
+                </a:solidFill>
+                <a:latin typeface="Calibri"/>
+                <a:ea typeface="ＭＳ ゴシック"/>
+              </a:rPr>
+              <a:t/>
+            </a:r>
+            <a:br>
+              <a:rPr lang="en-US" i="1" dirty="0" smtClean="0">
+                <a:solidFill>
+                  <a:schemeClr val="tx1"/>
+                </a:solidFill>
+                <a:latin typeface="Calibri"/>
+                <a:ea typeface="ＭＳ ゴシック"/>
+              </a:rPr>
+            </a:br>
+            <a:r>
+              <a:rPr lang="en-US" i="1" dirty="0" smtClean="0">
+                <a:solidFill>
+                  <a:schemeClr val="tx1"/>
+                </a:solidFill>
+                <a:latin typeface="Calibri"/>
+                <a:ea typeface="ＭＳ ゴシック"/>
+              </a:rPr>
+              <a:t>❑ </a:t>
+            </a:r>
+            <a:r>
+              <a:rPr lang="en-US" sz="1400" i="1" dirty="0">
+                <a:solidFill>
+                  <a:schemeClr val="bg1">
+                    <a:lumMod val="65000"/>
+                  </a:schemeClr>
+                </a:solidFill>
+                <a:latin typeface="Calibri"/>
+                <a:ea typeface="ＭＳ ゴシック"/>
+              </a:rPr>
+              <a:t>see </a:t>
+            </a:r>
+            <a:r>
+              <a:rPr lang="en-US" sz="1400" i="1" dirty="0" err="1" smtClean="0">
+                <a:solidFill>
+                  <a:schemeClr val="bg1">
+                    <a:lumMod val="65000"/>
+                  </a:schemeClr>
+                </a:solidFill>
+                <a:latin typeface="Calibri"/>
+                <a:ea typeface="ＭＳ ゴシック"/>
+              </a:rPr>
+              <a:t>functionViewModel.js</a:t>
+            </a:r>
+            <a:endParaRPr lang="en-US" b="0" i="1" u="none" strike="noStrike" dirty="0" smtClean="0">
+              <a:solidFill>
+                <a:schemeClr val="tx1"/>
+              </a:solidFill>
+              <a:latin typeface="Calibri"/>
+              <a:ea typeface="ＭＳ ゴシック"/>
+            </a:endParaRPr>
+          </a:p>
+          <a:p>
+            <a:pPr lvl="0"/>
+            <a:r>
+              <a:rPr lang="en-US" b="1" dirty="0">
+                <a:solidFill>
+                  <a:srgbClr val="4F81BD"/>
+                </a:solidFill>
+                <a:latin typeface="Calibri"/>
+                <a:ea typeface="ＭＳ ゴシック"/>
+              </a:rPr>
+              <a:t>This allows you to set up a hierarchy for you to organize how your each component of your data should relate to each other</a:t>
+            </a:r>
+          </a:p>
+          <a:p>
+            <a:pPr marL="0" indent="0">
+              <a:buNone/>
+            </a:pPr>
+            <a:endParaRPr lang="en-US" b="0" i="1" u="none" strike="noStrike" baseline="0" dirty="0" smtClean="0">
+              <a:solidFill>
+                <a:schemeClr val="tx1"/>
+              </a:solidFill>
+              <a:latin typeface="Calibri"/>
+              <a:ea typeface="ＭＳ ゴシック"/>
+            </a:endParaRPr>
           </a:p>
         </p:txBody>
       </p:sp>
     </p:spTree>
     <p:extLst>
       <p:ext uri="{BB962C8B-B14F-4D97-AF65-F5344CB8AC3E}">
-        <p14:creationId xmlns:p14="http://schemas.microsoft.com/office/powerpoint/2010/main" val="2349990538"/>
+        <p14:creationId xmlns:p14="http://schemas.microsoft.com/office/powerpoint/2010/main" val="1939111276"/>
       </p:ext>
     </p:extLst>
   </p:cSld>
@@ -6492,89 +6842,128 @@
             <p:ph type="title"/>
           </p:nvPr>
         </p:nvSpPr>
-        <p:spPr>
-          <a:xfrm>
-            <a:off x="549275" y="-800183"/>
-            <a:ext cx="8042276" cy="3152475"/>
-          </a:xfrm>
-        </p:spPr>
+        <p:spPr/>
+        <p:txBody>
+          <a:bodyPr/>
+          <a:lstStyle/>
+          <a:p>
+            <a:pPr marR="0" rtl="0"/>
+            <a:r>
+              <a:rPr lang="en-US" b="1" i="0" u="none" strike="noStrike" baseline="0" dirty="0" smtClean="0">
+                <a:solidFill>
+                  <a:srgbClr val="345A8A"/>
+                </a:solidFill>
+                <a:latin typeface="Calibri"/>
+                <a:ea typeface="ＭＳ ゴシック"/>
+              </a:rPr>
+              <a:t>Observables</a:t>
+            </a:r>
+          </a:p>
+        </p:txBody>
+      </p:sp>
+      <p:sp>
+        <p:nvSpPr>
+          <p:cNvPr id="3" name="Text Placeholder 2"/>
+          <p:cNvSpPr>
+            <a:spLocks noGrp="1"/>
+          </p:cNvSpPr>
+          <p:nvPr>
+            <p:ph type="body" idx="1"/>
+          </p:nvPr>
+        </p:nvSpPr>
+        <p:spPr/>
         <p:txBody>
           <a:bodyPr>
             <a:normAutofit/>
           </a:bodyPr>
           <a:lstStyle/>
           <a:p>
-            <a:pPr marR="0" rtl="0"/>
+            <a:pPr marR="0" lvl="0" rtl="0"/>
             <a:r>
               <a:rPr lang="en-US" b="1" i="0" u="none" strike="noStrike" baseline="0" dirty="0" smtClean="0">
                 <a:solidFill>
-                  <a:srgbClr val="345A8A"/>
-                </a:solidFill>
-                <a:latin typeface="Calibri"/>
-                <a:ea typeface="ＭＳ ゴシック"/>
-              </a:rPr>
-              <a:t>KO </a:t>
-            </a:r>
-            <a:r>
-              <a:rPr lang="en-US" b="1" i="0" u="none" strike="noStrike" baseline="0" dirty="0" err="1" smtClean="0">
-                <a:solidFill>
-                  <a:srgbClr val="345A8A"/>
-                </a:solidFill>
-                <a:latin typeface="Calibri"/>
-                <a:ea typeface="ＭＳ ゴシック"/>
-              </a:rPr>
-              <a:t>Templating</a:t>
-            </a:r>
+                  <a:srgbClr val="4F81BD"/>
+                </a:solidFill>
+                <a:latin typeface="Calibri"/>
+                <a:ea typeface="ＭＳ ゴシック"/>
+              </a:rPr>
+              <a:t>Typically they are just containers for data, like variables or objects</a:t>
+            </a:r>
+          </a:p>
+          <a:p>
+            <a:pPr lvl="1"/>
             <a:r>
               <a:rPr lang="en-US" b="1" i="0" u="none" strike="noStrike" baseline="0" dirty="0" smtClean="0">
                 <a:solidFill>
-                  <a:srgbClr val="345A8A"/>
-                </a:solidFill>
-                <a:latin typeface="Calibri"/>
-                <a:ea typeface="ＭＳ ゴシック"/>
-              </a:rPr>
-              <a:t> offers a powerful way to reuse and condense your code base</a:t>
-            </a:r>
-            <a:endParaRPr lang="en-US" b="1" i="0" u="none" strike="noStrike" baseline="0" dirty="0" smtClean="0">
+                  <a:srgbClr val="4F81BD"/>
+                </a:solidFill>
+                <a:latin typeface="Calibri"/>
+                <a:ea typeface="ＭＳ ゴシック"/>
+              </a:rPr>
+              <a:t>The main difference is that they come with built-in listeners that will </a:t>
+            </a:r>
+            <a:r>
+              <a:rPr lang="en-US" b="1" dirty="0" smtClean="0">
+                <a:solidFill>
+                  <a:srgbClr val="4F81BD"/>
+                </a:solidFill>
+                <a:latin typeface="Calibri"/>
+                <a:ea typeface="ＭＳ ゴシック"/>
+              </a:rPr>
+              <a:t>automatically </a:t>
+            </a:r>
+            <a:r>
+              <a:rPr lang="en-US" b="1" i="0" u="none" strike="noStrike" baseline="0" dirty="0" smtClean="0">
+                <a:solidFill>
+                  <a:srgbClr val="4F81BD"/>
+                </a:solidFill>
+                <a:latin typeface="Calibri"/>
+                <a:ea typeface="ＭＳ ゴシック"/>
+              </a:rPr>
+              <a:t>notify any other part of your data or display if that value changes</a:t>
+            </a:r>
+          </a:p>
+          <a:p>
+            <a:pPr lvl="2"/>
+            <a:r>
+              <a:rPr lang="en-US" b="1" i="1" u="none" strike="noStrike" baseline="0" dirty="0" smtClean="0">
+                <a:solidFill>
+                  <a:srgbClr val="4F81BD"/>
+                </a:solidFill>
+                <a:latin typeface="Calibri"/>
+                <a:ea typeface="ＭＳ ゴシック"/>
+              </a:rPr>
+              <a:t>Creating an observable is </a:t>
+            </a:r>
+            <a:r>
+              <a:rPr lang="en-US" b="1" i="1" dirty="0">
+                <a:solidFill>
+                  <a:srgbClr val="4F81BD"/>
+                </a:solidFill>
+                <a:latin typeface="Calibri"/>
+                <a:ea typeface="ＭＳ ゴシック"/>
+              </a:rPr>
+              <a:t>simple ❑</a:t>
+            </a:r>
+            <a:endParaRPr lang="en-US" b="1" i="1" u="none" strike="noStrike" baseline="0" dirty="0" smtClean="0">
               <a:solidFill>
-                <a:srgbClr val="345A8A"/>
+                <a:srgbClr val="4F81BD"/>
               </a:solidFill>
-              <a:latin typeface="Times New Roman"/>
+              <a:latin typeface="Calibri"/>
               <a:ea typeface="ＭＳ ゴシック"/>
             </a:endParaRPr>
           </a:p>
-        </p:txBody>
-      </p:sp>
-      <p:sp>
-        <p:nvSpPr>
-          <p:cNvPr id="3" name="Text Placeholder 2"/>
-          <p:cNvSpPr>
-            <a:spLocks noGrp="1"/>
-          </p:cNvSpPr>
-          <p:nvPr>
-            <p:ph type="body" idx="1"/>
-          </p:nvPr>
-        </p:nvSpPr>
-        <p:spPr>
-          <a:xfrm>
-            <a:off x="457200" y="2606253"/>
-            <a:ext cx="8229600" cy="3519910"/>
-          </a:xfrm>
-        </p:spPr>
-        <p:txBody>
-          <a:bodyPr/>
-          <a:lstStyle/>
-          <a:p>
-            <a:pPr marR="0" lvl="0" rtl="0"/>
-            <a:r>
-              <a:rPr lang="en-US" b="1" i="0" u="none" strike="noStrike" baseline="0" dirty="0" smtClean="0">
+          <a:p>
+            <a:pPr marR="0" lvl="2" rtl="0"/>
+            <a:r>
+              <a:rPr lang="en-US" b="1" i="1" u="none" strike="noStrike" baseline="0" dirty="0" smtClean="0">
                 <a:solidFill>
                   <a:srgbClr val="4F81BD"/>
                 </a:solidFill>
                 <a:latin typeface="Calibri"/>
                 <a:ea typeface="ＭＳ ゴシック"/>
               </a:rPr>
-              <a:t>KO allows other template engines, but KO has a very handy built in template system</a:t>
+              <a:t>There are also computed observables that allow you set an observable based off of the result of a function and observable arrays, but I won’t go into detail about those</a:t>
             </a:r>
           </a:p>
         </p:txBody>
@@ -6582,7 +6971,7 @@
     </p:spTree>
     <p:extLst>
       <p:ext uri="{BB962C8B-B14F-4D97-AF65-F5344CB8AC3E}">
-        <p14:creationId xmlns:p14="http://schemas.microsoft.com/office/powerpoint/2010/main" val="2168605684"/>
+        <p14:creationId xmlns:p14="http://schemas.microsoft.com/office/powerpoint/2010/main" val="3747089053"/>
       </p:ext>
     </p:extLst>
   </p:cSld>
@@ -6631,94 +7020,17 @@
           <a:bodyPr/>
           <a:lstStyle/>
           <a:p>
-            <a:pPr marR="0" rtl="0"/>
-            <a:r>
-              <a:rPr lang="en-US" b="1" i="0" u="none" strike="noStrike" baseline="0" dirty="0" smtClean="0">
+            <a:r>
+              <a:rPr lang="en-US" b="1" dirty="0" smtClean="0">
                 <a:solidFill>
                   <a:srgbClr val="345A8A"/>
                 </a:solidFill>
                 <a:latin typeface="Calibri"/>
                 <a:ea typeface="ＭＳ ゴシック"/>
               </a:rPr>
-              <a:t>Adding a Template</a:t>
-            </a:r>
-            <a:r>
-              <a:rPr lang="en-US" b="1" i="0" u="none" strike="noStrike" dirty="0" smtClean="0">
-                <a:solidFill>
-                  <a:srgbClr val="345A8A"/>
-                </a:solidFill>
-                <a:latin typeface="Calibri"/>
-                <a:ea typeface="ＭＳ ゴシック"/>
-              </a:rPr>
-              <a:t> with KO</a:t>
-            </a:r>
-            <a:endParaRPr lang="en-US" b="1" i="0" u="none" strike="noStrike" baseline="0" dirty="0" smtClean="0">
-              <a:solidFill>
-                <a:srgbClr val="345A8A"/>
-              </a:solidFill>
-              <a:latin typeface="Calibri"/>
-              <a:ea typeface="ＭＳ ゴシック"/>
-            </a:endParaRPr>
-          </a:p>
-        </p:txBody>
-      </p:sp>
-      <p:sp>
-        <p:nvSpPr>
-          <p:cNvPr id="3" name="Text Placeholder 2"/>
-          <p:cNvSpPr>
-            <a:spLocks noGrp="1"/>
-          </p:cNvSpPr>
-          <p:nvPr>
-            <p:ph type="body" idx="1"/>
-          </p:nvPr>
-        </p:nvSpPr>
-        <p:spPr>
-          <a:xfrm>
-            <a:off x="549275" y="1600200"/>
-            <a:ext cx="8042276" cy="4731315"/>
-          </a:xfrm>
-        </p:spPr>
-        <p:txBody>
-          <a:bodyPr>
-            <a:normAutofit/>
-          </a:bodyPr>
-          <a:lstStyle/>
-          <a:p>
-            <a:pPr lvl="0"/>
-            <a:r>
-              <a:rPr lang="en-US" b="1" i="0" u="none" strike="noStrike" baseline="0" dirty="0" smtClean="0">
-                <a:solidFill>
-                  <a:srgbClr val="4F81BD"/>
-                </a:solidFill>
-                <a:latin typeface="Calibri"/>
-                <a:ea typeface="ＭＳ ゴシック"/>
-              </a:rPr>
-              <a:t>Adding a template requires 2 parts…</a:t>
-            </a:r>
-          </a:p>
-          <a:p>
-            <a:pPr lvl="0"/>
-            <a:r>
-              <a:rPr lang="en-US" b="1" i="0" u="none" strike="noStrike" baseline="0" dirty="0" smtClean="0">
-                <a:solidFill>
-                  <a:srgbClr val="4F81BD"/>
-                </a:solidFill>
-                <a:latin typeface="Calibri"/>
-                <a:ea typeface="ＭＳ ゴシック"/>
-              </a:rPr>
-              <a:t>“template” data-</a:t>
-            </a:r>
-            <a:r>
-              <a:rPr lang="en-US" b="1" dirty="0">
-                <a:solidFill>
-                  <a:srgbClr val="4F81BD"/>
-                </a:solidFill>
-                <a:latin typeface="Calibri"/>
-                <a:ea typeface="ＭＳ ゴシック"/>
-              </a:rPr>
-              <a:t>bind ❒</a:t>
-            </a:r>
-            <a:endParaRPr lang="en-US" b="1" i="0" u="none" strike="noStrike" baseline="0" dirty="0" smtClean="0">
+              <a:t>Data-Binds</a:t>
+            </a:r>
+            <a:endParaRPr lang="en-US" b="1" dirty="0">
               <a:solidFill>
                 <a:srgbClr val="4F81BD"/>
               </a:solidFill>
@@ -6726,30 +7038,91 @@
               <a:ea typeface="ＭＳ ゴシック"/>
             </a:endParaRPr>
           </a:p>
-          <a:p>
-            <a:pPr lvl="0"/>
-            <a:r>
-              <a:rPr lang="en-US" b="1" i="0" u="none" strike="noStrike" baseline="0" dirty="0" smtClean="0">
+        </p:txBody>
+      </p:sp>
+      <p:sp>
+        <p:nvSpPr>
+          <p:cNvPr id="3" name="Text Placeholder 2"/>
+          <p:cNvSpPr>
+            <a:spLocks noGrp="1"/>
+          </p:cNvSpPr>
+          <p:nvPr>
+            <p:ph type="body" idx="1"/>
+          </p:nvPr>
+        </p:nvSpPr>
+        <p:spPr/>
+        <p:txBody>
+          <a:bodyPr>
+            <a:normAutofit/>
+          </a:bodyPr>
+          <a:lstStyle/>
+          <a:p>
+            <a:pPr lvl="1"/>
+            <a:r>
+              <a:rPr lang="en-US" b="1" i="1" u="none" strike="noStrike" baseline="0" dirty="0" smtClean="0">
                 <a:solidFill>
                   <a:srgbClr val="4F81BD"/>
                 </a:solidFill>
                 <a:latin typeface="Calibri"/>
                 <a:ea typeface="ＭＳ ゴシック"/>
               </a:rPr>
-              <a:t>A custom script tag that contains your template </a:t>
-            </a:r>
-            <a:r>
-              <a:rPr lang="en-US" b="1" dirty="0">
-                <a:solidFill>
-                  <a:srgbClr val="4F81BD"/>
-                </a:solidFill>
-                <a:latin typeface="Calibri"/>
-                <a:ea typeface="ＭＳ ゴシック"/>
-              </a:rPr>
-              <a:t>content ❒ </a:t>
-            </a:r>
-            <a:r>
-              <a:rPr lang="en-US" sz="2000" i="1" dirty="0" smtClean="0">
+              <a:t>So now what do you do with these view-models and observables? That’s where data-binds come into play.</a:t>
+            </a:r>
+          </a:p>
+          <a:p>
+            <a:pPr lvl="3"/>
+            <a:r>
+              <a:rPr lang="en-US" b="0" i="0" u="none" strike="noStrike" baseline="0" dirty="0" smtClean="0">
+                <a:solidFill>
+                  <a:srgbClr val="243F60"/>
+                </a:solidFill>
+                <a:latin typeface="Calibri"/>
+                <a:ea typeface="ＭＳ ゴシック"/>
+              </a:rPr>
+              <a:t>Just add a new data</a:t>
+            </a:r>
+            <a:r>
+              <a:rPr lang="en-US" b="0" i="0" u="none" strike="noStrike" baseline="0" smtClean="0">
+                <a:solidFill>
+                  <a:srgbClr val="243F60"/>
+                </a:solidFill>
+                <a:latin typeface="Calibri"/>
+                <a:ea typeface="ＭＳ ゴシック"/>
+              </a:rPr>
+              <a:t>-bind attribute </a:t>
+            </a:r>
+            <a:r>
+              <a:rPr lang="en-US" b="0" i="0" u="none" strike="noStrike" baseline="0" dirty="0" smtClean="0">
+                <a:solidFill>
+                  <a:srgbClr val="243F60"/>
+                </a:solidFill>
+                <a:latin typeface="Calibri"/>
+                <a:ea typeface="ＭＳ ゴシック"/>
+              </a:rPr>
+              <a:t>to any HTML </a:t>
+            </a:r>
+            <a:r>
+              <a:rPr lang="en-US" dirty="0">
+                <a:solidFill>
+                  <a:srgbClr val="243F60"/>
+                </a:solidFill>
+                <a:latin typeface="Calibri"/>
+                <a:ea typeface="ＭＳ ゴシック"/>
+              </a:rPr>
+              <a:t>tag. </a:t>
+            </a:r>
+            <a:r>
+              <a:rPr lang="en-US" dirty="0" smtClean="0">
+                <a:solidFill>
+                  <a:srgbClr val="243F60"/>
+                </a:solidFill>
+                <a:latin typeface="Calibri"/>
+                <a:ea typeface="ＭＳ ゴシック"/>
+              </a:rPr>
+              <a:t>❑</a:t>
+            </a:r>
+            <a:r>
+              <a:rPr lang="en-US" sz="1400" i="1" dirty="0" smtClean="0">
                 <a:solidFill>
                   <a:srgbClr val="A6A6A6"/>
                 </a:solidFill>
@@ -6759,16 +7132,16 @@
               <a:t>see </a:t>
             </a:r>
             <a:r>
-              <a:rPr lang="en-US" sz="2000" i="1" dirty="0" err="1" smtClean="0">
+              <a:rPr lang="en-US" sz="1400" i="1" dirty="0" err="1" smtClean="0">
                 <a:solidFill>
                   <a:srgbClr val="A6A6A6"/>
                 </a:solidFill>
                 <a:latin typeface="Calibri"/>
                 <a:ea typeface="ＭＳ ゴシック"/>
               </a:rPr>
-              <a:t>templateBinding.html</a:t>
-            </a:r>
-            <a:endParaRPr lang="en-US" sz="2000" i="1" u="none" strike="noStrike" baseline="0" dirty="0" smtClean="0">
+              <a:t>dataBind.html</a:t>
+            </a:r>
+            <a:endParaRPr lang="en-US" sz="1400" b="0" i="1" u="none" strike="noStrike" baseline="0" dirty="0" smtClean="0">
               <a:solidFill>
                 <a:srgbClr val="A6A6A6"/>
               </a:solidFill>
@@ -6776,12 +7149,58 @@
               <a:ea typeface="ＭＳ ゴシック"/>
             </a:endParaRPr>
           </a:p>
+          <a:p>
+            <a:pPr marR="0" lvl="3" rtl="0"/>
+            <a:r>
+              <a:rPr lang="en-US" b="0" i="0" u="none" strike="noStrike" baseline="0" dirty="0" smtClean="0">
+                <a:solidFill>
+                  <a:srgbClr val="243F60"/>
+                </a:solidFill>
+                <a:latin typeface="Calibri"/>
+                <a:ea typeface="ＭＳ ゴシック"/>
+              </a:rPr>
+              <a:t>What this allows you to do is any time “</a:t>
+            </a:r>
+            <a:r>
+              <a:rPr lang="en-US" b="0" i="0" u="none" strike="noStrike" baseline="0" dirty="0" err="1" smtClean="0">
+                <a:solidFill>
+                  <a:srgbClr val="243F60"/>
+                </a:solidFill>
+                <a:latin typeface="Calibri"/>
+                <a:ea typeface="ＭＳ ゴシック"/>
+              </a:rPr>
+              <a:t>firstName</a:t>
+            </a:r>
+            <a:r>
+              <a:rPr lang="en-US" b="0" i="0" u="none" strike="noStrike" baseline="0" dirty="0" smtClean="0">
+                <a:solidFill>
+                  <a:srgbClr val="243F60"/>
+                </a:solidFill>
+                <a:latin typeface="Calibri"/>
+                <a:ea typeface="ＭＳ ゴシック"/>
+              </a:rPr>
+              <a:t>” changes all elements that are bound to it will update automatically. There’s no need to write any additional code to listen for changes or make updates.</a:t>
+            </a:r>
+          </a:p>
+          <a:p>
+            <a:pPr marR="0" lvl="3" rtl="0"/>
+            <a:r>
+              <a:rPr lang="en-US" b="0" i="0" u="none" strike="noStrike" baseline="0" dirty="0" smtClean="0">
+                <a:solidFill>
+                  <a:srgbClr val="243F60"/>
+                </a:solidFill>
+                <a:latin typeface="Calibri"/>
+                <a:ea typeface="ＭＳ ゴシック"/>
+              </a:rPr>
+              <a:t>It may seem counterintuitive to add all this extra markup to you tags, but what you gain by adding it offsets the additional code.</a:t>
+            </a:r>
+          </a:p>
         </p:txBody>
       </p:sp>
     </p:spTree>
     <p:extLst>
       <p:ext uri="{BB962C8B-B14F-4D97-AF65-F5344CB8AC3E}">
-        <p14:creationId xmlns:p14="http://schemas.microsoft.com/office/powerpoint/2010/main" val="910141512"/>
+        <p14:creationId xmlns:p14="http://schemas.microsoft.com/office/powerpoint/2010/main" val="2548166475"/>
       </p:ext>
     </p:extLst>
   </p:cSld>

</xml_diff>